<commit_message>
Pattern Matching ausgebaut, Formatierungen
</commit_message>
<xml_diff>
--- a/20151202/Einführung20151202.pptx
+++ b/20151202/Einführung20151202.pptx
@@ -5,7 +5,7 @@
     <p:sldMasterId id="2147483648" r:id="rId1"/>
   </p:sldMasterIdLst>
   <p:notesMasterIdLst>
-    <p:notesMasterId r:id="rId20"/>
+    <p:notesMasterId r:id="rId21"/>
   </p:notesMasterIdLst>
   <p:sldIdLst>
     <p:sldId id="256" r:id="rId2"/>
@@ -15,17 +15,18 @@
     <p:sldId id="289" r:id="rId6"/>
     <p:sldId id="275" r:id="rId7"/>
     <p:sldId id="259" r:id="rId8"/>
-    <p:sldId id="291" r:id="rId9"/>
-    <p:sldId id="292" r:id="rId10"/>
-    <p:sldId id="287" r:id="rId11"/>
-    <p:sldId id="285" r:id="rId12"/>
-    <p:sldId id="260" r:id="rId13"/>
-    <p:sldId id="293" r:id="rId14"/>
-    <p:sldId id="261" r:id="rId15"/>
-    <p:sldId id="263" r:id="rId16"/>
-    <p:sldId id="294" r:id="rId17"/>
-    <p:sldId id="267" r:id="rId18"/>
-    <p:sldId id="268" r:id="rId19"/>
+    <p:sldId id="295" r:id="rId9"/>
+    <p:sldId id="291" r:id="rId10"/>
+    <p:sldId id="292" r:id="rId11"/>
+    <p:sldId id="287" r:id="rId12"/>
+    <p:sldId id="285" r:id="rId13"/>
+    <p:sldId id="260" r:id="rId14"/>
+    <p:sldId id="293" r:id="rId15"/>
+    <p:sldId id="261" r:id="rId16"/>
+    <p:sldId id="263" r:id="rId17"/>
+    <p:sldId id="294" r:id="rId18"/>
+    <p:sldId id="267" r:id="rId19"/>
+    <p:sldId id="268" r:id="rId20"/>
   </p:sldIdLst>
   <p:sldSz cx="9144000" cy="6858000" type="screen4x3"/>
   <p:notesSz cx="6858000" cy="9144000"/>
@@ -225,7 +226,7 @@
           <a:p>
             <a:fld id="{8583A242-7230-4070-B2AF-A33EB304C08D}" type="datetimeFigureOut">
               <a:rPr lang="en-US" smtClean="0"/>
-              <a:t>11/23/2015</a:t>
+              <a:t>11/24/2015</a:t>
             </a:fld>
             <a:endParaRPr lang="en-US"/>
           </a:p>
@@ -690,7 +691,7 @@
       </p:grpSpPr>
       <p:sp>
         <p:nvSpPr>
-          <p:cNvPr id="2" name="Folienbildplatzhalter 1"/>
+          <p:cNvPr id="2" name="Slide Image Placeholder 1"/>
           <p:cNvSpPr>
             <a:spLocks noGrp="1" noRot="1" noChangeAspect="1"/>
           </p:cNvSpPr>
@@ -702,7 +703,7 @@
       </p:sp>
       <p:sp>
         <p:nvSpPr>
-          <p:cNvPr id="3" name="Notizenplatzhalter 2"/>
+          <p:cNvPr id="3" name="Notes Placeholder 2"/>
           <p:cNvSpPr>
             <a:spLocks noGrp="1"/>
           </p:cNvSpPr>
@@ -715,21 +716,195 @@
           <a:bodyPr/>
           <a:lstStyle/>
           <a:p>
+            <a:pPr marL="0" marR="0" indent="0" algn="l" defTabSz="914400" rtl="0" eaLnBrk="1" fontAlgn="auto" latinLnBrk="0" hangingPunct="1">
+              <a:lnSpc>
+                <a:spcPct val="100000"/>
+              </a:lnSpc>
+              <a:spcBef>
+                <a:spcPts val="0"/>
+              </a:spcBef>
+              <a:spcAft>
+                <a:spcPts val="0"/>
+              </a:spcAft>
+              <a:buClrTx/>
+              <a:buSzTx/>
+              <a:buFontTx/>
+              <a:buNone/>
+              <a:tabLst/>
+              <a:defRPr/>
+            </a:pPr>
             <a:r>
               <a:rPr lang="de-DE" dirty="0" smtClean="0"/>
-              <a:t>Warum dieses Thema? Weil es überraschend viel</a:t>
+              <a:t>F# ist „</a:t>
+            </a:r>
+            <a:r>
+              <a:rPr lang="de-DE" dirty="0" err="1" smtClean="0"/>
+              <a:t>functional</a:t>
+            </a:r>
+            <a:r>
+              <a:rPr lang="de-DE" dirty="0" smtClean="0"/>
+              <a:t> </a:t>
+            </a:r>
+            <a:r>
+              <a:rPr lang="de-DE" dirty="0" err="1" smtClean="0"/>
+              <a:t>first</a:t>
+            </a:r>
+            <a:r>
+              <a:rPr lang="de-DE" dirty="0" smtClean="0"/>
+              <a:t>“, die Konstrukte der OO Welt stehen mir weiterhin zur</a:t>
             </a:r>
             <a:r>
               <a:rPr lang="de-DE" baseline="0" dirty="0" smtClean="0"/>
-              <a:t> Nutzen brachte und weil es mit DDD gut zusammenpasst</a:t>
-            </a:r>
-            <a:endParaRPr lang="de-DE" dirty="0"/>
+              <a:t> Verfügung in F#.</a:t>
+            </a:r>
+          </a:p>
+          <a:p>
+            <a:pPr marL="0" marR="0" indent="0" algn="l" defTabSz="914400" rtl="0" eaLnBrk="1" fontAlgn="auto" latinLnBrk="0" hangingPunct="1">
+              <a:lnSpc>
+                <a:spcPct val="100000"/>
+              </a:lnSpc>
+              <a:spcBef>
+                <a:spcPts val="0"/>
+              </a:spcBef>
+              <a:spcAft>
+                <a:spcPts val="0"/>
+              </a:spcAft>
+              <a:buClrTx/>
+              <a:buSzTx/>
+              <a:buFontTx/>
+              <a:buNone/>
+              <a:tabLst/>
+              <a:defRPr/>
+            </a:pPr>
+            <a:endParaRPr lang="de-DE" baseline="0" dirty="0" smtClean="0"/>
+          </a:p>
+          <a:p>
+            <a:pPr marL="0" marR="0" indent="0" algn="l" defTabSz="914400" rtl="0" eaLnBrk="1" fontAlgn="auto" latinLnBrk="0" hangingPunct="1">
+              <a:lnSpc>
+                <a:spcPct val="100000"/>
+              </a:lnSpc>
+              <a:spcBef>
+                <a:spcPts val="0"/>
+              </a:spcBef>
+              <a:spcAft>
+                <a:spcPts val="0"/>
+              </a:spcAft>
+              <a:buClrTx/>
+              <a:buSzTx/>
+              <a:buFontTx/>
+              <a:buNone/>
+              <a:tabLst/>
+              <a:defRPr/>
+            </a:pPr>
+            <a:r>
+              <a:rPr lang="de-DE" baseline="0" dirty="0" smtClean="0"/>
+              <a:t>Stärker betonen, dass (sobald funktionale Konstrukte in der Sprache bereitstehen), diese den Code vereinfachen können</a:t>
+            </a:r>
+          </a:p>
+          <a:p>
+            <a:pPr marL="0" marR="0" indent="0" algn="l" defTabSz="914400" rtl="0" eaLnBrk="1" fontAlgn="auto" latinLnBrk="0" hangingPunct="1">
+              <a:lnSpc>
+                <a:spcPct val="100000"/>
+              </a:lnSpc>
+              <a:spcBef>
+                <a:spcPts val="0"/>
+              </a:spcBef>
+              <a:spcAft>
+                <a:spcPts val="0"/>
+              </a:spcAft>
+              <a:buClrTx/>
+              <a:buSzTx/>
+              <a:buFontTx/>
+              <a:buNone/>
+              <a:tabLst/>
+              <a:defRPr/>
+            </a:pPr>
+            <a:endParaRPr lang="de-DE" baseline="0" dirty="0" smtClean="0"/>
+          </a:p>
+          <a:p>
+            <a:pPr marL="0" marR="0" indent="0" algn="l" defTabSz="914400" rtl="0" eaLnBrk="1" fontAlgn="auto" latinLnBrk="0" hangingPunct="1">
+              <a:lnSpc>
+                <a:spcPct val="100000"/>
+              </a:lnSpc>
+              <a:spcBef>
+                <a:spcPts val="0"/>
+              </a:spcBef>
+              <a:spcAft>
+                <a:spcPts val="0"/>
+              </a:spcAft>
+              <a:buClrTx/>
+              <a:buSzTx/>
+              <a:buFontTx/>
+              <a:buNone/>
+              <a:tabLst/>
+              <a:defRPr/>
+            </a:pPr>
+            <a:r>
+              <a:rPr lang="de-DE" baseline="0" dirty="0" smtClean="0"/>
+              <a:t>Direkt die Frage beantworten – Warum FP? -&gt; </a:t>
+            </a:r>
+            <a:r>
+              <a:rPr lang="de-DE" baseline="0" dirty="0" err="1" smtClean="0"/>
+              <a:t>Immutability</a:t>
+            </a:r>
+            <a:r>
+              <a:rPr lang="de-DE" baseline="0" dirty="0" smtClean="0"/>
+              <a:t>, Making invalid </a:t>
+            </a:r>
+            <a:r>
+              <a:rPr lang="de-DE" baseline="0" dirty="0" err="1" smtClean="0"/>
+              <a:t>state</a:t>
+            </a:r>
+            <a:r>
+              <a:rPr lang="de-DE" baseline="0" dirty="0" smtClean="0"/>
+              <a:t> </a:t>
+            </a:r>
+            <a:r>
+              <a:rPr lang="de-DE" baseline="0" dirty="0" err="1" smtClean="0"/>
+              <a:t>un-representable</a:t>
+            </a:r>
+            <a:r>
+              <a:rPr lang="de-DE" baseline="0" dirty="0" smtClean="0"/>
+              <a:t> (Muss ich mir für das Beispiel mit DDD aufheben!), high-oder </a:t>
+            </a:r>
+            <a:r>
+              <a:rPr lang="de-DE" baseline="0" dirty="0" err="1" smtClean="0"/>
+              <a:t>functions</a:t>
+            </a:r>
+            <a:r>
+              <a:rPr lang="de-DE" baseline="0" dirty="0" smtClean="0"/>
+              <a:t>, …</a:t>
+            </a:r>
+            <a:endParaRPr lang="en-US" dirty="0" smtClean="0"/>
+          </a:p>
+          <a:p>
+            <a:pPr marL="0" marR="0" indent="0" algn="l" defTabSz="914400" rtl="0" eaLnBrk="1" fontAlgn="auto" latinLnBrk="0" hangingPunct="1">
+              <a:lnSpc>
+                <a:spcPct val="100000"/>
+              </a:lnSpc>
+              <a:spcBef>
+                <a:spcPts val="0"/>
+              </a:spcBef>
+              <a:spcAft>
+                <a:spcPts val="0"/>
+              </a:spcAft>
+              <a:buClrTx/>
+              <a:buSzTx/>
+              <a:buFontTx/>
+              <a:buNone/>
+              <a:tabLst/>
+              <a:defRPr/>
+            </a:pPr>
+            <a:endParaRPr lang="de-DE" baseline="0" dirty="0" smtClean="0"/>
+          </a:p>
+          <a:p>
+            <a:endParaRPr lang="en-US" dirty="0"/>
           </a:p>
         </p:txBody>
       </p:sp>
       <p:sp>
         <p:nvSpPr>
-          <p:cNvPr id="4" name="Foliennummernplatzhalter 3"/>
+          <p:cNvPr id="4" name="Slide Number Placeholder 3"/>
           <p:cNvSpPr>
             <a:spLocks noGrp="1"/>
           </p:cNvSpPr>
@@ -753,7 +928,7 @@
     </p:spTree>
     <p:extLst>
       <p:ext uri="{BB962C8B-B14F-4D97-AF65-F5344CB8AC3E}">
-        <p14:creationId xmlns:p14="http://schemas.microsoft.com/office/powerpoint/2010/main" val="3022985809"/>
+        <p14:creationId xmlns:p14="http://schemas.microsoft.com/office/powerpoint/2010/main" val="3358926703"/>
       </p:ext>
     </p:extLst>
   </p:cSld>
@@ -782,7 +957,7 @@
       </p:grpSpPr>
       <p:sp>
         <p:nvSpPr>
-          <p:cNvPr id="2" name="Slide Image Placeholder 1"/>
+          <p:cNvPr id="2" name="Folienbildplatzhalter 1"/>
           <p:cNvSpPr>
             <a:spLocks noGrp="1" noRot="1" noChangeAspect="1"/>
           </p:cNvSpPr>
@@ -794,7 +969,7 @@
       </p:sp>
       <p:sp>
         <p:nvSpPr>
-          <p:cNvPr id="3" name="Notes Placeholder 2"/>
+          <p:cNvPr id="3" name="Notizenplatzhalter 2"/>
           <p:cNvSpPr>
             <a:spLocks noGrp="1"/>
           </p:cNvSpPr>
@@ -809,26 +984,19 @@
           <a:p>
             <a:r>
               <a:rPr lang="de-DE" dirty="0" smtClean="0"/>
-              <a:t>Annotation: entweder tut der Programmierer dies oder,</a:t>
+              <a:t>Warum dieses Thema? Weil es überraschend viel</a:t>
             </a:r>
             <a:r>
               <a:rPr lang="de-DE" baseline="0" dirty="0" smtClean="0"/>
-              <a:t> im Falle von F#, das Type </a:t>
-            </a:r>
-            <a:r>
-              <a:rPr lang="de-DE" baseline="0" dirty="0" err="1" smtClean="0"/>
-              <a:t>inference</a:t>
-            </a:r>
-            <a:endParaRPr lang="de-DE" baseline="0" dirty="0" smtClean="0"/>
-          </a:p>
-          <a:p>
-            <a:endParaRPr lang="en-US" dirty="0"/>
+              <a:t> Nutzen brachte und weil es mit DDD gut zusammenpasst</a:t>
+            </a:r>
+            <a:endParaRPr lang="de-DE" dirty="0"/>
           </a:p>
         </p:txBody>
       </p:sp>
       <p:sp>
         <p:nvSpPr>
-          <p:cNvPr id="4" name="Slide Number Placeholder 3"/>
+          <p:cNvPr id="4" name="Foliennummernplatzhalter 3"/>
           <p:cNvSpPr>
             <a:spLocks noGrp="1"/>
           </p:cNvSpPr>
@@ -852,7 +1020,7 @@
     </p:spTree>
     <p:extLst>
       <p:ext uri="{BB962C8B-B14F-4D97-AF65-F5344CB8AC3E}">
-        <p14:creationId xmlns:p14="http://schemas.microsoft.com/office/powerpoint/2010/main" val="2102569733"/>
+        <p14:creationId xmlns:p14="http://schemas.microsoft.com/office/powerpoint/2010/main" val="3022985809"/>
       </p:ext>
     </p:extLst>
   </p:cSld>
@@ -906,124 +1074,18 @@
           <a:bodyPr/>
           <a:lstStyle/>
           <a:p>
-            <a:pPr marL="0" marR="0" indent="0" algn="l" defTabSz="914400" rtl="0" eaLnBrk="1" fontAlgn="auto" latinLnBrk="0" hangingPunct="1">
-              <a:lnSpc>
-                <a:spcPct val="100000"/>
-              </a:lnSpc>
-              <a:spcBef>
-                <a:spcPts val="0"/>
-              </a:spcBef>
-              <a:spcAft>
-                <a:spcPts val="0"/>
-              </a:spcAft>
-              <a:buClrTx/>
-              <a:buSzTx/>
-              <a:buFontTx/>
-              <a:buNone/>
-              <a:tabLst/>
-              <a:defRPr/>
-            </a:pPr>
             <a:r>
               <a:rPr lang="de-DE" dirty="0" smtClean="0"/>
-              <a:t>Ist am besten erkennbar wenn man die Möglichkeiten einer schwachen Typisierung betrachtet</a:t>
-            </a:r>
-          </a:p>
-          <a:p>
-            <a:pPr marL="0" marR="0" indent="0" algn="l" defTabSz="914400" rtl="0" eaLnBrk="1" fontAlgn="auto" latinLnBrk="0" hangingPunct="1">
-              <a:lnSpc>
-                <a:spcPct val="100000"/>
-              </a:lnSpc>
-              <a:spcBef>
-                <a:spcPts val="0"/>
-              </a:spcBef>
-              <a:spcAft>
-                <a:spcPts val="0"/>
-              </a:spcAft>
-              <a:buClrTx/>
-              <a:buSzTx/>
-              <a:buFontTx/>
-              <a:buNone/>
-              <a:tabLst/>
-              <a:defRPr/>
-            </a:pPr>
-            <a:r>
-              <a:rPr lang="de-DE" dirty="0" smtClean="0"/>
-              <a:t>Copyright </a:t>
-            </a:r>
-            <a:r>
-              <a:rPr lang="en-US" sz="1200" b="1" i="0" kern="1200" dirty="0" err="1" smtClean="0">
-                <a:solidFill>
-                  <a:schemeClr val="tx1"/>
-                </a:solidFill>
-                <a:effectLst/>
-                <a:latin typeface="+mn-lt"/>
-                <a:ea typeface="+mn-ea"/>
-                <a:cs typeface="+mn-cs"/>
-              </a:rPr>
-              <a:t>Karlkim</a:t>
-            </a:r>
-            <a:r>
-              <a:rPr lang="en-US" sz="1200" b="1" i="0" kern="1200" dirty="0" smtClean="0">
-                <a:solidFill>
-                  <a:schemeClr val="tx1"/>
-                </a:solidFill>
-                <a:effectLst/>
-                <a:latin typeface="+mn-lt"/>
-                <a:ea typeface="+mn-ea"/>
-                <a:cs typeface="+mn-cs"/>
-              </a:rPr>
-              <a:t> </a:t>
-            </a:r>
-            <a:r>
-              <a:rPr lang="en-US" sz="1200" b="1" i="0" kern="1200" dirty="0" err="1" smtClean="0">
-                <a:solidFill>
-                  <a:schemeClr val="tx1"/>
-                </a:solidFill>
-                <a:effectLst/>
-                <a:latin typeface="+mn-lt"/>
-                <a:ea typeface="+mn-ea"/>
-                <a:cs typeface="+mn-cs"/>
-              </a:rPr>
-              <a:t>Suwanmongkol</a:t>
-            </a:r>
-            <a:r>
-              <a:rPr lang="en-US" sz="1200" b="1" i="0" kern="1200" dirty="0" smtClean="0">
-                <a:solidFill>
-                  <a:schemeClr val="tx1"/>
-                </a:solidFill>
-                <a:effectLst/>
-                <a:latin typeface="+mn-lt"/>
-                <a:ea typeface="+mn-ea"/>
-                <a:cs typeface="+mn-cs"/>
-              </a:rPr>
-              <a:t> (@</a:t>
-            </a:r>
-            <a:r>
-              <a:rPr lang="en-US" sz="1200" b="1" i="0" kern="1200" dirty="0" err="1" smtClean="0">
-                <a:solidFill>
-                  <a:schemeClr val="tx1"/>
-                </a:solidFill>
-                <a:effectLst/>
-                <a:latin typeface="+mn-lt"/>
-                <a:ea typeface="+mn-ea"/>
-                <a:cs typeface="+mn-cs"/>
-              </a:rPr>
-              <a:t>kimsk</a:t>
-            </a:r>
-            <a:r>
-              <a:rPr lang="en-US" sz="1200" b="1" i="0" kern="1200" dirty="0" smtClean="0">
-                <a:solidFill>
-                  <a:schemeClr val="tx1"/>
-                </a:solidFill>
-                <a:effectLst/>
-                <a:latin typeface="+mn-lt"/>
-                <a:ea typeface="+mn-ea"/>
-                <a:cs typeface="+mn-cs"/>
-              </a:rPr>
-              <a:t>) | Twitter</a:t>
-            </a:r>
-          </a:p>
-          <a:p>
+              <a:t>Annotation: entweder tut der Programmierer dies oder,</a:t>
+            </a:r>
+            <a:r>
+              <a:rPr lang="de-DE" baseline="0" dirty="0" smtClean="0"/>
+              <a:t> im Falle von F#, das Type </a:t>
+            </a:r>
+            <a:r>
+              <a:rPr lang="de-DE" baseline="0" dirty="0" err="1" smtClean="0"/>
+              <a:t>inference</a:t>
+            </a:r>
             <a:endParaRPr lang="de-DE" baseline="0" dirty="0" smtClean="0"/>
           </a:p>
           <a:p>
@@ -1086,7 +1148,7 @@
       </p:grpSpPr>
       <p:sp>
         <p:nvSpPr>
-          <p:cNvPr id="2" name="Folienbildplatzhalter 1"/>
+          <p:cNvPr id="2" name="Slide Image Placeholder 1"/>
           <p:cNvSpPr>
             <a:spLocks noGrp="1" noRot="1" noChangeAspect="1"/>
           </p:cNvSpPr>
@@ -1098,7 +1160,7 @@
       </p:sp>
       <p:sp>
         <p:nvSpPr>
-          <p:cNvPr id="3" name="Notizenplatzhalter 2"/>
+          <p:cNvPr id="3" name="Notes Placeholder 2"/>
           <p:cNvSpPr>
             <a:spLocks noGrp="1"/>
           </p:cNvSpPr>
@@ -1111,29 +1173,134 @@
           <a:bodyPr/>
           <a:lstStyle/>
           <a:p>
+            <a:pPr marL="0" marR="0" indent="0" algn="l" defTabSz="914400" rtl="0" eaLnBrk="1" fontAlgn="auto" latinLnBrk="0" hangingPunct="1">
+              <a:lnSpc>
+                <a:spcPct val="100000"/>
+              </a:lnSpc>
+              <a:spcBef>
+                <a:spcPts val="0"/>
+              </a:spcBef>
+              <a:spcAft>
+                <a:spcPts val="0"/>
+              </a:spcAft>
+              <a:buClrTx/>
+              <a:buSzTx/>
+              <a:buFontTx/>
+              <a:buNone/>
+              <a:tabLst/>
+              <a:defRPr/>
+            </a:pPr>
             <a:r>
               <a:rPr lang="de-DE" dirty="0" smtClean="0"/>
-              <a:t>Eventuell</a:t>
-            </a:r>
-            <a:r>
-              <a:rPr lang="de-DE" baseline="0" dirty="0" smtClean="0"/>
-              <a:t> noch zusammenfassen – was sind die Vorteile? Nicht unbedingt hier, sondern als </a:t>
-            </a:r>
-            <a:r>
-              <a:rPr lang="de-DE" baseline="0" dirty="0" err="1" smtClean="0"/>
-              <a:t>Zusammenfasung</a:t>
-            </a:r>
-            <a:r>
-              <a:rPr lang="de-DE" baseline="0" dirty="0" smtClean="0"/>
-              <a:t> am Ende?</a:t>
-            </a:r>
-            <a:endParaRPr lang="de-DE" dirty="0"/>
+              <a:t>Ist am besten erkennbar wenn man die Möglichkeiten einer schwachen Typisierung betrachtet</a:t>
+            </a:r>
+          </a:p>
+          <a:p>
+            <a:pPr marL="0" marR="0" indent="0" algn="l" defTabSz="914400" rtl="0" eaLnBrk="1" fontAlgn="auto" latinLnBrk="0" hangingPunct="1">
+              <a:lnSpc>
+                <a:spcPct val="100000"/>
+              </a:lnSpc>
+              <a:spcBef>
+                <a:spcPts val="0"/>
+              </a:spcBef>
+              <a:spcAft>
+                <a:spcPts val="0"/>
+              </a:spcAft>
+              <a:buClrTx/>
+              <a:buSzTx/>
+              <a:buFontTx/>
+              <a:buNone/>
+              <a:tabLst/>
+              <a:defRPr/>
+            </a:pPr>
+            <a:r>
+              <a:rPr lang="de-DE" dirty="0" smtClean="0"/>
+              <a:t>Copyright </a:t>
+            </a:r>
+            <a:r>
+              <a:rPr lang="en-US" sz="1200" b="1" i="0" kern="1200" dirty="0" err="1" smtClean="0">
+                <a:solidFill>
+                  <a:schemeClr val="tx1"/>
+                </a:solidFill>
+                <a:effectLst/>
+                <a:latin typeface="+mn-lt"/>
+                <a:ea typeface="+mn-ea"/>
+                <a:cs typeface="+mn-cs"/>
+              </a:rPr>
+              <a:t>Karlkim</a:t>
+            </a:r>
+            <a:r>
+              <a:rPr lang="en-US" sz="1200" b="1" i="0" kern="1200" dirty="0" smtClean="0">
+                <a:solidFill>
+                  <a:schemeClr val="tx1"/>
+                </a:solidFill>
+                <a:effectLst/>
+                <a:latin typeface="+mn-lt"/>
+                <a:ea typeface="+mn-ea"/>
+                <a:cs typeface="+mn-cs"/>
+              </a:rPr>
+              <a:t> </a:t>
+            </a:r>
+            <a:r>
+              <a:rPr lang="en-US" sz="1200" b="1" i="0" kern="1200" dirty="0" err="1" smtClean="0">
+                <a:solidFill>
+                  <a:schemeClr val="tx1"/>
+                </a:solidFill>
+                <a:effectLst/>
+                <a:latin typeface="+mn-lt"/>
+                <a:ea typeface="+mn-ea"/>
+                <a:cs typeface="+mn-cs"/>
+              </a:rPr>
+              <a:t>Suwanmongkol</a:t>
+            </a:r>
+            <a:r>
+              <a:rPr lang="en-US" sz="1200" b="1" i="0" kern="1200" dirty="0" smtClean="0">
+                <a:solidFill>
+                  <a:schemeClr val="tx1"/>
+                </a:solidFill>
+                <a:effectLst/>
+                <a:latin typeface="+mn-lt"/>
+                <a:ea typeface="+mn-ea"/>
+                <a:cs typeface="+mn-cs"/>
+              </a:rPr>
+              <a:t> (@</a:t>
+            </a:r>
+            <a:r>
+              <a:rPr lang="en-US" sz="1200" b="1" i="0" kern="1200" dirty="0" err="1" smtClean="0">
+                <a:solidFill>
+                  <a:schemeClr val="tx1"/>
+                </a:solidFill>
+                <a:effectLst/>
+                <a:latin typeface="+mn-lt"/>
+                <a:ea typeface="+mn-ea"/>
+                <a:cs typeface="+mn-cs"/>
+              </a:rPr>
+              <a:t>kimsk</a:t>
+            </a:r>
+            <a:r>
+              <a:rPr lang="en-US" sz="1200" b="1" i="0" kern="1200" dirty="0" smtClean="0">
+                <a:solidFill>
+                  <a:schemeClr val="tx1"/>
+                </a:solidFill>
+                <a:effectLst/>
+                <a:latin typeface="+mn-lt"/>
+                <a:ea typeface="+mn-ea"/>
+                <a:cs typeface="+mn-cs"/>
+              </a:rPr>
+              <a:t>) | Twitter</a:t>
+            </a:r>
+          </a:p>
+          <a:p>
+            <a:endParaRPr lang="de-DE" baseline="0" dirty="0" smtClean="0"/>
+          </a:p>
+          <a:p>
+            <a:endParaRPr lang="en-US" dirty="0"/>
           </a:p>
         </p:txBody>
       </p:sp>
       <p:sp>
         <p:nvSpPr>
-          <p:cNvPr id="4" name="Foliennummernplatzhalter 3"/>
+          <p:cNvPr id="4" name="Slide Number Placeholder 3"/>
           <p:cNvSpPr>
             <a:spLocks noGrp="1"/>
           </p:cNvSpPr>
@@ -1157,7 +1324,7 @@
     </p:spTree>
     <p:extLst>
       <p:ext uri="{BB962C8B-B14F-4D97-AF65-F5344CB8AC3E}">
-        <p14:creationId xmlns:p14="http://schemas.microsoft.com/office/powerpoint/2010/main" val="2305588509"/>
+        <p14:creationId xmlns:p14="http://schemas.microsoft.com/office/powerpoint/2010/main" val="2102569733"/>
       </p:ext>
     </p:extLst>
   </p:cSld>
@@ -1186,7 +1353,7 @@
       </p:grpSpPr>
       <p:sp>
         <p:nvSpPr>
-          <p:cNvPr id="2" name="Slide Image Placeholder 1"/>
+          <p:cNvPr id="2" name="Folienbildplatzhalter 1"/>
           <p:cNvSpPr>
             <a:spLocks noGrp="1" noRot="1" noChangeAspect="1"/>
           </p:cNvSpPr>
@@ -1198,7 +1365,7 @@
       </p:sp>
       <p:sp>
         <p:nvSpPr>
-          <p:cNvPr id="3" name="Notes Placeholder 2"/>
+          <p:cNvPr id="3" name="Notizenplatzhalter 2"/>
           <p:cNvSpPr>
             <a:spLocks noGrp="1"/>
           </p:cNvSpPr>
@@ -1211,77 +1378,13 @@
           <a:bodyPr/>
           <a:lstStyle/>
           <a:p>
-            <a:r>
-              <a:rPr lang="de-DE" dirty="0" err="1" smtClean="0"/>
-              <a:t>Types</a:t>
-            </a:r>
-            <a:r>
-              <a:rPr lang="de-DE" dirty="0" smtClean="0"/>
-              <a:t> werden immer aus kleineren Einheiten zusammen erstellt, die kleinsten sind die Primitives der</a:t>
-            </a:r>
-            <a:r>
-              <a:rPr lang="de-DE" baseline="0" dirty="0" smtClean="0"/>
-              <a:t> Sprache.</a:t>
-            </a:r>
-            <a:endParaRPr lang="de-DE" dirty="0" smtClean="0"/>
-          </a:p>
-          <a:p>
-            <a:r>
-              <a:rPr lang="de-DE" dirty="0" smtClean="0"/>
-              <a:t>Dies bedingt dass ich sowohl aus einfachen Einheiten einen komplexeren Typ</a:t>
-            </a:r>
-            <a:r>
-              <a:rPr lang="de-DE" baseline="0" dirty="0" smtClean="0"/>
-              <a:t> erstellen kann, </a:t>
-            </a:r>
-          </a:p>
-          <a:p>
-            <a:r>
-              <a:rPr lang="de-DE" baseline="0" dirty="0" smtClean="0"/>
-              <a:t>oder aus einem komplexeren die konstituierende einfachere Typen „heraus“ holen kann</a:t>
-            </a:r>
-          </a:p>
-          <a:p>
-            <a:endParaRPr lang="de-DE" baseline="0" dirty="0" smtClean="0"/>
-          </a:p>
-          <a:p>
-            <a:r>
-              <a:rPr lang="de-DE" baseline="0" dirty="0" smtClean="0"/>
-              <a:t>WICHTIG</a:t>
-            </a:r>
-          </a:p>
-          <a:p>
-            <a:r>
-              <a:rPr lang="de-DE" baseline="0" dirty="0" smtClean="0"/>
-              <a:t>Unterschied zu OO:</a:t>
-            </a:r>
-          </a:p>
-          <a:p>
-            <a:r>
-              <a:rPr lang="de-DE" baseline="0" dirty="0" smtClean="0"/>
-              <a:t>In OO kann ich eine Klasse erst „Leer“ erstellen, dann nach und nach Properties zuweisen/ändern.</a:t>
-            </a:r>
-          </a:p>
-          <a:p>
-            <a:r>
-              <a:rPr lang="de-DE" baseline="0" dirty="0" smtClean="0"/>
-              <a:t>In FP nicht.  </a:t>
-            </a:r>
-            <a:r>
-              <a:rPr lang="de-DE" baseline="0" dirty="0" err="1" smtClean="0"/>
-              <a:t>Immutability</a:t>
-            </a:r>
-            <a:r>
-              <a:rPr lang="de-DE" baseline="0" dirty="0" smtClean="0"/>
-              <a:t> heißt einmal erstellt, unveränderbar. Alle Daten müssen bei der Erstellung verfügbar sein</a:t>
-            </a:r>
-            <a:endParaRPr lang="en-US" dirty="0"/>
+            <a:endParaRPr lang="de-DE" dirty="0"/>
           </a:p>
         </p:txBody>
       </p:sp>
       <p:sp>
         <p:nvSpPr>
-          <p:cNvPr id="4" name="Slide Number Placeholder 3"/>
+          <p:cNvPr id="4" name="Foliennummernplatzhalter 3"/>
           <p:cNvSpPr>
             <a:spLocks noGrp="1"/>
           </p:cNvSpPr>
@@ -1305,7 +1408,7 @@
     </p:spTree>
     <p:extLst>
       <p:ext uri="{BB962C8B-B14F-4D97-AF65-F5344CB8AC3E}">
-        <p14:creationId xmlns:p14="http://schemas.microsoft.com/office/powerpoint/2010/main" val="1056229856"/>
+        <p14:creationId xmlns:p14="http://schemas.microsoft.com/office/powerpoint/2010/main" val="2305588509"/>
       </p:ext>
     </p:extLst>
   </p:cSld>
@@ -1359,6 +1462,75 @@
           <a:bodyPr/>
           <a:lstStyle/>
           <a:p>
+            <a:r>
+              <a:rPr lang="de-DE" dirty="0" err="1" smtClean="0"/>
+              <a:t>Types</a:t>
+            </a:r>
+            <a:r>
+              <a:rPr lang="de-DE" dirty="0" smtClean="0"/>
+              <a:t> werden immer aus kleineren Einheiten zusammen erstellt, die kleinsten sind die Primitives der</a:t>
+            </a:r>
+            <a:r>
+              <a:rPr lang="de-DE" baseline="0" dirty="0" smtClean="0"/>
+              <a:t> Sprache.</a:t>
+            </a:r>
+            <a:endParaRPr lang="de-DE" dirty="0" smtClean="0"/>
+          </a:p>
+          <a:p>
+            <a:r>
+              <a:rPr lang="de-DE" dirty="0" smtClean="0"/>
+              <a:t>Dies bedingt dass ich sowohl aus einfachen Einheiten einen komplexeren Typ</a:t>
+            </a:r>
+            <a:r>
+              <a:rPr lang="de-DE" baseline="0" dirty="0" smtClean="0"/>
+              <a:t> erstellen kann, </a:t>
+            </a:r>
+          </a:p>
+          <a:p>
+            <a:r>
+              <a:rPr lang="de-DE" baseline="0" dirty="0" smtClean="0"/>
+              <a:t>oder aus einem komplexeren die konstituierende einfachere Typen „heraus“ holen </a:t>
+            </a:r>
+            <a:r>
+              <a:rPr lang="de-DE" baseline="0" dirty="0" smtClean="0"/>
+              <a:t>kann, oder „Zerlegen“</a:t>
+            </a:r>
+            <a:endParaRPr lang="de-DE" baseline="0" dirty="0" smtClean="0"/>
+          </a:p>
+          <a:p>
+            <a:endParaRPr lang="de-DE" baseline="0" dirty="0" smtClean="0"/>
+          </a:p>
+          <a:p>
+            <a:r>
+              <a:rPr lang="de-DE" baseline="0" dirty="0" smtClean="0"/>
+              <a:t>WICHTIG</a:t>
+            </a:r>
+          </a:p>
+          <a:p>
+            <a:r>
+              <a:rPr lang="de-DE" baseline="0" dirty="0" smtClean="0"/>
+              <a:t>Unterschied zu OO:</a:t>
+            </a:r>
+          </a:p>
+          <a:p>
+            <a:r>
+              <a:rPr lang="de-DE" baseline="0" dirty="0" smtClean="0"/>
+              <a:t>In OO kann ich eine Klasse erst „Leer“ erstellen, dann nach und nach Properties zuweisen/ändern.</a:t>
+            </a:r>
+          </a:p>
+          <a:p>
+            <a:r>
+              <a:rPr lang="de-DE" baseline="0" dirty="0" smtClean="0"/>
+              <a:t>In FP nicht.  </a:t>
+            </a:r>
+            <a:r>
+              <a:rPr lang="de-DE" baseline="0" dirty="0" err="1" smtClean="0"/>
+              <a:t>Immutability</a:t>
+            </a:r>
+            <a:r>
+              <a:rPr lang="de-DE" baseline="0" dirty="0" smtClean="0"/>
+              <a:t> heißt einmal erstellt, unveränderbar. Alle Daten müssen bei der Erstellung verfügbar sein</a:t>
+            </a:r>
             <a:endParaRPr lang="en-US" dirty="0"/>
           </a:p>
         </p:txBody>
@@ -1445,11 +1617,60 @@
           <a:p>
             <a:r>
               <a:rPr lang="de-DE" dirty="0" smtClean="0"/>
-              <a:t>Zwei im</a:t>
+              <a:t>IF </a:t>
+            </a:r>
+            <a:r>
+              <a:rPr lang="de-DE" dirty="0" err="1" smtClean="0"/>
+              <a:t>and</a:t>
+            </a:r>
+            <a:r>
+              <a:rPr lang="de-DE" dirty="0" smtClean="0"/>
+              <a:t> SWITCH on STERIODS</a:t>
+            </a:r>
+          </a:p>
+          <a:p>
+            <a:endParaRPr lang="de-DE" dirty="0" smtClean="0"/>
+          </a:p>
+          <a:p>
+            <a:r>
+              <a:rPr lang="de-DE" dirty="0" smtClean="0"/>
+              <a:t>Der F# Compiler ist in der Lage fehlende oder fehlerhafte Fälle</a:t>
             </a:r>
             <a:r>
               <a:rPr lang="de-DE" baseline="0" dirty="0" smtClean="0"/>
-              <a:t> Sinne des Domains gleichwertige Instanzen „Kunde 123“ sind nicht identisch.</a:t>
+              <a:t> zu entdecken.  Dies ist bedingt durch die </a:t>
+            </a:r>
+            <a:r>
+              <a:rPr lang="de-DE" baseline="0" dirty="0" err="1" smtClean="0"/>
+              <a:t>Hindley-Milner</a:t>
+            </a:r>
+            <a:r>
+              <a:rPr lang="de-DE" baseline="0" dirty="0" smtClean="0"/>
+              <a:t> Type </a:t>
+            </a:r>
+            <a:r>
+              <a:rPr lang="de-DE" baseline="0" dirty="0" err="1" smtClean="0"/>
+              <a:t>Inference</a:t>
+            </a:r>
+            <a:r>
+              <a:rPr lang="de-DE" baseline="0" dirty="0" smtClean="0"/>
+              <a:t>, C# wird dies nicht können ohne dass „</a:t>
+            </a:r>
+            <a:r>
+              <a:rPr lang="de-DE" baseline="0" dirty="0" err="1" smtClean="0"/>
+              <a:t>breaking</a:t>
+            </a:r>
+            <a:r>
+              <a:rPr lang="de-DE" baseline="0" dirty="0" smtClean="0"/>
+              <a:t> </a:t>
+            </a:r>
+            <a:r>
+              <a:rPr lang="de-DE" baseline="0" dirty="0" err="1" smtClean="0"/>
+              <a:t>changes</a:t>
+            </a:r>
+            <a:r>
+              <a:rPr lang="de-DE" baseline="0" dirty="0" smtClean="0"/>
+              <a:t>“ eingeführt werden.</a:t>
             </a:r>
             <a:endParaRPr lang="en-US" dirty="0"/>
           </a:p>
@@ -1481,7 +1702,7 @@
     </p:spTree>
     <p:extLst>
       <p:ext uri="{BB962C8B-B14F-4D97-AF65-F5344CB8AC3E}">
-        <p14:creationId xmlns:p14="http://schemas.microsoft.com/office/powerpoint/2010/main" val="836832827"/>
+        <p14:creationId xmlns:p14="http://schemas.microsoft.com/office/powerpoint/2010/main" val="1056229856"/>
       </p:ext>
     </p:extLst>
   </p:cSld>
@@ -1537,19 +1758,11 @@
           <a:p>
             <a:r>
               <a:rPr lang="de-DE" dirty="0" smtClean="0"/>
-              <a:t>Es ist möglich das generierte</a:t>
+              <a:t>Zwei im</a:t>
             </a:r>
             <a:r>
               <a:rPr lang="de-DE" baseline="0" dirty="0" smtClean="0"/>
-              <a:t> Code in einem Decompiler zu sehen, nur die PDB Datei entfernen damit das IL Code als C# dekompiliert wird, manche </a:t>
-            </a:r>
-            <a:r>
-              <a:rPr lang="de-DE" baseline="0" dirty="0" err="1" smtClean="0"/>
-              <a:t>decompiler</a:t>
-            </a:r>
-            <a:r>
-              <a:rPr lang="de-DE" baseline="0" dirty="0" smtClean="0"/>
-              <a:t> sind schlau und nehmen die Info aus der PDB heraus.  Dann sieht man was der Compiler alles erzeugt.</a:t>
+              <a:t> Sinne des Domains gleichwertige Instanzen „Kunde 123“ sind nicht identisch.</a:t>
             </a:r>
             <a:endParaRPr lang="en-US" dirty="0"/>
           </a:p>
@@ -1573,6 +1786,106 @@
             <a:fld id="{4775FDF9-2A53-4261-A0AF-3B6A9698D365}" type="slidenum">
               <a:rPr lang="en-US" smtClean="0"/>
               <a:t>18</a:t>
+            </a:fld>
+            <a:endParaRPr lang="en-US"/>
+          </a:p>
+        </p:txBody>
+      </p:sp>
+    </p:spTree>
+    <p:extLst>
+      <p:ext uri="{BB962C8B-B14F-4D97-AF65-F5344CB8AC3E}">
+        <p14:creationId xmlns:p14="http://schemas.microsoft.com/office/powerpoint/2010/main" val="836832827"/>
+      </p:ext>
+    </p:extLst>
+  </p:cSld>
+  <p:clrMapOvr>
+    <a:masterClrMapping/>
+  </p:clrMapOvr>
+</p:notes>
+</file>
+
+<file path=ppt/notesSlides/notesSlide18.xml><?xml version="1.0" encoding="utf-8"?>
+<p:notes xmlns:a="http://schemas.openxmlformats.org/drawingml/2006/main" xmlns:r="http://schemas.openxmlformats.org/officeDocument/2006/relationships" xmlns:p="http://schemas.openxmlformats.org/presentationml/2006/main">
+  <p:cSld>
+    <p:spTree>
+      <p:nvGrpSpPr>
+        <p:cNvPr id="1" name=""/>
+        <p:cNvGrpSpPr/>
+        <p:nvPr/>
+      </p:nvGrpSpPr>
+      <p:grpSpPr>
+        <a:xfrm>
+          <a:off x="0" y="0"/>
+          <a:ext cx="0" cy="0"/>
+          <a:chOff x="0" y="0"/>
+          <a:chExt cx="0" cy="0"/>
+        </a:xfrm>
+      </p:grpSpPr>
+      <p:sp>
+        <p:nvSpPr>
+          <p:cNvPr id="2" name="Slide Image Placeholder 1"/>
+          <p:cNvSpPr>
+            <a:spLocks noGrp="1" noRot="1" noChangeAspect="1"/>
+          </p:cNvSpPr>
+          <p:nvPr>
+            <p:ph type="sldImg"/>
+          </p:nvPr>
+        </p:nvSpPr>
+        <p:spPr/>
+      </p:sp>
+      <p:sp>
+        <p:nvSpPr>
+          <p:cNvPr id="3" name="Notes Placeholder 2"/>
+          <p:cNvSpPr>
+            <a:spLocks noGrp="1"/>
+          </p:cNvSpPr>
+          <p:nvPr>
+            <p:ph type="body" idx="1"/>
+          </p:nvPr>
+        </p:nvSpPr>
+        <p:spPr/>
+        <p:txBody>
+          <a:bodyPr/>
+          <a:lstStyle/>
+          <a:p>
+            <a:r>
+              <a:rPr lang="de-DE" dirty="0" smtClean="0"/>
+              <a:t>Es ist möglich das generierte</a:t>
+            </a:r>
+            <a:r>
+              <a:rPr lang="de-DE" baseline="0" dirty="0" smtClean="0"/>
+              <a:t> Code in einem Decompiler zu sehen, nur die PDB Datei entfernen damit das IL Code als C# dekompiliert wird, manche </a:t>
+            </a:r>
+            <a:r>
+              <a:rPr lang="de-DE" baseline="0" dirty="0" err="1" smtClean="0"/>
+              <a:t>decompiler</a:t>
+            </a:r>
+            <a:r>
+              <a:rPr lang="de-DE" baseline="0" dirty="0" smtClean="0"/>
+              <a:t> sind schlau und nehmen die Info aus der PDB heraus.  Dann sieht man was der Compiler alles erzeugt.</a:t>
+            </a:r>
+            <a:endParaRPr lang="en-US" dirty="0"/>
+          </a:p>
+        </p:txBody>
+      </p:sp>
+      <p:sp>
+        <p:nvSpPr>
+          <p:cNvPr id="4" name="Slide Number Placeholder 3"/>
+          <p:cNvSpPr>
+            <a:spLocks noGrp="1"/>
+          </p:cNvSpPr>
+          <p:nvPr>
+            <p:ph type="sldNum" sz="quarter" idx="10"/>
+          </p:nvPr>
+        </p:nvSpPr>
+        <p:spPr/>
+        <p:txBody>
+          <a:bodyPr/>
+          <a:lstStyle/>
+          <a:p>
+            <a:fld id="{4775FDF9-2A53-4261-A0AF-3B6A9698D365}" type="slidenum">
+              <a:rPr lang="en-US" smtClean="0"/>
+              <a:t>19</a:t>
             </a:fld>
             <a:endParaRPr lang="en-US"/>
           </a:p>
@@ -1915,21 +2228,31 @@
             </a:r>
             <a:r>
               <a:rPr lang="de-DE" baseline="0" dirty="0" smtClean="0"/>
-              <a:t> gearbeitet, Sollte eine Turing Maschine werden. </a:t>
-            </a:r>
-          </a:p>
-          <a:p>
+              <a:t> gearbeitet</a:t>
+            </a:r>
             <a:r>
               <a:rPr lang="de-DE" baseline="0" dirty="0" smtClean="0"/>
-              <a:t>Alonzo Church führt das Lambda-Kalkül: "formale Sprache zur Untersuchung von Funktionen". </a:t>
-            </a:r>
-            <a:r>
-              <a:rPr lang="de-DE" baseline="0" dirty="0" err="1" smtClean="0"/>
-              <a:t>Mathmatische</a:t>
+              <a:t>, die Basis für eine </a:t>
             </a:r>
             <a:r>
               <a:rPr lang="de-DE" baseline="0" dirty="0" smtClean="0"/>
-              <a:t> Analyse von Funktionen und deren gebundenen Parameter.</a:t>
+              <a:t>Turing </a:t>
+            </a:r>
+            <a:r>
+              <a:rPr lang="de-DE" baseline="0" dirty="0" smtClean="0"/>
+              <a:t>Maschine. "</a:t>
+            </a:r>
+            <a:r>
+              <a:rPr lang="de-DE" baseline="0" dirty="0" smtClean="0"/>
+              <a:t>formale Sprache zur Untersuchung von Funktionen". </a:t>
+            </a:r>
+            <a:r>
+              <a:rPr lang="de-DE" baseline="0" dirty="0" smtClean="0"/>
+              <a:t>Mathematische </a:t>
+            </a:r>
+            <a:r>
+              <a:rPr lang="de-DE" baseline="0" dirty="0" smtClean="0"/>
+              <a:t>Analyse von Funktionen und deren gebundenen Parameter.</a:t>
             </a:r>
           </a:p>
           <a:p>
@@ -1941,8 +2264,13 @@
           <a:p>
             <a:r>
               <a:rPr lang="de-DE" baseline="0" dirty="0" smtClean="0"/>
-              <a:t>John McCarthy, hat die Spezifikation und das erste Compiler für LISP geschrieben</a:t>
-            </a:r>
+              <a:t>John McCarthy, hat die Spezifikation und das erste Compiler für LISP </a:t>
+            </a:r>
+            <a:r>
+              <a:rPr lang="de-DE" baseline="0" dirty="0" smtClean="0"/>
+              <a:t>geschrieben, die zweit älteste und noch gebräuchliche Programmiersprache (FORTRAN ist die erste!)</a:t>
+            </a:r>
+            <a:endParaRPr lang="de-DE" baseline="0" dirty="0" smtClean="0"/>
           </a:p>
           <a:p>
             <a:endParaRPr lang="de-DE" baseline="0" dirty="0" smtClean="0"/>
@@ -2033,8 +2361,30 @@
           <a:lstStyle/>
           <a:p>
             <a:r>
+              <a:rPr lang="de-DE" dirty="0" err="1" smtClean="0"/>
+              <a:t>Functional</a:t>
+            </a:r>
+            <a:r>
               <a:rPr lang="de-DE" dirty="0" smtClean="0"/>
-              <a:t>Kein Hype, kein neuer Trend, sondern endlich auch im Enterprise-Umfeld angekommen (Scala/</a:t>
+              <a:t> </a:t>
+            </a:r>
+            <a:r>
+              <a:rPr lang="de-DE" dirty="0" err="1" smtClean="0"/>
+              <a:t>Creep</a:t>
+            </a:r>
+            <a:endParaRPr lang="de-DE" dirty="0" smtClean="0"/>
+          </a:p>
+          <a:p>
+            <a:endParaRPr lang="de-DE" dirty="0" smtClean="0"/>
+          </a:p>
+          <a:p>
+            <a:r>
+              <a:rPr lang="de-DE" dirty="0" smtClean="0"/>
+              <a:t>Kein </a:t>
+            </a:r>
+            <a:r>
+              <a:rPr lang="de-DE" dirty="0" smtClean="0"/>
+              <a:t>Hype, kein neuer Trend, sondern endlich auch im Enterprise-Umfeld angekommen (Scala/</a:t>
             </a:r>
             <a:r>
               <a:rPr lang="de-DE" dirty="0" err="1" smtClean="0"/>
@@ -2048,8 +2398,61 @@
           <a:p>
             <a:r>
               <a:rPr lang="de-DE" baseline="0" dirty="0" smtClean="0"/>
-              <a:t>Prognose: In den 2020ern wird genau so erwartet, dass man funktional programmieren kann, wie heute mit OOP</a:t>
-            </a:r>
+              <a:t>Prognose: In den 2020ern wird genau so erwartet, dass man funktional programmieren kann, wie heute mit </a:t>
+            </a:r>
+            <a:r>
+              <a:rPr lang="de-DE" baseline="0" dirty="0" smtClean="0"/>
+              <a:t>OOP (Zitat R.B.!)</a:t>
+            </a:r>
+          </a:p>
+          <a:p>
+            <a:endParaRPr lang="de-DE" baseline="0" dirty="0" smtClean="0"/>
+          </a:p>
+          <a:p>
+            <a:pPr marL="0" marR="0" indent="0" algn="l" defTabSz="914400" rtl="0" eaLnBrk="1" fontAlgn="auto" latinLnBrk="0" hangingPunct="1">
+              <a:lnSpc>
+                <a:spcPct val="100000"/>
+              </a:lnSpc>
+              <a:spcBef>
+                <a:spcPts val="0"/>
+              </a:spcBef>
+              <a:spcAft>
+                <a:spcPts val="0"/>
+              </a:spcAft>
+              <a:buClrTx/>
+              <a:buSzTx/>
+              <a:buFontTx/>
+              <a:buNone/>
+              <a:tabLst/>
+              <a:defRPr/>
+            </a:pPr>
+            <a:r>
+              <a:rPr lang="de-DE" dirty="0" smtClean="0"/>
+              <a:t>OO Unzulänglichkeiten: Noch mehr Frameworks, vielversprechende</a:t>
+            </a:r>
+            <a:r>
+              <a:rPr lang="de-DE" baseline="0" dirty="0" smtClean="0"/>
+              <a:t> Ansätze erweisen sich als äußerst schwierig wie Test-</a:t>
+            </a:r>
+            <a:r>
+              <a:rPr lang="de-DE" baseline="0" dirty="0" err="1" smtClean="0"/>
+              <a:t>Driven</a:t>
+            </a:r>
+            <a:r>
+              <a:rPr lang="de-DE" baseline="0" dirty="0" smtClean="0"/>
+              <a:t>-Development, Domain </a:t>
+            </a:r>
+            <a:r>
+              <a:rPr lang="de-DE" baseline="0" dirty="0" err="1" smtClean="0"/>
+              <a:t>Driven</a:t>
+            </a:r>
+            <a:r>
+              <a:rPr lang="de-DE" baseline="0" dirty="0" smtClean="0"/>
+              <a:t> Development</a:t>
+            </a:r>
+            <a:endParaRPr lang="de-DE" dirty="0" smtClean="0"/>
+          </a:p>
+          <a:p>
             <a:endParaRPr lang="de-DE" dirty="0"/>
           </a:p>
         </p:txBody>
@@ -2415,6 +2818,23 @@
             </a:r>
           </a:p>
           <a:p>
+            <a:pPr marL="171450" indent="-171450">
+              <a:buFontTx/>
+              <a:buChar char="-"/>
+            </a:pPr>
+            <a:endParaRPr lang="de-DE" baseline="0" dirty="0" smtClean="0"/>
+          </a:p>
+          <a:p>
+            <a:pPr marL="0" indent="0">
+              <a:buFontTx/>
+              <a:buNone/>
+            </a:pPr>
+            <a:r>
+              <a:rPr lang="de-DE" baseline="0" dirty="0" smtClean="0"/>
+              <a:t>Eine Funktion wird zu einem Ausdruck gebunden und gibt diesem einen Wert.</a:t>
+            </a:r>
+          </a:p>
+          <a:p>
             <a:endParaRPr lang="de-DE" baseline="0" dirty="0" smtClean="0"/>
           </a:p>
           <a:p>
@@ -2503,275 +2923,52 @@
           <a:lstStyle/>
           <a:p>
             <a:r>
-              <a:rPr lang="en-US" sz="1200" kern="1200" dirty="0" smtClean="0">
-                <a:solidFill>
-                  <a:schemeClr val="tx1"/>
-                </a:solidFill>
-                <a:latin typeface="+mn-lt"/>
-                <a:ea typeface="+mn-ea"/>
-                <a:cs typeface="+mn-cs"/>
-              </a:rPr>
-              <a:t>type S = { Name : string; </a:t>
-            </a:r>
-            <a:r>
-              <a:rPr lang="en-US" sz="1200" kern="1200" dirty="0" err="1" smtClean="0">
-                <a:solidFill>
-                  <a:schemeClr val="tx1"/>
-                </a:solidFill>
-                <a:latin typeface="+mn-lt"/>
-                <a:ea typeface="+mn-ea"/>
-                <a:cs typeface="+mn-cs"/>
-              </a:rPr>
-              <a:t>Tun</a:t>
-            </a:r>
-            <a:r>
-              <a:rPr lang="en-US" sz="1200" kern="1200" dirty="0" smtClean="0">
-                <a:solidFill>
-                  <a:schemeClr val="tx1"/>
-                </a:solidFill>
-                <a:latin typeface="+mn-lt"/>
-                <a:ea typeface="+mn-ea"/>
-                <a:cs typeface="+mn-cs"/>
-              </a:rPr>
-              <a:t> : string -&gt; string; };;</a:t>
-            </a:r>
-          </a:p>
-          <a:p>
-            <a:r>
-              <a:rPr lang="de-DE" sz="1200" kern="1200" dirty="0" err="1" smtClean="0">
-                <a:solidFill>
-                  <a:schemeClr val="tx1"/>
-                </a:solidFill>
-                <a:latin typeface="+mn-lt"/>
-                <a:ea typeface="+mn-ea"/>
-                <a:cs typeface="+mn-cs"/>
-              </a:rPr>
-              <a:t>let</a:t>
-            </a:r>
-            <a:r>
-              <a:rPr lang="de-DE" sz="1200" kern="1200" baseline="0" dirty="0" smtClean="0">
-                <a:solidFill>
-                  <a:schemeClr val="tx1"/>
-                </a:solidFill>
-                <a:latin typeface="+mn-lt"/>
-                <a:ea typeface="+mn-ea"/>
-                <a:cs typeface="+mn-cs"/>
-              </a:rPr>
-              <a:t> f g x = g x;;</a:t>
-            </a:r>
-          </a:p>
-          <a:p>
-            <a:r>
-              <a:rPr lang="de-DE" sz="1200" kern="1200" baseline="0" dirty="0" err="1" smtClean="0">
-                <a:solidFill>
-                  <a:schemeClr val="tx1"/>
-                </a:solidFill>
-                <a:latin typeface="+mn-lt"/>
-                <a:ea typeface="+mn-ea"/>
-                <a:cs typeface="+mn-cs"/>
-              </a:rPr>
-              <a:t>let</a:t>
-            </a:r>
-            <a:r>
-              <a:rPr lang="de-DE" sz="1200" kern="1200" baseline="0" dirty="0" smtClean="0">
-                <a:solidFill>
-                  <a:schemeClr val="tx1"/>
-                </a:solidFill>
-                <a:latin typeface="+mn-lt"/>
-                <a:ea typeface="+mn-ea"/>
-                <a:cs typeface="+mn-cs"/>
-              </a:rPr>
-              <a:t> </a:t>
-            </a:r>
-            <a:r>
-              <a:rPr lang="de-DE" sz="1200" kern="1200" baseline="0" dirty="0" err="1" smtClean="0">
-                <a:solidFill>
-                  <a:schemeClr val="tx1"/>
-                </a:solidFill>
-                <a:latin typeface="+mn-lt"/>
-                <a:ea typeface="+mn-ea"/>
-                <a:cs typeface="+mn-cs"/>
-              </a:rPr>
-              <a:t>addFive</a:t>
-            </a:r>
-            <a:r>
-              <a:rPr lang="de-DE" sz="1200" kern="1200" baseline="0" dirty="0" smtClean="0">
-                <a:solidFill>
-                  <a:schemeClr val="tx1"/>
-                </a:solidFill>
-                <a:latin typeface="+mn-lt"/>
-                <a:ea typeface="+mn-ea"/>
-                <a:cs typeface="+mn-cs"/>
-              </a:rPr>
-              <a:t> x = (+) x 5;;</a:t>
-            </a:r>
-            <a:endParaRPr lang="de-DE" dirty="0" smtClean="0"/>
-          </a:p>
-          <a:p>
-            <a:endParaRPr lang="de-DE" dirty="0" smtClean="0"/>
-          </a:p>
-          <a:p>
-            <a:r>
               <a:rPr lang="de-DE" dirty="0" smtClean="0"/>
-              <a:t>Typ &lt;&gt; Klasse: Kein Verhalten,</a:t>
+              <a:t>Variable </a:t>
+            </a:r>
+            <a:r>
+              <a:rPr lang="de-DE" dirty="0" err="1" smtClean="0"/>
+              <a:t>result</a:t>
+            </a:r>
+            <a:r>
+              <a:rPr lang="de-DE" dirty="0" smtClean="0"/>
+              <a:t> muss außerhalb der Anweisung definiert werden,</a:t>
             </a:r>
             <a:r>
               <a:rPr lang="de-DE" baseline="0" dirty="0" smtClean="0"/>
-              <a:t> Reine Datenstruktur.  Aber Achtung: Ich kann in F# da ein bisschen schummeln, F# ist </a:t>
+              <a:t> wird jedoch davon berührt: das ist eine Nebenwirkung, also Side </a:t>
             </a:r>
             <a:r>
               <a:rPr lang="de-DE" baseline="0" dirty="0" err="1" smtClean="0"/>
-              <a:t>Functional</a:t>
+              <a:t>Effect</a:t>
             </a:r>
             <a:r>
               <a:rPr lang="de-DE" baseline="0" dirty="0" smtClean="0"/>
-              <a:t> </a:t>
-            </a:r>
+              <a:t>.</a:t>
+            </a:r>
+          </a:p>
+          <a:p>
             <a:r>
               <a:rPr lang="de-DE" baseline="0" dirty="0" err="1" smtClean="0"/>
-              <a:t>first</a:t>
+              <a:t>If</a:t>
             </a:r>
             <a:r>
               <a:rPr lang="de-DE" baseline="0" dirty="0" smtClean="0"/>
-              <a:t> und erlaubt die Verwendung von OO Konstrukte.</a:t>
-            </a:r>
-          </a:p>
-          <a:p>
-            <a:endParaRPr lang="de-DE" baseline="0" dirty="0" smtClean="0"/>
+              <a:t> ist eine Anweisung die NUR Nebenwirkungen erzeugt.  Ich kann IF nicht binden zu einem Bezeichner.</a:t>
+            </a:r>
           </a:p>
           <a:p>
             <a:r>
               <a:rPr lang="de-DE" baseline="0" dirty="0" smtClean="0"/>
-              <a:t>type Name = { Vor : </a:t>
+              <a:t>In einem Ausdruck gibt es keine Nebenwirkung da die Variable den Wert erhält sobald sie deklariert wird.  In einer FP Sprache wäre </a:t>
             </a:r>
             <a:r>
               <a:rPr lang="de-DE" baseline="0" dirty="0" err="1" smtClean="0"/>
-              <a:t>string</a:t>
+              <a:t>result</a:t>
             </a:r>
             <a:r>
               <a:rPr lang="de-DE" baseline="0" dirty="0" smtClean="0"/>
-              <a:t>; Nach : </a:t>
-            </a:r>
-            <a:r>
-              <a:rPr lang="de-DE" baseline="0" dirty="0" err="1" smtClean="0"/>
-              <a:t>string</a:t>
-            </a:r>
-            <a:r>
-              <a:rPr lang="de-DE" baseline="0" dirty="0" smtClean="0"/>
-              <a:t>; }</a:t>
-            </a:r>
-          </a:p>
-          <a:p>
-            <a:r>
-              <a:rPr lang="de-DE" baseline="0" dirty="0" smtClean="0"/>
-              <a:t>type Name‘ = { Name : Name; Title : </a:t>
-            </a:r>
-            <a:r>
-              <a:rPr lang="de-DE" baseline="0" dirty="0" err="1" smtClean="0"/>
-              <a:t>string</a:t>
-            </a:r>
-            <a:r>
-              <a:rPr lang="de-DE" baseline="0" dirty="0" smtClean="0"/>
-              <a:t>; Zusatz : </a:t>
-            </a:r>
-            <a:r>
-              <a:rPr lang="de-DE" baseline="0" dirty="0" err="1" smtClean="0"/>
-              <a:t>string</a:t>
-            </a:r>
-            <a:r>
-              <a:rPr lang="de-DE" baseline="0" dirty="0" smtClean="0"/>
-              <a:t>; }</a:t>
-            </a:r>
-          </a:p>
-          <a:p>
-            <a:endParaRPr lang="de-DE" baseline="0" dirty="0" smtClean="0"/>
-          </a:p>
-          <a:p>
-            <a:r>
-              <a:rPr lang="de-DE" baseline="0" dirty="0" err="1" smtClean="0"/>
-              <a:t>Immutability</a:t>
-            </a:r>
-            <a:r>
-              <a:rPr lang="de-DE" baseline="0" dirty="0" smtClean="0"/>
-              <a:t>. Grundsätzlich: Es gibt keine Variablen (Slot im Speicher wo ich etwas pushen und poppen kann). Einmal zugewiesen, bleibt es da für immer! Zwei Vorteile:</a:t>
-            </a:r>
-          </a:p>
-          <a:p>
-            <a:pPr marL="171450" indent="-171450">
-              <a:buFontTx/>
-              <a:buChar char="-"/>
-            </a:pPr>
-            <a:r>
-              <a:rPr lang="de-DE" baseline="0" dirty="0" smtClean="0"/>
-              <a:t>Simple </a:t>
-            </a:r>
-            <a:r>
-              <a:rPr lang="de-DE" baseline="0" dirty="0" err="1" smtClean="0"/>
-              <a:t>to</a:t>
-            </a:r>
-            <a:r>
-              <a:rPr lang="de-DE" baseline="0" dirty="0" smtClean="0"/>
-              <a:t> </a:t>
-            </a:r>
-            <a:r>
-              <a:rPr lang="de-DE" baseline="0" dirty="0" err="1" smtClean="0"/>
-              <a:t>reason</a:t>
-            </a:r>
-            <a:r>
-              <a:rPr lang="de-DE" baseline="0" dirty="0" smtClean="0"/>
-              <a:t> </a:t>
-            </a:r>
-            <a:r>
-              <a:rPr lang="de-DE" baseline="0" dirty="0" err="1" smtClean="0"/>
-              <a:t>about</a:t>
-            </a:r>
-            <a:r>
-              <a:rPr lang="de-DE" baseline="0" dirty="0" smtClean="0"/>
-              <a:t>. Die Frage „Wann hat sich der Wert geändert?“ stellt sich gar nicht mehr, der Wert kann nur zugewiesen werden</a:t>
-            </a:r>
-          </a:p>
-          <a:p>
-            <a:pPr marL="171450" indent="-171450">
-              <a:buFontTx/>
-              <a:buChar char="-"/>
-            </a:pPr>
-            <a:r>
-              <a:rPr lang="de-DE" baseline="0" dirty="0" smtClean="0"/>
-              <a:t>Multi Core </a:t>
-            </a:r>
-            <a:r>
-              <a:rPr lang="de-DE" baseline="0" dirty="0" err="1" smtClean="0"/>
-              <a:t>ready</a:t>
-            </a:r>
-            <a:r>
-              <a:rPr lang="de-DE" baseline="0" dirty="0" smtClean="0"/>
-              <a:t>: Kein </a:t>
-            </a:r>
-            <a:r>
-              <a:rPr lang="de-DE" baseline="0" dirty="0" err="1" smtClean="0"/>
-              <a:t>Mutex</a:t>
-            </a:r>
-            <a:r>
-              <a:rPr lang="de-DE" baseline="0" dirty="0" smtClean="0"/>
-              <a:t>, kein Semaphore, kein Monitor!</a:t>
-            </a:r>
-          </a:p>
-          <a:p>
-            <a:pPr marL="171450" indent="-171450">
-              <a:buFontTx/>
-              <a:buChar char="-"/>
-            </a:pPr>
-            <a:r>
-              <a:rPr lang="de-DE" baseline="0" dirty="0" smtClean="0"/>
-              <a:t>Man muss State neudenken, besser neulernen, die FP Leute haben das schon gemacht. Und übrigens, </a:t>
-            </a:r>
-            <a:r>
-              <a:rPr lang="de-DE" baseline="0" dirty="0" err="1" smtClean="0"/>
-              <a:t>SmallTalk</a:t>
-            </a:r>
-            <a:r>
-              <a:rPr lang="de-DE" baseline="0" dirty="0" smtClean="0"/>
-              <a:t> war auch </a:t>
+              <a:t> auch noch </a:t>
             </a:r>
             <a:r>
               <a:rPr lang="de-DE" baseline="0" dirty="0" err="1" smtClean="0"/>
@@ -2779,13 +2976,25 @@
             </a:r>
             <a:r>
               <a:rPr lang="de-DE" baseline="0" dirty="0" smtClean="0"/>
-              <a:t>, State war nur mittels eines Messaging Untersystem möglich.</a:t>
+              <a:t>.</a:t>
             </a:r>
           </a:p>
           <a:p>
             <a:endParaRPr lang="de-DE" baseline="0" dirty="0" smtClean="0"/>
           </a:p>
           <a:p>
+            <a:r>
+              <a:rPr lang="de-DE" baseline="0" dirty="0" smtClean="0"/>
+              <a:t>KEINE </a:t>
+            </a:r>
+            <a:r>
+              <a:rPr lang="de-DE" baseline="0" dirty="0" err="1" smtClean="0"/>
+              <a:t>NullReferenceExceptions</a:t>
+            </a:r>
+            <a:r>
+              <a:rPr lang="de-DE" baseline="0" dirty="0" smtClean="0"/>
+              <a:t> mehr, WIRKLICH, GAR keine mehr!!!!!!!!!!!!</a:t>
+            </a:r>
             <a:endParaRPr lang="en-US" dirty="0"/>
           </a:p>
         </p:txBody>
@@ -2816,7 +3025,7 @@
     </p:spTree>
     <p:extLst>
       <p:ext uri="{BB962C8B-B14F-4D97-AF65-F5344CB8AC3E}">
-        <p14:creationId xmlns:p14="http://schemas.microsoft.com/office/powerpoint/2010/main" val="1782259541"/>
+        <p14:creationId xmlns:p14="http://schemas.microsoft.com/office/powerpoint/2010/main" val="1270029111"/>
       </p:ext>
     </p:extLst>
   </p:cSld>
@@ -3238,6 +3447,189 @@
           <a:bodyPr/>
           <a:lstStyle/>
           <a:p>
+            <a:r>
+              <a:rPr lang="de-DE" dirty="0" smtClean="0"/>
+              <a:t>Typ </a:t>
+            </a:r>
+            <a:r>
+              <a:rPr lang="de-DE" dirty="0" smtClean="0"/>
+              <a:t>&lt;&gt; Klasse: Kein Verhalten,</a:t>
+            </a:r>
+            <a:r>
+              <a:rPr lang="de-DE" baseline="0" dirty="0" smtClean="0"/>
+              <a:t> Reine Datenstruktur.  Aber Achtung: Ich kann in F# da ein bisschen schummeln, F# ist </a:t>
+            </a:r>
+            <a:r>
+              <a:rPr lang="de-DE" baseline="0" dirty="0" err="1" smtClean="0"/>
+              <a:t>Functional</a:t>
+            </a:r>
+            <a:r>
+              <a:rPr lang="de-DE" baseline="0" dirty="0" smtClean="0"/>
+              <a:t> </a:t>
+            </a:r>
+            <a:r>
+              <a:rPr lang="de-DE" baseline="0" dirty="0" err="1" smtClean="0"/>
+              <a:t>first</a:t>
+            </a:r>
+            <a:r>
+              <a:rPr lang="de-DE" baseline="0" dirty="0" smtClean="0"/>
+              <a:t> und erlaubt die Verwendung von OO Konstrukte.</a:t>
+            </a:r>
+          </a:p>
+          <a:p>
+            <a:endParaRPr lang="de-DE" baseline="0" dirty="0" smtClean="0"/>
+          </a:p>
+          <a:p>
+            <a:r>
+              <a:rPr lang="de-DE" baseline="0" dirty="0" smtClean="0"/>
+              <a:t>type Name = { Vor : </a:t>
+            </a:r>
+            <a:r>
+              <a:rPr lang="de-DE" baseline="0" dirty="0" err="1" smtClean="0"/>
+              <a:t>string</a:t>
+            </a:r>
+            <a:r>
+              <a:rPr lang="de-DE" baseline="0" dirty="0" smtClean="0"/>
+              <a:t>; Nach : </a:t>
+            </a:r>
+            <a:r>
+              <a:rPr lang="de-DE" baseline="0" dirty="0" err="1" smtClean="0"/>
+              <a:t>string</a:t>
+            </a:r>
+            <a:r>
+              <a:rPr lang="de-DE" baseline="0" dirty="0" smtClean="0"/>
+              <a:t>; }</a:t>
+            </a:r>
+          </a:p>
+          <a:p>
+            <a:r>
+              <a:rPr lang="de-DE" baseline="0" dirty="0" smtClean="0"/>
+              <a:t>type Name‘ = { Name : Name; Title : </a:t>
+            </a:r>
+            <a:r>
+              <a:rPr lang="de-DE" baseline="0" dirty="0" err="1" smtClean="0"/>
+              <a:t>string</a:t>
+            </a:r>
+            <a:r>
+              <a:rPr lang="de-DE" baseline="0" dirty="0" smtClean="0"/>
+              <a:t>; Zusatz : </a:t>
+            </a:r>
+            <a:r>
+              <a:rPr lang="de-DE" baseline="0" dirty="0" err="1" smtClean="0"/>
+              <a:t>string</a:t>
+            </a:r>
+            <a:r>
+              <a:rPr lang="de-DE" baseline="0" dirty="0" smtClean="0"/>
+              <a:t>; }</a:t>
+            </a:r>
+          </a:p>
+          <a:p>
+            <a:endParaRPr lang="de-DE" baseline="0" dirty="0" smtClean="0"/>
+          </a:p>
+          <a:p>
+            <a:r>
+              <a:rPr lang="de-DE" baseline="0" dirty="0" err="1" smtClean="0"/>
+              <a:t>Immutability</a:t>
+            </a:r>
+            <a:r>
+              <a:rPr lang="de-DE" baseline="0" dirty="0" smtClean="0"/>
+              <a:t>. Grundsätzlich: Es gibt keine Variablen (Slot im Speicher wo ich etwas pushen und poppen kann). Einmal zugewiesen, bleibt es da für immer! Zwei Vorteile:</a:t>
+            </a:r>
+          </a:p>
+          <a:p>
+            <a:pPr marL="171450" indent="-171450">
+              <a:buFontTx/>
+              <a:buChar char="-"/>
+            </a:pPr>
+            <a:r>
+              <a:rPr lang="de-DE" baseline="0" dirty="0" smtClean="0"/>
+              <a:t>Simple </a:t>
+            </a:r>
+            <a:r>
+              <a:rPr lang="de-DE" baseline="0" dirty="0" err="1" smtClean="0"/>
+              <a:t>to</a:t>
+            </a:r>
+            <a:r>
+              <a:rPr lang="de-DE" baseline="0" dirty="0" smtClean="0"/>
+              <a:t> </a:t>
+            </a:r>
+            <a:r>
+              <a:rPr lang="de-DE" baseline="0" dirty="0" err="1" smtClean="0"/>
+              <a:t>reason</a:t>
+            </a:r>
+            <a:r>
+              <a:rPr lang="de-DE" baseline="0" dirty="0" smtClean="0"/>
+              <a:t> </a:t>
+            </a:r>
+            <a:r>
+              <a:rPr lang="de-DE" baseline="0" dirty="0" err="1" smtClean="0"/>
+              <a:t>about</a:t>
+            </a:r>
+            <a:r>
+              <a:rPr lang="de-DE" baseline="0" dirty="0" smtClean="0"/>
+              <a:t>. Die Frage „Wann hat sich der Wert geändert?“ stellt sich gar nicht mehr, der Wert kann nur zugewiesen werden</a:t>
+            </a:r>
+          </a:p>
+          <a:p>
+            <a:pPr marL="171450" indent="-171450">
+              <a:buFontTx/>
+              <a:buChar char="-"/>
+            </a:pPr>
+            <a:r>
+              <a:rPr lang="de-DE" baseline="0" dirty="0" smtClean="0"/>
+              <a:t>Multi Core </a:t>
+            </a:r>
+            <a:r>
+              <a:rPr lang="de-DE" baseline="0" dirty="0" err="1" smtClean="0"/>
+              <a:t>ready</a:t>
+            </a:r>
+            <a:r>
+              <a:rPr lang="de-DE" baseline="0" dirty="0" smtClean="0"/>
+              <a:t>: Kein </a:t>
+            </a:r>
+            <a:r>
+              <a:rPr lang="de-DE" baseline="0" dirty="0" err="1" smtClean="0"/>
+              <a:t>Mutex</a:t>
+            </a:r>
+            <a:r>
+              <a:rPr lang="de-DE" baseline="0" dirty="0" smtClean="0"/>
+              <a:t>, kein Semaphore, kein Monitor!</a:t>
+            </a:r>
+          </a:p>
+          <a:p>
+            <a:pPr marL="171450" indent="-171450">
+              <a:buFontTx/>
+              <a:buChar char="-"/>
+            </a:pPr>
+            <a:r>
+              <a:rPr lang="de-DE" baseline="0" dirty="0" smtClean="0"/>
+              <a:t>Man muss State neudenken, besser neulernen, die FP Leute haben das schon gemacht. Und übrigens, </a:t>
+            </a:r>
+            <a:r>
+              <a:rPr lang="de-DE" baseline="0" dirty="0" err="1" smtClean="0"/>
+              <a:t>SmallTalk</a:t>
+            </a:r>
+            <a:r>
+              <a:rPr lang="de-DE" baseline="0" dirty="0" smtClean="0"/>
+              <a:t> war auch </a:t>
+            </a:r>
+            <a:r>
+              <a:rPr lang="de-DE" baseline="0" dirty="0" err="1" smtClean="0"/>
+              <a:t>immutable</a:t>
+            </a:r>
+            <a:r>
+              <a:rPr lang="de-DE" baseline="0" dirty="0" smtClean="0"/>
+              <a:t>, State war nur mittels eines Messaging Untersystem möglich.</a:t>
+            </a:r>
+          </a:p>
+          <a:p>
+            <a:pPr marL="171450" indent="-171450">
+              <a:buFontTx/>
+              <a:buChar char="-"/>
+            </a:pPr>
+            <a:endParaRPr lang="de-DE" baseline="0" dirty="0" smtClean="0"/>
+          </a:p>
+          <a:p>
             <a:pPr marL="0" marR="0" indent="0" algn="l" defTabSz="914400" rtl="0" eaLnBrk="1" fontAlgn="auto" latinLnBrk="0" hangingPunct="1">
               <a:lnSpc>
                 <a:spcPct val="100000"/>
@@ -3257,166 +3649,147 @@
             </a:pPr>
             <a:r>
               <a:rPr lang="de-DE" dirty="0" smtClean="0"/>
-              <a:t>F# ist „</a:t>
-            </a:r>
-            <a:r>
-              <a:rPr lang="de-DE" dirty="0" err="1" smtClean="0"/>
-              <a:t>functional</a:t>
-            </a:r>
-            <a:r>
-              <a:rPr lang="de-DE" dirty="0" smtClean="0"/>
-              <a:t> </a:t>
-            </a:r>
-            <a:r>
-              <a:rPr lang="de-DE" dirty="0" err="1" smtClean="0"/>
-              <a:t>first</a:t>
-            </a:r>
-            <a:r>
-              <a:rPr lang="de-DE" dirty="0" smtClean="0"/>
-              <a:t>“, die Konstrukte der OO Welt stehen mir weiterhin zur</a:t>
+              <a:t>Eventuell</a:t>
             </a:r>
             <a:r>
               <a:rPr lang="de-DE" baseline="0" dirty="0" smtClean="0"/>
-              <a:t> Verfügung in F#.</a:t>
-            </a:r>
-          </a:p>
-          <a:p>
-            <a:pPr marL="0" marR="0" indent="0" algn="l" defTabSz="914400" rtl="0" eaLnBrk="1" fontAlgn="auto" latinLnBrk="0" hangingPunct="1">
-              <a:lnSpc>
-                <a:spcPct val="100000"/>
-              </a:lnSpc>
-              <a:spcBef>
-                <a:spcPts val="0"/>
-              </a:spcBef>
-              <a:spcAft>
-                <a:spcPts val="0"/>
-              </a:spcAft>
-              <a:buClrTx/>
-              <a:buSzTx/>
+              <a:t> noch zusammenfassen – was sind die Vorteile? Nicht unbedingt hier, sondern als </a:t>
+            </a:r>
+            <a:r>
+              <a:rPr lang="de-DE" baseline="0" dirty="0" err="1" smtClean="0"/>
+              <a:t>Zusammenfasung</a:t>
+            </a:r>
+            <a:r>
+              <a:rPr lang="de-DE" baseline="0" dirty="0" smtClean="0"/>
+              <a:t> am Ende</a:t>
+            </a:r>
+            <a:r>
+              <a:rPr lang="de-DE" baseline="0" dirty="0" smtClean="0"/>
+              <a:t>? FEHLT</a:t>
+            </a:r>
+            <a:endParaRPr lang="de-DE" dirty="0" smtClean="0"/>
+          </a:p>
+          <a:p>
+            <a:pPr marL="0" indent="0">
               <a:buFontTx/>
               <a:buNone/>
-              <a:tabLst/>
-              <a:defRPr/>
             </a:pPr>
             <a:endParaRPr lang="de-DE" baseline="0" dirty="0" smtClean="0"/>
           </a:p>
           <a:p>
-            <a:pPr marL="0" marR="0" indent="0" algn="l" defTabSz="914400" rtl="0" eaLnBrk="1" fontAlgn="auto" latinLnBrk="0" hangingPunct="1">
-              <a:lnSpc>
-                <a:spcPct val="100000"/>
-              </a:lnSpc>
-              <a:spcBef>
-                <a:spcPts val="0"/>
-              </a:spcBef>
-              <a:spcAft>
-                <a:spcPts val="0"/>
-              </a:spcAft>
-              <a:buClrTx/>
-              <a:buSzTx/>
+            <a:r>
+              <a:rPr lang="en-US" sz="1200" kern="1200" dirty="0" smtClean="0">
+                <a:solidFill>
+                  <a:schemeClr val="tx1"/>
+                </a:solidFill>
+                <a:latin typeface="+mn-lt"/>
+                <a:ea typeface="+mn-ea"/>
+                <a:cs typeface="+mn-cs"/>
+              </a:rPr>
+              <a:t>type S = { Name : string; </a:t>
+            </a:r>
+            <a:r>
+              <a:rPr lang="en-US" sz="1200" kern="1200" dirty="0" err="1" smtClean="0">
+                <a:solidFill>
+                  <a:schemeClr val="tx1"/>
+                </a:solidFill>
+                <a:latin typeface="+mn-lt"/>
+                <a:ea typeface="+mn-ea"/>
+                <a:cs typeface="+mn-cs"/>
+              </a:rPr>
+              <a:t>Tun</a:t>
+            </a:r>
+            <a:r>
+              <a:rPr lang="en-US" sz="1200" kern="1200" dirty="0" smtClean="0">
+                <a:solidFill>
+                  <a:schemeClr val="tx1"/>
+                </a:solidFill>
+                <a:latin typeface="+mn-lt"/>
+                <a:ea typeface="+mn-ea"/>
+                <a:cs typeface="+mn-cs"/>
+              </a:rPr>
+              <a:t> : string -&gt; string; };;</a:t>
+            </a:r>
+          </a:p>
+          <a:p>
+            <a:r>
+              <a:rPr lang="de-DE" sz="1200" kern="1200" dirty="0" err="1" smtClean="0">
+                <a:solidFill>
+                  <a:schemeClr val="tx1"/>
+                </a:solidFill>
+                <a:latin typeface="+mn-lt"/>
+                <a:ea typeface="+mn-ea"/>
+                <a:cs typeface="+mn-cs"/>
+              </a:rPr>
+              <a:t>let</a:t>
+            </a:r>
+            <a:r>
+              <a:rPr lang="de-DE" sz="1200" kern="1200" baseline="0" dirty="0" smtClean="0">
+                <a:solidFill>
+                  <a:schemeClr val="tx1"/>
+                </a:solidFill>
+                <a:latin typeface="+mn-lt"/>
+                <a:ea typeface="+mn-ea"/>
+                <a:cs typeface="+mn-cs"/>
+              </a:rPr>
+              <a:t> f g x = g x;;</a:t>
+            </a:r>
+          </a:p>
+          <a:p>
+            <a:r>
+              <a:rPr lang="de-DE" sz="1200" kern="1200" baseline="0" dirty="0" err="1" smtClean="0">
+                <a:solidFill>
+                  <a:schemeClr val="tx1"/>
+                </a:solidFill>
+                <a:latin typeface="+mn-lt"/>
+                <a:ea typeface="+mn-ea"/>
+                <a:cs typeface="+mn-cs"/>
+              </a:rPr>
+              <a:t>let</a:t>
+            </a:r>
+            <a:r>
+              <a:rPr lang="de-DE" sz="1200" kern="1200" baseline="0" dirty="0" smtClean="0">
+                <a:solidFill>
+                  <a:schemeClr val="tx1"/>
+                </a:solidFill>
+                <a:latin typeface="+mn-lt"/>
+                <a:ea typeface="+mn-ea"/>
+                <a:cs typeface="+mn-cs"/>
+              </a:rPr>
+              <a:t> </a:t>
+            </a:r>
+            <a:r>
+              <a:rPr lang="de-DE" sz="1200" kern="1200" baseline="0" dirty="0" err="1" smtClean="0">
+                <a:solidFill>
+                  <a:schemeClr val="tx1"/>
+                </a:solidFill>
+                <a:latin typeface="+mn-lt"/>
+                <a:ea typeface="+mn-ea"/>
+                <a:cs typeface="+mn-cs"/>
+              </a:rPr>
+              <a:t>addFive</a:t>
+            </a:r>
+            <a:r>
+              <a:rPr lang="de-DE" sz="1200" kern="1200" baseline="0" dirty="0" smtClean="0">
+                <a:solidFill>
+                  <a:schemeClr val="tx1"/>
+                </a:solidFill>
+                <a:latin typeface="+mn-lt"/>
+                <a:ea typeface="+mn-ea"/>
+                <a:cs typeface="+mn-cs"/>
+              </a:rPr>
+              <a:t> x = (+) x 5;;</a:t>
+            </a:r>
+            <a:endParaRPr lang="de-DE" dirty="0" smtClean="0"/>
+          </a:p>
+          <a:p>
+            <a:pPr marL="0" indent="0">
               <a:buFontTx/>
               <a:buNone/>
-              <a:tabLst/>
-              <a:defRPr/>
-            </a:pPr>
-            <a:r>
-              <a:rPr lang="de-DE" baseline="0" dirty="0" smtClean="0"/>
-              <a:t>Stärker betonen, dass (sobald funktionale Konstrukte in der Sprache bereitstehen), diese den Code vereinfachen können</a:t>
-            </a:r>
-          </a:p>
-          <a:p>
-            <a:pPr marL="0" marR="0" indent="0" algn="l" defTabSz="914400" rtl="0" eaLnBrk="1" fontAlgn="auto" latinLnBrk="0" hangingPunct="1">
-              <a:lnSpc>
-                <a:spcPct val="100000"/>
-              </a:lnSpc>
-              <a:spcBef>
-                <a:spcPts val="0"/>
-              </a:spcBef>
-              <a:spcAft>
-                <a:spcPts val="0"/>
-              </a:spcAft>
-              <a:buClrTx/>
-              <a:buSzTx/>
-              <a:buFontTx/>
-              <a:buNone/>
-              <a:tabLst/>
-              <a:defRPr/>
             </a:pPr>
             <a:endParaRPr lang="de-DE" baseline="0" dirty="0" smtClean="0"/>
           </a:p>
           <a:p>
-            <a:pPr marL="0" marR="0" indent="0" algn="l" defTabSz="914400" rtl="0" eaLnBrk="1" fontAlgn="auto" latinLnBrk="0" hangingPunct="1">
-              <a:lnSpc>
-                <a:spcPct val="100000"/>
-              </a:lnSpc>
-              <a:spcBef>
-                <a:spcPts val="0"/>
-              </a:spcBef>
-              <a:spcAft>
-                <a:spcPts val="0"/>
-              </a:spcAft>
-              <a:buClrTx/>
-              <a:buSzTx/>
-              <a:buFontTx/>
-              <a:buNone/>
-              <a:tabLst/>
-              <a:defRPr/>
-            </a:pPr>
-            <a:r>
-              <a:rPr lang="de-DE" baseline="0" dirty="0" smtClean="0"/>
-              <a:t>Direkt die Frage beantworten – Warum FP? -&gt; </a:t>
-            </a:r>
-            <a:r>
-              <a:rPr lang="de-DE" baseline="0" dirty="0" err="1" smtClean="0"/>
-              <a:t>Immutability</a:t>
-            </a:r>
-            <a:r>
-              <a:rPr lang="de-DE" baseline="0" dirty="0" smtClean="0"/>
-              <a:t>, Making invalid </a:t>
-            </a:r>
-            <a:r>
-              <a:rPr lang="de-DE" baseline="0" dirty="0" err="1" smtClean="0"/>
-              <a:t>state</a:t>
-            </a:r>
-            <a:r>
-              <a:rPr lang="de-DE" baseline="0" dirty="0" smtClean="0"/>
-              <a:t> </a:t>
-            </a:r>
-            <a:r>
-              <a:rPr lang="de-DE" baseline="0" dirty="0" err="1" smtClean="0"/>
-              <a:t>un-representable</a:t>
-            </a:r>
-            <a:r>
-              <a:rPr lang="de-DE" baseline="0" dirty="0" smtClean="0"/>
-              <a:t> (Muss ich mir für das Beispiel mit DDD aufheben!), high-oder </a:t>
-            </a:r>
-            <a:r>
-              <a:rPr lang="de-DE" baseline="0" dirty="0" err="1" smtClean="0"/>
-              <a:t>functions</a:t>
-            </a:r>
-            <a:r>
-              <a:rPr lang="de-DE" baseline="0" dirty="0" smtClean="0"/>
-              <a:t>, …</a:t>
-            </a:r>
-            <a:endParaRPr lang="en-US" dirty="0" smtClean="0"/>
-          </a:p>
-          <a:p>
-            <a:pPr marL="0" marR="0" indent="0" algn="l" defTabSz="914400" rtl="0" eaLnBrk="1" fontAlgn="auto" latinLnBrk="0" hangingPunct="1">
-              <a:lnSpc>
-                <a:spcPct val="100000"/>
-              </a:lnSpc>
-              <a:spcBef>
-                <a:spcPts val="0"/>
-              </a:spcBef>
-              <a:spcAft>
-                <a:spcPts val="0"/>
-              </a:spcAft>
-              <a:buClrTx/>
-              <a:buSzTx/>
-              <a:buFontTx/>
-              <a:buNone/>
-              <a:tabLst/>
-              <a:defRPr/>
-            </a:pPr>
             <a:endParaRPr lang="de-DE" baseline="0" dirty="0" smtClean="0"/>
           </a:p>
           <a:p>
@@ -3450,7 +3823,7 @@
     </p:spTree>
     <p:extLst>
       <p:ext uri="{BB962C8B-B14F-4D97-AF65-F5344CB8AC3E}">
-        <p14:creationId xmlns:p14="http://schemas.microsoft.com/office/powerpoint/2010/main" val="3358926703"/>
+        <p14:creationId xmlns:p14="http://schemas.microsoft.com/office/powerpoint/2010/main" val="1782259541"/>
       </p:ext>
     </p:extLst>
   </p:cSld>
@@ -3641,7 +4014,7 @@
           <a:p>
             <a:fld id="{28CA3B8B-C56F-4663-93D1-BECEDA7EAF67}" type="datetimeFigureOut">
               <a:rPr lang="en-US" smtClean="0"/>
-              <a:t>11/23/2015</a:t>
+              <a:t>11/24/2015</a:t>
             </a:fld>
             <a:endParaRPr lang="en-US"/>
           </a:p>
@@ -3811,7 +4184,7 @@
           <a:p>
             <a:fld id="{28CA3B8B-C56F-4663-93D1-BECEDA7EAF67}" type="datetimeFigureOut">
               <a:rPr lang="en-US" smtClean="0"/>
-              <a:t>11/23/2015</a:t>
+              <a:t>11/24/2015</a:t>
             </a:fld>
             <a:endParaRPr lang="en-US"/>
           </a:p>
@@ -3991,7 +4364,7 @@
           <a:p>
             <a:fld id="{28CA3B8B-C56F-4663-93D1-BECEDA7EAF67}" type="datetimeFigureOut">
               <a:rPr lang="en-US" smtClean="0"/>
-              <a:t>11/23/2015</a:t>
+              <a:t>11/24/2015</a:t>
             </a:fld>
             <a:endParaRPr lang="en-US"/>
           </a:p>
@@ -4161,7 +4534,7 @@
           <a:p>
             <a:fld id="{28CA3B8B-C56F-4663-93D1-BECEDA7EAF67}" type="datetimeFigureOut">
               <a:rPr lang="en-US" smtClean="0"/>
-              <a:t>11/23/2015</a:t>
+              <a:t>11/24/2015</a:t>
             </a:fld>
             <a:endParaRPr lang="en-US"/>
           </a:p>
@@ -4407,7 +4780,7 @@
           <a:p>
             <a:fld id="{28CA3B8B-C56F-4663-93D1-BECEDA7EAF67}" type="datetimeFigureOut">
               <a:rPr lang="en-US" smtClean="0"/>
-              <a:t>11/23/2015</a:t>
+              <a:t>11/24/2015</a:t>
             </a:fld>
             <a:endParaRPr lang="en-US"/>
           </a:p>
@@ -4695,7 +5068,7 @@
           <a:p>
             <a:fld id="{28CA3B8B-C56F-4663-93D1-BECEDA7EAF67}" type="datetimeFigureOut">
               <a:rPr lang="en-US" smtClean="0"/>
-              <a:t>11/23/2015</a:t>
+              <a:t>11/24/2015</a:t>
             </a:fld>
             <a:endParaRPr lang="en-US"/>
           </a:p>
@@ -5117,7 +5490,7 @@
           <a:p>
             <a:fld id="{28CA3B8B-C56F-4663-93D1-BECEDA7EAF67}" type="datetimeFigureOut">
               <a:rPr lang="en-US" smtClean="0"/>
-              <a:t>11/23/2015</a:t>
+              <a:t>11/24/2015</a:t>
             </a:fld>
             <a:endParaRPr lang="en-US"/>
           </a:p>
@@ -5235,7 +5608,7 @@
           <a:p>
             <a:fld id="{28CA3B8B-C56F-4663-93D1-BECEDA7EAF67}" type="datetimeFigureOut">
               <a:rPr lang="en-US" smtClean="0"/>
-              <a:t>11/23/2015</a:t>
+              <a:t>11/24/2015</a:t>
             </a:fld>
             <a:endParaRPr lang="en-US"/>
           </a:p>
@@ -5330,7 +5703,7 @@
           <a:p>
             <a:fld id="{28CA3B8B-C56F-4663-93D1-BECEDA7EAF67}" type="datetimeFigureOut">
               <a:rPr lang="en-US" smtClean="0"/>
-              <a:t>11/23/2015</a:t>
+              <a:t>11/24/2015</a:t>
             </a:fld>
             <a:endParaRPr lang="en-US"/>
           </a:p>
@@ -5607,7 +5980,7 @@
           <a:p>
             <a:fld id="{28CA3B8B-C56F-4663-93D1-BECEDA7EAF67}" type="datetimeFigureOut">
               <a:rPr lang="en-US" smtClean="0"/>
-              <a:t>11/23/2015</a:t>
+              <a:t>11/24/2015</a:t>
             </a:fld>
             <a:endParaRPr lang="en-US"/>
           </a:p>
@@ -5860,7 +6233,7 @@
           <a:p>
             <a:fld id="{28CA3B8B-C56F-4663-93D1-BECEDA7EAF67}" type="datetimeFigureOut">
               <a:rPr lang="en-US" smtClean="0"/>
-              <a:t>11/23/2015</a:t>
+              <a:t>11/24/2015</a:t>
             </a:fld>
             <a:endParaRPr lang="en-US"/>
           </a:p>
@@ -6073,7 +6446,7 @@
           <a:p>
             <a:fld id="{28CA3B8B-C56F-4663-93D1-BECEDA7EAF67}" type="datetimeFigureOut">
               <a:rPr lang="en-US" smtClean="0"/>
-              <a:t>11/23/2015</a:t>
+              <a:t>11/24/2015</a:t>
             </a:fld>
             <a:endParaRPr lang="en-US"/>
           </a:p>
@@ -6709,11 +7082,11 @@
           <a:bodyPr/>
           <a:lstStyle/>
           <a:p>
-            <a:r>
-              <a:rPr lang="de-DE" dirty="0" smtClean="0"/>
-              <a:t>Warum F#?</a:t>
-            </a:r>
-            <a:endParaRPr lang="en-US" dirty="0"/>
+            <a:pPr marL="0" indent="0"/>
+            <a:r>
+              <a:rPr lang="de-DE" dirty="0"/>
+              <a:t>Ideen aus der FP Welt</a:t>
+            </a:r>
           </a:p>
         </p:txBody>
       </p:sp>
@@ -6730,7 +7103,7 @@
         <p:spPr/>
         <p:txBody>
           <a:bodyPr>
-            <a:normAutofit/>
+            <a:normAutofit fontScale="92500" lnSpcReduction="20000"/>
           </a:bodyPr>
           <a:lstStyle/>
           <a:p>
@@ -6738,22 +7111,471 @@
               <a:buNone/>
             </a:pPr>
             <a:r>
+              <a:rPr lang="de-DE" dirty="0" err="1" smtClean="0"/>
+              <a:t>Immutability</a:t>
+            </a:r>
+            <a:endParaRPr lang="de-DE" dirty="0" smtClean="0"/>
+          </a:p>
+          <a:p>
+            <a:r>
+              <a:rPr lang="de-DE" dirty="0" smtClean="0"/>
+              <a:t>Keine </a:t>
+            </a:r>
+            <a:r>
               <a:rPr lang="de-DE" dirty="0"/>
-              <a:t>F# ist eine </a:t>
+              <a:t>Variablen (Slot im Speicher wo ich etwas pushen und poppen kann). Einmal zugewiesen, bleibt </a:t>
+            </a:r>
+            <a:r>
+              <a:rPr lang="de-DE" dirty="0" smtClean="0"/>
+              <a:t>der Wert</a:t>
+            </a:r>
+          </a:p>
+          <a:p>
+            <a:r>
+              <a:rPr lang="de-DE" dirty="0" smtClean="0"/>
+              <a:t>Die </a:t>
+            </a:r>
+            <a:r>
+              <a:rPr lang="de-DE" dirty="0"/>
+              <a:t>Frage „Wann hat sich der Wert geändert?“ stellt sich gar nicht mehr, der Wert kann nur zugewiesen </a:t>
+            </a:r>
+            <a:r>
+              <a:rPr lang="de-DE" dirty="0" smtClean="0"/>
+              <a:t>werden</a:t>
+            </a:r>
+          </a:p>
+          <a:p>
+            <a:r>
+              <a:rPr lang="de-DE" dirty="0" smtClean="0"/>
+              <a:t>Multi-Core </a:t>
             </a:r>
             <a:r>
               <a:rPr lang="de-DE" dirty="0" err="1"/>
-              <a:t>functional</a:t>
+              <a:t>ready</a:t>
             </a:r>
             <a:r>
               <a:rPr lang="de-DE" dirty="0"/>
-              <a:t>-first .net Sprache</a:t>
-            </a:r>
+              <a:t>: Kein </a:t>
+            </a:r>
+            <a:r>
+              <a:rPr lang="de-DE" dirty="0" err="1"/>
+              <a:t>Mutex</a:t>
+            </a:r>
+            <a:r>
+              <a:rPr lang="de-DE" dirty="0"/>
+              <a:t>, </a:t>
+            </a:r>
+            <a:r>
+              <a:rPr lang="de-DE" dirty="0" smtClean="0"/>
+              <a:t>Semaphore</a:t>
+            </a:r>
+            <a:r>
+              <a:rPr lang="de-DE" dirty="0"/>
+              <a:t>, </a:t>
+            </a:r>
+            <a:r>
+              <a:rPr lang="de-DE" dirty="0" smtClean="0"/>
+              <a:t>Monitor!</a:t>
+            </a:r>
+          </a:p>
+          <a:p>
+            <a:r>
+              <a:rPr lang="de-DE" dirty="0" smtClean="0"/>
+              <a:t>Konsequenz: State muss neugedacht werden</a:t>
+            </a:r>
+            <a:endParaRPr lang="de-DE" dirty="0"/>
+          </a:p>
+          <a:p>
+            <a:endParaRPr lang="de-DE" dirty="0" smtClean="0"/>
           </a:p>
           <a:p>
             <a:pPr marL="0" indent="0">
               <a:buNone/>
             </a:pPr>
+            <a:endParaRPr lang="de-DE" dirty="0"/>
+          </a:p>
+        </p:txBody>
+      </p:sp>
+    </p:spTree>
+    <p:extLst>
+      <p:ext uri="{BB962C8B-B14F-4D97-AF65-F5344CB8AC3E}">
+        <p14:creationId xmlns:p14="http://schemas.microsoft.com/office/powerpoint/2010/main" val="1145584124"/>
+      </p:ext>
+    </p:extLst>
+  </p:cSld>
+  <p:clrMapOvr>
+    <a:masterClrMapping/>
+  </p:clrMapOvr>
+  <p:timing>
+    <p:tnLst>
+      <p:par>
+        <p:cTn id="1" dur="indefinite" restart="never" nodeType="tmRoot">
+          <p:childTnLst>
+            <p:seq concurrent="1" nextAc="seek">
+              <p:cTn id="2" dur="indefinite" nodeType="mainSeq">
+                <p:childTnLst>
+                  <p:par>
+                    <p:cTn id="3" fill="hold">
+                      <p:stCondLst>
+                        <p:cond delay="indefinite"/>
+                      </p:stCondLst>
+                      <p:childTnLst>
+                        <p:par>
+                          <p:cTn id="4" fill="hold">
+                            <p:stCondLst>
+                              <p:cond delay="0"/>
+                            </p:stCondLst>
+                            <p:childTnLst>
+                              <p:par>
+                                <p:cTn id="5" presetID="1" presetClass="entr" presetSubtype="0" fill="hold" nodeType="clickEffect">
+                                  <p:stCondLst>
+                                    <p:cond delay="0"/>
+                                  </p:stCondLst>
+                                  <p:childTnLst>
+                                    <p:set>
+                                      <p:cBhvr>
+                                        <p:cTn id="6" dur="1" fill="hold">
+                                          <p:stCondLst>
+                                            <p:cond delay="0"/>
+                                          </p:stCondLst>
+                                        </p:cTn>
+                                        <p:tgtEl>
+                                          <p:spTgt spid="3">
+                                            <p:txEl>
+                                              <p:pRg st="0" end="0"/>
+                                            </p:txEl>
+                                          </p:spTgt>
+                                        </p:tgtEl>
+                                        <p:attrNameLst>
+                                          <p:attrName>style.visibility</p:attrName>
+                                        </p:attrNameLst>
+                                      </p:cBhvr>
+                                      <p:to>
+                                        <p:strVal val="visible"/>
+                                      </p:to>
+                                    </p:set>
+                                  </p:childTnLst>
+                                </p:cTn>
+                              </p:par>
+                            </p:childTnLst>
+                          </p:cTn>
+                        </p:par>
+                      </p:childTnLst>
+                    </p:cTn>
+                  </p:par>
+                  <p:par>
+                    <p:cTn id="7" fill="hold">
+                      <p:stCondLst>
+                        <p:cond delay="indefinite"/>
+                      </p:stCondLst>
+                      <p:childTnLst>
+                        <p:par>
+                          <p:cTn id="8" fill="hold">
+                            <p:stCondLst>
+                              <p:cond delay="0"/>
+                            </p:stCondLst>
+                            <p:childTnLst>
+                              <p:par>
+                                <p:cTn id="9" presetID="1" presetClass="entr" presetSubtype="0" fill="hold" nodeType="clickEffect">
+                                  <p:stCondLst>
+                                    <p:cond delay="0"/>
+                                  </p:stCondLst>
+                                  <p:childTnLst>
+                                    <p:set>
+                                      <p:cBhvr>
+                                        <p:cTn id="10" dur="1" fill="hold">
+                                          <p:stCondLst>
+                                            <p:cond delay="0"/>
+                                          </p:stCondLst>
+                                        </p:cTn>
+                                        <p:tgtEl>
+                                          <p:spTgt spid="3">
+                                            <p:txEl>
+                                              <p:pRg st="1" end="1"/>
+                                            </p:txEl>
+                                          </p:spTgt>
+                                        </p:tgtEl>
+                                        <p:attrNameLst>
+                                          <p:attrName>style.visibility</p:attrName>
+                                        </p:attrNameLst>
+                                      </p:cBhvr>
+                                      <p:to>
+                                        <p:strVal val="visible"/>
+                                      </p:to>
+                                    </p:set>
+                                  </p:childTnLst>
+                                </p:cTn>
+                              </p:par>
+                            </p:childTnLst>
+                          </p:cTn>
+                        </p:par>
+                      </p:childTnLst>
+                    </p:cTn>
+                  </p:par>
+                  <p:par>
+                    <p:cTn id="11" fill="hold">
+                      <p:stCondLst>
+                        <p:cond delay="indefinite"/>
+                      </p:stCondLst>
+                      <p:childTnLst>
+                        <p:par>
+                          <p:cTn id="12" fill="hold">
+                            <p:stCondLst>
+                              <p:cond delay="0"/>
+                            </p:stCondLst>
+                            <p:childTnLst>
+                              <p:par>
+                                <p:cTn id="13" presetID="1" presetClass="entr" presetSubtype="0" fill="hold" nodeType="clickEffect">
+                                  <p:stCondLst>
+                                    <p:cond delay="0"/>
+                                  </p:stCondLst>
+                                  <p:childTnLst>
+                                    <p:set>
+                                      <p:cBhvr>
+                                        <p:cTn id="14" dur="1" fill="hold">
+                                          <p:stCondLst>
+                                            <p:cond delay="0"/>
+                                          </p:stCondLst>
+                                        </p:cTn>
+                                        <p:tgtEl>
+                                          <p:spTgt spid="3">
+                                            <p:txEl>
+                                              <p:pRg st="2" end="2"/>
+                                            </p:txEl>
+                                          </p:spTgt>
+                                        </p:tgtEl>
+                                        <p:attrNameLst>
+                                          <p:attrName>style.visibility</p:attrName>
+                                        </p:attrNameLst>
+                                      </p:cBhvr>
+                                      <p:to>
+                                        <p:strVal val="visible"/>
+                                      </p:to>
+                                    </p:set>
+                                  </p:childTnLst>
+                                </p:cTn>
+                              </p:par>
+                            </p:childTnLst>
+                          </p:cTn>
+                        </p:par>
+                      </p:childTnLst>
+                    </p:cTn>
+                  </p:par>
+                  <p:par>
+                    <p:cTn id="15" fill="hold">
+                      <p:stCondLst>
+                        <p:cond delay="indefinite"/>
+                      </p:stCondLst>
+                      <p:childTnLst>
+                        <p:par>
+                          <p:cTn id="16" fill="hold">
+                            <p:stCondLst>
+                              <p:cond delay="0"/>
+                            </p:stCondLst>
+                            <p:childTnLst>
+                              <p:par>
+                                <p:cTn id="17" presetID="1" presetClass="entr" presetSubtype="0" fill="hold" nodeType="clickEffect">
+                                  <p:stCondLst>
+                                    <p:cond delay="0"/>
+                                  </p:stCondLst>
+                                  <p:childTnLst>
+                                    <p:set>
+                                      <p:cBhvr>
+                                        <p:cTn id="18" dur="1" fill="hold">
+                                          <p:stCondLst>
+                                            <p:cond delay="0"/>
+                                          </p:stCondLst>
+                                        </p:cTn>
+                                        <p:tgtEl>
+                                          <p:spTgt spid="3">
+                                            <p:txEl>
+                                              <p:pRg st="3" end="3"/>
+                                            </p:txEl>
+                                          </p:spTgt>
+                                        </p:tgtEl>
+                                        <p:attrNameLst>
+                                          <p:attrName>style.visibility</p:attrName>
+                                        </p:attrNameLst>
+                                      </p:cBhvr>
+                                      <p:to>
+                                        <p:strVal val="visible"/>
+                                      </p:to>
+                                    </p:set>
+                                  </p:childTnLst>
+                                </p:cTn>
+                              </p:par>
+                            </p:childTnLst>
+                          </p:cTn>
+                        </p:par>
+                      </p:childTnLst>
+                    </p:cTn>
+                  </p:par>
+                  <p:par>
+                    <p:cTn id="19" fill="hold">
+                      <p:stCondLst>
+                        <p:cond delay="indefinite"/>
+                      </p:stCondLst>
+                      <p:childTnLst>
+                        <p:par>
+                          <p:cTn id="20" fill="hold">
+                            <p:stCondLst>
+                              <p:cond delay="0"/>
+                            </p:stCondLst>
+                            <p:childTnLst>
+                              <p:par>
+                                <p:cTn id="21" presetID="1" presetClass="entr" presetSubtype="0" fill="hold" nodeType="clickEffect">
+                                  <p:stCondLst>
+                                    <p:cond delay="0"/>
+                                  </p:stCondLst>
+                                  <p:childTnLst>
+                                    <p:set>
+                                      <p:cBhvr>
+                                        <p:cTn id="22" dur="1" fill="hold">
+                                          <p:stCondLst>
+                                            <p:cond delay="0"/>
+                                          </p:stCondLst>
+                                        </p:cTn>
+                                        <p:tgtEl>
+                                          <p:spTgt spid="3">
+                                            <p:txEl>
+                                              <p:pRg st="4" end="4"/>
+                                            </p:txEl>
+                                          </p:spTgt>
+                                        </p:tgtEl>
+                                        <p:attrNameLst>
+                                          <p:attrName>style.visibility</p:attrName>
+                                        </p:attrNameLst>
+                                      </p:cBhvr>
+                                      <p:to>
+                                        <p:strVal val="visible"/>
+                                      </p:to>
+                                    </p:set>
+                                  </p:childTnLst>
+                                </p:cTn>
+                              </p:par>
+                            </p:childTnLst>
+                          </p:cTn>
+                        </p:par>
+                      </p:childTnLst>
+                    </p:cTn>
+                  </p:par>
+                </p:childTnLst>
+              </p:cTn>
+              <p:prevCondLst>
+                <p:cond evt="onPrev" delay="0">
+                  <p:tgtEl>
+                    <p:sldTgt/>
+                  </p:tgtEl>
+                </p:cond>
+              </p:prevCondLst>
+              <p:nextCondLst>
+                <p:cond evt="onNext" delay="0">
+                  <p:tgtEl>
+                    <p:sldTgt/>
+                  </p:tgtEl>
+                </p:cond>
+              </p:nextCondLst>
+            </p:seq>
+          </p:childTnLst>
+        </p:cTn>
+      </p:par>
+    </p:tnLst>
+  </p:timing>
+</p:sld>
+</file>
+
+<file path=ppt/slides/slide11.xml><?xml version="1.0" encoding="utf-8"?>
+<p:sld xmlns:a="http://schemas.openxmlformats.org/drawingml/2006/main" xmlns:r="http://schemas.openxmlformats.org/officeDocument/2006/relationships" xmlns:p="http://schemas.openxmlformats.org/presentationml/2006/main">
+  <p:cSld>
+    <p:spTree>
+      <p:nvGrpSpPr>
+        <p:cNvPr id="1" name=""/>
+        <p:cNvGrpSpPr/>
+        <p:nvPr/>
+      </p:nvGrpSpPr>
+      <p:grpSpPr>
+        <a:xfrm>
+          <a:off x="0" y="0"/>
+          <a:ext cx="0" cy="0"/>
+          <a:chOff x="0" y="0"/>
+          <a:chExt cx="0" cy="0"/>
+        </a:xfrm>
+      </p:grpSpPr>
+      <p:sp>
+        <p:nvSpPr>
+          <p:cNvPr id="2" name="Title 1"/>
+          <p:cNvSpPr>
+            <a:spLocks noGrp="1"/>
+          </p:cNvSpPr>
+          <p:nvPr>
+            <p:ph type="title"/>
+          </p:nvPr>
+        </p:nvSpPr>
+        <p:spPr/>
+        <p:txBody>
+          <a:bodyPr/>
+          <a:lstStyle/>
+          <a:p>
+            <a:r>
+              <a:rPr lang="de-DE" dirty="0" smtClean="0"/>
+              <a:t>Warum F#?</a:t>
+            </a:r>
+            <a:endParaRPr lang="en-US" dirty="0"/>
+          </a:p>
+        </p:txBody>
+      </p:sp>
+      <p:sp>
+        <p:nvSpPr>
+          <p:cNvPr id="3" name="Content Placeholder 2"/>
+          <p:cNvSpPr>
+            <a:spLocks noGrp="1"/>
+          </p:cNvSpPr>
+          <p:nvPr>
+            <p:ph idx="1"/>
+          </p:nvPr>
+        </p:nvSpPr>
+        <p:spPr/>
+        <p:txBody>
+          <a:bodyPr>
+            <a:normAutofit fontScale="92500" lnSpcReduction="10000"/>
+          </a:bodyPr>
+          <a:lstStyle/>
+          <a:p>
+            <a:r>
+              <a:rPr lang="de-DE" dirty="0"/>
+              <a:t>F# ist eine </a:t>
+            </a:r>
+            <a:r>
+              <a:rPr lang="de-DE" dirty="0" err="1"/>
+              <a:t>functional</a:t>
+            </a:r>
+            <a:r>
+              <a:rPr lang="de-DE" dirty="0"/>
+              <a:t>-first .net Sprache: </a:t>
+            </a:r>
+            <a:r>
+              <a:rPr lang="de-DE" dirty="0" smtClean="0"/>
+              <a:t>Alles </a:t>
+            </a:r>
+            <a:r>
+              <a:rPr lang="de-DE" dirty="0"/>
+              <a:t>was in C# (IL) möglich ist (Getter/Setter, Interfaces, </a:t>
+            </a:r>
+            <a:r>
+              <a:rPr lang="de-DE" dirty="0" err="1"/>
+              <a:t>Methods</a:t>
+            </a:r>
+            <a:r>
+              <a:rPr lang="de-DE" dirty="0"/>
+              <a:t>, etc</a:t>
+            </a:r>
+            <a:r>
+              <a:rPr lang="de-DE" dirty="0" smtClean="0"/>
+              <a:t>.)</a:t>
+            </a:r>
+            <a:endParaRPr lang="de-DE" dirty="0"/>
+          </a:p>
+          <a:p>
             <a:r>
               <a:rPr lang="de-DE" dirty="0" smtClean="0"/>
               <a:t>Typsystem das </a:t>
@@ -6769,31 +7591,43 @@
             <a:endParaRPr lang="de-DE" dirty="0"/>
           </a:p>
           <a:p>
-            <a:pPr marL="0" indent="0">
-              <a:buNone/>
-            </a:pPr>
             <a:r>
               <a:rPr lang="de-DE" dirty="0" smtClean="0"/>
               <a:t>Prägnanz, LOC Zahl reduziert durch ML Syntax</a:t>
             </a:r>
           </a:p>
           <a:p>
-            <a:pPr marL="0" indent="0">
-              <a:buNone/>
-            </a:pPr>
             <a:r>
               <a:rPr lang="de-DE" dirty="0" err="1" smtClean="0"/>
               <a:t>Immutability</a:t>
             </a:r>
             <a:r>
               <a:rPr lang="de-DE" dirty="0" smtClean="0"/>
-              <a:t> als Default</a:t>
-            </a:r>
-          </a:p>
-          <a:p>
-            <a:pPr marL="0" indent="0">
-              <a:buNone/>
-            </a:pPr>
+              <a:t> als </a:t>
+            </a:r>
+            <a:r>
+              <a:rPr lang="de-DE" dirty="0" smtClean="0"/>
+              <a:t>Default, </a:t>
+            </a:r>
+            <a:r>
+              <a:rPr lang="de-DE" dirty="0" err="1" smtClean="0"/>
+              <a:t>mutable</a:t>
+            </a:r>
+            <a:r>
+              <a:rPr lang="de-DE" dirty="0" smtClean="0"/>
+              <a:t> „Code </a:t>
+            </a:r>
+            <a:r>
+              <a:rPr lang="de-DE" dirty="0" err="1" smtClean="0"/>
+              <a:t>smell</a:t>
+            </a:r>
+            <a:r>
+              <a:rPr lang="de-DE" dirty="0" smtClean="0"/>
+              <a:t>“</a:t>
+            </a:r>
+            <a:endParaRPr lang="de-DE" dirty="0" smtClean="0"/>
+          </a:p>
+          <a:p>
             <a:r>
               <a:rPr lang="de-DE" dirty="0"/>
               <a:t>ML Syntax </a:t>
@@ -6812,9 +7646,6 @@
             </a:r>
           </a:p>
           <a:p>
-            <a:pPr marL="0" indent="0">
-              <a:buNone/>
-            </a:pPr>
             <a:r>
               <a:rPr lang="de-DE" dirty="0" smtClean="0"/>
               <a:t>Vereinfachung </a:t>
@@ -6849,9 +7680,6 @@
             </a:r>
           </a:p>
           <a:p>
-            <a:pPr marL="0" indent="0">
-              <a:buNone/>
-            </a:pPr>
             <a:r>
               <a:rPr lang="de-DE" dirty="0"/>
               <a:t>Vereinfachung (Asynchron, Parallel, Strategie</a:t>
@@ -7276,7 +8104,7 @@
 </p:sld>
 </file>
 
-<file path=ppt/slides/slide11.xml><?xml version="1.0" encoding="utf-8"?>
+<file path=ppt/slides/slide12.xml><?xml version="1.0" encoding="utf-8"?>
 <p:sld xmlns:a="http://schemas.openxmlformats.org/drawingml/2006/main" xmlns:r="http://schemas.openxmlformats.org/officeDocument/2006/relationships" xmlns:p="http://schemas.openxmlformats.org/presentationml/2006/main">
   <p:cSld>
     <p:spTree>
@@ -7705,7 +8533,7 @@
 </p:sld>
 </file>
 
-<file path=ppt/slides/slide12.xml><?xml version="1.0" encoding="utf-8"?>
+<file path=ppt/slides/slide13.xml><?xml version="1.0" encoding="utf-8"?>
 <p:sld xmlns:a="http://schemas.openxmlformats.org/drawingml/2006/main" xmlns:r="http://schemas.openxmlformats.org/officeDocument/2006/relationships" xmlns:p="http://schemas.openxmlformats.org/presentationml/2006/main">
   <p:cSld>
     <p:spTree>
@@ -8191,7 +9019,7 @@
 </p:sld>
 </file>
 
-<file path=ppt/slides/slide13.xml><?xml version="1.0" encoding="utf-8"?>
+<file path=ppt/slides/slide14.xml><?xml version="1.0" encoding="utf-8"?>
 <p:sld xmlns:a="http://schemas.openxmlformats.org/drawingml/2006/main" xmlns:r="http://schemas.openxmlformats.org/officeDocument/2006/relationships" xmlns:p="http://schemas.openxmlformats.org/presentationml/2006/main">
   <p:cSld>
     <p:spTree>
@@ -8399,7 +9227,7 @@
 </p:sld>
 </file>
 
-<file path=ppt/slides/slide14.xml><?xml version="1.0" encoding="utf-8"?>
+<file path=ppt/slides/slide15.xml><?xml version="1.0" encoding="utf-8"?>
 <p:sld xmlns:a="http://schemas.openxmlformats.org/drawingml/2006/main" xmlns:r="http://schemas.openxmlformats.org/officeDocument/2006/relationships" xmlns:p="http://schemas.openxmlformats.org/presentationml/2006/main">
   <p:cSld>
     <p:spTree>
@@ -8433,7 +9261,7 @@
           <a:p>
             <a:r>
               <a:rPr lang="de-DE" dirty="0" smtClean="0"/>
-              <a:t>Fokus für Heute?</a:t>
+              <a:t>Themen</a:t>
             </a:r>
             <a:endParaRPr lang="en-US" dirty="0"/>
           </a:p>
@@ -8452,7 +9280,7 @@
         <p:spPr/>
         <p:txBody>
           <a:bodyPr>
-            <a:normAutofit lnSpcReduction="10000"/>
+            <a:normAutofit fontScale="92500" lnSpcReduction="20000"/>
           </a:bodyPr>
           <a:lstStyle/>
           <a:p>
@@ -8515,42 +9343,37 @@
           </a:p>
           <a:p>
             <a:r>
-              <a:rPr lang="de-DE" dirty="0" err="1"/>
-              <a:t>Function</a:t>
-            </a:r>
-            <a:r>
-              <a:rPr lang="de-DE" dirty="0"/>
-              <a:t> </a:t>
-            </a:r>
-            <a:r>
-              <a:rPr lang="de-DE" dirty="0" err="1"/>
-              <a:t>types</a:t>
-            </a:r>
-            <a:r>
-              <a:rPr lang="de-DE" dirty="0"/>
-              <a:t> (Nein</a:t>
-            </a:r>
+              <a:rPr lang="de-DE" dirty="0" err="1" smtClean="0"/>
+              <a:t>Functions</a:t>
+            </a:r>
+            <a:endParaRPr lang="de-DE" dirty="0" smtClean="0"/>
+          </a:p>
+          <a:p>
             <a:r>
               <a:rPr lang="de-DE" dirty="0" smtClean="0"/>
-              <a:t>)</a:t>
+              <a:t>Listenwesen</a:t>
             </a:r>
           </a:p>
           <a:p>
             <a:r>
               <a:rPr lang="de-DE" dirty="0" smtClean="0"/>
-              <a:t>Listenwesen (Nein)</a:t>
+              <a:t>Einheiten</a:t>
             </a:r>
           </a:p>
           <a:p>
             <a:r>
               <a:rPr lang="de-DE" dirty="0" smtClean="0"/>
-              <a:t>Einheiten (Nein)</a:t>
-            </a:r>
-          </a:p>
-          <a:p>
+              <a:t>Type </a:t>
+            </a:r>
             <a:r>
               <a:rPr lang="de-DE" dirty="0" smtClean="0"/>
-              <a:t>Type Provider (Nein)</a:t>
+              <a:t>Provider</a:t>
+            </a:r>
+          </a:p>
+          <a:p>
+            <a:r>
+              <a:rPr lang="de-DE" dirty="0" smtClean="0"/>
+              <a:t>Berechnungsausdrucke</a:t>
             </a:r>
             <a:endParaRPr lang="de-DE" dirty="0"/>
           </a:p>
@@ -8972,6 +9795,55 @@
                       </p:childTnLst>
                     </p:cTn>
                   </p:par>
+                  <p:par>
+                    <p:cTn id="35" fill="hold">
+                      <p:stCondLst>
+                        <p:cond delay="indefinite"/>
+                      </p:stCondLst>
+                      <p:childTnLst>
+                        <p:par>
+                          <p:cTn id="36" fill="hold">
+                            <p:stCondLst>
+                              <p:cond delay="0"/>
+                            </p:stCondLst>
+                            <p:childTnLst>
+                              <p:par>
+                                <p:cTn id="37" presetID="1" presetClass="entr" presetSubtype="0" fill="hold" grpId="0" nodeType="clickEffect">
+                                  <p:stCondLst>
+                                    <p:cond delay="0"/>
+                                  </p:stCondLst>
+                                  <p:childTnLst>
+                                    <p:set>
+                                      <p:cBhvr>
+                                        <p:cTn id="38" dur="1" fill="hold">
+                                          <p:stCondLst>
+                                            <p:cond delay="0"/>
+                                          </p:stCondLst>
+                                        </p:cTn>
+                                        <p:tgtEl>
+                                          <p:spTgt spid="3">
+                                            <p:txEl>
+                                              <p:pRg st="8" end="8"/>
+                                            </p:txEl>
+                                          </p:spTgt>
+                                        </p:tgtEl>
+                                        <p:attrNameLst>
+                                          <p:attrName>style.visibility</p:attrName>
+                                        </p:attrNameLst>
+                                      </p:cBhvr>
+                                      <p:to>
+                                        <p:strVal val="visible"/>
+                                      </p:to>
+                                    </p:set>
+                                  </p:childTnLst>
+                                </p:cTn>
+                              </p:par>
+                            </p:childTnLst>
+                          </p:cTn>
+                        </p:par>
+                      </p:childTnLst>
+                    </p:cTn>
+                  </p:par>
                 </p:childTnLst>
               </p:cTn>
               <p:prevCondLst>
@@ -9000,7 +9872,7 @@
 </p:sld>
 </file>
 
-<file path=ppt/slides/slide15.xml><?xml version="1.0" encoding="utf-8"?>
+<file path=ppt/slides/slide16.xml><?xml version="1.0" encoding="utf-8"?>
 <p:sld xmlns:a="http://schemas.openxmlformats.org/drawingml/2006/main" xmlns:r="http://schemas.openxmlformats.org/officeDocument/2006/relationships" xmlns:p="http://schemas.openxmlformats.org/presentationml/2006/main">
   <p:cSld>
     <p:spTree>
@@ -9059,35 +9931,20 @@
           <a:bodyPr/>
           <a:lstStyle/>
           <a:p>
-            <a:pPr marL="0" indent="0">
-              <a:buNone/>
-            </a:pPr>
             <a:r>
               <a:rPr lang="de-DE" dirty="0" err="1" smtClean="0"/>
-              <a:t>Constructing</a:t>
-            </a:r>
-            <a:r>
-              <a:rPr lang="de-DE" dirty="0" smtClean="0"/>
-              <a:t> a type</a:t>
-            </a:r>
-          </a:p>
-          <a:p>
-            <a:pPr marL="0" indent="0">
-              <a:buNone/>
-            </a:pPr>
+              <a:t>Construction</a:t>
+            </a:r>
+            <a:endParaRPr lang="de-DE" dirty="0" smtClean="0"/>
+          </a:p>
+          <a:p>
             <a:r>
               <a:rPr lang="de-DE" dirty="0" err="1" smtClean="0"/>
-              <a:t>Deconstructing</a:t>
-            </a:r>
-            <a:r>
-              <a:rPr lang="de-DE" dirty="0" smtClean="0"/>
-              <a:t> a type</a:t>
-            </a:r>
-          </a:p>
-          <a:p>
-            <a:pPr marL="0" indent="0">
-              <a:buNone/>
-            </a:pPr>
+              <a:t>Deconstruction</a:t>
+            </a:r>
+            <a:endParaRPr lang="de-DE" dirty="0" smtClean="0"/>
+          </a:p>
+          <a:p>
             <a:r>
               <a:rPr lang="de-DE" dirty="0" smtClean="0"/>
               <a:t>Pattern </a:t>
@@ -9099,9 +9956,6 @@
             <a:endParaRPr lang="de-DE" dirty="0" smtClean="0"/>
           </a:p>
           <a:p>
-            <a:pPr marL="0" indent="0">
-              <a:buNone/>
-            </a:pPr>
             <a:r>
               <a:rPr lang="de-DE" dirty="0" err="1" smtClean="0"/>
               <a:t>Structural</a:t>
@@ -9113,6 +9967,14 @@
             <a:r>
               <a:rPr lang="de-DE" dirty="0" err="1" smtClean="0"/>
               <a:t>Equality</a:t>
+            </a:r>
+            <a:r>
+              <a:rPr lang="de-DE" dirty="0" smtClean="0"/>
+              <a:t> vs. Reference </a:t>
+            </a:r>
+            <a:r>
+              <a:rPr lang="de-DE" dirty="0" err="1" smtClean="0"/>
+              <a:t>Euqality</a:t>
             </a:r>
             <a:endParaRPr lang="en-US" dirty="0"/>
           </a:p>
@@ -9360,7 +10222,7 @@
 </p:sld>
 </file>
 
-<file path=ppt/slides/slide16.xml><?xml version="1.0" encoding="utf-8"?>
+<file path=ppt/slides/slide17.xml><?xml version="1.0" encoding="utf-8"?>
 <p:sld xmlns:a="http://schemas.openxmlformats.org/drawingml/2006/main" xmlns:r="http://schemas.openxmlformats.org/officeDocument/2006/relationships" xmlns:p="http://schemas.openxmlformats.org/presentationml/2006/main">
   <p:cSld>
     <p:spTree>
@@ -9420,8 +10282,8 @@
         </p:nvSpPr>
         <p:spPr>
           <a:xfrm>
-            <a:off x="971600" y="4941168"/>
-            <a:ext cx="7409849" cy="1200329"/>
+            <a:off x="947639" y="3933056"/>
+            <a:ext cx="3791872" cy="461665"/>
           </a:xfrm>
           <a:prstGeom prst="rect">
             <a:avLst/>
@@ -9440,24 +10302,20 @@
             </a:pPr>
             <a:r>
               <a:rPr lang="de-DE" sz="2400" dirty="0" smtClean="0"/>
-              <a:t>Erlaubt die Extraktion von Werten aus Datentypen auch</a:t>
-            </a:r>
-          </a:p>
-          <a:p>
-            <a:pPr marL="285750" indent="-285750">
-              <a:buFont typeface="Arial" panose="020B0604020202020204" pitchFamily="34" charset="0"/>
-              <a:buChar char="•"/>
-            </a:pPr>
-            <a:r>
-              <a:rPr lang="de-DE" sz="2400" dirty="0"/>
-              <a:t>Angepasst für die F# Datentypen, weniger für </a:t>
+              <a:t>Kreuzung aus </a:t>
+            </a:r>
+            <a:r>
+              <a:rPr lang="de-DE" sz="2400" dirty="0" err="1" smtClean="0"/>
+              <a:t>if</a:t>
             </a:r>
             <a:r>
               <a:rPr lang="de-DE" sz="2400" dirty="0" smtClean="0"/>
-              <a:t>OO</a:t>
-            </a:r>
-          </a:p>
-          <a:p>
+              <a:t> und </a:t>
+            </a:r>
+            <a:r>
+              <a:rPr lang="de-DE" sz="2400" dirty="0" err="1" smtClean="0"/>
+              <a:t>switch</a:t>
+            </a:r>
             <a:endParaRPr lang="de-DE" sz="2400" dirty="0" smtClean="0"/>
           </a:p>
         </p:txBody>
@@ -9516,6 +10374,152 @@
           </a:extLst>
         </p:spPr>
       </p:pic>
+      <p:sp>
+        <p:nvSpPr>
+          <p:cNvPr id="5" name="TextBox 4"/>
+          <p:cNvSpPr txBox="1"/>
+          <p:nvPr/>
+        </p:nvSpPr>
+        <p:spPr>
+          <a:xfrm>
+            <a:off x="947639" y="4725144"/>
+            <a:ext cx="7103676" cy="461665"/>
+          </a:xfrm>
+          <a:prstGeom prst="rect">
+            <a:avLst/>
+          </a:prstGeom>
+          <a:noFill/>
+        </p:spPr>
+        <p:txBody>
+          <a:bodyPr wrap="none" rtlCol="0">
+            <a:spAutoFit/>
+          </a:bodyPr>
+          <a:lstStyle/>
+          <a:p>
+            <a:pPr marL="285750" indent="-285750">
+              <a:buFont typeface="Arial" panose="020B0604020202020204" pitchFamily="34" charset="0"/>
+              <a:buChar char="•"/>
+            </a:pPr>
+            <a:r>
+              <a:rPr lang="de-DE" sz="2400" dirty="0" smtClean="0"/>
+              <a:t>Erlaubt die Extraktion von Werten aus F# Datentypen</a:t>
+            </a:r>
+            <a:endParaRPr lang="de-DE" sz="2400" dirty="0" smtClean="0"/>
+          </a:p>
+        </p:txBody>
+      </p:sp>
+      <p:sp>
+        <p:nvSpPr>
+          <p:cNvPr id="6" name="TextBox 5"/>
+          <p:cNvSpPr txBox="1"/>
+          <p:nvPr/>
+        </p:nvSpPr>
+        <p:spPr>
+          <a:xfrm>
+            <a:off x="947638" y="5559623"/>
+            <a:ext cx="4291624" cy="461665"/>
+          </a:xfrm>
+          <a:prstGeom prst="rect">
+            <a:avLst/>
+          </a:prstGeom>
+          <a:noFill/>
+        </p:spPr>
+        <p:txBody>
+          <a:bodyPr wrap="none" rtlCol="0">
+            <a:spAutoFit/>
+          </a:bodyPr>
+          <a:lstStyle/>
+          <a:p>
+            <a:pPr marL="285750" indent="-285750">
+              <a:buFont typeface="Arial" panose="020B0604020202020204" pitchFamily="34" charset="0"/>
+              <a:buChar char="•"/>
+            </a:pPr>
+            <a:r>
+              <a:rPr lang="de-DE" sz="2400" dirty="0" smtClean="0"/>
+              <a:t>(Vollständigkeit) Exhaustivness</a:t>
+            </a:r>
+            <a:endParaRPr lang="de-DE" sz="2400" dirty="0" smtClean="0"/>
+          </a:p>
+        </p:txBody>
+      </p:sp>
+      <p:sp>
+        <p:nvSpPr>
+          <p:cNvPr id="7" name="TextBox 6"/>
+          <p:cNvSpPr txBox="1"/>
+          <p:nvPr/>
+        </p:nvSpPr>
+        <p:spPr>
+          <a:xfrm>
+            <a:off x="971600" y="4309645"/>
+            <a:ext cx="5183855" cy="461665"/>
+          </a:xfrm>
+          <a:prstGeom prst="rect">
+            <a:avLst/>
+          </a:prstGeom>
+          <a:noFill/>
+        </p:spPr>
+        <p:txBody>
+          <a:bodyPr wrap="none" rtlCol="0">
+            <a:spAutoFit/>
+          </a:bodyPr>
+          <a:lstStyle/>
+          <a:p>
+            <a:pPr marL="285750" indent="-285750">
+              <a:buFont typeface="Arial" panose="020B0604020202020204" pitchFamily="34" charset="0"/>
+              <a:buChar char="•"/>
+            </a:pPr>
+            <a:r>
+              <a:rPr lang="de-DE" sz="2400" dirty="0" smtClean="0"/>
+              <a:t>Ist </a:t>
+            </a:r>
+            <a:r>
+              <a:rPr lang="de-DE" sz="2400" dirty="0" smtClean="0"/>
+              <a:t>ein Ausdruck und keine Anweisung</a:t>
+            </a:r>
+          </a:p>
+        </p:txBody>
+      </p:sp>
+      <p:sp>
+        <p:nvSpPr>
+          <p:cNvPr id="8" name="TextBox 7"/>
+          <p:cNvSpPr txBox="1"/>
+          <p:nvPr/>
+        </p:nvSpPr>
+        <p:spPr>
+          <a:xfrm>
+            <a:off x="971600" y="5127575"/>
+            <a:ext cx="6605142" cy="461665"/>
+          </a:xfrm>
+          <a:prstGeom prst="rect">
+            <a:avLst/>
+          </a:prstGeom>
+          <a:noFill/>
+        </p:spPr>
+        <p:txBody>
+          <a:bodyPr wrap="none" rtlCol="0">
+            <a:spAutoFit/>
+          </a:bodyPr>
+          <a:lstStyle/>
+          <a:p>
+            <a:pPr marL="285750" indent="-285750">
+              <a:buFont typeface="Arial" panose="020B0604020202020204" pitchFamily="34" charset="0"/>
+              <a:buChar char="•"/>
+            </a:pPr>
+            <a:r>
+              <a:rPr lang="de-DE" sz="2400" dirty="0" smtClean="0"/>
+              <a:t>Angepasst </a:t>
+            </a:r>
+            <a:r>
+              <a:rPr lang="de-DE" sz="2400" dirty="0"/>
+              <a:t>für die F# Datentypen, weniger für </a:t>
+            </a:r>
+            <a:r>
+              <a:rPr lang="de-DE" sz="2400" dirty="0" smtClean="0"/>
+              <a:t>OO</a:t>
+            </a:r>
+          </a:p>
+        </p:txBody>
+      </p:sp>
     </p:spTree>
     <p:extLst>
       <p:ext uri="{BB962C8B-B14F-4D97-AF65-F5344CB8AC3E}">
@@ -9624,6 +10628,186 @@
                       </p:childTnLst>
                     </p:cTn>
                   </p:par>
+                  <p:par>
+                    <p:cTn id="11" fill="hold">
+                      <p:stCondLst>
+                        <p:cond delay="indefinite"/>
+                      </p:stCondLst>
+                      <p:childTnLst>
+                        <p:par>
+                          <p:cTn id="12" fill="hold">
+                            <p:stCondLst>
+                              <p:cond delay="0"/>
+                            </p:stCondLst>
+                            <p:childTnLst>
+                              <p:par>
+                                <p:cTn id="13" presetID="1" presetClass="entr" presetSubtype="0" fill="hold" grpId="0" nodeType="clickEffect">
+                                  <p:stCondLst>
+                                    <p:cond delay="0"/>
+                                  </p:stCondLst>
+                                  <p:childTnLst>
+                                    <p:set>
+                                      <p:cBhvr>
+                                        <p:cTn id="14" dur="1" fill="hold">
+                                          <p:stCondLst>
+                                            <p:cond delay="0"/>
+                                          </p:stCondLst>
+                                        </p:cTn>
+                                        <p:tgtEl>
+                                          <p:spTgt spid="7"/>
+                                        </p:tgtEl>
+                                        <p:attrNameLst>
+                                          <p:attrName>style.visibility</p:attrName>
+                                        </p:attrNameLst>
+                                      </p:cBhvr>
+                                      <p:to>
+                                        <p:strVal val="visible"/>
+                                      </p:to>
+                                    </p:set>
+                                  </p:childTnLst>
+                                </p:cTn>
+                              </p:par>
+                            </p:childTnLst>
+                          </p:cTn>
+                        </p:par>
+                      </p:childTnLst>
+                    </p:cTn>
+                  </p:par>
+                  <p:par>
+                    <p:cTn id="15" fill="hold">
+                      <p:stCondLst>
+                        <p:cond delay="indefinite"/>
+                      </p:stCondLst>
+                      <p:childTnLst>
+                        <p:par>
+                          <p:cTn id="16" fill="hold">
+                            <p:stCondLst>
+                              <p:cond delay="0"/>
+                            </p:stCondLst>
+                            <p:childTnLst>
+                              <p:par>
+                                <p:cTn id="17" presetID="1" presetClass="entr" presetSubtype="0" fill="hold" grpId="0" nodeType="clickEffect">
+                                  <p:stCondLst>
+                                    <p:cond delay="0"/>
+                                  </p:stCondLst>
+                                  <p:childTnLst>
+                                    <p:set>
+                                      <p:cBhvr>
+                                        <p:cTn id="18" dur="1" fill="hold">
+                                          <p:stCondLst>
+                                            <p:cond delay="0"/>
+                                          </p:stCondLst>
+                                        </p:cTn>
+                                        <p:tgtEl>
+                                          <p:spTgt spid="5"/>
+                                        </p:tgtEl>
+                                        <p:attrNameLst>
+                                          <p:attrName>style.visibility</p:attrName>
+                                        </p:attrNameLst>
+                                      </p:cBhvr>
+                                      <p:to>
+                                        <p:strVal val="visible"/>
+                                      </p:to>
+                                    </p:set>
+                                  </p:childTnLst>
+                                </p:cTn>
+                              </p:par>
+                            </p:childTnLst>
+                          </p:cTn>
+                        </p:par>
+                      </p:childTnLst>
+                    </p:cTn>
+                  </p:par>
+                  <p:par>
+                    <p:cTn id="19" fill="hold">
+                      <p:stCondLst>
+                        <p:cond delay="indefinite"/>
+                      </p:stCondLst>
+                      <p:childTnLst>
+                        <p:par>
+                          <p:cTn id="20" fill="hold">
+                            <p:stCondLst>
+                              <p:cond delay="0"/>
+                            </p:stCondLst>
+                            <p:childTnLst>
+                              <p:par>
+                                <p:cTn id="21" presetID="1" presetClass="entr" presetSubtype="0" fill="hold" grpId="0" nodeType="clickEffect">
+                                  <p:stCondLst>
+                                    <p:cond delay="0"/>
+                                  </p:stCondLst>
+                                  <p:childTnLst>
+                                    <p:set>
+                                      <p:cBhvr>
+                                        <p:cTn id="22" dur="1" fill="hold">
+                                          <p:stCondLst>
+                                            <p:cond delay="0"/>
+                                          </p:stCondLst>
+                                        </p:cTn>
+                                        <p:tgtEl>
+                                          <p:spTgt spid="8"/>
+                                        </p:tgtEl>
+                                        <p:attrNameLst>
+                                          <p:attrName>style.visibility</p:attrName>
+                                        </p:attrNameLst>
+                                      </p:cBhvr>
+                                      <p:to>
+                                        <p:strVal val="visible"/>
+                                      </p:to>
+                                    </p:set>
+                                  </p:childTnLst>
+                                </p:cTn>
+                              </p:par>
+                            </p:childTnLst>
+                          </p:cTn>
+                        </p:par>
+                      </p:childTnLst>
+                    </p:cTn>
+                  </p:par>
+                  <p:par>
+                    <p:cTn id="23" fill="hold">
+                      <p:stCondLst>
+                        <p:cond delay="indefinite"/>
+                      </p:stCondLst>
+                      <p:childTnLst>
+                        <p:par>
+                          <p:cTn id="24" fill="hold">
+                            <p:stCondLst>
+                              <p:cond delay="0"/>
+                            </p:stCondLst>
+                            <p:childTnLst>
+                              <p:par>
+                                <p:cTn id="25" presetID="1" presetClass="entr" presetSubtype="0" fill="hold" grpId="0" nodeType="clickEffect">
+                                  <p:stCondLst>
+                                    <p:cond delay="0"/>
+                                  </p:stCondLst>
+                                  <p:childTnLst>
+                                    <p:set>
+                                      <p:cBhvr>
+                                        <p:cTn id="26" dur="1" fill="hold">
+                                          <p:stCondLst>
+                                            <p:cond delay="0"/>
+                                          </p:stCondLst>
+                                        </p:cTn>
+                                        <p:tgtEl>
+                                          <p:spTgt spid="6"/>
+                                        </p:tgtEl>
+                                        <p:attrNameLst>
+                                          <p:attrName>style.visibility</p:attrName>
+                                        </p:attrNameLst>
+                                      </p:cBhvr>
+                                      <p:to>
+                                        <p:strVal val="visible"/>
+                                      </p:to>
+                                    </p:set>
+                                  </p:childTnLst>
+                                </p:cTn>
+                              </p:par>
+                            </p:childTnLst>
+                          </p:cTn>
+                        </p:par>
+                      </p:childTnLst>
+                    </p:cTn>
+                  </p:par>
                 </p:childTnLst>
               </p:cTn>
               <p:prevCondLst>
@@ -9647,12 +10831,16 @@
     </p:tnLst>
     <p:bldLst>
       <p:bldP spid="4" grpId="0"/>
+      <p:bldP spid="5" grpId="0"/>
+      <p:bldP spid="6" grpId="0"/>
+      <p:bldP spid="7" grpId="0"/>
+      <p:bldP spid="8" grpId="0"/>
     </p:bldLst>
   </p:timing>
 </p:sld>
 </file>
 
-<file path=ppt/slides/slide17.xml><?xml version="1.0" encoding="utf-8"?>
+<file path=ppt/slides/slide18.xml><?xml version="1.0" encoding="utf-8"?>
 <p:sld xmlns:a="http://schemas.openxmlformats.org/drawingml/2006/main" xmlns:r="http://schemas.openxmlformats.org/officeDocument/2006/relationships" xmlns:p="http://schemas.openxmlformats.org/presentationml/2006/main">
   <p:cSld>
     <p:spTree>
@@ -9720,7 +10908,12 @@
             <p:ph idx="1"/>
           </p:nvPr>
         </p:nvSpPr>
-        <p:spPr/>
+        <p:spPr>
+          <a:xfrm>
+            <a:off x="457200" y="1600201"/>
+            <a:ext cx="8229600" cy="3484984"/>
+          </a:xfrm>
+        </p:spPr>
         <p:txBody>
           <a:bodyPr/>
           <a:lstStyle/>
@@ -9734,10 +10927,6 @@
             </a:r>
           </a:p>
           <a:p>
-            <a:pPr>
-              <a:buFontTx/>
-              <a:buChar char="-"/>
-            </a:pPr>
             <a:r>
               <a:rPr lang="de-DE" dirty="0" err="1" smtClean="0"/>
               <a:t>Werttyp</a:t>
@@ -9756,10 +10945,6 @@
             </a:r>
           </a:p>
           <a:p>
-            <a:pPr>
-              <a:buFontTx/>
-              <a:buChar char="-"/>
-            </a:pPr>
             <a:r>
               <a:rPr lang="de-DE" dirty="0" err="1" smtClean="0"/>
               <a:t>Struct</a:t>
@@ -9778,10 +10963,6 @@
             </a:r>
           </a:p>
           <a:p>
-            <a:pPr>
-              <a:buFontTx/>
-              <a:buChar char="-"/>
-            </a:pPr>
             <a:r>
               <a:rPr lang="de-DE" dirty="0" smtClean="0"/>
               <a:t>Instanzen: Referenzen werden abgeglichen</a:t>
@@ -9803,14 +10984,236 @@
   <p:timing>
     <p:tnLst>
       <p:par>
-        <p:cTn id="1" dur="indefinite" restart="never" nodeType="tmRoot"/>
+        <p:cTn id="1" dur="indefinite" restart="never" nodeType="tmRoot">
+          <p:childTnLst>
+            <p:seq concurrent="1" nextAc="seek">
+              <p:cTn id="2" dur="indefinite" nodeType="mainSeq">
+                <p:childTnLst>
+                  <p:par>
+                    <p:cTn id="3" fill="hold">
+                      <p:stCondLst>
+                        <p:cond delay="indefinite"/>
+                      </p:stCondLst>
+                      <p:childTnLst>
+                        <p:par>
+                          <p:cTn id="4" fill="hold">
+                            <p:stCondLst>
+                              <p:cond delay="0"/>
+                            </p:stCondLst>
+                            <p:childTnLst>
+                              <p:par>
+                                <p:cTn id="5" presetID="1" presetClass="entr" presetSubtype="0" fill="hold" grpId="0" nodeType="clickEffect">
+                                  <p:stCondLst>
+                                    <p:cond delay="0"/>
+                                  </p:stCondLst>
+                                  <p:childTnLst>
+                                    <p:set>
+                                      <p:cBhvr>
+                                        <p:cTn id="6" dur="1" fill="hold">
+                                          <p:stCondLst>
+                                            <p:cond delay="0"/>
+                                          </p:stCondLst>
+                                        </p:cTn>
+                                        <p:tgtEl>
+                                          <p:spTgt spid="3">
+                                            <p:txEl>
+                                              <p:pRg st="0" end="0"/>
+                                            </p:txEl>
+                                          </p:spTgt>
+                                        </p:tgtEl>
+                                        <p:attrNameLst>
+                                          <p:attrName>style.visibility</p:attrName>
+                                        </p:attrNameLst>
+                                      </p:cBhvr>
+                                      <p:to>
+                                        <p:strVal val="visible"/>
+                                      </p:to>
+                                    </p:set>
+                                  </p:childTnLst>
+                                </p:cTn>
+                              </p:par>
+                            </p:childTnLst>
+                          </p:cTn>
+                        </p:par>
+                      </p:childTnLst>
+                    </p:cTn>
+                  </p:par>
+                  <p:par>
+                    <p:cTn id="7" fill="hold">
+                      <p:stCondLst>
+                        <p:cond delay="indefinite"/>
+                      </p:stCondLst>
+                      <p:childTnLst>
+                        <p:par>
+                          <p:cTn id="8" fill="hold">
+                            <p:stCondLst>
+                              <p:cond delay="0"/>
+                            </p:stCondLst>
+                            <p:childTnLst>
+                              <p:par>
+                                <p:cTn id="9" presetID="1" presetClass="entr" presetSubtype="0" fill="hold" grpId="0" nodeType="clickEffect">
+                                  <p:stCondLst>
+                                    <p:cond delay="0"/>
+                                  </p:stCondLst>
+                                  <p:childTnLst>
+                                    <p:set>
+                                      <p:cBhvr>
+                                        <p:cTn id="10" dur="1" fill="hold">
+                                          <p:stCondLst>
+                                            <p:cond delay="0"/>
+                                          </p:stCondLst>
+                                        </p:cTn>
+                                        <p:tgtEl>
+                                          <p:spTgt spid="3">
+                                            <p:txEl>
+                                              <p:pRg st="1" end="1"/>
+                                            </p:txEl>
+                                          </p:spTgt>
+                                        </p:tgtEl>
+                                        <p:attrNameLst>
+                                          <p:attrName>style.visibility</p:attrName>
+                                        </p:attrNameLst>
+                                      </p:cBhvr>
+                                      <p:to>
+                                        <p:strVal val="visible"/>
+                                      </p:to>
+                                    </p:set>
+                                  </p:childTnLst>
+                                </p:cTn>
+                              </p:par>
+                            </p:childTnLst>
+                          </p:cTn>
+                        </p:par>
+                      </p:childTnLst>
+                    </p:cTn>
+                  </p:par>
+                  <p:par>
+                    <p:cTn id="11" fill="hold">
+                      <p:stCondLst>
+                        <p:cond delay="indefinite"/>
+                      </p:stCondLst>
+                      <p:childTnLst>
+                        <p:par>
+                          <p:cTn id="12" fill="hold">
+                            <p:stCondLst>
+                              <p:cond delay="0"/>
+                            </p:stCondLst>
+                            <p:childTnLst>
+                              <p:par>
+                                <p:cTn id="13" presetID="1" presetClass="entr" presetSubtype="0" fill="hold" grpId="0" nodeType="clickEffect">
+                                  <p:stCondLst>
+                                    <p:cond delay="0"/>
+                                  </p:stCondLst>
+                                  <p:childTnLst>
+                                    <p:set>
+                                      <p:cBhvr>
+                                        <p:cTn id="14" dur="1" fill="hold">
+                                          <p:stCondLst>
+                                            <p:cond delay="0"/>
+                                          </p:stCondLst>
+                                        </p:cTn>
+                                        <p:tgtEl>
+                                          <p:spTgt spid="3">
+                                            <p:txEl>
+                                              <p:pRg st="2" end="2"/>
+                                            </p:txEl>
+                                          </p:spTgt>
+                                        </p:tgtEl>
+                                        <p:attrNameLst>
+                                          <p:attrName>style.visibility</p:attrName>
+                                        </p:attrNameLst>
+                                      </p:cBhvr>
+                                      <p:to>
+                                        <p:strVal val="visible"/>
+                                      </p:to>
+                                    </p:set>
+                                  </p:childTnLst>
+                                </p:cTn>
+                              </p:par>
+                            </p:childTnLst>
+                          </p:cTn>
+                        </p:par>
+                      </p:childTnLst>
+                    </p:cTn>
+                  </p:par>
+                  <p:par>
+                    <p:cTn id="15" fill="hold">
+                      <p:stCondLst>
+                        <p:cond delay="indefinite"/>
+                      </p:stCondLst>
+                      <p:childTnLst>
+                        <p:par>
+                          <p:cTn id="16" fill="hold">
+                            <p:stCondLst>
+                              <p:cond delay="0"/>
+                            </p:stCondLst>
+                            <p:childTnLst>
+                              <p:par>
+                                <p:cTn id="17" presetID="1" presetClass="entr" presetSubtype="0" fill="hold" grpId="0" nodeType="clickEffect">
+                                  <p:stCondLst>
+                                    <p:cond delay="0"/>
+                                  </p:stCondLst>
+                                  <p:childTnLst>
+                                    <p:set>
+                                      <p:cBhvr>
+                                        <p:cTn id="18" dur="1" fill="hold">
+                                          <p:stCondLst>
+                                            <p:cond delay="0"/>
+                                          </p:stCondLst>
+                                        </p:cTn>
+                                        <p:tgtEl>
+                                          <p:spTgt spid="3">
+                                            <p:txEl>
+                                              <p:pRg st="3" end="3"/>
+                                            </p:txEl>
+                                          </p:spTgt>
+                                        </p:tgtEl>
+                                        <p:attrNameLst>
+                                          <p:attrName>style.visibility</p:attrName>
+                                        </p:attrNameLst>
+                                      </p:cBhvr>
+                                      <p:to>
+                                        <p:strVal val="visible"/>
+                                      </p:to>
+                                    </p:set>
+                                  </p:childTnLst>
+                                </p:cTn>
+                              </p:par>
+                            </p:childTnLst>
+                          </p:cTn>
+                        </p:par>
+                      </p:childTnLst>
+                    </p:cTn>
+                  </p:par>
+                </p:childTnLst>
+              </p:cTn>
+              <p:prevCondLst>
+                <p:cond evt="onPrev" delay="0">
+                  <p:tgtEl>
+                    <p:sldTgt/>
+                  </p:tgtEl>
+                </p:cond>
+              </p:prevCondLst>
+              <p:nextCondLst>
+                <p:cond evt="onNext" delay="0">
+                  <p:tgtEl>
+                    <p:sldTgt/>
+                  </p:tgtEl>
+                </p:cond>
+              </p:nextCondLst>
+            </p:seq>
+          </p:childTnLst>
+        </p:cTn>
       </p:par>
     </p:tnLst>
+    <p:bldLst>
+      <p:bldP spid="3" grpId="0" build="p"/>
+    </p:bldLst>
   </p:timing>
 </p:sld>
 </file>
 
-<file path=ppt/slides/slide18.xml><?xml version="1.0" encoding="utf-8"?>
+<file path=ppt/slides/slide19.xml><?xml version="1.0" encoding="utf-8"?>
 <p:sld xmlns:a="http://schemas.openxmlformats.org/drawingml/2006/main" xmlns:r="http://schemas.openxmlformats.org/officeDocument/2006/relationships" xmlns:p="http://schemas.openxmlformats.org/presentationml/2006/main">
   <p:cSld>
     <p:spTree>
@@ -9960,8 +11363,8 @@
         </p:blipFill>
         <p:spPr bwMode="auto">
           <a:xfrm>
-            <a:off x="611560" y="3826346"/>
-            <a:ext cx="5314950" cy="2266950"/>
+            <a:off x="611560" y="3826345"/>
+            <a:ext cx="6408712" cy="2733465"/>
           </a:xfrm>
           <a:prstGeom prst="rect">
             <a:avLst/>
@@ -11109,9 +12512,6 @@
           </a:bodyPr>
           <a:lstStyle/>
           <a:p>
-            <a:pPr marL="0" indent="0">
-              <a:buNone/>
-            </a:pPr>
             <a:r>
               <a:rPr lang="de-DE" dirty="0" err="1"/>
               <a:t>JQuery</a:t>
@@ -11122,9 +12522,6 @@
             </a:r>
           </a:p>
           <a:p>
-            <a:pPr marL="0" indent="0">
-              <a:buNone/>
-            </a:pPr>
             <a:r>
               <a:rPr lang="de-DE" dirty="0" smtClean="0"/>
               <a:t>C</a:t>
@@ -11139,9 +12536,6 @@
             </a:r>
           </a:p>
           <a:p>
-            <a:pPr marL="0" indent="0">
-              <a:buNone/>
-            </a:pPr>
             <a:r>
               <a:rPr lang="de-DE" dirty="0" err="1" smtClean="0"/>
               <a:t>Func</a:t>
@@ -11152,9 +12546,6 @@
             </a:r>
           </a:p>
           <a:p>
-            <a:pPr marL="0" indent="0">
-              <a:buNone/>
-            </a:pPr>
             <a:r>
               <a:rPr lang="de-DE" dirty="0" err="1" smtClean="0"/>
               <a:t>Immutability</a:t>
@@ -11169,21 +12560,9 @@
             </a:r>
           </a:p>
           <a:p>
-            <a:pPr marL="0" indent="0">
-              <a:buNone/>
-            </a:pPr>
             <a:r>
               <a:rPr lang="de-DE" dirty="0" smtClean="0"/>
               <a:t>Erfolge: WhatsApp, Jane Street</a:t>
-            </a:r>
-          </a:p>
-          <a:p>
-            <a:pPr marL="0" indent="0">
-              <a:buNone/>
-            </a:pPr>
-            <a:r>
-              <a:rPr lang="de-DE" dirty="0" smtClean="0"/>
-              <a:t>OO Unzulänglichkeiten: Noch mehr Frameworks</a:t>
             </a:r>
           </a:p>
           <a:p>
@@ -11469,55 +12848,6 @@
                       </p:childTnLst>
                     </p:cTn>
                   </p:par>
-                  <p:par>
-                    <p:cTn id="23" fill="hold">
-                      <p:stCondLst>
-                        <p:cond delay="indefinite"/>
-                      </p:stCondLst>
-                      <p:childTnLst>
-                        <p:par>
-                          <p:cTn id="24" fill="hold">
-                            <p:stCondLst>
-                              <p:cond delay="0"/>
-                            </p:stCondLst>
-                            <p:childTnLst>
-                              <p:par>
-                                <p:cTn id="25" presetID="1" presetClass="entr" presetSubtype="0" fill="hold" nodeType="clickEffect">
-                                  <p:stCondLst>
-                                    <p:cond delay="0"/>
-                                  </p:stCondLst>
-                                  <p:childTnLst>
-                                    <p:set>
-                                      <p:cBhvr>
-                                        <p:cTn id="26" dur="1" fill="hold">
-                                          <p:stCondLst>
-                                            <p:cond delay="0"/>
-                                          </p:stCondLst>
-                                        </p:cTn>
-                                        <p:tgtEl>
-                                          <p:spTgt spid="3">
-                                            <p:txEl>
-                                              <p:pRg st="5" end="5"/>
-                                            </p:txEl>
-                                          </p:spTgt>
-                                        </p:tgtEl>
-                                        <p:attrNameLst>
-                                          <p:attrName>style.visibility</p:attrName>
-                                        </p:attrNameLst>
-                                      </p:cBhvr>
-                                      <p:to>
-                                        <p:strVal val="visible"/>
-                                      </p:to>
-                                    </p:set>
-                                  </p:childTnLst>
-                                </p:cTn>
-                              </p:par>
-                            </p:childTnLst>
-                          </p:cTn>
-                        </p:par>
-                      </p:childTnLst>
-                    </p:cTn>
-                  </p:par>
                 </p:childTnLst>
               </p:cTn>
               <p:prevCondLst>
@@ -11605,13 +12935,13 @@
             </a:pPr>
             <a:r>
               <a:rPr lang="de-DE" dirty="0" smtClean="0"/>
-              <a:t>Funktionen sind auch nur Typen, können als Input, als Output verwendet werden</a:t>
+              <a:t>Funktionen sind auch nur Typen</a:t>
             </a:r>
           </a:p>
           <a:p>
             <a:r>
               <a:rPr lang="de-DE" dirty="0" smtClean="0"/>
-              <a:t>Können Namen haben</a:t>
+              <a:t>Haben Bezeichner</a:t>
             </a:r>
           </a:p>
           <a:p>
@@ -11635,7 +12965,7 @@
           <a:p>
             <a:r>
               <a:rPr lang="de-DE" dirty="0" smtClean="0"/>
-              <a:t>Funktion ist keine Anweisung</a:t>
+              <a:t>„Reine“ (pure) Funktionen haben keine Nebenwirkung</a:t>
             </a:r>
           </a:p>
         </p:txBody>
@@ -12009,6 +13339,370 @@
           <a:bodyPr/>
           <a:lstStyle/>
           <a:p>
+            <a:r>
+              <a:rPr lang="de-DE" dirty="0" smtClean="0"/>
+              <a:t>Ideen aus der FP Welt</a:t>
+            </a:r>
+            <a:endParaRPr lang="en-US" dirty="0"/>
+          </a:p>
+        </p:txBody>
+      </p:sp>
+      <p:sp>
+        <p:nvSpPr>
+          <p:cNvPr id="3" name="Content Placeholder 2"/>
+          <p:cNvSpPr>
+            <a:spLocks noGrp="1"/>
+          </p:cNvSpPr>
+          <p:nvPr>
+            <p:ph idx="1"/>
+          </p:nvPr>
+        </p:nvSpPr>
+        <p:spPr>
+          <a:xfrm>
+            <a:off x="457200" y="1600201"/>
+            <a:ext cx="8229600" cy="604664"/>
+          </a:xfrm>
+        </p:spPr>
+        <p:txBody>
+          <a:bodyPr/>
+          <a:lstStyle/>
+          <a:p>
+            <a:pPr marL="0" indent="0">
+              <a:buNone/>
+            </a:pPr>
+            <a:r>
+              <a:rPr lang="de-DE" dirty="0" smtClean="0"/>
+              <a:t>Funktionen vs. Ausdrucke</a:t>
+            </a:r>
+            <a:endParaRPr lang="en-US" dirty="0"/>
+          </a:p>
+        </p:txBody>
+      </p:sp>
+      <p:pic>
+        <p:nvPicPr>
+          <p:cNvPr id="1029" name="Picture 5"/>
+          <p:cNvPicPr>
+            <a:picLocks noChangeAspect="1" noChangeArrowheads="1"/>
+          </p:cNvPicPr>
+          <p:nvPr/>
+        </p:nvPicPr>
+        <p:blipFill>
+          <a:blip r:embed="rId3">
+            <a:extLst>
+              <a:ext uri="{28A0092B-C50C-407E-A947-70E740481C1C}">
+                <a14:useLocalDpi xmlns:a14="http://schemas.microsoft.com/office/drawing/2010/main" val="0"/>
+              </a:ext>
+            </a:extLst>
+          </a:blip>
+          <a:srcRect/>
+          <a:stretch>
+            <a:fillRect/>
+          </a:stretch>
+        </p:blipFill>
+        <p:spPr bwMode="auto">
+          <a:xfrm>
+            <a:off x="539552" y="2204864"/>
+            <a:ext cx="4410075" cy="2724150"/>
+          </a:xfrm>
+          <a:prstGeom prst="rect">
+            <a:avLst/>
+          </a:prstGeom>
+          <a:noFill/>
+          <a:ln>
+            <a:noFill/>
+          </a:ln>
+          <a:extLst>
+            <a:ext uri="{909E8E84-426E-40DD-AFC4-6F175D3DCCD1}">
+              <a14:hiddenFill xmlns:a14="http://schemas.microsoft.com/office/drawing/2010/main">
+                <a:solidFill>
+                  <a:schemeClr val="accent1"/>
+                </a:solidFill>
+              </a14:hiddenFill>
+            </a:ext>
+            <a:ext uri="{91240B29-F687-4F45-9708-019B960494DF}">
+              <a14:hiddenLine xmlns:a14="http://schemas.microsoft.com/office/drawing/2010/main" w="9525">
+                <a:solidFill>
+                  <a:schemeClr val="tx1"/>
+                </a:solidFill>
+                <a:miter lim="800000"/>
+                <a:headEnd/>
+                <a:tailEnd/>
+              </a14:hiddenLine>
+            </a:ext>
+          </a:extLst>
+        </p:spPr>
+      </p:pic>
+      <p:pic>
+        <p:nvPicPr>
+          <p:cNvPr id="1030" name="Picture 6"/>
+          <p:cNvPicPr>
+            <a:picLocks noChangeAspect="1" noChangeArrowheads="1"/>
+          </p:cNvPicPr>
+          <p:nvPr/>
+        </p:nvPicPr>
+        <p:blipFill>
+          <a:blip r:embed="rId4">
+            <a:extLst>
+              <a:ext uri="{28A0092B-C50C-407E-A947-70E740481C1C}">
+                <a14:useLocalDpi xmlns:a14="http://schemas.microsoft.com/office/drawing/2010/main" val="0"/>
+              </a:ext>
+            </a:extLst>
+          </a:blip>
+          <a:srcRect/>
+          <a:stretch>
+            <a:fillRect/>
+          </a:stretch>
+        </p:blipFill>
+        <p:spPr bwMode="auto">
+          <a:xfrm>
+            <a:off x="568127" y="4971876"/>
+            <a:ext cx="4552950" cy="1209675"/>
+          </a:xfrm>
+          <a:prstGeom prst="rect">
+            <a:avLst/>
+          </a:prstGeom>
+          <a:noFill/>
+          <a:ln>
+            <a:noFill/>
+          </a:ln>
+          <a:extLst>
+            <a:ext uri="{909E8E84-426E-40DD-AFC4-6F175D3DCCD1}">
+              <a14:hiddenFill xmlns:a14="http://schemas.microsoft.com/office/drawing/2010/main">
+                <a:solidFill>
+                  <a:schemeClr val="accent1"/>
+                </a:solidFill>
+              </a14:hiddenFill>
+            </a:ext>
+            <a:ext uri="{91240B29-F687-4F45-9708-019B960494DF}">
+              <a14:hiddenLine xmlns:a14="http://schemas.microsoft.com/office/drawing/2010/main" w="9525">
+                <a:solidFill>
+                  <a:schemeClr val="tx1"/>
+                </a:solidFill>
+                <a:miter lim="800000"/>
+                <a:headEnd/>
+                <a:tailEnd/>
+              </a14:hiddenLine>
+            </a:ext>
+          </a:extLst>
+        </p:spPr>
+      </p:pic>
+    </p:spTree>
+    <p:extLst>
+      <p:ext uri="{BB962C8B-B14F-4D97-AF65-F5344CB8AC3E}">
+        <p14:creationId xmlns:p14="http://schemas.microsoft.com/office/powerpoint/2010/main" val="211290368"/>
+      </p:ext>
+    </p:extLst>
+  </p:cSld>
+  <p:clrMapOvr>
+    <a:masterClrMapping/>
+  </p:clrMapOvr>
+  <p:timing>
+    <p:tnLst>
+      <p:par>
+        <p:cTn id="1" dur="indefinite" restart="never" nodeType="tmRoot">
+          <p:childTnLst>
+            <p:seq concurrent="1" nextAc="seek">
+              <p:cTn id="2" dur="indefinite" nodeType="mainSeq">
+                <p:childTnLst>
+                  <p:par>
+                    <p:cTn id="3" fill="hold">
+                      <p:stCondLst>
+                        <p:cond delay="indefinite"/>
+                      </p:stCondLst>
+                      <p:childTnLst>
+                        <p:par>
+                          <p:cTn id="4" fill="hold">
+                            <p:stCondLst>
+                              <p:cond delay="0"/>
+                            </p:stCondLst>
+                            <p:childTnLst>
+                              <p:par>
+                                <p:cTn id="5" presetID="1" presetClass="entr" presetSubtype="0" fill="hold" grpId="0" nodeType="clickEffect">
+                                  <p:stCondLst>
+                                    <p:cond delay="0"/>
+                                  </p:stCondLst>
+                                  <p:childTnLst>
+                                    <p:set>
+                                      <p:cBhvr>
+                                        <p:cTn id="6" dur="1" fill="hold">
+                                          <p:stCondLst>
+                                            <p:cond delay="0"/>
+                                          </p:stCondLst>
+                                        </p:cTn>
+                                        <p:tgtEl>
+                                          <p:spTgt spid="3">
+                                            <p:txEl>
+                                              <p:pRg st="0" end="0"/>
+                                            </p:txEl>
+                                          </p:spTgt>
+                                        </p:tgtEl>
+                                        <p:attrNameLst>
+                                          <p:attrName>style.visibility</p:attrName>
+                                        </p:attrNameLst>
+                                      </p:cBhvr>
+                                      <p:to>
+                                        <p:strVal val="visible"/>
+                                      </p:to>
+                                    </p:set>
+                                  </p:childTnLst>
+                                </p:cTn>
+                              </p:par>
+                            </p:childTnLst>
+                          </p:cTn>
+                        </p:par>
+                      </p:childTnLst>
+                    </p:cTn>
+                  </p:par>
+                  <p:par>
+                    <p:cTn id="7" fill="hold">
+                      <p:stCondLst>
+                        <p:cond delay="indefinite"/>
+                      </p:stCondLst>
+                      <p:childTnLst>
+                        <p:par>
+                          <p:cTn id="8" fill="hold">
+                            <p:stCondLst>
+                              <p:cond delay="0"/>
+                            </p:stCondLst>
+                            <p:childTnLst>
+                              <p:par>
+                                <p:cTn id="9" presetID="1" presetClass="entr" presetSubtype="0" fill="hold" nodeType="clickEffect">
+                                  <p:stCondLst>
+                                    <p:cond delay="0"/>
+                                  </p:stCondLst>
+                                  <p:childTnLst>
+                                    <p:set>
+                                      <p:cBhvr>
+                                        <p:cTn id="10" dur="1" fill="hold">
+                                          <p:stCondLst>
+                                            <p:cond delay="0"/>
+                                          </p:stCondLst>
+                                        </p:cTn>
+                                        <p:tgtEl>
+                                          <p:spTgt spid="1029"/>
+                                        </p:tgtEl>
+                                        <p:attrNameLst>
+                                          <p:attrName>style.visibility</p:attrName>
+                                        </p:attrNameLst>
+                                      </p:cBhvr>
+                                      <p:to>
+                                        <p:strVal val="visible"/>
+                                      </p:to>
+                                    </p:set>
+                                  </p:childTnLst>
+                                </p:cTn>
+                              </p:par>
+                            </p:childTnLst>
+                          </p:cTn>
+                        </p:par>
+                      </p:childTnLst>
+                    </p:cTn>
+                  </p:par>
+                  <p:par>
+                    <p:cTn id="11" fill="hold">
+                      <p:stCondLst>
+                        <p:cond delay="indefinite"/>
+                      </p:stCondLst>
+                      <p:childTnLst>
+                        <p:par>
+                          <p:cTn id="12" fill="hold">
+                            <p:stCondLst>
+                              <p:cond delay="0"/>
+                            </p:stCondLst>
+                            <p:childTnLst>
+                              <p:par>
+                                <p:cTn id="13" presetID="1" presetClass="entr" presetSubtype="0" fill="hold" nodeType="clickEffect">
+                                  <p:stCondLst>
+                                    <p:cond delay="0"/>
+                                  </p:stCondLst>
+                                  <p:childTnLst>
+                                    <p:set>
+                                      <p:cBhvr>
+                                        <p:cTn id="14" dur="1" fill="hold">
+                                          <p:stCondLst>
+                                            <p:cond delay="0"/>
+                                          </p:stCondLst>
+                                        </p:cTn>
+                                        <p:tgtEl>
+                                          <p:spTgt spid="1030"/>
+                                        </p:tgtEl>
+                                        <p:attrNameLst>
+                                          <p:attrName>style.visibility</p:attrName>
+                                        </p:attrNameLst>
+                                      </p:cBhvr>
+                                      <p:to>
+                                        <p:strVal val="visible"/>
+                                      </p:to>
+                                    </p:set>
+                                  </p:childTnLst>
+                                </p:cTn>
+                              </p:par>
+                            </p:childTnLst>
+                          </p:cTn>
+                        </p:par>
+                      </p:childTnLst>
+                    </p:cTn>
+                  </p:par>
+                </p:childTnLst>
+              </p:cTn>
+              <p:prevCondLst>
+                <p:cond evt="onPrev" delay="0">
+                  <p:tgtEl>
+                    <p:sldTgt/>
+                  </p:tgtEl>
+                </p:cond>
+              </p:prevCondLst>
+              <p:nextCondLst>
+                <p:cond evt="onNext" delay="0">
+                  <p:tgtEl>
+                    <p:sldTgt/>
+                  </p:tgtEl>
+                </p:cond>
+              </p:nextCondLst>
+            </p:seq>
+          </p:childTnLst>
+        </p:cTn>
+      </p:par>
+    </p:tnLst>
+    <p:bldLst>
+      <p:bldP spid="3" grpId="0" build="p"/>
+    </p:bldLst>
+  </p:timing>
+</p:sld>
+</file>
+
+<file path=ppt/slides/slide9.xml><?xml version="1.0" encoding="utf-8"?>
+<p:sld xmlns:a="http://schemas.openxmlformats.org/drawingml/2006/main" xmlns:r="http://schemas.openxmlformats.org/officeDocument/2006/relationships" xmlns:p="http://schemas.openxmlformats.org/presentationml/2006/main">
+  <p:cSld>
+    <p:spTree>
+      <p:nvGrpSpPr>
+        <p:cNvPr id="1" name=""/>
+        <p:cNvGrpSpPr/>
+        <p:nvPr/>
+      </p:nvGrpSpPr>
+      <p:grpSpPr>
+        <a:xfrm>
+          <a:off x="0" y="0"/>
+          <a:ext cx="0" cy="0"/>
+          <a:chOff x="0" y="0"/>
+          <a:chExt cx="0" cy="0"/>
+        </a:xfrm>
+      </p:grpSpPr>
+      <p:sp>
+        <p:nvSpPr>
+          <p:cNvPr id="2" name="Title 1"/>
+          <p:cNvSpPr>
+            <a:spLocks noGrp="1"/>
+          </p:cNvSpPr>
+          <p:nvPr>
+            <p:ph type="title"/>
+          </p:nvPr>
+        </p:nvSpPr>
+        <p:spPr/>
+        <p:txBody>
+          <a:bodyPr/>
+          <a:lstStyle/>
+          <a:p>
             <a:pPr marL="0" indent="0"/>
             <a:r>
               <a:rPr lang="de-DE" dirty="0"/>
@@ -12049,19 +13743,17 @@
           <a:p>
             <a:r>
               <a:rPr lang="de-DE" dirty="0" smtClean="0"/>
-              <a:t>Datenstruktur beinhalten nur Daten</a:t>
+              <a:t>Datenstruktur beinhaltet nur Daten</a:t>
             </a:r>
           </a:p>
           <a:p>
             <a:r>
               <a:rPr lang="de-DE" dirty="0" smtClean="0"/>
-              <a:t>Funktionen dienen der Transformation</a:t>
-            </a:r>
-          </a:p>
-          <a:p>
+              <a:t>Komposition</a:t>
+            </a:r>
             <a:r>
               <a:rPr lang="de-DE" dirty="0"/>
-              <a:t>Komposition: light-</a:t>
+              <a:t>: light-</a:t>
             </a:r>
             <a:r>
               <a:rPr lang="de-DE" dirty="0" err="1"/>
@@ -12100,12 +13792,6 @@
               <a:t>Vererbung</a:t>
             </a:r>
             <a:endParaRPr lang="de-DE" dirty="0"/>
-          </a:p>
-          <a:p>
-            <a:r>
-              <a:rPr lang="de-DE" dirty="0" smtClean="0"/>
-              <a:t>F# ist eine .net Sprache: Alles was in C# (IL) möglich ist</a:t>
-            </a:r>
           </a:p>
           <a:p>
             <a:pPr marL="0" indent="0">
@@ -12260,538 +13946,6 @@
                                           <p:spTgt spid="3">
                                             <p:txEl>
                                               <p:pRg st="2" end="2"/>
-                                            </p:txEl>
-                                          </p:spTgt>
-                                        </p:tgtEl>
-                                        <p:attrNameLst>
-                                          <p:attrName>style.visibility</p:attrName>
-                                        </p:attrNameLst>
-                                      </p:cBhvr>
-                                      <p:to>
-                                        <p:strVal val="visible"/>
-                                      </p:to>
-                                    </p:set>
-                                  </p:childTnLst>
-                                </p:cTn>
-                              </p:par>
-                            </p:childTnLst>
-                          </p:cTn>
-                        </p:par>
-                      </p:childTnLst>
-                    </p:cTn>
-                  </p:par>
-                  <p:par>
-                    <p:cTn id="15" fill="hold">
-                      <p:stCondLst>
-                        <p:cond delay="indefinite"/>
-                      </p:stCondLst>
-                      <p:childTnLst>
-                        <p:par>
-                          <p:cTn id="16" fill="hold">
-                            <p:stCondLst>
-                              <p:cond delay="0"/>
-                            </p:stCondLst>
-                            <p:childTnLst>
-                              <p:par>
-                                <p:cTn id="17" presetID="1" presetClass="entr" presetSubtype="0" fill="hold" nodeType="clickEffect">
-                                  <p:stCondLst>
-                                    <p:cond delay="0"/>
-                                  </p:stCondLst>
-                                  <p:childTnLst>
-                                    <p:set>
-                                      <p:cBhvr>
-                                        <p:cTn id="18" dur="1" fill="hold">
-                                          <p:stCondLst>
-                                            <p:cond delay="0"/>
-                                          </p:stCondLst>
-                                        </p:cTn>
-                                        <p:tgtEl>
-                                          <p:spTgt spid="3">
-                                            <p:txEl>
-                                              <p:pRg st="3" end="3"/>
-                                            </p:txEl>
-                                          </p:spTgt>
-                                        </p:tgtEl>
-                                        <p:attrNameLst>
-                                          <p:attrName>style.visibility</p:attrName>
-                                        </p:attrNameLst>
-                                      </p:cBhvr>
-                                      <p:to>
-                                        <p:strVal val="visible"/>
-                                      </p:to>
-                                    </p:set>
-                                  </p:childTnLst>
-                                </p:cTn>
-                              </p:par>
-                            </p:childTnLst>
-                          </p:cTn>
-                        </p:par>
-                      </p:childTnLst>
-                    </p:cTn>
-                  </p:par>
-                  <p:par>
-                    <p:cTn id="19" fill="hold">
-                      <p:stCondLst>
-                        <p:cond delay="indefinite"/>
-                      </p:stCondLst>
-                      <p:childTnLst>
-                        <p:par>
-                          <p:cTn id="20" fill="hold">
-                            <p:stCondLst>
-                              <p:cond delay="0"/>
-                            </p:stCondLst>
-                            <p:childTnLst>
-                              <p:par>
-                                <p:cTn id="21" presetID="1" presetClass="entr" presetSubtype="0" fill="hold" nodeType="clickEffect">
-                                  <p:stCondLst>
-                                    <p:cond delay="0"/>
-                                  </p:stCondLst>
-                                  <p:childTnLst>
-                                    <p:set>
-                                      <p:cBhvr>
-                                        <p:cTn id="22" dur="1" fill="hold">
-                                          <p:stCondLst>
-                                            <p:cond delay="0"/>
-                                          </p:stCondLst>
-                                        </p:cTn>
-                                        <p:tgtEl>
-                                          <p:spTgt spid="3">
-                                            <p:txEl>
-                                              <p:pRg st="4" end="4"/>
-                                            </p:txEl>
-                                          </p:spTgt>
-                                        </p:tgtEl>
-                                        <p:attrNameLst>
-                                          <p:attrName>style.visibility</p:attrName>
-                                        </p:attrNameLst>
-                                      </p:cBhvr>
-                                      <p:to>
-                                        <p:strVal val="visible"/>
-                                      </p:to>
-                                    </p:set>
-                                  </p:childTnLst>
-                                </p:cTn>
-                              </p:par>
-                            </p:childTnLst>
-                          </p:cTn>
-                        </p:par>
-                      </p:childTnLst>
-                    </p:cTn>
-                  </p:par>
-                </p:childTnLst>
-              </p:cTn>
-              <p:prevCondLst>
-                <p:cond evt="onPrev" delay="0">
-                  <p:tgtEl>
-                    <p:sldTgt/>
-                  </p:tgtEl>
-                </p:cond>
-              </p:prevCondLst>
-              <p:nextCondLst>
-                <p:cond evt="onNext" delay="0">
-                  <p:tgtEl>
-                    <p:sldTgt/>
-                  </p:tgtEl>
-                </p:cond>
-              </p:nextCondLst>
-            </p:seq>
-          </p:childTnLst>
-        </p:cTn>
-      </p:par>
-    </p:tnLst>
-  </p:timing>
-</p:sld>
-</file>
-
-<file path=ppt/slides/slide9.xml><?xml version="1.0" encoding="utf-8"?>
-<p:sld xmlns:a="http://schemas.openxmlformats.org/drawingml/2006/main" xmlns:r="http://schemas.openxmlformats.org/officeDocument/2006/relationships" xmlns:p="http://schemas.openxmlformats.org/presentationml/2006/main">
-  <p:cSld>
-    <p:spTree>
-      <p:nvGrpSpPr>
-        <p:cNvPr id="1" name=""/>
-        <p:cNvGrpSpPr/>
-        <p:nvPr/>
-      </p:nvGrpSpPr>
-      <p:grpSpPr>
-        <a:xfrm>
-          <a:off x="0" y="0"/>
-          <a:ext cx="0" cy="0"/>
-          <a:chOff x="0" y="0"/>
-          <a:chExt cx="0" cy="0"/>
-        </a:xfrm>
-      </p:grpSpPr>
-      <p:sp>
-        <p:nvSpPr>
-          <p:cNvPr id="2" name="Title 1"/>
-          <p:cNvSpPr>
-            <a:spLocks noGrp="1"/>
-          </p:cNvSpPr>
-          <p:nvPr>
-            <p:ph type="title"/>
-          </p:nvPr>
-        </p:nvSpPr>
-        <p:spPr/>
-        <p:txBody>
-          <a:bodyPr/>
-          <a:lstStyle/>
-          <a:p>
-            <a:pPr marL="0" indent="0"/>
-            <a:r>
-              <a:rPr lang="de-DE" dirty="0"/>
-              <a:t>Ideen aus der FP Welt</a:t>
-            </a:r>
-          </a:p>
-        </p:txBody>
-      </p:sp>
-      <p:sp>
-        <p:nvSpPr>
-          <p:cNvPr id="3" name="Content Placeholder 2"/>
-          <p:cNvSpPr>
-            <a:spLocks noGrp="1"/>
-          </p:cNvSpPr>
-          <p:nvPr>
-            <p:ph idx="1"/>
-          </p:nvPr>
-        </p:nvSpPr>
-        <p:spPr/>
-        <p:txBody>
-          <a:bodyPr>
-            <a:normAutofit fontScale="92500" lnSpcReduction="20000"/>
-          </a:bodyPr>
-          <a:lstStyle/>
-          <a:p>
-            <a:pPr marL="0" indent="0">
-              <a:buNone/>
-            </a:pPr>
-            <a:r>
-              <a:rPr lang="de-DE" dirty="0" err="1" smtClean="0"/>
-              <a:t>Mutability</a:t>
-            </a:r>
-            <a:endParaRPr lang="de-DE" dirty="0" smtClean="0"/>
-          </a:p>
-          <a:p>
-            <a:r>
-              <a:rPr lang="de-DE" dirty="0" smtClean="0"/>
-              <a:t>Keine </a:t>
-            </a:r>
-            <a:r>
-              <a:rPr lang="de-DE" dirty="0"/>
-              <a:t>Variablen (Slot im Speicher wo ich etwas pushen und poppen kann). Einmal zugewiesen, bleibt </a:t>
-            </a:r>
-            <a:r>
-              <a:rPr lang="de-DE" dirty="0" smtClean="0"/>
-              <a:t>der Wert</a:t>
-            </a:r>
-          </a:p>
-          <a:p>
-            <a:r>
-              <a:rPr lang="de-DE" dirty="0" smtClean="0"/>
-              <a:t>Die </a:t>
-            </a:r>
-            <a:r>
-              <a:rPr lang="de-DE" dirty="0"/>
-              <a:t>Frage „Wann hat sich der Wert geändert?“ stellt sich gar nicht mehr, der Wert kann nur zugewiesen </a:t>
-            </a:r>
-            <a:r>
-              <a:rPr lang="de-DE" dirty="0" smtClean="0"/>
-              <a:t>werden</a:t>
-            </a:r>
-          </a:p>
-          <a:p>
-            <a:r>
-              <a:rPr lang="de-DE" dirty="0" smtClean="0"/>
-              <a:t>Multi-Core </a:t>
-            </a:r>
-            <a:r>
-              <a:rPr lang="de-DE" dirty="0" err="1"/>
-              <a:t>ready</a:t>
-            </a:r>
-            <a:r>
-              <a:rPr lang="de-DE" dirty="0"/>
-              <a:t>: Kein </a:t>
-            </a:r>
-            <a:r>
-              <a:rPr lang="de-DE" dirty="0" err="1"/>
-              <a:t>Mutex</a:t>
-            </a:r>
-            <a:r>
-              <a:rPr lang="de-DE" dirty="0"/>
-              <a:t>, </a:t>
-            </a:r>
-            <a:r>
-              <a:rPr lang="de-DE" dirty="0" smtClean="0"/>
-              <a:t>Semaphore</a:t>
-            </a:r>
-            <a:r>
-              <a:rPr lang="de-DE" dirty="0"/>
-              <a:t>, </a:t>
-            </a:r>
-            <a:r>
-              <a:rPr lang="de-DE" dirty="0" smtClean="0"/>
-              <a:t>Monitor!</a:t>
-            </a:r>
-          </a:p>
-          <a:p>
-            <a:r>
-              <a:rPr lang="de-DE" dirty="0" smtClean="0"/>
-              <a:t>State muss neugedacht werden</a:t>
-            </a:r>
-            <a:endParaRPr lang="de-DE" dirty="0"/>
-          </a:p>
-          <a:p>
-            <a:endParaRPr lang="de-DE" dirty="0" smtClean="0"/>
-          </a:p>
-          <a:p>
-            <a:pPr marL="0" indent="0">
-              <a:buNone/>
-            </a:pPr>
-            <a:endParaRPr lang="de-DE" dirty="0"/>
-          </a:p>
-        </p:txBody>
-      </p:sp>
-    </p:spTree>
-    <p:extLst>
-      <p:ext uri="{BB962C8B-B14F-4D97-AF65-F5344CB8AC3E}">
-        <p14:creationId xmlns:p14="http://schemas.microsoft.com/office/powerpoint/2010/main" val="1145584124"/>
-      </p:ext>
-    </p:extLst>
-  </p:cSld>
-  <p:clrMapOvr>
-    <a:masterClrMapping/>
-  </p:clrMapOvr>
-  <p:timing>
-    <p:tnLst>
-      <p:par>
-        <p:cTn id="1" dur="indefinite" restart="never" nodeType="tmRoot">
-          <p:childTnLst>
-            <p:seq concurrent="1" nextAc="seek">
-              <p:cTn id="2" dur="indefinite" nodeType="mainSeq">
-                <p:childTnLst>
-                  <p:par>
-                    <p:cTn id="3" fill="hold">
-                      <p:stCondLst>
-                        <p:cond delay="indefinite"/>
-                      </p:stCondLst>
-                      <p:childTnLst>
-                        <p:par>
-                          <p:cTn id="4" fill="hold">
-                            <p:stCondLst>
-                              <p:cond delay="0"/>
-                            </p:stCondLst>
-                            <p:childTnLst>
-                              <p:par>
-                                <p:cTn id="5" presetID="1" presetClass="entr" presetSubtype="0" fill="hold" nodeType="clickEffect">
-                                  <p:stCondLst>
-                                    <p:cond delay="0"/>
-                                  </p:stCondLst>
-                                  <p:childTnLst>
-                                    <p:set>
-                                      <p:cBhvr>
-                                        <p:cTn id="6" dur="1" fill="hold">
-                                          <p:stCondLst>
-                                            <p:cond delay="0"/>
-                                          </p:stCondLst>
-                                        </p:cTn>
-                                        <p:tgtEl>
-                                          <p:spTgt spid="3">
-                                            <p:txEl>
-                                              <p:pRg st="0" end="0"/>
-                                            </p:txEl>
-                                          </p:spTgt>
-                                        </p:tgtEl>
-                                        <p:attrNameLst>
-                                          <p:attrName>style.visibility</p:attrName>
-                                        </p:attrNameLst>
-                                      </p:cBhvr>
-                                      <p:to>
-                                        <p:strVal val="visible"/>
-                                      </p:to>
-                                    </p:set>
-                                  </p:childTnLst>
-                                </p:cTn>
-                              </p:par>
-                            </p:childTnLst>
-                          </p:cTn>
-                        </p:par>
-                      </p:childTnLst>
-                    </p:cTn>
-                  </p:par>
-                  <p:par>
-                    <p:cTn id="7" fill="hold">
-                      <p:stCondLst>
-                        <p:cond delay="indefinite"/>
-                      </p:stCondLst>
-                      <p:childTnLst>
-                        <p:par>
-                          <p:cTn id="8" fill="hold">
-                            <p:stCondLst>
-                              <p:cond delay="0"/>
-                            </p:stCondLst>
-                            <p:childTnLst>
-                              <p:par>
-                                <p:cTn id="9" presetID="1" presetClass="entr" presetSubtype="0" fill="hold" nodeType="clickEffect">
-                                  <p:stCondLst>
-                                    <p:cond delay="0"/>
-                                  </p:stCondLst>
-                                  <p:childTnLst>
-                                    <p:set>
-                                      <p:cBhvr>
-                                        <p:cTn id="10" dur="1" fill="hold">
-                                          <p:stCondLst>
-                                            <p:cond delay="0"/>
-                                          </p:stCondLst>
-                                        </p:cTn>
-                                        <p:tgtEl>
-                                          <p:spTgt spid="3">
-                                            <p:txEl>
-                                              <p:pRg st="1" end="1"/>
-                                            </p:txEl>
-                                          </p:spTgt>
-                                        </p:tgtEl>
-                                        <p:attrNameLst>
-                                          <p:attrName>style.visibility</p:attrName>
-                                        </p:attrNameLst>
-                                      </p:cBhvr>
-                                      <p:to>
-                                        <p:strVal val="visible"/>
-                                      </p:to>
-                                    </p:set>
-                                  </p:childTnLst>
-                                </p:cTn>
-                              </p:par>
-                            </p:childTnLst>
-                          </p:cTn>
-                        </p:par>
-                      </p:childTnLst>
-                    </p:cTn>
-                  </p:par>
-                  <p:par>
-                    <p:cTn id="11" fill="hold">
-                      <p:stCondLst>
-                        <p:cond delay="indefinite"/>
-                      </p:stCondLst>
-                      <p:childTnLst>
-                        <p:par>
-                          <p:cTn id="12" fill="hold">
-                            <p:stCondLst>
-                              <p:cond delay="0"/>
-                            </p:stCondLst>
-                            <p:childTnLst>
-                              <p:par>
-                                <p:cTn id="13" presetID="1" presetClass="entr" presetSubtype="0" fill="hold" nodeType="clickEffect">
-                                  <p:stCondLst>
-                                    <p:cond delay="0"/>
-                                  </p:stCondLst>
-                                  <p:childTnLst>
-                                    <p:set>
-                                      <p:cBhvr>
-                                        <p:cTn id="14" dur="1" fill="hold">
-                                          <p:stCondLst>
-                                            <p:cond delay="0"/>
-                                          </p:stCondLst>
-                                        </p:cTn>
-                                        <p:tgtEl>
-                                          <p:spTgt spid="3">
-                                            <p:txEl>
-                                              <p:pRg st="2" end="2"/>
-                                            </p:txEl>
-                                          </p:spTgt>
-                                        </p:tgtEl>
-                                        <p:attrNameLst>
-                                          <p:attrName>style.visibility</p:attrName>
-                                        </p:attrNameLst>
-                                      </p:cBhvr>
-                                      <p:to>
-                                        <p:strVal val="visible"/>
-                                      </p:to>
-                                    </p:set>
-                                  </p:childTnLst>
-                                </p:cTn>
-                              </p:par>
-                            </p:childTnLst>
-                          </p:cTn>
-                        </p:par>
-                      </p:childTnLst>
-                    </p:cTn>
-                  </p:par>
-                  <p:par>
-                    <p:cTn id="15" fill="hold">
-                      <p:stCondLst>
-                        <p:cond delay="indefinite"/>
-                      </p:stCondLst>
-                      <p:childTnLst>
-                        <p:par>
-                          <p:cTn id="16" fill="hold">
-                            <p:stCondLst>
-                              <p:cond delay="0"/>
-                            </p:stCondLst>
-                            <p:childTnLst>
-                              <p:par>
-                                <p:cTn id="17" presetID="1" presetClass="entr" presetSubtype="0" fill="hold" nodeType="clickEffect">
-                                  <p:stCondLst>
-                                    <p:cond delay="0"/>
-                                  </p:stCondLst>
-                                  <p:childTnLst>
-                                    <p:set>
-                                      <p:cBhvr>
-                                        <p:cTn id="18" dur="1" fill="hold">
-                                          <p:stCondLst>
-                                            <p:cond delay="0"/>
-                                          </p:stCondLst>
-                                        </p:cTn>
-                                        <p:tgtEl>
-                                          <p:spTgt spid="3">
-                                            <p:txEl>
-                                              <p:pRg st="3" end="3"/>
-                                            </p:txEl>
-                                          </p:spTgt>
-                                        </p:tgtEl>
-                                        <p:attrNameLst>
-                                          <p:attrName>style.visibility</p:attrName>
-                                        </p:attrNameLst>
-                                      </p:cBhvr>
-                                      <p:to>
-                                        <p:strVal val="visible"/>
-                                      </p:to>
-                                    </p:set>
-                                  </p:childTnLst>
-                                </p:cTn>
-                              </p:par>
-                            </p:childTnLst>
-                          </p:cTn>
-                        </p:par>
-                      </p:childTnLst>
-                    </p:cTn>
-                  </p:par>
-                  <p:par>
-                    <p:cTn id="19" fill="hold">
-                      <p:stCondLst>
-                        <p:cond delay="indefinite"/>
-                      </p:stCondLst>
-                      <p:childTnLst>
-                        <p:par>
-                          <p:cTn id="20" fill="hold">
-                            <p:stCondLst>
-                              <p:cond delay="0"/>
-                            </p:stCondLst>
-                            <p:childTnLst>
-                              <p:par>
-                                <p:cTn id="21" presetID="1" presetClass="entr" presetSubtype="0" fill="hold" nodeType="clickEffect">
-                                  <p:stCondLst>
-                                    <p:cond delay="0"/>
-                                  </p:stCondLst>
-                                  <p:childTnLst>
-                                    <p:set>
-                                      <p:cBhvr>
-                                        <p:cTn id="22" dur="1" fill="hold">
-                                          <p:stCondLst>
-                                            <p:cond delay="0"/>
-                                          </p:stCondLst>
-                                        </p:cTn>
-                                        <p:tgtEl>
-                                          <p:spTgt spid="3">
-                                            <p:txEl>
-                                              <p:pRg st="4" end="4"/>
                                             </p:txEl>
                                           </p:spTgt>
                                         </p:tgtEl>

</xml_diff>

<commit_message>
Folie zum Thema Runtime und Funktional, Java und .net
</commit_message>
<xml_diff>
--- a/20151202/Einführung20151202.pptx
+++ b/20151202/Einführung20151202.pptx
@@ -5,7 +5,7 @@
     <p:sldMasterId id="2147483648" r:id="rId1"/>
   </p:sldMasterIdLst>
   <p:notesMasterIdLst>
-    <p:notesMasterId r:id="rId21"/>
+    <p:notesMasterId r:id="rId22"/>
   </p:notesMasterIdLst>
   <p:sldIdLst>
     <p:sldId id="256" r:id="rId2"/>
@@ -13,20 +13,21 @@
     <p:sldId id="288" r:id="rId4"/>
     <p:sldId id="290" r:id="rId5"/>
     <p:sldId id="289" r:id="rId6"/>
-    <p:sldId id="275" r:id="rId7"/>
-    <p:sldId id="259" r:id="rId8"/>
-    <p:sldId id="295" r:id="rId9"/>
-    <p:sldId id="291" r:id="rId10"/>
-    <p:sldId id="292" r:id="rId11"/>
-    <p:sldId id="287" r:id="rId12"/>
-    <p:sldId id="285" r:id="rId13"/>
-    <p:sldId id="260" r:id="rId14"/>
-    <p:sldId id="293" r:id="rId15"/>
-    <p:sldId id="261" r:id="rId16"/>
-    <p:sldId id="263" r:id="rId17"/>
-    <p:sldId id="294" r:id="rId18"/>
-    <p:sldId id="267" r:id="rId19"/>
-    <p:sldId id="268" r:id="rId20"/>
+    <p:sldId id="296" r:id="rId7"/>
+    <p:sldId id="275" r:id="rId8"/>
+    <p:sldId id="259" r:id="rId9"/>
+    <p:sldId id="295" r:id="rId10"/>
+    <p:sldId id="291" r:id="rId11"/>
+    <p:sldId id="292" r:id="rId12"/>
+    <p:sldId id="287" r:id="rId13"/>
+    <p:sldId id="285" r:id="rId14"/>
+    <p:sldId id="260" r:id="rId15"/>
+    <p:sldId id="293" r:id="rId16"/>
+    <p:sldId id="261" r:id="rId17"/>
+    <p:sldId id="263" r:id="rId18"/>
+    <p:sldId id="294" r:id="rId19"/>
+    <p:sldId id="267" r:id="rId20"/>
+    <p:sldId id="268" r:id="rId21"/>
   </p:sldIdLst>
   <p:sldSz cx="9144000" cy="6858000" type="screen4x3"/>
   <p:notesSz cx="6858000" cy="9144000"/>
@@ -127,7 +128,7 @@
   </p:defaultTextStyle>
   <p:extLst>
     <p:ext uri="{EFAFB233-063F-42B5-8137-9DF3F51BA10A}">
-      <p15:sldGuideLst xmlns="" xmlns:p15="http://schemas.microsoft.com/office/powerpoint/2012/main">
+      <p15:sldGuideLst xmlns:p15="http://schemas.microsoft.com/office/powerpoint/2012/main" xmlns="">
         <p15:guide id="1" orient="horz" pos="2160">
           <p15:clr>
             <a:srgbClr val="A4A3A4"/>
@@ -226,7 +227,7 @@
           <a:p>
             <a:fld id="{8583A242-7230-4070-B2AF-A33EB304C08D}" type="datetimeFigureOut">
               <a:rPr lang="en-US" smtClean="0"/>
-              <a:t>11/24/2015</a:t>
+              <a:t>11/25/2015</a:t>
             </a:fld>
             <a:endParaRPr lang="en-US"/>
           </a:p>
@@ -716,6 +717,185 @@
           <a:bodyPr/>
           <a:lstStyle/>
           <a:p>
+            <a:r>
+              <a:rPr lang="de-DE" dirty="0" smtClean="0"/>
+              <a:t>Typ &lt;&gt; Klasse: Kein Verhalten,</a:t>
+            </a:r>
+            <a:r>
+              <a:rPr lang="de-DE" baseline="0" dirty="0" smtClean="0"/>
+              <a:t> Reine Datenstruktur.  Aber Achtung: Ich kann in F# da ein bisschen schummeln, F# ist </a:t>
+            </a:r>
+            <a:r>
+              <a:rPr lang="de-DE" baseline="0" dirty="0" err="1" smtClean="0"/>
+              <a:t>Functional</a:t>
+            </a:r>
+            <a:r>
+              <a:rPr lang="de-DE" baseline="0" dirty="0" smtClean="0"/>
+              <a:t> </a:t>
+            </a:r>
+            <a:r>
+              <a:rPr lang="de-DE" baseline="0" dirty="0" err="1" smtClean="0"/>
+              <a:t>first</a:t>
+            </a:r>
+            <a:r>
+              <a:rPr lang="de-DE" baseline="0" dirty="0" smtClean="0"/>
+              <a:t> und erlaubt die Verwendung von OO Konstrukte.</a:t>
+            </a:r>
+          </a:p>
+          <a:p>
+            <a:endParaRPr lang="de-DE" baseline="0" dirty="0" smtClean="0"/>
+          </a:p>
+          <a:p>
+            <a:r>
+              <a:rPr lang="de-DE" baseline="0" dirty="0" smtClean="0"/>
+              <a:t>type Name = { Vor : </a:t>
+            </a:r>
+            <a:r>
+              <a:rPr lang="de-DE" baseline="0" dirty="0" err="1" smtClean="0"/>
+              <a:t>string</a:t>
+            </a:r>
+            <a:r>
+              <a:rPr lang="de-DE" baseline="0" dirty="0" smtClean="0"/>
+              <a:t>; Nach : </a:t>
+            </a:r>
+            <a:r>
+              <a:rPr lang="de-DE" baseline="0" dirty="0" err="1" smtClean="0"/>
+              <a:t>string</a:t>
+            </a:r>
+            <a:r>
+              <a:rPr lang="de-DE" baseline="0" dirty="0" smtClean="0"/>
+              <a:t>; }</a:t>
+            </a:r>
+          </a:p>
+          <a:p>
+            <a:r>
+              <a:rPr lang="de-DE" baseline="0" dirty="0" smtClean="0"/>
+              <a:t>type Name‘ = { Name : Name; Title : </a:t>
+            </a:r>
+            <a:r>
+              <a:rPr lang="de-DE" baseline="0" dirty="0" err="1" smtClean="0"/>
+              <a:t>string</a:t>
+            </a:r>
+            <a:r>
+              <a:rPr lang="de-DE" baseline="0" dirty="0" smtClean="0"/>
+              <a:t>; Zusatz : </a:t>
+            </a:r>
+            <a:r>
+              <a:rPr lang="de-DE" baseline="0" dirty="0" err="1" smtClean="0"/>
+              <a:t>string</a:t>
+            </a:r>
+            <a:r>
+              <a:rPr lang="de-DE" baseline="0" dirty="0" smtClean="0"/>
+              <a:t>; }</a:t>
+            </a:r>
+          </a:p>
+          <a:p>
+            <a:endParaRPr lang="de-DE" baseline="0" dirty="0" smtClean="0"/>
+          </a:p>
+          <a:p>
+            <a:r>
+              <a:rPr lang="de-DE" baseline="0" dirty="0" err="1" smtClean="0"/>
+              <a:t>Immutability</a:t>
+            </a:r>
+            <a:r>
+              <a:rPr lang="de-DE" baseline="0" dirty="0" smtClean="0"/>
+              <a:t>. Grundsätzlich: Es gibt keine Variablen (Slot im Speicher wo ich etwas pushen und poppen kann). Einmal zugewiesen, bleibt es da für immer! Zwei Vorteile:</a:t>
+            </a:r>
+          </a:p>
+          <a:p>
+            <a:pPr marL="171450" indent="-171450">
+              <a:buFontTx/>
+              <a:buChar char="-"/>
+            </a:pPr>
+            <a:r>
+              <a:rPr lang="de-DE" baseline="0" dirty="0" smtClean="0"/>
+              <a:t>Simple </a:t>
+            </a:r>
+            <a:r>
+              <a:rPr lang="de-DE" baseline="0" dirty="0" err="1" smtClean="0"/>
+              <a:t>to</a:t>
+            </a:r>
+            <a:r>
+              <a:rPr lang="de-DE" baseline="0" dirty="0" smtClean="0"/>
+              <a:t> </a:t>
+            </a:r>
+            <a:r>
+              <a:rPr lang="de-DE" baseline="0" dirty="0" err="1" smtClean="0"/>
+              <a:t>reason</a:t>
+            </a:r>
+            <a:r>
+              <a:rPr lang="de-DE" baseline="0" dirty="0" smtClean="0"/>
+              <a:t> </a:t>
+            </a:r>
+            <a:r>
+              <a:rPr lang="de-DE" baseline="0" dirty="0" err="1" smtClean="0"/>
+              <a:t>about</a:t>
+            </a:r>
+            <a:r>
+              <a:rPr lang="de-DE" baseline="0" dirty="0" smtClean="0"/>
+              <a:t>. Die Frage „Wann hat sich der Wert geändert?“ stellt sich gar nicht mehr, der Wert kann nur zugewiesen werden</a:t>
+            </a:r>
+          </a:p>
+          <a:p>
+            <a:pPr marL="171450" indent="-171450">
+              <a:buFontTx/>
+              <a:buChar char="-"/>
+            </a:pPr>
+            <a:r>
+              <a:rPr lang="de-DE" baseline="0" dirty="0" smtClean="0"/>
+              <a:t>Multi Core </a:t>
+            </a:r>
+            <a:r>
+              <a:rPr lang="de-DE" baseline="0" dirty="0" err="1" smtClean="0"/>
+              <a:t>ready</a:t>
+            </a:r>
+            <a:r>
+              <a:rPr lang="de-DE" baseline="0" dirty="0" smtClean="0"/>
+              <a:t>: Kein </a:t>
+            </a:r>
+            <a:r>
+              <a:rPr lang="de-DE" baseline="0" dirty="0" err="1" smtClean="0"/>
+              <a:t>Mutex</a:t>
+            </a:r>
+            <a:r>
+              <a:rPr lang="de-DE" baseline="0" dirty="0" smtClean="0"/>
+              <a:t>, kein Semaphore, kein Monitor!</a:t>
+            </a:r>
+          </a:p>
+          <a:p>
+            <a:pPr marL="171450" indent="-171450">
+              <a:buFontTx/>
+              <a:buChar char="-"/>
+            </a:pPr>
+            <a:r>
+              <a:rPr lang="de-DE" baseline="0" dirty="0" smtClean="0"/>
+              <a:t>Man muss State neudenken, besser neulernen, die FP Leute haben das schon gemacht. Und übrigens, </a:t>
+            </a:r>
+            <a:r>
+              <a:rPr lang="de-DE" baseline="0" dirty="0" err="1" smtClean="0"/>
+              <a:t>SmallTalk</a:t>
+            </a:r>
+            <a:r>
+              <a:rPr lang="de-DE" baseline="0" dirty="0" smtClean="0"/>
+              <a:t> war auch </a:t>
+            </a:r>
+            <a:r>
+              <a:rPr lang="de-DE" baseline="0" dirty="0" err="1" smtClean="0"/>
+              <a:t>immutable</a:t>
+            </a:r>
+            <a:r>
+              <a:rPr lang="de-DE" baseline="0" dirty="0" smtClean="0"/>
+              <a:t>, State war nur mittels eines Messaging Untersystem möglich.</a:t>
+            </a:r>
+          </a:p>
+          <a:p>
+            <a:pPr marL="171450" indent="-171450">
+              <a:buFontTx/>
+              <a:buChar char="-"/>
+            </a:pPr>
+            <a:endParaRPr lang="de-DE" baseline="0" dirty="0" smtClean="0"/>
+          </a:p>
+          <a:p>
             <a:pPr marL="0" marR="0" indent="0" algn="l" defTabSz="914400" rtl="0" eaLnBrk="1" fontAlgn="auto" latinLnBrk="0" hangingPunct="1">
               <a:lnSpc>
                 <a:spcPct val="100000"/>
@@ -735,166 +915,143 @@
             </a:pPr>
             <a:r>
               <a:rPr lang="de-DE" dirty="0" smtClean="0"/>
-              <a:t>F# ist „</a:t>
-            </a:r>
-            <a:r>
-              <a:rPr lang="de-DE" dirty="0" err="1" smtClean="0"/>
-              <a:t>functional</a:t>
-            </a:r>
-            <a:r>
-              <a:rPr lang="de-DE" dirty="0" smtClean="0"/>
-              <a:t> </a:t>
-            </a:r>
-            <a:r>
-              <a:rPr lang="de-DE" dirty="0" err="1" smtClean="0"/>
-              <a:t>first</a:t>
-            </a:r>
-            <a:r>
-              <a:rPr lang="de-DE" dirty="0" smtClean="0"/>
-              <a:t>“, die Konstrukte der OO Welt stehen mir weiterhin zur</a:t>
+              <a:t>Eventuell</a:t>
             </a:r>
             <a:r>
               <a:rPr lang="de-DE" baseline="0" dirty="0" smtClean="0"/>
-              <a:t> Verfügung in F#.</a:t>
-            </a:r>
-          </a:p>
-          <a:p>
-            <a:pPr marL="0" marR="0" indent="0" algn="l" defTabSz="914400" rtl="0" eaLnBrk="1" fontAlgn="auto" latinLnBrk="0" hangingPunct="1">
-              <a:lnSpc>
-                <a:spcPct val="100000"/>
-              </a:lnSpc>
-              <a:spcBef>
-                <a:spcPts val="0"/>
-              </a:spcBef>
-              <a:spcAft>
-                <a:spcPts val="0"/>
-              </a:spcAft>
-              <a:buClrTx/>
-              <a:buSzTx/>
+              <a:t> noch zusammenfassen – was sind die Vorteile? Nicht unbedingt hier, sondern als </a:t>
+            </a:r>
+            <a:r>
+              <a:rPr lang="de-DE" baseline="0" dirty="0" err="1" smtClean="0"/>
+              <a:t>Zusammenfasung</a:t>
+            </a:r>
+            <a:r>
+              <a:rPr lang="de-DE" baseline="0" dirty="0" smtClean="0"/>
+              <a:t> am Ende? FEHLT</a:t>
+            </a:r>
+            <a:endParaRPr lang="de-DE" dirty="0" smtClean="0"/>
+          </a:p>
+          <a:p>
+            <a:pPr marL="0" indent="0">
               <a:buFontTx/>
               <a:buNone/>
-              <a:tabLst/>
-              <a:defRPr/>
             </a:pPr>
             <a:endParaRPr lang="de-DE" baseline="0" dirty="0" smtClean="0"/>
           </a:p>
           <a:p>
-            <a:pPr marL="0" marR="0" indent="0" algn="l" defTabSz="914400" rtl="0" eaLnBrk="1" fontAlgn="auto" latinLnBrk="0" hangingPunct="1">
-              <a:lnSpc>
-                <a:spcPct val="100000"/>
-              </a:lnSpc>
-              <a:spcBef>
-                <a:spcPts val="0"/>
-              </a:spcBef>
-              <a:spcAft>
-                <a:spcPts val="0"/>
-              </a:spcAft>
-              <a:buClrTx/>
-              <a:buSzTx/>
+            <a:r>
+              <a:rPr lang="en-US" sz="1200" kern="1200" dirty="0" smtClean="0">
+                <a:solidFill>
+                  <a:schemeClr val="tx1"/>
+                </a:solidFill>
+                <a:latin typeface="+mn-lt"/>
+                <a:ea typeface="+mn-ea"/>
+                <a:cs typeface="+mn-cs"/>
+              </a:rPr>
+              <a:t>type S = { Name : string; </a:t>
+            </a:r>
+            <a:r>
+              <a:rPr lang="en-US" sz="1200" kern="1200" dirty="0" err="1" smtClean="0">
+                <a:solidFill>
+                  <a:schemeClr val="tx1"/>
+                </a:solidFill>
+                <a:latin typeface="+mn-lt"/>
+                <a:ea typeface="+mn-ea"/>
+                <a:cs typeface="+mn-cs"/>
+              </a:rPr>
+              <a:t>Tun</a:t>
+            </a:r>
+            <a:r>
+              <a:rPr lang="en-US" sz="1200" kern="1200" dirty="0" smtClean="0">
+                <a:solidFill>
+                  <a:schemeClr val="tx1"/>
+                </a:solidFill>
+                <a:latin typeface="+mn-lt"/>
+                <a:ea typeface="+mn-ea"/>
+                <a:cs typeface="+mn-cs"/>
+              </a:rPr>
+              <a:t> : string -&gt; string; };;</a:t>
+            </a:r>
+          </a:p>
+          <a:p>
+            <a:r>
+              <a:rPr lang="de-DE" sz="1200" kern="1200" dirty="0" err="1" smtClean="0">
+                <a:solidFill>
+                  <a:schemeClr val="tx1"/>
+                </a:solidFill>
+                <a:latin typeface="+mn-lt"/>
+                <a:ea typeface="+mn-ea"/>
+                <a:cs typeface="+mn-cs"/>
+              </a:rPr>
+              <a:t>let</a:t>
+            </a:r>
+            <a:r>
+              <a:rPr lang="de-DE" sz="1200" kern="1200" baseline="0" dirty="0" smtClean="0">
+                <a:solidFill>
+                  <a:schemeClr val="tx1"/>
+                </a:solidFill>
+                <a:latin typeface="+mn-lt"/>
+                <a:ea typeface="+mn-ea"/>
+                <a:cs typeface="+mn-cs"/>
+              </a:rPr>
+              <a:t> f g x = g x;;</a:t>
+            </a:r>
+          </a:p>
+          <a:p>
+            <a:r>
+              <a:rPr lang="de-DE" sz="1200" kern="1200" baseline="0" dirty="0" err="1" smtClean="0">
+                <a:solidFill>
+                  <a:schemeClr val="tx1"/>
+                </a:solidFill>
+                <a:latin typeface="+mn-lt"/>
+                <a:ea typeface="+mn-ea"/>
+                <a:cs typeface="+mn-cs"/>
+              </a:rPr>
+              <a:t>let</a:t>
+            </a:r>
+            <a:r>
+              <a:rPr lang="de-DE" sz="1200" kern="1200" baseline="0" dirty="0" smtClean="0">
+                <a:solidFill>
+                  <a:schemeClr val="tx1"/>
+                </a:solidFill>
+                <a:latin typeface="+mn-lt"/>
+                <a:ea typeface="+mn-ea"/>
+                <a:cs typeface="+mn-cs"/>
+              </a:rPr>
+              <a:t> </a:t>
+            </a:r>
+            <a:r>
+              <a:rPr lang="de-DE" sz="1200" kern="1200" baseline="0" dirty="0" err="1" smtClean="0">
+                <a:solidFill>
+                  <a:schemeClr val="tx1"/>
+                </a:solidFill>
+                <a:latin typeface="+mn-lt"/>
+                <a:ea typeface="+mn-ea"/>
+                <a:cs typeface="+mn-cs"/>
+              </a:rPr>
+              <a:t>addFive</a:t>
+            </a:r>
+            <a:r>
+              <a:rPr lang="de-DE" sz="1200" kern="1200" baseline="0" dirty="0" smtClean="0">
+                <a:solidFill>
+                  <a:schemeClr val="tx1"/>
+                </a:solidFill>
+                <a:latin typeface="+mn-lt"/>
+                <a:ea typeface="+mn-ea"/>
+                <a:cs typeface="+mn-cs"/>
+              </a:rPr>
+              <a:t> x = (+) x 5;;</a:t>
+            </a:r>
+            <a:endParaRPr lang="de-DE" dirty="0" smtClean="0"/>
+          </a:p>
+          <a:p>
+            <a:pPr marL="0" indent="0">
               <a:buFontTx/>
               <a:buNone/>
-              <a:tabLst/>
-              <a:defRPr/>
-            </a:pPr>
-            <a:r>
-              <a:rPr lang="de-DE" baseline="0" dirty="0" smtClean="0"/>
-              <a:t>Stärker betonen, dass (sobald funktionale Konstrukte in der Sprache bereitstehen), diese den Code vereinfachen können</a:t>
-            </a:r>
-          </a:p>
-          <a:p>
-            <a:pPr marL="0" marR="0" indent="0" algn="l" defTabSz="914400" rtl="0" eaLnBrk="1" fontAlgn="auto" latinLnBrk="0" hangingPunct="1">
-              <a:lnSpc>
-                <a:spcPct val="100000"/>
-              </a:lnSpc>
-              <a:spcBef>
-                <a:spcPts val="0"/>
-              </a:spcBef>
-              <a:spcAft>
-                <a:spcPts val="0"/>
-              </a:spcAft>
-              <a:buClrTx/>
-              <a:buSzTx/>
-              <a:buFontTx/>
-              <a:buNone/>
-              <a:tabLst/>
-              <a:defRPr/>
             </a:pPr>
             <a:endParaRPr lang="de-DE" baseline="0" dirty="0" smtClean="0"/>
           </a:p>
           <a:p>
-            <a:pPr marL="0" marR="0" indent="0" algn="l" defTabSz="914400" rtl="0" eaLnBrk="1" fontAlgn="auto" latinLnBrk="0" hangingPunct="1">
-              <a:lnSpc>
-                <a:spcPct val="100000"/>
-              </a:lnSpc>
-              <a:spcBef>
-                <a:spcPts val="0"/>
-              </a:spcBef>
-              <a:spcAft>
-                <a:spcPts val="0"/>
-              </a:spcAft>
-              <a:buClrTx/>
-              <a:buSzTx/>
-              <a:buFontTx/>
-              <a:buNone/>
-              <a:tabLst/>
-              <a:defRPr/>
-            </a:pPr>
-            <a:r>
-              <a:rPr lang="de-DE" baseline="0" dirty="0" smtClean="0"/>
-              <a:t>Direkt die Frage beantworten – Warum FP? -&gt; </a:t>
-            </a:r>
-            <a:r>
-              <a:rPr lang="de-DE" baseline="0" dirty="0" err="1" smtClean="0"/>
-              <a:t>Immutability</a:t>
-            </a:r>
-            <a:r>
-              <a:rPr lang="de-DE" baseline="0" dirty="0" smtClean="0"/>
-              <a:t>, Making invalid </a:t>
-            </a:r>
-            <a:r>
-              <a:rPr lang="de-DE" baseline="0" dirty="0" err="1" smtClean="0"/>
-              <a:t>state</a:t>
-            </a:r>
-            <a:r>
-              <a:rPr lang="de-DE" baseline="0" dirty="0" smtClean="0"/>
-              <a:t> </a:t>
-            </a:r>
-            <a:r>
-              <a:rPr lang="de-DE" baseline="0" dirty="0" err="1" smtClean="0"/>
-              <a:t>un-representable</a:t>
-            </a:r>
-            <a:r>
-              <a:rPr lang="de-DE" baseline="0" dirty="0" smtClean="0"/>
-              <a:t> (Muss ich mir für das Beispiel mit DDD aufheben!), high-oder </a:t>
-            </a:r>
-            <a:r>
-              <a:rPr lang="de-DE" baseline="0" dirty="0" err="1" smtClean="0"/>
-              <a:t>functions</a:t>
-            </a:r>
-            <a:r>
-              <a:rPr lang="de-DE" baseline="0" dirty="0" smtClean="0"/>
-              <a:t>, …</a:t>
-            </a:r>
-            <a:endParaRPr lang="en-US" dirty="0" smtClean="0"/>
-          </a:p>
-          <a:p>
-            <a:pPr marL="0" marR="0" indent="0" algn="l" defTabSz="914400" rtl="0" eaLnBrk="1" fontAlgn="auto" latinLnBrk="0" hangingPunct="1">
-              <a:lnSpc>
-                <a:spcPct val="100000"/>
-              </a:lnSpc>
-              <a:spcBef>
-                <a:spcPts val="0"/>
-              </a:spcBef>
-              <a:spcAft>
-                <a:spcPts val="0"/>
-              </a:spcAft>
-              <a:buClrTx/>
-              <a:buSzTx/>
-              <a:buFontTx/>
-              <a:buNone/>
-              <a:tabLst/>
-              <a:defRPr/>
-            </a:pPr>
             <a:endParaRPr lang="de-DE" baseline="0" dirty="0" smtClean="0"/>
           </a:p>
           <a:p>
@@ -928,7 +1085,7 @@
     </p:spTree>
     <p:extLst>
       <p:ext uri="{BB962C8B-B14F-4D97-AF65-F5344CB8AC3E}">
-        <p14:creationId xmlns:p14="http://schemas.microsoft.com/office/powerpoint/2010/main" val="3358926703"/>
+        <p14:creationId xmlns:p14="http://schemas.microsoft.com/office/powerpoint/2010/main" val="1782259541"/>
       </p:ext>
     </p:extLst>
   </p:cSld>
@@ -957,7 +1114,7 @@
       </p:grpSpPr>
       <p:sp>
         <p:nvSpPr>
-          <p:cNvPr id="2" name="Folienbildplatzhalter 1"/>
+          <p:cNvPr id="2" name="Slide Image Placeholder 1"/>
           <p:cNvSpPr>
             <a:spLocks noGrp="1" noRot="1" noChangeAspect="1"/>
           </p:cNvSpPr>
@@ -969,7 +1126,7 @@
       </p:sp>
       <p:sp>
         <p:nvSpPr>
-          <p:cNvPr id="3" name="Notizenplatzhalter 2"/>
+          <p:cNvPr id="3" name="Notes Placeholder 2"/>
           <p:cNvSpPr>
             <a:spLocks noGrp="1"/>
           </p:cNvSpPr>
@@ -982,21 +1139,195 @@
           <a:bodyPr/>
           <a:lstStyle/>
           <a:p>
+            <a:pPr marL="0" marR="0" indent="0" algn="l" defTabSz="914400" rtl="0" eaLnBrk="1" fontAlgn="auto" latinLnBrk="0" hangingPunct="1">
+              <a:lnSpc>
+                <a:spcPct val="100000"/>
+              </a:lnSpc>
+              <a:spcBef>
+                <a:spcPts val="0"/>
+              </a:spcBef>
+              <a:spcAft>
+                <a:spcPts val="0"/>
+              </a:spcAft>
+              <a:buClrTx/>
+              <a:buSzTx/>
+              <a:buFontTx/>
+              <a:buNone/>
+              <a:tabLst/>
+              <a:defRPr/>
+            </a:pPr>
             <a:r>
               <a:rPr lang="de-DE" dirty="0" smtClean="0"/>
-              <a:t>Warum dieses Thema? Weil es überraschend viel</a:t>
+              <a:t>F# ist „</a:t>
+            </a:r>
+            <a:r>
+              <a:rPr lang="de-DE" dirty="0" err="1" smtClean="0"/>
+              <a:t>functional</a:t>
+            </a:r>
+            <a:r>
+              <a:rPr lang="de-DE" dirty="0" smtClean="0"/>
+              <a:t> </a:t>
+            </a:r>
+            <a:r>
+              <a:rPr lang="de-DE" dirty="0" err="1" smtClean="0"/>
+              <a:t>first</a:t>
+            </a:r>
+            <a:r>
+              <a:rPr lang="de-DE" dirty="0" smtClean="0"/>
+              <a:t>“, die Konstrukte der OO Welt stehen mir weiterhin zur</a:t>
             </a:r>
             <a:r>
               <a:rPr lang="de-DE" baseline="0" dirty="0" smtClean="0"/>
-              <a:t> Nutzen brachte und weil es mit DDD gut zusammenpasst</a:t>
-            </a:r>
-            <a:endParaRPr lang="de-DE" dirty="0"/>
-          </a:p>
-        </p:txBody>
-      </p:sp>
-      <p:sp>
-        <p:nvSpPr>
-          <p:cNvPr id="4" name="Foliennummernplatzhalter 3"/>
+              <a:t> Verfügung in F#.</a:t>
+            </a:r>
+          </a:p>
+          <a:p>
+            <a:pPr marL="0" marR="0" indent="0" algn="l" defTabSz="914400" rtl="0" eaLnBrk="1" fontAlgn="auto" latinLnBrk="0" hangingPunct="1">
+              <a:lnSpc>
+                <a:spcPct val="100000"/>
+              </a:lnSpc>
+              <a:spcBef>
+                <a:spcPts val="0"/>
+              </a:spcBef>
+              <a:spcAft>
+                <a:spcPts val="0"/>
+              </a:spcAft>
+              <a:buClrTx/>
+              <a:buSzTx/>
+              <a:buFontTx/>
+              <a:buNone/>
+              <a:tabLst/>
+              <a:defRPr/>
+            </a:pPr>
+            <a:endParaRPr lang="de-DE" baseline="0" dirty="0" smtClean="0"/>
+          </a:p>
+          <a:p>
+            <a:pPr marL="0" marR="0" indent="0" algn="l" defTabSz="914400" rtl="0" eaLnBrk="1" fontAlgn="auto" latinLnBrk="0" hangingPunct="1">
+              <a:lnSpc>
+                <a:spcPct val="100000"/>
+              </a:lnSpc>
+              <a:spcBef>
+                <a:spcPts val="0"/>
+              </a:spcBef>
+              <a:spcAft>
+                <a:spcPts val="0"/>
+              </a:spcAft>
+              <a:buClrTx/>
+              <a:buSzTx/>
+              <a:buFontTx/>
+              <a:buNone/>
+              <a:tabLst/>
+              <a:defRPr/>
+            </a:pPr>
+            <a:r>
+              <a:rPr lang="de-DE" baseline="0" dirty="0" smtClean="0"/>
+              <a:t>Stärker betonen, dass (sobald funktionale Konstrukte in der Sprache bereitstehen), diese den Code vereinfachen können</a:t>
+            </a:r>
+          </a:p>
+          <a:p>
+            <a:pPr marL="0" marR="0" indent="0" algn="l" defTabSz="914400" rtl="0" eaLnBrk="1" fontAlgn="auto" latinLnBrk="0" hangingPunct="1">
+              <a:lnSpc>
+                <a:spcPct val="100000"/>
+              </a:lnSpc>
+              <a:spcBef>
+                <a:spcPts val="0"/>
+              </a:spcBef>
+              <a:spcAft>
+                <a:spcPts val="0"/>
+              </a:spcAft>
+              <a:buClrTx/>
+              <a:buSzTx/>
+              <a:buFontTx/>
+              <a:buNone/>
+              <a:tabLst/>
+              <a:defRPr/>
+            </a:pPr>
+            <a:endParaRPr lang="de-DE" baseline="0" dirty="0" smtClean="0"/>
+          </a:p>
+          <a:p>
+            <a:pPr marL="0" marR="0" indent="0" algn="l" defTabSz="914400" rtl="0" eaLnBrk="1" fontAlgn="auto" latinLnBrk="0" hangingPunct="1">
+              <a:lnSpc>
+                <a:spcPct val="100000"/>
+              </a:lnSpc>
+              <a:spcBef>
+                <a:spcPts val="0"/>
+              </a:spcBef>
+              <a:spcAft>
+                <a:spcPts val="0"/>
+              </a:spcAft>
+              <a:buClrTx/>
+              <a:buSzTx/>
+              <a:buFontTx/>
+              <a:buNone/>
+              <a:tabLst/>
+              <a:defRPr/>
+            </a:pPr>
+            <a:r>
+              <a:rPr lang="de-DE" baseline="0" dirty="0" smtClean="0"/>
+              <a:t>Direkt die Frage beantworten – Warum FP? -&gt; </a:t>
+            </a:r>
+            <a:r>
+              <a:rPr lang="de-DE" baseline="0" dirty="0" err="1" smtClean="0"/>
+              <a:t>Immutability</a:t>
+            </a:r>
+            <a:r>
+              <a:rPr lang="de-DE" baseline="0" dirty="0" smtClean="0"/>
+              <a:t>, Making invalid </a:t>
+            </a:r>
+            <a:r>
+              <a:rPr lang="de-DE" baseline="0" dirty="0" err="1" smtClean="0"/>
+              <a:t>state</a:t>
+            </a:r>
+            <a:r>
+              <a:rPr lang="de-DE" baseline="0" dirty="0" smtClean="0"/>
+              <a:t> </a:t>
+            </a:r>
+            <a:r>
+              <a:rPr lang="de-DE" baseline="0" dirty="0" err="1" smtClean="0"/>
+              <a:t>un-representable</a:t>
+            </a:r>
+            <a:r>
+              <a:rPr lang="de-DE" baseline="0" dirty="0" smtClean="0"/>
+              <a:t> (Muss ich mir für das Beispiel mit DDD aufheben!), high-oder </a:t>
+            </a:r>
+            <a:r>
+              <a:rPr lang="de-DE" baseline="0" dirty="0" err="1" smtClean="0"/>
+              <a:t>functions</a:t>
+            </a:r>
+            <a:r>
+              <a:rPr lang="de-DE" baseline="0" dirty="0" smtClean="0"/>
+              <a:t>, …</a:t>
+            </a:r>
+            <a:endParaRPr lang="en-US" dirty="0" smtClean="0"/>
+          </a:p>
+          <a:p>
+            <a:pPr marL="0" marR="0" indent="0" algn="l" defTabSz="914400" rtl="0" eaLnBrk="1" fontAlgn="auto" latinLnBrk="0" hangingPunct="1">
+              <a:lnSpc>
+                <a:spcPct val="100000"/>
+              </a:lnSpc>
+              <a:spcBef>
+                <a:spcPts val="0"/>
+              </a:spcBef>
+              <a:spcAft>
+                <a:spcPts val="0"/>
+              </a:spcAft>
+              <a:buClrTx/>
+              <a:buSzTx/>
+              <a:buFontTx/>
+              <a:buNone/>
+              <a:tabLst/>
+              <a:defRPr/>
+            </a:pPr>
+            <a:endParaRPr lang="de-DE" baseline="0" dirty="0" smtClean="0"/>
+          </a:p>
+          <a:p>
+            <a:endParaRPr lang="en-US" dirty="0"/>
+          </a:p>
+        </p:txBody>
+      </p:sp>
+      <p:sp>
+        <p:nvSpPr>
+          <p:cNvPr id="4" name="Slide Number Placeholder 3"/>
           <p:cNvSpPr>
             <a:spLocks noGrp="1"/>
           </p:cNvSpPr>
@@ -1020,7 +1351,7 @@
     </p:spTree>
     <p:extLst>
       <p:ext uri="{BB962C8B-B14F-4D97-AF65-F5344CB8AC3E}">
-        <p14:creationId xmlns:p14="http://schemas.microsoft.com/office/powerpoint/2010/main" val="3022985809"/>
+        <p14:creationId xmlns:p14="http://schemas.microsoft.com/office/powerpoint/2010/main" val="3358926703"/>
       </p:ext>
     </p:extLst>
   </p:cSld>
@@ -1049,7 +1380,7 @@
       </p:grpSpPr>
       <p:sp>
         <p:nvSpPr>
-          <p:cNvPr id="2" name="Slide Image Placeholder 1"/>
+          <p:cNvPr id="2" name="Folienbildplatzhalter 1"/>
           <p:cNvSpPr>
             <a:spLocks noGrp="1" noRot="1" noChangeAspect="1"/>
           </p:cNvSpPr>
@@ -1061,7 +1392,7 @@
       </p:sp>
       <p:sp>
         <p:nvSpPr>
-          <p:cNvPr id="3" name="Notes Placeholder 2"/>
+          <p:cNvPr id="3" name="Notizenplatzhalter 2"/>
           <p:cNvSpPr>
             <a:spLocks noGrp="1"/>
           </p:cNvSpPr>
@@ -1076,26 +1407,19 @@
           <a:p>
             <a:r>
               <a:rPr lang="de-DE" dirty="0" smtClean="0"/>
-              <a:t>Annotation: entweder tut der Programmierer dies oder,</a:t>
+              <a:t>Warum dieses Thema? Weil es überraschend viel</a:t>
             </a:r>
             <a:r>
               <a:rPr lang="de-DE" baseline="0" dirty="0" smtClean="0"/>
-              <a:t> im Falle von F#, das Type </a:t>
-            </a:r>
-            <a:r>
-              <a:rPr lang="de-DE" baseline="0" dirty="0" err="1" smtClean="0"/>
-              <a:t>inference</a:t>
-            </a:r>
-            <a:endParaRPr lang="de-DE" baseline="0" dirty="0" smtClean="0"/>
-          </a:p>
-          <a:p>
-            <a:endParaRPr lang="en-US" dirty="0"/>
-          </a:p>
-        </p:txBody>
-      </p:sp>
-      <p:sp>
-        <p:nvSpPr>
-          <p:cNvPr id="4" name="Slide Number Placeholder 3"/>
+              <a:t> Nutzen brachte und weil es mit DDD gut zusammenpasst</a:t>
+            </a:r>
+            <a:endParaRPr lang="de-DE" dirty="0"/>
+          </a:p>
+        </p:txBody>
+      </p:sp>
+      <p:sp>
+        <p:nvSpPr>
+          <p:cNvPr id="4" name="Foliennummernplatzhalter 3"/>
           <p:cNvSpPr>
             <a:spLocks noGrp="1"/>
           </p:cNvSpPr>
@@ -1119,7 +1443,7 @@
     </p:spTree>
     <p:extLst>
       <p:ext uri="{BB962C8B-B14F-4D97-AF65-F5344CB8AC3E}">
-        <p14:creationId xmlns:p14="http://schemas.microsoft.com/office/powerpoint/2010/main" val="2102569733"/>
+        <p14:creationId xmlns:p14="http://schemas.microsoft.com/office/powerpoint/2010/main" val="3022985809"/>
       </p:ext>
     </p:extLst>
   </p:cSld>
@@ -1173,124 +1497,18 @@
           <a:bodyPr/>
           <a:lstStyle/>
           <a:p>
-            <a:pPr marL="0" marR="0" indent="0" algn="l" defTabSz="914400" rtl="0" eaLnBrk="1" fontAlgn="auto" latinLnBrk="0" hangingPunct="1">
-              <a:lnSpc>
-                <a:spcPct val="100000"/>
-              </a:lnSpc>
-              <a:spcBef>
-                <a:spcPts val="0"/>
-              </a:spcBef>
-              <a:spcAft>
-                <a:spcPts val="0"/>
-              </a:spcAft>
-              <a:buClrTx/>
-              <a:buSzTx/>
-              <a:buFontTx/>
-              <a:buNone/>
-              <a:tabLst/>
-              <a:defRPr/>
-            </a:pPr>
             <a:r>
               <a:rPr lang="de-DE" dirty="0" smtClean="0"/>
-              <a:t>Ist am besten erkennbar wenn man die Möglichkeiten einer schwachen Typisierung betrachtet</a:t>
-            </a:r>
-          </a:p>
-          <a:p>
-            <a:pPr marL="0" marR="0" indent="0" algn="l" defTabSz="914400" rtl="0" eaLnBrk="1" fontAlgn="auto" latinLnBrk="0" hangingPunct="1">
-              <a:lnSpc>
-                <a:spcPct val="100000"/>
-              </a:lnSpc>
-              <a:spcBef>
-                <a:spcPts val="0"/>
-              </a:spcBef>
-              <a:spcAft>
-                <a:spcPts val="0"/>
-              </a:spcAft>
-              <a:buClrTx/>
-              <a:buSzTx/>
-              <a:buFontTx/>
-              <a:buNone/>
-              <a:tabLst/>
-              <a:defRPr/>
-            </a:pPr>
-            <a:r>
-              <a:rPr lang="de-DE" dirty="0" smtClean="0"/>
-              <a:t>Copyright </a:t>
-            </a:r>
-            <a:r>
-              <a:rPr lang="en-US" sz="1200" b="1" i="0" kern="1200" dirty="0" err="1" smtClean="0">
-                <a:solidFill>
-                  <a:schemeClr val="tx1"/>
-                </a:solidFill>
-                <a:effectLst/>
-                <a:latin typeface="+mn-lt"/>
-                <a:ea typeface="+mn-ea"/>
-                <a:cs typeface="+mn-cs"/>
-              </a:rPr>
-              <a:t>Karlkim</a:t>
-            </a:r>
-            <a:r>
-              <a:rPr lang="en-US" sz="1200" b="1" i="0" kern="1200" dirty="0" smtClean="0">
-                <a:solidFill>
-                  <a:schemeClr val="tx1"/>
-                </a:solidFill>
-                <a:effectLst/>
-                <a:latin typeface="+mn-lt"/>
-                <a:ea typeface="+mn-ea"/>
-                <a:cs typeface="+mn-cs"/>
-              </a:rPr>
-              <a:t> </a:t>
-            </a:r>
-            <a:r>
-              <a:rPr lang="en-US" sz="1200" b="1" i="0" kern="1200" dirty="0" err="1" smtClean="0">
-                <a:solidFill>
-                  <a:schemeClr val="tx1"/>
-                </a:solidFill>
-                <a:effectLst/>
-                <a:latin typeface="+mn-lt"/>
-                <a:ea typeface="+mn-ea"/>
-                <a:cs typeface="+mn-cs"/>
-              </a:rPr>
-              <a:t>Suwanmongkol</a:t>
-            </a:r>
-            <a:r>
-              <a:rPr lang="en-US" sz="1200" b="1" i="0" kern="1200" dirty="0" smtClean="0">
-                <a:solidFill>
-                  <a:schemeClr val="tx1"/>
-                </a:solidFill>
-                <a:effectLst/>
-                <a:latin typeface="+mn-lt"/>
-                <a:ea typeface="+mn-ea"/>
-                <a:cs typeface="+mn-cs"/>
-              </a:rPr>
-              <a:t> (@</a:t>
-            </a:r>
-            <a:r>
-              <a:rPr lang="en-US" sz="1200" b="1" i="0" kern="1200" dirty="0" err="1" smtClean="0">
-                <a:solidFill>
-                  <a:schemeClr val="tx1"/>
-                </a:solidFill>
-                <a:effectLst/>
-                <a:latin typeface="+mn-lt"/>
-                <a:ea typeface="+mn-ea"/>
-                <a:cs typeface="+mn-cs"/>
-              </a:rPr>
-              <a:t>kimsk</a:t>
-            </a:r>
-            <a:r>
-              <a:rPr lang="en-US" sz="1200" b="1" i="0" kern="1200" dirty="0" smtClean="0">
-                <a:solidFill>
-                  <a:schemeClr val="tx1"/>
-                </a:solidFill>
-                <a:effectLst/>
-                <a:latin typeface="+mn-lt"/>
-                <a:ea typeface="+mn-ea"/>
-                <a:cs typeface="+mn-cs"/>
-              </a:rPr>
-              <a:t>) | Twitter</a:t>
-            </a:r>
-          </a:p>
-          <a:p>
+              <a:t>Annotation: entweder tut der Programmierer dies oder,</a:t>
+            </a:r>
+            <a:r>
+              <a:rPr lang="de-DE" baseline="0" dirty="0" smtClean="0"/>
+              <a:t> im Falle von F#, das Type </a:t>
+            </a:r>
+            <a:r>
+              <a:rPr lang="de-DE" baseline="0" dirty="0" err="1" smtClean="0"/>
+              <a:t>inference</a:t>
+            </a:r>
             <a:endParaRPr lang="de-DE" baseline="0" dirty="0" smtClean="0"/>
           </a:p>
           <a:p>
@@ -1353,7 +1571,7 @@
       </p:grpSpPr>
       <p:sp>
         <p:nvSpPr>
-          <p:cNvPr id="2" name="Folienbildplatzhalter 1"/>
+          <p:cNvPr id="2" name="Slide Image Placeholder 1"/>
           <p:cNvSpPr>
             <a:spLocks noGrp="1" noRot="1" noChangeAspect="1"/>
           </p:cNvSpPr>
@@ -1365,7 +1583,7 @@
       </p:sp>
       <p:sp>
         <p:nvSpPr>
-          <p:cNvPr id="3" name="Notizenplatzhalter 2"/>
+          <p:cNvPr id="3" name="Notes Placeholder 2"/>
           <p:cNvSpPr>
             <a:spLocks noGrp="1"/>
           </p:cNvSpPr>
@@ -1378,13 +1596,134 @@
           <a:bodyPr/>
           <a:lstStyle/>
           <a:p>
-            <a:endParaRPr lang="de-DE" dirty="0"/>
-          </a:p>
-        </p:txBody>
-      </p:sp>
-      <p:sp>
-        <p:nvSpPr>
-          <p:cNvPr id="4" name="Foliennummernplatzhalter 3"/>
+            <a:pPr marL="0" marR="0" indent="0" algn="l" defTabSz="914400" rtl="0" eaLnBrk="1" fontAlgn="auto" latinLnBrk="0" hangingPunct="1">
+              <a:lnSpc>
+                <a:spcPct val="100000"/>
+              </a:lnSpc>
+              <a:spcBef>
+                <a:spcPts val="0"/>
+              </a:spcBef>
+              <a:spcAft>
+                <a:spcPts val="0"/>
+              </a:spcAft>
+              <a:buClrTx/>
+              <a:buSzTx/>
+              <a:buFontTx/>
+              <a:buNone/>
+              <a:tabLst/>
+              <a:defRPr/>
+            </a:pPr>
+            <a:r>
+              <a:rPr lang="de-DE" dirty="0" smtClean="0"/>
+              <a:t>Ist am besten erkennbar wenn man die Möglichkeiten einer schwachen Typisierung betrachtet</a:t>
+            </a:r>
+          </a:p>
+          <a:p>
+            <a:pPr marL="0" marR="0" indent="0" algn="l" defTabSz="914400" rtl="0" eaLnBrk="1" fontAlgn="auto" latinLnBrk="0" hangingPunct="1">
+              <a:lnSpc>
+                <a:spcPct val="100000"/>
+              </a:lnSpc>
+              <a:spcBef>
+                <a:spcPts val="0"/>
+              </a:spcBef>
+              <a:spcAft>
+                <a:spcPts val="0"/>
+              </a:spcAft>
+              <a:buClrTx/>
+              <a:buSzTx/>
+              <a:buFontTx/>
+              <a:buNone/>
+              <a:tabLst/>
+              <a:defRPr/>
+            </a:pPr>
+            <a:r>
+              <a:rPr lang="de-DE" dirty="0" smtClean="0"/>
+              <a:t>Copyright </a:t>
+            </a:r>
+            <a:r>
+              <a:rPr lang="en-US" sz="1200" b="1" i="0" kern="1200" dirty="0" err="1" smtClean="0">
+                <a:solidFill>
+                  <a:schemeClr val="tx1"/>
+                </a:solidFill>
+                <a:effectLst/>
+                <a:latin typeface="+mn-lt"/>
+                <a:ea typeface="+mn-ea"/>
+                <a:cs typeface="+mn-cs"/>
+              </a:rPr>
+              <a:t>Karlkim</a:t>
+            </a:r>
+            <a:r>
+              <a:rPr lang="en-US" sz="1200" b="1" i="0" kern="1200" dirty="0" smtClean="0">
+                <a:solidFill>
+                  <a:schemeClr val="tx1"/>
+                </a:solidFill>
+                <a:effectLst/>
+                <a:latin typeface="+mn-lt"/>
+                <a:ea typeface="+mn-ea"/>
+                <a:cs typeface="+mn-cs"/>
+              </a:rPr>
+              <a:t> </a:t>
+            </a:r>
+            <a:r>
+              <a:rPr lang="en-US" sz="1200" b="1" i="0" kern="1200" dirty="0" err="1" smtClean="0">
+                <a:solidFill>
+                  <a:schemeClr val="tx1"/>
+                </a:solidFill>
+                <a:effectLst/>
+                <a:latin typeface="+mn-lt"/>
+                <a:ea typeface="+mn-ea"/>
+                <a:cs typeface="+mn-cs"/>
+              </a:rPr>
+              <a:t>Suwanmongkol</a:t>
+            </a:r>
+            <a:r>
+              <a:rPr lang="en-US" sz="1200" b="1" i="0" kern="1200" dirty="0" smtClean="0">
+                <a:solidFill>
+                  <a:schemeClr val="tx1"/>
+                </a:solidFill>
+                <a:effectLst/>
+                <a:latin typeface="+mn-lt"/>
+                <a:ea typeface="+mn-ea"/>
+                <a:cs typeface="+mn-cs"/>
+              </a:rPr>
+              <a:t> (@</a:t>
+            </a:r>
+            <a:r>
+              <a:rPr lang="en-US" sz="1200" b="1" i="0" kern="1200" dirty="0" err="1" smtClean="0">
+                <a:solidFill>
+                  <a:schemeClr val="tx1"/>
+                </a:solidFill>
+                <a:effectLst/>
+                <a:latin typeface="+mn-lt"/>
+                <a:ea typeface="+mn-ea"/>
+                <a:cs typeface="+mn-cs"/>
+              </a:rPr>
+              <a:t>kimsk</a:t>
+            </a:r>
+            <a:r>
+              <a:rPr lang="en-US" sz="1200" b="1" i="0" kern="1200" dirty="0" smtClean="0">
+                <a:solidFill>
+                  <a:schemeClr val="tx1"/>
+                </a:solidFill>
+                <a:effectLst/>
+                <a:latin typeface="+mn-lt"/>
+                <a:ea typeface="+mn-ea"/>
+                <a:cs typeface="+mn-cs"/>
+              </a:rPr>
+              <a:t>) | Twitter</a:t>
+            </a:r>
+          </a:p>
+          <a:p>
+            <a:endParaRPr lang="de-DE" baseline="0" dirty="0" smtClean="0"/>
+          </a:p>
+          <a:p>
+            <a:endParaRPr lang="en-US" dirty="0"/>
+          </a:p>
+        </p:txBody>
+      </p:sp>
+      <p:sp>
+        <p:nvSpPr>
+          <p:cNvPr id="4" name="Slide Number Placeholder 3"/>
           <p:cNvSpPr>
             <a:spLocks noGrp="1"/>
           </p:cNvSpPr>
@@ -1408,7 +1747,7 @@
     </p:spTree>
     <p:extLst>
       <p:ext uri="{BB962C8B-B14F-4D97-AF65-F5344CB8AC3E}">
-        <p14:creationId xmlns:p14="http://schemas.microsoft.com/office/powerpoint/2010/main" val="2305588509"/>
+        <p14:creationId xmlns:p14="http://schemas.microsoft.com/office/powerpoint/2010/main" val="2102569733"/>
       </p:ext>
     </p:extLst>
   </p:cSld>
@@ -1437,7 +1776,7 @@
       </p:grpSpPr>
       <p:sp>
         <p:nvSpPr>
-          <p:cNvPr id="2" name="Slide Image Placeholder 1"/>
+          <p:cNvPr id="2" name="Folienbildplatzhalter 1"/>
           <p:cNvSpPr>
             <a:spLocks noGrp="1" noRot="1" noChangeAspect="1"/>
           </p:cNvSpPr>
@@ -1449,7 +1788,7 @@
       </p:sp>
       <p:sp>
         <p:nvSpPr>
-          <p:cNvPr id="3" name="Notes Placeholder 2"/>
+          <p:cNvPr id="3" name="Notizenplatzhalter 2"/>
           <p:cNvSpPr>
             <a:spLocks noGrp="1"/>
           </p:cNvSpPr>
@@ -1462,82 +1801,13 @@
           <a:bodyPr/>
           <a:lstStyle/>
           <a:p>
-            <a:r>
-              <a:rPr lang="de-DE" dirty="0" err="1" smtClean="0"/>
-              <a:t>Types</a:t>
-            </a:r>
-            <a:r>
-              <a:rPr lang="de-DE" dirty="0" smtClean="0"/>
-              <a:t> werden immer aus kleineren Einheiten zusammen erstellt, die kleinsten sind die Primitives der</a:t>
-            </a:r>
-            <a:r>
-              <a:rPr lang="de-DE" baseline="0" dirty="0" smtClean="0"/>
-              <a:t> Sprache.</a:t>
-            </a:r>
-            <a:endParaRPr lang="de-DE" dirty="0" smtClean="0"/>
-          </a:p>
-          <a:p>
-            <a:r>
-              <a:rPr lang="de-DE" dirty="0" smtClean="0"/>
-              <a:t>Dies bedingt dass ich sowohl aus einfachen Einheiten einen komplexeren Typ</a:t>
-            </a:r>
-            <a:r>
-              <a:rPr lang="de-DE" baseline="0" dirty="0" smtClean="0"/>
-              <a:t> erstellen kann, </a:t>
-            </a:r>
-          </a:p>
-          <a:p>
-            <a:r>
-              <a:rPr lang="de-DE" baseline="0" dirty="0" smtClean="0"/>
-              <a:t>oder aus einem komplexeren die konstituierende einfachere Typen „heraus“ holen </a:t>
-            </a:r>
-            <a:r>
-              <a:rPr lang="de-DE" baseline="0" dirty="0" smtClean="0"/>
-              <a:t>kann, oder „Zerlegen“</a:t>
-            </a:r>
-            <a:endParaRPr lang="de-DE" baseline="0" dirty="0" smtClean="0"/>
-          </a:p>
-          <a:p>
-            <a:endParaRPr lang="de-DE" baseline="0" dirty="0" smtClean="0"/>
-          </a:p>
-          <a:p>
-            <a:r>
-              <a:rPr lang="de-DE" baseline="0" dirty="0" smtClean="0"/>
-              <a:t>WICHTIG</a:t>
-            </a:r>
-          </a:p>
-          <a:p>
-            <a:r>
-              <a:rPr lang="de-DE" baseline="0" dirty="0" smtClean="0"/>
-              <a:t>Unterschied zu OO:</a:t>
-            </a:r>
-          </a:p>
-          <a:p>
-            <a:r>
-              <a:rPr lang="de-DE" baseline="0" dirty="0" smtClean="0"/>
-              <a:t>In OO kann ich eine Klasse erst „Leer“ erstellen, dann nach und nach Properties zuweisen/ändern.</a:t>
-            </a:r>
-          </a:p>
-          <a:p>
-            <a:r>
-              <a:rPr lang="de-DE" baseline="0" dirty="0" smtClean="0"/>
-              <a:t>In FP nicht.  </a:t>
-            </a:r>
-            <a:r>
-              <a:rPr lang="de-DE" baseline="0" dirty="0" err="1" smtClean="0"/>
-              <a:t>Immutability</a:t>
-            </a:r>
-            <a:r>
-              <a:rPr lang="de-DE" baseline="0" dirty="0" smtClean="0"/>
-              <a:t> heißt einmal erstellt, unveränderbar. Alle Daten müssen bei der Erstellung verfügbar sein</a:t>
-            </a:r>
-            <a:endParaRPr lang="en-US" dirty="0"/>
-          </a:p>
-        </p:txBody>
-      </p:sp>
-      <p:sp>
-        <p:nvSpPr>
-          <p:cNvPr id="4" name="Slide Number Placeholder 3"/>
+            <a:endParaRPr lang="de-DE" dirty="0"/>
+          </a:p>
+        </p:txBody>
+      </p:sp>
+      <p:sp>
+        <p:nvSpPr>
+          <p:cNvPr id="4" name="Foliennummernplatzhalter 3"/>
           <p:cNvSpPr>
             <a:spLocks noGrp="1"/>
           </p:cNvSpPr>
@@ -1561,7 +1831,7 @@
     </p:spTree>
     <p:extLst>
       <p:ext uri="{BB962C8B-B14F-4D97-AF65-F5344CB8AC3E}">
-        <p14:creationId xmlns:p14="http://schemas.microsoft.com/office/powerpoint/2010/main" val="1056229856"/>
+        <p14:creationId xmlns:p14="http://schemas.microsoft.com/office/powerpoint/2010/main" val="2305588509"/>
       </p:ext>
     </p:extLst>
   </p:cSld>
@@ -1616,61 +1886,68 @@
           <a:lstStyle/>
           <a:p>
             <a:r>
+              <a:rPr lang="de-DE" dirty="0" err="1" smtClean="0"/>
+              <a:t>Types</a:t>
+            </a:r>
+            <a:r>
               <a:rPr lang="de-DE" dirty="0" smtClean="0"/>
-              <a:t>IF </a:t>
-            </a:r>
-            <a:r>
-              <a:rPr lang="de-DE" dirty="0" err="1" smtClean="0"/>
-              <a:t>and</a:t>
-            </a:r>
+              <a:t> werden immer aus kleineren Einheiten zusammen erstellt, die kleinsten sind die Primitives der</a:t>
+            </a:r>
+            <a:r>
+              <a:rPr lang="de-DE" baseline="0" dirty="0" smtClean="0"/>
+              <a:t> Sprache.</a:t>
+            </a:r>
+            <a:endParaRPr lang="de-DE" dirty="0" smtClean="0"/>
+          </a:p>
+          <a:p>
             <a:r>
               <a:rPr lang="de-DE" dirty="0" smtClean="0"/>
-              <a:t> SWITCH on STERIODS</a:t>
-            </a:r>
-          </a:p>
-          <a:p>
-            <a:endParaRPr lang="de-DE" dirty="0" smtClean="0"/>
-          </a:p>
-          <a:p>
-            <a:r>
-              <a:rPr lang="de-DE" dirty="0" smtClean="0"/>
-              <a:t>Der F# Compiler ist in der Lage fehlende oder fehlerhafte Fälle</a:t>
+              <a:t>Dies bedingt dass ich sowohl aus einfachen Einheiten einen komplexeren Typ</a:t>
             </a:r>
             <a:r>
               <a:rPr lang="de-DE" baseline="0" dirty="0" smtClean="0"/>
-              <a:t> zu entdecken.  Dies ist bedingt durch die </a:t>
+              <a:t> erstellen kann, </a:t>
+            </a:r>
+          </a:p>
+          <a:p>
+            <a:r>
+              <a:rPr lang="de-DE" baseline="0" dirty="0" smtClean="0"/>
+              <a:t>oder aus einem komplexeren die konstituierende einfachere Typen „heraus“ holen kann, oder „Zerlegen“</a:t>
+            </a:r>
+          </a:p>
+          <a:p>
+            <a:endParaRPr lang="de-DE" baseline="0" dirty="0" smtClean="0"/>
+          </a:p>
+          <a:p>
+            <a:r>
+              <a:rPr lang="de-DE" baseline="0" dirty="0" smtClean="0"/>
+              <a:t>WICHTIG</a:t>
+            </a:r>
+          </a:p>
+          <a:p>
+            <a:r>
+              <a:rPr lang="de-DE" baseline="0" dirty="0" smtClean="0"/>
+              <a:t>Unterschied zu OO:</a:t>
+            </a:r>
+          </a:p>
+          <a:p>
+            <a:r>
+              <a:rPr lang="de-DE" baseline="0" dirty="0" smtClean="0"/>
+              <a:t>In OO kann ich eine Klasse erst „Leer“ erstellen, dann nach und nach Properties zuweisen/ändern.</a:t>
+            </a:r>
+          </a:p>
+          <a:p>
+            <a:r>
+              <a:rPr lang="de-DE" baseline="0" dirty="0" smtClean="0"/>
+              <a:t>In FP nicht.  </a:t>
             </a:r>
             <a:r>
               <a:rPr lang="de-DE" baseline="0" dirty="0" err="1" smtClean="0"/>
-              <a:t>Hindley-Milner</a:t>
+              <a:t>Immutability</a:t>
             </a:r>
             <a:r>
               <a:rPr lang="de-DE" baseline="0" dirty="0" smtClean="0"/>
-              <a:t> Type </a:t>
-            </a:r>
-            <a:r>
-              <a:rPr lang="de-DE" baseline="0" dirty="0" err="1" smtClean="0"/>
-              <a:t>Inference</a:t>
-            </a:r>
-            <a:r>
-              <a:rPr lang="de-DE" baseline="0" dirty="0" smtClean="0"/>
-              <a:t>, C# wird dies nicht können ohne dass „</a:t>
-            </a:r>
-            <a:r>
-              <a:rPr lang="de-DE" baseline="0" dirty="0" err="1" smtClean="0"/>
-              <a:t>breaking</a:t>
-            </a:r>
-            <a:r>
-              <a:rPr lang="de-DE" baseline="0" dirty="0" smtClean="0"/>
-              <a:t> </a:t>
-            </a:r>
-            <a:r>
-              <a:rPr lang="de-DE" baseline="0" dirty="0" err="1" smtClean="0"/>
-              <a:t>changes</a:t>
-            </a:r>
-            <a:r>
-              <a:rPr lang="de-DE" baseline="0" dirty="0" smtClean="0"/>
-              <a:t>“ eingeführt werden.</a:t>
+              <a:t> heißt einmal erstellt, unveränderbar. Alle Daten müssen bei der Erstellung verfügbar sein</a:t>
             </a:r>
             <a:endParaRPr lang="en-US" dirty="0"/>
           </a:p>
@@ -1758,11 +2035,60 @@
           <a:p>
             <a:r>
               <a:rPr lang="de-DE" dirty="0" smtClean="0"/>
-              <a:t>Zwei im</a:t>
+              <a:t>IF </a:t>
+            </a:r>
+            <a:r>
+              <a:rPr lang="de-DE" dirty="0" err="1" smtClean="0"/>
+              <a:t>and</a:t>
+            </a:r>
+            <a:r>
+              <a:rPr lang="de-DE" dirty="0" smtClean="0"/>
+              <a:t> SWITCH on STERIODS</a:t>
+            </a:r>
+          </a:p>
+          <a:p>
+            <a:endParaRPr lang="de-DE" dirty="0" smtClean="0"/>
+          </a:p>
+          <a:p>
+            <a:r>
+              <a:rPr lang="de-DE" dirty="0" smtClean="0"/>
+              <a:t>Der F# Compiler ist in der Lage fehlende oder fehlerhafte Fälle</a:t>
             </a:r>
             <a:r>
               <a:rPr lang="de-DE" baseline="0" dirty="0" smtClean="0"/>
-              <a:t> Sinne des Domains gleichwertige Instanzen „Kunde 123“ sind nicht identisch.</a:t>
+              <a:t> zu entdecken.  Dies ist bedingt durch die </a:t>
+            </a:r>
+            <a:r>
+              <a:rPr lang="de-DE" baseline="0" dirty="0" err="1" smtClean="0"/>
+              <a:t>Hindley-Milner</a:t>
+            </a:r>
+            <a:r>
+              <a:rPr lang="de-DE" baseline="0" dirty="0" smtClean="0"/>
+              <a:t> Type </a:t>
+            </a:r>
+            <a:r>
+              <a:rPr lang="de-DE" baseline="0" dirty="0" err="1" smtClean="0"/>
+              <a:t>Inference</a:t>
+            </a:r>
+            <a:r>
+              <a:rPr lang="de-DE" baseline="0" dirty="0" smtClean="0"/>
+              <a:t>, C# wird dies nicht können ohne dass „</a:t>
+            </a:r>
+            <a:r>
+              <a:rPr lang="de-DE" baseline="0" dirty="0" err="1" smtClean="0"/>
+              <a:t>breaking</a:t>
+            </a:r>
+            <a:r>
+              <a:rPr lang="de-DE" baseline="0" dirty="0" smtClean="0"/>
+              <a:t> </a:t>
+            </a:r>
+            <a:r>
+              <a:rPr lang="de-DE" baseline="0" dirty="0" err="1" smtClean="0"/>
+              <a:t>changes</a:t>
+            </a:r>
+            <a:r>
+              <a:rPr lang="de-DE" baseline="0" dirty="0" smtClean="0"/>
+              <a:t>“ eingeführt werden.</a:t>
             </a:r>
             <a:endParaRPr lang="en-US" dirty="0"/>
           </a:p>
@@ -1794,7 +2120,7 @@
     </p:spTree>
     <p:extLst>
       <p:ext uri="{BB962C8B-B14F-4D97-AF65-F5344CB8AC3E}">
-        <p14:creationId xmlns:p14="http://schemas.microsoft.com/office/powerpoint/2010/main" val="836832827"/>
+        <p14:creationId xmlns:p14="http://schemas.microsoft.com/office/powerpoint/2010/main" val="1056229856"/>
       </p:ext>
     </p:extLst>
   </p:cSld>
@@ -1850,19 +2176,11 @@
           <a:p>
             <a:r>
               <a:rPr lang="de-DE" dirty="0" smtClean="0"/>
-              <a:t>Es ist möglich das generierte</a:t>
+              <a:t>Zwei im</a:t>
             </a:r>
             <a:r>
               <a:rPr lang="de-DE" baseline="0" dirty="0" smtClean="0"/>
-              <a:t> Code in einem Decompiler zu sehen, nur die PDB Datei entfernen damit das IL Code als C# dekompiliert wird, manche </a:t>
-            </a:r>
-            <a:r>
-              <a:rPr lang="de-DE" baseline="0" dirty="0" err="1" smtClean="0"/>
-              <a:t>decompiler</a:t>
-            </a:r>
-            <a:r>
-              <a:rPr lang="de-DE" baseline="0" dirty="0" smtClean="0"/>
-              <a:t> sind schlau und nehmen die Info aus der PDB heraus.  Dann sieht man was der Compiler alles erzeugt.</a:t>
+              <a:t> Sinne des Domains gleichwertige Instanzen „Kunde 123“ sind nicht identisch.</a:t>
             </a:r>
             <a:endParaRPr lang="en-US" dirty="0"/>
           </a:p>
@@ -1886,6 +2204,106 @@
             <a:fld id="{4775FDF9-2A53-4261-A0AF-3B6A9698D365}" type="slidenum">
               <a:rPr lang="en-US" smtClean="0"/>
               <a:t>19</a:t>
+            </a:fld>
+            <a:endParaRPr lang="en-US"/>
+          </a:p>
+        </p:txBody>
+      </p:sp>
+    </p:spTree>
+    <p:extLst>
+      <p:ext uri="{BB962C8B-B14F-4D97-AF65-F5344CB8AC3E}">
+        <p14:creationId xmlns:p14="http://schemas.microsoft.com/office/powerpoint/2010/main" val="836832827"/>
+      </p:ext>
+    </p:extLst>
+  </p:cSld>
+  <p:clrMapOvr>
+    <a:masterClrMapping/>
+  </p:clrMapOvr>
+</p:notes>
+</file>
+
+<file path=ppt/notesSlides/notesSlide19.xml><?xml version="1.0" encoding="utf-8"?>
+<p:notes xmlns:a="http://schemas.openxmlformats.org/drawingml/2006/main" xmlns:r="http://schemas.openxmlformats.org/officeDocument/2006/relationships" xmlns:p="http://schemas.openxmlformats.org/presentationml/2006/main">
+  <p:cSld>
+    <p:spTree>
+      <p:nvGrpSpPr>
+        <p:cNvPr id="1" name=""/>
+        <p:cNvGrpSpPr/>
+        <p:nvPr/>
+      </p:nvGrpSpPr>
+      <p:grpSpPr>
+        <a:xfrm>
+          <a:off x="0" y="0"/>
+          <a:ext cx="0" cy="0"/>
+          <a:chOff x="0" y="0"/>
+          <a:chExt cx="0" cy="0"/>
+        </a:xfrm>
+      </p:grpSpPr>
+      <p:sp>
+        <p:nvSpPr>
+          <p:cNvPr id="2" name="Slide Image Placeholder 1"/>
+          <p:cNvSpPr>
+            <a:spLocks noGrp="1" noRot="1" noChangeAspect="1"/>
+          </p:cNvSpPr>
+          <p:nvPr>
+            <p:ph type="sldImg"/>
+          </p:nvPr>
+        </p:nvSpPr>
+        <p:spPr/>
+      </p:sp>
+      <p:sp>
+        <p:nvSpPr>
+          <p:cNvPr id="3" name="Notes Placeholder 2"/>
+          <p:cNvSpPr>
+            <a:spLocks noGrp="1"/>
+          </p:cNvSpPr>
+          <p:nvPr>
+            <p:ph type="body" idx="1"/>
+          </p:nvPr>
+        </p:nvSpPr>
+        <p:spPr/>
+        <p:txBody>
+          <a:bodyPr/>
+          <a:lstStyle/>
+          <a:p>
+            <a:r>
+              <a:rPr lang="de-DE" dirty="0" smtClean="0"/>
+              <a:t>Es ist möglich das generierte</a:t>
+            </a:r>
+            <a:r>
+              <a:rPr lang="de-DE" baseline="0" dirty="0" smtClean="0"/>
+              <a:t> Code in einem Decompiler zu sehen, nur die PDB Datei entfernen damit das IL Code als C# dekompiliert wird, manche </a:t>
+            </a:r>
+            <a:r>
+              <a:rPr lang="de-DE" baseline="0" dirty="0" err="1" smtClean="0"/>
+              <a:t>decompiler</a:t>
+            </a:r>
+            <a:r>
+              <a:rPr lang="de-DE" baseline="0" dirty="0" smtClean="0"/>
+              <a:t> sind schlau und nehmen die Info aus der PDB heraus.  Dann sieht man was der Compiler alles erzeugt.</a:t>
+            </a:r>
+            <a:endParaRPr lang="en-US" dirty="0"/>
+          </a:p>
+        </p:txBody>
+      </p:sp>
+      <p:sp>
+        <p:nvSpPr>
+          <p:cNvPr id="4" name="Slide Number Placeholder 3"/>
+          <p:cNvSpPr>
+            <a:spLocks noGrp="1"/>
+          </p:cNvSpPr>
+          <p:nvPr>
+            <p:ph type="sldNum" sz="quarter" idx="10"/>
+          </p:nvPr>
+        </p:nvSpPr>
+        <p:spPr/>
+        <p:txBody>
+          <a:bodyPr/>
+          <a:lstStyle/>
+          <a:p>
+            <a:fld id="{4775FDF9-2A53-4261-A0AF-3B6A9698D365}" type="slidenum">
+              <a:rPr lang="en-US" smtClean="0"/>
+              <a:t>20</a:t>
             </a:fld>
             <a:endParaRPr lang="en-US"/>
           </a:p>
@@ -2228,31 +2646,7 @@
             </a:r>
             <a:r>
               <a:rPr lang="de-DE" baseline="0" dirty="0" smtClean="0"/>
-              <a:t> gearbeitet</a:t>
-            </a:r>
-            <a:r>
-              <a:rPr lang="de-DE" baseline="0" dirty="0" smtClean="0"/>
-              <a:t>, die Basis für eine </a:t>
-            </a:r>
-            <a:r>
-              <a:rPr lang="de-DE" baseline="0" dirty="0" smtClean="0"/>
-              <a:t>Turing </a:t>
-            </a:r>
-            <a:r>
-              <a:rPr lang="de-DE" baseline="0" dirty="0" smtClean="0"/>
-              <a:t>Maschine. "</a:t>
-            </a:r>
-            <a:r>
-              <a:rPr lang="de-DE" baseline="0" dirty="0" smtClean="0"/>
-              <a:t>formale Sprache zur Untersuchung von Funktionen". </a:t>
-            </a:r>
-            <a:r>
-              <a:rPr lang="de-DE" baseline="0" dirty="0" smtClean="0"/>
-              <a:t>Mathematische </a:t>
-            </a:r>
-            <a:r>
-              <a:rPr lang="de-DE" baseline="0" dirty="0" smtClean="0"/>
-              <a:t>Analyse von Funktionen und deren gebundenen Parameter.</a:t>
+              <a:t> gearbeitet, die Basis für eine Turing Maschine. "formale Sprache zur Untersuchung von Funktionen". Mathematische Analyse von Funktionen und deren gebundenen Parameter.</a:t>
             </a:r>
           </a:p>
           <a:p>
@@ -2264,13 +2658,8 @@
           <a:p>
             <a:r>
               <a:rPr lang="de-DE" baseline="0" dirty="0" smtClean="0"/>
-              <a:t>John McCarthy, hat die Spezifikation und das erste Compiler für LISP </a:t>
-            </a:r>
-            <a:r>
-              <a:rPr lang="de-DE" baseline="0" dirty="0" smtClean="0"/>
-              <a:t>geschrieben, die zweit älteste und noch gebräuchliche Programmiersprache (FORTRAN ist die erste!)</a:t>
-            </a:r>
-            <a:endParaRPr lang="de-DE" baseline="0" dirty="0" smtClean="0"/>
+              <a:t>John McCarthy, hat die Spezifikation und das erste Compiler für LISP geschrieben, die zweit älteste und noch gebräuchliche Programmiersprache (FORTRAN ist die erste!)</a:t>
+            </a:r>
           </a:p>
           <a:p>
             <a:endParaRPr lang="de-DE" baseline="0" dirty="0" smtClean="0"/>
@@ -2361,99 +2750,56 @@
           <a:lstStyle/>
           <a:p>
             <a:r>
-              <a:rPr lang="de-DE" dirty="0" err="1" smtClean="0"/>
-              <a:t>Functional</a:t>
-            </a:r>
-            <a:r>
               <a:rPr lang="de-DE" dirty="0" smtClean="0"/>
+              <a:t>Seit Mitte</a:t>
+            </a:r>
+            <a:r>
+              <a:rPr lang="de-DE" baseline="0" dirty="0" smtClean="0"/>
+              <a:t> der 2000er Jahre haben die führenden Laufzeitumgebungen neue Konstrukte eingeführt die funktionale Sprachen begünstigen</a:t>
+            </a:r>
+          </a:p>
+          <a:p>
+            <a:pPr marL="171450" indent="-171450">
+              <a:buFontTx/>
+              <a:buChar char="-"/>
+            </a:pPr>
+            <a:r>
+              <a:rPr lang="de-DE" baseline="0" dirty="0" smtClean="0"/>
+              <a:t>Lambdas</a:t>
+            </a:r>
+          </a:p>
+          <a:p>
+            <a:pPr marL="171450" indent="-171450">
+              <a:buFontTx/>
+              <a:buChar char="-"/>
+            </a:pPr>
+            <a:r>
+              <a:rPr lang="de-DE" baseline="0" dirty="0" smtClean="0"/>
+              <a:t>Endrekursion (</a:t>
+            </a:r>
+            <a:r>
+              <a:rPr lang="de-DE" baseline="0" dirty="0" err="1" smtClean="0"/>
+              <a:t>Tail</a:t>
+            </a:r>
+            <a:r>
+              <a:rPr lang="de-DE" baseline="0" dirty="0" smtClean="0"/>
               <a:t> </a:t>
             </a:r>
             <a:r>
-              <a:rPr lang="de-DE" dirty="0" err="1" smtClean="0"/>
-              <a:t>Creep</a:t>
-            </a:r>
-            <a:endParaRPr lang="de-DE" dirty="0" smtClean="0"/>
-          </a:p>
-          <a:p>
-            <a:endParaRPr lang="de-DE" dirty="0" smtClean="0"/>
-          </a:p>
-          <a:p>
-            <a:r>
-              <a:rPr lang="de-DE" dirty="0" smtClean="0"/>
-              <a:t>Kein </a:t>
-            </a:r>
-            <a:r>
-              <a:rPr lang="de-DE" dirty="0" smtClean="0"/>
-              <a:t>Hype, kein neuer Trend, sondern endlich auch im Enterprise-Umfeld angekommen (Scala/</a:t>
-            </a:r>
-            <a:r>
-              <a:rPr lang="de-DE" dirty="0" err="1" smtClean="0"/>
-              <a:t>Clojure</a:t>
+              <a:rPr lang="de-DE" baseline="0" dirty="0" err="1" smtClean="0"/>
+              <a:t>Recursion</a:t>
             </a:r>
             <a:r>
               <a:rPr lang="de-DE" baseline="0" dirty="0" smtClean="0"/>
-              <a:t> auf JVM, F# auf .NET, funktionale Ansätze in JavaScript)</a:t>
-            </a:r>
-          </a:p>
-          <a:p>
-            <a:r>
-              <a:rPr lang="de-DE" baseline="0" dirty="0" smtClean="0"/>
-              <a:t>Prognose: In den 2020ern wird genau so erwartet, dass man funktional programmieren kann, wie heute mit </a:t>
-            </a:r>
-            <a:r>
-              <a:rPr lang="de-DE" baseline="0" dirty="0" smtClean="0"/>
-              <a:t>OOP (Zitat R.B.!)</a:t>
-            </a:r>
-          </a:p>
-          <a:p>
-            <a:endParaRPr lang="de-DE" baseline="0" dirty="0" smtClean="0"/>
-          </a:p>
-          <a:p>
-            <a:pPr marL="0" marR="0" indent="0" algn="l" defTabSz="914400" rtl="0" eaLnBrk="1" fontAlgn="auto" latinLnBrk="0" hangingPunct="1">
-              <a:lnSpc>
-                <a:spcPct val="100000"/>
-              </a:lnSpc>
-              <a:spcBef>
-                <a:spcPts val="0"/>
-              </a:spcBef>
-              <a:spcAft>
-                <a:spcPts val="0"/>
-              </a:spcAft>
-              <a:buClrTx/>
-              <a:buSzTx/>
+              <a:t>)</a:t>
+            </a:r>
+          </a:p>
+          <a:p>
+            <a:pPr marL="0" indent="0">
               <a:buFontTx/>
               <a:buNone/>
-              <a:tabLst/>
-              <a:defRPr/>
             </a:pPr>
-            <a:r>
-              <a:rPr lang="de-DE" dirty="0" smtClean="0"/>
-              <a:t>OO Unzulänglichkeiten: Noch mehr Frameworks, vielversprechende</a:t>
-            </a:r>
-            <a:r>
-              <a:rPr lang="de-DE" baseline="0" dirty="0" smtClean="0"/>
-              <a:t> Ansätze erweisen sich als äußerst schwierig wie Test-</a:t>
-            </a:r>
-            <a:r>
-              <a:rPr lang="de-DE" baseline="0" dirty="0" err="1" smtClean="0"/>
-              <a:t>Driven</a:t>
-            </a:r>
-            <a:r>
-              <a:rPr lang="de-DE" baseline="0" dirty="0" smtClean="0"/>
-              <a:t>-Development, Domain </a:t>
-            </a:r>
-            <a:r>
-              <a:rPr lang="de-DE" baseline="0" dirty="0" err="1" smtClean="0"/>
-              <a:t>Driven</a:t>
-            </a:r>
-            <a:r>
-              <a:rPr lang="de-DE" baseline="0" dirty="0" smtClean="0"/>
-              <a:t> Development</a:t>
-            </a:r>
-            <a:endParaRPr lang="de-DE" dirty="0" smtClean="0"/>
-          </a:p>
-          <a:p>
-            <a:endParaRPr lang="de-DE" dirty="0"/>
+            <a:endParaRPr lang="de-DE" baseline="0" dirty="0" smtClean="0"/>
           </a:p>
         </p:txBody>
       </p:sp>
@@ -2483,7 +2829,7 @@
     </p:spTree>
     <p:extLst>
       <p:ext uri="{BB962C8B-B14F-4D97-AF65-F5344CB8AC3E}">
-        <p14:creationId xmlns:p14="http://schemas.microsoft.com/office/powerpoint/2010/main" val="1139320735"/>
+        <p14:creationId xmlns:p14="http://schemas.microsoft.com/office/powerpoint/2010/main" val="948069316"/>
       </p:ext>
     </p:extLst>
   </p:cSld>
@@ -2538,107 +2884,16 @@
           <a:lstStyle/>
           <a:p>
             <a:r>
-              <a:rPr lang="en-US" sz="1200" kern="1200" dirty="0" smtClean="0">
-                <a:solidFill>
-                  <a:schemeClr val="tx1"/>
-                </a:solidFill>
-                <a:latin typeface="+mn-lt"/>
-                <a:ea typeface="+mn-ea"/>
-                <a:cs typeface="+mn-cs"/>
-              </a:rPr>
-              <a:t>type S = { Name : string; </a:t>
-            </a:r>
-            <a:r>
-              <a:rPr lang="en-US" sz="1200" kern="1200" dirty="0" err="1" smtClean="0">
-                <a:solidFill>
-                  <a:schemeClr val="tx1"/>
-                </a:solidFill>
-                <a:latin typeface="+mn-lt"/>
-                <a:ea typeface="+mn-ea"/>
-                <a:cs typeface="+mn-cs"/>
-              </a:rPr>
-              <a:t>Tun</a:t>
-            </a:r>
-            <a:r>
-              <a:rPr lang="en-US" sz="1200" kern="1200" dirty="0" smtClean="0">
-                <a:solidFill>
-                  <a:schemeClr val="tx1"/>
-                </a:solidFill>
-                <a:latin typeface="+mn-lt"/>
-                <a:ea typeface="+mn-ea"/>
-                <a:cs typeface="+mn-cs"/>
-              </a:rPr>
-              <a:t> : string -&gt; string; };;</a:t>
-            </a:r>
-          </a:p>
-          <a:p>
-            <a:r>
-              <a:rPr lang="de-DE" sz="1200" kern="1200" dirty="0" err="1" smtClean="0">
-                <a:solidFill>
-                  <a:schemeClr val="tx1"/>
-                </a:solidFill>
-                <a:latin typeface="+mn-lt"/>
-                <a:ea typeface="+mn-ea"/>
-                <a:cs typeface="+mn-cs"/>
-              </a:rPr>
-              <a:t>let</a:t>
-            </a:r>
-            <a:r>
-              <a:rPr lang="de-DE" sz="1200" kern="1200" baseline="0" dirty="0" smtClean="0">
-                <a:solidFill>
-                  <a:schemeClr val="tx1"/>
-                </a:solidFill>
-                <a:latin typeface="+mn-lt"/>
-                <a:ea typeface="+mn-ea"/>
-                <a:cs typeface="+mn-cs"/>
-              </a:rPr>
-              <a:t> f g x = g x;;</a:t>
-            </a:r>
-          </a:p>
-          <a:p>
-            <a:r>
-              <a:rPr lang="de-DE" sz="1200" kern="1200" baseline="0" dirty="0" err="1" smtClean="0">
-                <a:solidFill>
-                  <a:schemeClr val="tx1"/>
-                </a:solidFill>
-                <a:latin typeface="+mn-lt"/>
-                <a:ea typeface="+mn-ea"/>
-                <a:cs typeface="+mn-cs"/>
-              </a:rPr>
-              <a:t>let</a:t>
-            </a:r>
-            <a:r>
-              <a:rPr lang="de-DE" sz="1200" kern="1200" baseline="0" dirty="0" smtClean="0">
-                <a:solidFill>
-                  <a:schemeClr val="tx1"/>
-                </a:solidFill>
-                <a:latin typeface="+mn-lt"/>
-                <a:ea typeface="+mn-ea"/>
-                <a:cs typeface="+mn-cs"/>
-              </a:rPr>
+              <a:rPr lang="de-DE" dirty="0" err="1" smtClean="0"/>
+              <a:t>Functional</a:t>
+            </a:r>
+            <a:r>
+              <a:rPr lang="de-DE" dirty="0" smtClean="0"/>
               <a:t> </a:t>
             </a:r>
             <a:r>
-              <a:rPr lang="de-DE" sz="1200" kern="1200" baseline="0" dirty="0" err="1" smtClean="0">
-                <a:solidFill>
-                  <a:schemeClr val="tx1"/>
-                </a:solidFill>
-                <a:latin typeface="+mn-lt"/>
-                <a:ea typeface="+mn-ea"/>
-                <a:cs typeface="+mn-cs"/>
-              </a:rPr>
-              <a:t>addFive</a:t>
-            </a:r>
-            <a:r>
-              <a:rPr lang="de-DE" sz="1200" kern="1200" baseline="0" dirty="0" smtClean="0">
-                <a:solidFill>
-                  <a:schemeClr val="tx1"/>
-                </a:solidFill>
-                <a:latin typeface="+mn-lt"/>
-                <a:ea typeface="+mn-ea"/>
-                <a:cs typeface="+mn-cs"/>
-              </a:rPr>
-              <a:t> x = (+) x 5;;</a:t>
+              <a:rPr lang="de-DE" dirty="0" err="1" smtClean="0"/>
+              <a:t>Creep</a:t>
             </a:r>
             <a:endParaRPr lang="de-DE" dirty="0" smtClean="0"/>
           </a:p>
@@ -2648,197 +2903,72 @@
           <a:p>
             <a:r>
               <a:rPr lang="de-DE" dirty="0" smtClean="0"/>
-              <a:t>Typ &lt;&gt; Klasse: Kein Verhalten,</a:t>
+              <a:t>Kein Hype, kein neuer Trend, sondern endlich auch im Enterprise-Umfeld angekommen (Scala/</a:t>
+            </a:r>
+            <a:r>
+              <a:rPr lang="de-DE" dirty="0" err="1" smtClean="0"/>
+              <a:t>Clojure</a:t>
             </a:r>
             <a:r>
               <a:rPr lang="de-DE" baseline="0" dirty="0" smtClean="0"/>
-              <a:t> Reine Datenstruktur.  Aber Achtung: Ich kann in F# da ein bisschen schummeln, F# ist </a:t>
-            </a:r>
-            <a:r>
-              <a:rPr lang="de-DE" baseline="0" dirty="0" err="1" smtClean="0"/>
-              <a:t>Functional</a:t>
-            </a:r>
+              <a:t> auf JVM, F# auf .NET, funktionale Ansätze in JavaScript)</a:t>
+            </a:r>
+          </a:p>
+          <a:p>
             <a:r>
               <a:rPr lang="de-DE" baseline="0" dirty="0" smtClean="0"/>
-              <a:t> </a:t>
-            </a:r>
-            <a:r>
-              <a:rPr lang="de-DE" baseline="0" dirty="0" err="1" smtClean="0"/>
-              <a:t>first</a:t>
-            </a:r>
-            <a:r>
-              <a:rPr lang="de-DE" baseline="0" dirty="0" smtClean="0"/>
-              <a:t> und erlaubt die Verwendung von OO Konstrukte.</a:t>
+              <a:t>Prognose: In den 2020ern wird genau so erwartet, dass man funktional programmieren kann, wie heute mit OOP (Zitat R.B.!)</a:t>
             </a:r>
           </a:p>
           <a:p>
             <a:endParaRPr lang="de-DE" baseline="0" dirty="0" smtClean="0"/>
           </a:p>
           <a:p>
-            <a:r>
-              <a:rPr lang="de-DE" baseline="0" dirty="0" smtClean="0"/>
-              <a:t>type Name = { Vor : </a:t>
-            </a:r>
-            <a:r>
-              <a:rPr lang="de-DE" baseline="0" dirty="0" err="1" smtClean="0"/>
-              <a:t>string</a:t>
-            </a:r>
-            <a:r>
-              <a:rPr lang="de-DE" baseline="0" dirty="0" smtClean="0"/>
-              <a:t>; Nach : </a:t>
-            </a:r>
-            <a:r>
-              <a:rPr lang="de-DE" baseline="0" dirty="0" err="1" smtClean="0"/>
-              <a:t>string</a:t>
-            </a:r>
-            <a:r>
-              <a:rPr lang="de-DE" baseline="0" dirty="0" smtClean="0"/>
-              <a:t>; }</a:t>
-            </a:r>
-          </a:p>
-          <a:p>
-            <a:r>
-              <a:rPr lang="de-DE" baseline="0" dirty="0" smtClean="0"/>
-              <a:t>type Name‘ = { Name : Name; Title : </a:t>
-            </a:r>
-            <a:r>
-              <a:rPr lang="de-DE" baseline="0" dirty="0" err="1" smtClean="0"/>
-              <a:t>string</a:t>
-            </a:r>
-            <a:r>
-              <a:rPr lang="de-DE" baseline="0" dirty="0" smtClean="0"/>
-              <a:t>; Zusatz : </a:t>
-            </a:r>
-            <a:r>
-              <a:rPr lang="de-DE" baseline="0" dirty="0" err="1" smtClean="0"/>
-              <a:t>string</a:t>
-            </a:r>
-            <a:r>
-              <a:rPr lang="de-DE" baseline="0" dirty="0" smtClean="0"/>
-              <a:t>; }</a:t>
-            </a:r>
-          </a:p>
-          <a:p>
-            <a:endParaRPr lang="de-DE" baseline="0" dirty="0" smtClean="0"/>
-          </a:p>
-          <a:p>
-            <a:r>
-              <a:rPr lang="de-DE" baseline="0" dirty="0" err="1" smtClean="0"/>
-              <a:t>Immutability</a:t>
-            </a:r>
-            <a:r>
-              <a:rPr lang="de-DE" baseline="0" dirty="0" smtClean="0"/>
-              <a:t>. Grundsätzlich: Es gibt keine Variablen (Slot im Speicher wo ich etwas pushen und poppen kann). Einmal zugewiesen, bleibt es da für immer! Zwei Vorteile:</a:t>
-            </a:r>
-          </a:p>
-          <a:p>
-            <a:pPr marL="171450" indent="-171450">
-              <a:buFontTx/>
-              <a:buChar char="-"/>
-            </a:pPr>
-            <a:r>
-              <a:rPr lang="de-DE" baseline="0" dirty="0" smtClean="0"/>
-              <a:t>Simple </a:t>
-            </a:r>
-            <a:r>
-              <a:rPr lang="de-DE" baseline="0" dirty="0" err="1" smtClean="0"/>
-              <a:t>to</a:t>
-            </a:r>
-            <a:r>
-              <a:rPr lang="de-DE" baseline="0" dirty="0" smtClean="0"/>
-              <a:t> </a:t>
-            </a:r>
-            <a:r>
-              <a:rPr lang="de-DE" baseline="0" dirty="0" err="1" smtClean="0"/>
-              <a:t>reason</a:t>
-            </a:r>
-            <a:r>
-              <a:rPr lang="de-DE" baseline="0" dirty="0" smtClean="0"/>
-              <a:t> </a:t>
-            </a:r>
-            <a:r>
-              <a:rPr lang="de-DE" baseline="0" dirty="0" err="1" smtClean="0"/>
-              <a:t>about</a:t>
-            </a:r>
-            <a:r>
-              <a:rPr lang="de-DE" baseline="0" dirty="0" smtClean="0"/>
-              <a:t>. Die Frage „Wann hat sich der Wert geändert?“ stellt sich gar nicht mehr, der Wert kann nur zugewiesen werden</a:t>
-            </a:r>
-          </a:p>
-          <a:p>
-            <a:pPr marL="171450" indent="-171450">
-              <a:buFontTx/>
-              <a:buChar char="-"/>
-            </a:pPr>
-            <a:r>
-              <a:rPr lang="de-DE" baseline="0" dirty="0" smtClean="0"/>
-              <a:t>Multi Core </a:t>
-            </a:r>
-            <a:r>
-              <a:rPr lang="de-DE" baseline="0" dirty="0" err="1" smtClean="0"/>
-              <a:t>ready</a:t>
-            </a:r>
-            <a:r>
-              <a:rPr lang="de-DE" baseline="0" dirty="0" smtClean="0"/>
-              <a:t>: Kein </a:t>
-            </a:r>
-            <a:r>
-              <a:rPr lang="de-DE" baseline="0" dirty="0" err="1" smtClean="0"/>
-              <a:t>Mutex</a:t>
-            </a:r>
-            <a:r>
-              <a:rPr lang="de-DE" baseline="0" dirty="0" smtClean="0"/>
-              <a:t>, kein Semaphore, kein Monitor!</a:t>
-            </a:r>
-          </a:p>
-          <a:p>
-            <a:pPr marL="171450" indent="-171450">
-              <a:buFontTx/>
-              <a:buChar char="-"/>
-            </a:pPr>
-            <a:r>
-              <a:rPr lang="de-DE" baseline="0" dirty="0" smtClean="0"/>
-              <a:t>Man muss State neudenken, besser neulernen, die FP Leute haben das schon gemacht. Und übrigens, </a:t>
-            </a:r>
-            <a:r>
-              <a:rPr lang="de-DE" baseline="0" dirty="0" err="1" smtClean="0"/>
-              <a:t>SmallTalk</a:t>
-            </a:r>
-            <a:r>
-              <a:rPr lang="de-DE" baseline="0" dirty="0" smtClean="0"/>
-              <a:t> war auch </a:t>
-            </a:r>
-            <a:r>
-              <a:rPr lang="de-DE" baseline="0" dirty="0" err="1" smtClean="0"/>
-              <a:t>immutable</a:t>
-            </a:r>
-            <a:r>
-              <a:rPr lang="de-DE" baseline="0" dirty="0" smtClean="0"/>
-              <a:t>, State war nur mittels eines Messaging Untersystem möglich.</a:t>
-            </a:r>
-          </a:p>
-          <a:p>
-            <a:pPr marL="171450" indent="-171450">
-              <a:buFontTx/>
-              <a:buChar char="-"/>
-            </a:pPr>
-            <a:endParaRPr lang="de-DE" baseline="0" dirty="0" smtClean="0"/>
-          </a:p>
-          <a:p>
-            <a:pPr marL="0" indent="0">
+            <a:pPr marL="0" marR="0" indent="0" algn="l" defTabSz="914400" rtl="0" eaLnBrk="1" fontAlgn="auto" latinLnBrk="0" hangingPunct="1">
+              <a:lnSpc>
+                <a:spcPct val="100000"/>
+              </a:lnSpc>
+              <a:spcBef>
+                <a:spcPts val="0"/>
+              </a:spcBef>
+              <a:spcAft>
+                <a:spcPts val="0"/>
+              </a:spcAft>
+              <a:buClrTx/>
+              <a:buSzTx/>
               <a:buFontTx/>
               <a:buNone/>
+              <a:tabLst/>
+              <a:defRPr/>
             </a:pPr>
             <a:r>
+              <a:rPr lang="de-DE" dirty="0" smtClean="0"/>
+              <a:t>OO Unzulänglichkeiten: Noch mehr Frameworks, vielversprechende</a:t>
+            </a:r>
+            <a:r>
               <a:rPr lang="de-DE" baseline="0" dirty="0" smtClean="0"/>
-              <a:t>Eine Funktion wird zu einem Ausdruck gebunden und gibt diesem einen Wert.</a:t>
-            </a:r>
-          </a:p>
-          <a:p>
-            <a:endParaRPr lang="de-DE" baseline="0" dirty="0" smtClean="0"/>
-          </a:p>
-          <a:p>
-            <a:endParaRPr lang="en-US" dirty="0"/>
+              <a:t> Ansätze erweisen sich als äußerst schwierig wie Test-</a:t>
+            </a:r>
+            <a:r>
+              <a:rPr lang="de-DE" baseline="0" dirty="0" err="1" smtClean="0"/>
+              <a:t>Driven</a:t>
+            </a:r>
+            <a:r>
+              <a:rPr lang="de-DE" baseline="0" dirty="0" smtClean="0"/>
+              <a:t>-Development, Domain </a:t>
+            </a:r>
+            <a:r>
+              <a:rPr lang="de-DE" baseline="0" dirty="0" err="1" smtClean="0"/>
+              <a:t>Driven</a:t>
+            </a:r>
+            <a:r>
+              <a:rPr lang="de-DE" baseline="0" dirty="0" smtClean="0"/>
+              <a:t> Development</a:t>
+            </a:r>
+            <a:endParaRPr lang="de-DE" dirty="0" smtClean="0"/>
+          </a:p>
+          <a:p>
+            <a:endParaRPr lang="de-DE" dirty="0"/>
           </a:p>
         </p:txBody>
       </p:sp>
@@ -2868,7 +2998,7 @@
     </p:spTree>
     <p:extLst>
       <p:ext uri="{BB962C8B-B14F-4D97-AF65-F5344CB8AC3E}">
-        <p14:creationId xmlns:p14="http://schemas.microsoft.com/office/powerpoint/2010/main" val="1782259541"/>
+        <p14:creationId xmlns:p14="http://schemas.microsoft.com/office/powerpoint/2010/main" val="1139320735"/>
       </p:ext>
     </p:extLst>
   </p:cSld>
@@ -2923,52 +3053,275 @@
           <a:lstStyle/>
           <a:p>
             <a:r>
+              <a:rPr lang="en-US" sz="1200" kern="1200" dirty="0" smtClean="0">
+                <a:solidFill>
+                  <a:schemeClr val="tx1"/>
+                </a:solidFill>
+                <a:latin typeface="+mn-lt"/>
+                <a:ea typeface="+mn-ea"/>
+                <a:cs typeface="+mn-cs"/>
+              </a:rPr>
+              <a:t>type S = { Name : string; </a:t>
+            </a:r>
+            <a:r>
+              <a:rPr lang="en-US" sz="1200" kern="1200" dirty="0" err="1" smtClean="0">
+                <a:solidFill>
+                  <a:schemeClr val="tx1"/>
+                </a:solidFill>
+                <a:latin typeface="+mn-lt"/>
+                <a:ea typeface="+mn-ea"/>
+                <a:cs typeface="+mn-cs"/>
+              </a:rPr>
+              <a:t>Tun</a:t>
+            </a:r>
+            <a:r>
+              <a:rPr lang="en-US" sz="1200" kern="1200" dirty="0" smtClean="0">
+                <a:solidFill>
+                  <a:schemeClr val="tx1"/>
+                </a:solidFill>
+                <a:latin typeface="+mn-lt"/>
+                <a:ea typeface="+mn-ea"/>
+                <a:cs typeface="+mn-cs"/>
+              </a:rPr>
+              <a:t> : string -&gt; string; };;</a:t>
+            </a:r>
+          </a:p>
+          <a:p>
+            <a:r>
+              <a:rPr lang="de-DE" sz="1200" kern="1200" dirty="0" err="1" smtClean="0">
+                <a:solidFill>
+                  <a:schemeClr val="tx1"/>
+                </a:solidFill>
+                <a:latin typeface="+mn-lt"/>
+                <a:ea typeface="+mn-ea"/>
+                <a:cs typeface="+mn-cs"/>
+              </a:rPr>
+              <a:t>let</a:t>
+            </a:r>
+            <a:r>
+              <a:rPr lang="de-DE" sz="1200" kern="1200" baseline="0" dirty="0" smtClean="0">
+                <a:solidFill>
+                  <a:schemeClr val="tx1"/>
+                </a:solidFill>
+                <a:latin typeface="+mn-lt"/>
+                <a:ea typeface="+mn-ea"/>
+                <a:cs typeface="+mn-cs"/>
+              </a:rPr>
+              <a:t> f g x = g x;;</a:t>
+            </a:r>
+          </a:p>
+          <a:p>
+            <a:r>
+              <a:rPr lang="de-DE" sz="1200" kern="1200" baseline="0" dirty="0" err="1" smtClean="0">
+                <a:solidFill>
+                  <a:schemeClr val="tx1"/>
+                </a:solidFill>
+                <a:latin typeface="+mn-lt"/>
+                <a:ea typeface="+mn-ea"/>
+                <a:cs typeface="+mn-cs"/>
+              </a:rPr>
+              <a:t>let</a:t>
+            </a:r>
+            <a:r>
+              <a:rPr lang="de-DE" sz="1200" kern="1200" baseline="0" dirty="0" smtClean="0">
+                <a:solidFill>
+                  <a:schemeClr val="tx1"/>
+                </a:solidFill>
+                <a:latin typeface="+mn-lt"/>
+                <a:ea typeface="+mn-ea"/>
+                <a:cs typeface="+mn-cs"/>
+              </a:rPr>
+              <a:t> </a:t>
+            </a:r>
+            <a:r>
+              <a:rPr lang="de-DE" sz="1200" kern="1200" baseline="0" dirty="0" err="1" smtClean="0">
+                <a:solidFill>
+                  <a:schemeClr val="tx1"/>
+                </a:solidFill>
+                <a:latin typeface="+mn-lt"/>
+                <a:ea typeface="+mn-ea"/>
+                <a:cs typeface="+mn-cs"/>
+              </a:rPr>
+              <a:t>addFive</a:t>
+            </a:r>
+            <a:r>
+              <a:rPr lang="de-DE" sz="1200" kern="1200" baseline="0" dirty="0" smtClean="0">
+                <a:solidFill>
+                  <a:schemeClr val="tx1"/>
+                </a:solidFill>
+                <a:latin typeface="+mn-lt"/>
+                <a:ea typeface="+mn-ea"/>
+                <a:cs typeface="+mn-cs"/>
+              </a:rPr>
+              <a:t> x = (+) x 5;;</a:t>
+            </a:r>
+            <a:endParaRPr lang="de-DE" dirty="0" smtClean="0"/>
+          </a:p>
+          <a:p>
+            <a:endParaRPr lang="de-DE" dirty="0" smtClean="0"/>
+          </a:p>
+          <a:p>
+            <a:r>
               <a:rPr lang="de-DE" dirty="0" smtClean="0"/>
-              <a:t>Variable </a:t>
-            </a:r>
-            <a:r>
-              <a:rPr lang="de-DE" dirty="0" err="1" smtClean="0"/>
-              <a:t>result</a:t>
-            </a:r>
-            <a:r>
-              <a:rPr lang="de-DE" dirty="0" smtClean="0"/>
-              <a:t> muss außerhalb der Anweisung definiert werden,</a:t>
+              <a:t>Typ &lt;&gt; Klasse: Kein Verhalten,</a:t>
             </a:r>
             <a:r>
               <a:rPr lang="de-DE" baseline="0" dirty="0" smtClean="0"/>
-              <a:t> wird jedoch davon berührt: das ist eine Nebenwirkung, also Side </a:t>
+              <a:t> Reine Datenstruktur.  Aber Achtung: Ich kann in F# da ein bisschen schummeln, F# ist </a:t>
             </a:r>
             <a:r>
               <a:rPr lang="de-DE" baseline="0" dirty="0" err="1" smtClean="0"/>
-              <a:t>Effect</a:t>
+              <a:t>Functional</a:t>
             </a:r>
             <a:r>
               <a:rPr lang="de-DE" baseline="0" dirty="0" smtClean="0"/>
-              <a:t>.</a:t>
-            </a:r>
-          </a:p>
-          <a:p>
+              <a:t> </a:t>
+            </a:r>
             <a:r>
               <a:rPr lang="de-DE" baseline="0" dirty="0" err="1" smtClean="0"/>
-              <a:t>If</a:t>
+              <a:t>first</a:t>
             </a:r>
             <a:r>
               <a:rPr lang="de-DE" baseline="0" dirty="0" smtClean="0"/>
-              <a:t> ist eine Anweisung die NUR Nebenwirkungen erzeugt.  Ich kann IF nicht binden zu einem Bezeichner.</a:t>
-            </a:r>
+              <a:t> und erlaubt die Verwendung von OO Konstrukte.</a:t>
+            </a:r>
+          </a:p>
+          <a:p>
+            <a:endParaRPr lang="de-DE" baseline="0" dirty="0" smtClean="0"/>
           </a:p>
           <a:p>
             <a:r>
               <a:rPr lang="de-DE" baseline="0" dirty="0" smtClean="0"/>
-              <a:t>In einem Ausdruck gibt es keine Nebenwirkung da die Variable den Wert erhält sobald sie deklariert wird.  In einer FP Sprache wäre </a:t>
+              <a:t>type Name = { Vor : </a:t>
             </a:r>
             <a:r>
               <a:rPr lang="de-DE" baseline="0" dirty="0" err="1" smtClean="0"/>
-              <a:t>result</a:t>
+              <a:t>string</a:t>
             </a:r>
             <a:r>
               <a:rPr lang="de-DE" baseline="0" dirty="0" smtClean="0"/>
-              <a:t> auch noch </a:t>
+              <a:t>; Nach : </a:t>
+            </a:r>
+            <a:r>
+              <a:rPr lang="de-DE" baseline="0" dirty="0" err="1" smtClean="0"/>
+              <a:t>string</a:t>
+            </a:r>
+            <a:r>
+              <a:rPr lang="de-DE" baseline="0" dirty="0" smtClean="0"/>
+              <a:t>; }</a:t>
+            </a:r>
+          </a:p>
+          <a:p>
+            <a:r>
+              <a:rPr lang="de-DE" baseline="0" dirty="0" smtClean="0"/>
+              <a:t>type Name‘ = { Name : Name; Title : </a:t>
+            </a:r>
+            <a:r>
+              <a:rPr lang="de-DE" baseline="0" dirty="0" err="1" smtClean="0"/>
+              <a:t>string</a:t>
+            </a:r>
+            <a:r>
+              <a:rPr lang="de-DE" baseline="0" dirty="0" smtClean="0"/>
+              <a:t>; Zusatz : </a:t>
+            </a:r>
+            <a:r>
+              <a:rPr lang="de-DE" baseline="0" dirty="0" err="1" smtClean="0"/>
+              <a:t>string</a:t>
+            </a:r>
+            <a:r>
+              <a:rPr lang="de-DE" baseline="0" dirty="0" smtClean="0"/>
+              <a:t>; }</a:t>
+            </a:r>
+          </a:p>
+          <a:p>
+            <a:endParaRPr lang="de-DE" baseline="0" dirty="0" smtClean="0"/>
+          </a:p>
+          <a:p>
+            <a:r>
+              <a:rPr lang="de-DE" baseline="0" dirty="0" err="1" smtClean="0"/>
+              <a:t>Immutability</a:t>
+            </a:r>
+            <a:r>
+              <a:rPr lang="de-DE" baseline="0" dirty="0" smtClean="0"/>
+              <a:t>. Grundsätzlich: Es gibt keine Variablen (Slot im Speicher wo ich etwas pushen und poppen kann). Einmal zugewiesen, bleibt es da für immer! Zwei Vorteile:</a:t>
+            </a:r>
+          </a:p>
+          <a:p>
+            <a:pPr marL="171450" indent="-171450">
+              <a:buFontTx/>
+              <a:buChar char="-"/>
+            </a:pPr>
+            <a:r>
+              <a:rPr lang="de-DE" baseline="0" dirty="0" smtClean="0"/>
+              <a:t>Simple </a:t>
+            </a:r>
+            <a:r>
+              <a:rPr lang="de-DE" baseline="0" dirty="0" err="1" smtClean="0"/>
+              <a:t>to</a:t>
+            </a:r>
+            <a:r>
+              <a:rPr lang="de-DE" baseline="0" dirty="0" smtClean="0"/>
+              <a:t> </a:t>
+            </a:r>
+            <a:r>
+              <a:rPr lang="de-DE" baseline="0" dirty="0" err="1" smtClean="0"/>
+              <a:t>reason</a:t>
+            </a:r>
+            <a:r>
+              <a:rPr lang="de-DE" baseline="0" dirty="0" smtClean="0"/>
+              <a:t> </a:t>
+            </a:r>
+            <a:r>
+              <a:rPr lang="de-DE" baseline="0" dirty="0" err="1" smtClean="0"/>
+              <a:t>about</a:t>
+            </a:r>
+            <a:r>
+              <a:rPr lang="de-DE" baseline="0" dirty="0" smtClean="0"/>
+              <a:t>. Die Frage „Wann hat sich der Wert geändert?“ stellt sich gar nicht mehr, der Wert kann nur zugewiesen werden</a:t>
+            </a:r>
+          </a:p>
+          <a:p>
+            <a:pPr marL="171450" indent="-171450">
+              <a:buFontTx/>
+              <a:buChar char="-"/>
+            </a:pPr>
+            <a:r>
+              <a:rPr lang="de-DE" baseline="0" dirty="0" smtClean="0"/>
+              <a:t>Multi Core </a:t>
+            </a:r>
+            <a:r>
+              <a:rPr lang="de-DE" baseline="0" dirty="0" err="1" smtClean="0"/>
+              <a:t>ready</a:t>
+            </a:r>
+            <a:r>
+              <a:rPr lang="de-DE" baseline="0" dirty="0" smtClean="0"/>
+              <a:t>: Kein </a:t>
+            </a:r>
+            <a:r>
+              <a:rPr lang="de-DE" baseline="0" dirty="0" err="1" smtClean="0"/>
+              <a:t>Mutex</a:t>
+            </a:r>
+            <a:r>
+              <a:rPr lang="de-DE" baseline="0" dirty="0" smtClean="0"/>
+              <a:t>, kein Semaphore, kein Monitor!</a:t>
+            </a:r>
+          </a:p>
+          <a:p>
+            <a:pPr marL="171450" indent="-171450">
+              <a:buFontTx/>
+              <a:buChar char="-"/>
+            </a:pPr>
+            <a:r>
+              <a:rPr lang="de-DE" baseline="0" dirty="0" smtClean="0"/>
+              <a:t>Man muss State neudenken, besser neulernen, die FP Leute haben das schon gemacht. Und übrigens, </a:t>
+            </a:r>
+            <a:r>
+              <a:rPr lang="de-DE" baseline="0" dirty="0" err="1" smtClean="0"/>
+              <a:t>SmallTalk</a:t>
+            </a:r>
+            <a:r>
+              <a:rPr lang="de-DE" baseline="0" dirty="0" smtClean="0"/>
+              <a:t> war auch </a:t>
             </a:r>
             <a:r>
               <a:rPr lang="de-DE" baseline="0" dirty="0" err="1" smtClean="0"/>
@@ -2976,25 +3329,30 @@
             </a:r>
             <a:r>
               <a:rPr lang="de-DE" baseline="0" dirty="0" smtClean="0"/>
-              <a:t>.</a:t>
-            </a:r>
-          </a:p>
-          <a:p>
+              <a:t>, State war nur mittels eines Messaging Untersystem möglich.</a:t>
+            </a:r>
+          </a:p>
+          <a:p>
+            <a:pPr marL="171450" indent="-171450">
+              <a:buFontTx/>
+              <a:buChar char="-"/>
+            </a:pPr>
             <a:endParaRPr lang="de-DE" baseline="0" dirty="0" smtClean="0"/>
           </a:p>
           <a:p>
+            <a:pPr marL="0" indent="0">
+              <a:buFontTx/>
+              <a:buNone/>
+            </a:pPr>
             <a:r>
               <a:rPr lang="de-DE" baseline="0" dirty="0" smtClean="0"/>
-              <a:t>KEINE </a:t>
-            </a:r>
-            <a:r>
-              <a:rPr lang="de-DE" baseline="0" dirty="0" err="1" smtClean="0"/>
-              <a:t>NullReferenceExceptions</a:t>
-            </a:r>
-            <a:r>
-              <a:rPr lang="de-DE" baseline="0" dirty="0" smtClean="0"/>
-              <a:t> mehr, WIRKLICH, GAR keine mehr!!!!!!!!!!!!</a:t>
-            </a:r>
+              <a:t>Eine Funktion wird zu einem Ausdruck gebunden und gibt diesem einen Wert.</a:t>
+            </a:r>
+          </a:p>
+          <a:p>
+            <a:endParaRPr lang="de-DE" baseline="0" dirty="0" smtClean="0"/>
+          </a:p>
+          <a:p>
             <a:endParaRPr lang="en-US" dirty="0"/>
           </a:p>
         </p:txBody>
@@ -3025,7 +3383,7 @@
     </p:spTree>
     <p:extLst>
       <p:ext uri="{BB962C8B-B14F-4D97-AF65-F5344CB8AC3E}">
-        <p14:creationId xmlns:p14="http://schemas.microsoft.com/office/powerpoint/2010/main" val="1270029111"/>
+        <p14:creationId xmlns:p14="http://schemas.microsoft.com/office/powerpoint/2010/main" val="1782259541"/>
       </p:ext>
     </p:extLst>
   </p:cSld>
@@ -3080,275 +3438,52 @@
           <a:lstStyle/>
           <a:p>
             <a:r>
-              <a:rPr lang="en-US" sz="1200" kern="1200" dirty="0" smtClean="0">
-                <a:solidFill>
-                  <a:schemeClr val="tx1"/>
-                </a:solidFill>
-                <a:latin typeface="+mn-lt"/>
-                <a:ea typeface="+mn-ea"/>
-                <a:cs typeface="+mn-cs"/>
-              </a:rPr>
-              <a:t>type S = { Name : string; </a:t>
-            </a:r>
-            <a:r>
-              <a:rPr lang="en-US" sz="1200" kern="1200" dirty="0" err="1" smtClean="0">
-                <a:solidFill>
-                  <a:schemeClr val="tx1"/>
-                </a:solidFill>
-                <a:latin typeface="+mn-lt"/>
-                <a:ea typeface="+mn-ea"/>
-                <a:cs typeface="+mn-cs"/>
-              </a:rPr>
-              <a:t>Tun</a:t>
-            </a:r>
-            <a:r>
-              <a:rPr lang="en-US" sz="1200" kern="1200" dirty="0" smtClean="0">
-                <a:solidFill>
-                  <a:schemeClr val="tx1"/>
-                </a:solidFill>
-                <a:latin typeface="+mn-lt"/>
-                <a:ea typeface="+mn-ea"/>
-                <a:cs typeface="+mn-cs"/>
-              </a:rPr>
-              <a:t> : string -&gt; string; };;</a:t>
-            </a:r>
-          </a:p>
-          <a:p>
-            <a:r>
-              <a:rPr lang="de-DE" sz="1200" kern="1200" dirty="0" err="1" smtClean="0">
-                <a:solidFill>
-                  <a:schemeClr val="tx1"/>
-                </a:solidFill>
-                <a:latin typeface="+mn-lt"/>
-                <a:ea typeface="+mn-ea"/>
-                <a:cs typeface="+mn-cs"/>
-              </a:rPr>
-              <a:t>let</a:t>
-            </a:r>
-            <a:r>
-              <a:rPr lang="de-DE" sz="1200" kern="1200" baseline="0" dirty="0" smtClean="0">
-                <a:solidFill>
-                  <a:schemeClr val="tx1"/>
-                </a:solidFill>
-                <a:latin typeface="+mn-lt"/>
-                <a:ea typeface="+mn-ea"/>
-                <a:cs typeface="+mn-cs"/>
-              </a:rPr>
-              <a:t> f g x = g x;;</a:t>
-            </a:r>
-          </a:p>
-          <a:p>
-            <a:r>
-              <a:rPr lang="de-DE" sz="1200" kern="1200" baseline="0" dirty="0" err="1" smtClean="0">
-                <a:solidFill>
-                  <a:schemeClr val="tx1"/>
-                </a:solidFill>
-                <a:latin typeface="+mn-lt"/>
-                <a:ea typeface="+mn-ea"/>
-                <a:cs typeface="+mn-cs"/>
-              </a:rPr>
-              <a:t>let</a:t>
-            </a:r>
-            <a:r>
-              <a:rPr lang="de-DE" sz="1200" kern="1200" baseline="0" dirty="0" smtClean="0">
-                <a:solidFill>
-                  <a:schemeClr val="tx1"/>
-                </a:solidFill>
-                <a:latin typeface="+mn-lt"/>
-                <a:ea typeface="+mn-ea"/>
-                <a:cs typeface="+mn-cs"/>
-              </a:rPr>
-              <a:t> </a:t>
-            </a:r>
-            <a:r>
-              <a:rPr lang="de-DE" sz="1200" kern="1200" baseline="0" dirty="0" err="1" smtClean="0">
-                <a:solidFill>
-                  <a:schemeClr val="tx1"/>
-                </a:solidFill>
-                <a:latin typeface="+mn-lt"/>
-                <a:ea typeface="+mn-ea"/>
-                <a:cs typeface="+mn-cs"/>
-              </a:rPr>
-              <a:t>addFive</a:t>
-            </a:r>
-            <a:r>
-              <a:rPr lang="de-DE" sz="1200" kern="1200" baseline="0" dirty="0" smtClean="0">
-                <a:solidFill>
-                  <a:schemeClr val="tx1"/>
-                </a:solidFill>
-                <a:latin typeface="+mn-lt"/>
-                <a:ea typeface="+mn-ea"/>
-                <a:cs typeface="+mn-cs"/>
-              </a:rPr>
-              <a:t> x = (+) x 5;;</a:t>
-            </a:r>
-            <a:endParaRPr lang="de-DE" dirty="0" smtClean="0"/>
-          </a:p>
-          <a:p>
-            <a:endParaRPr lang="de-DE" dirty="0" smtClean="0"/>
-          </a:p>
-          <a:p>
-            <a:r>
               <a:rPr lang="de-DE" dirty="0" smtClean="0"/>
-              <a:t>Typ &lt;&gt; Klasse: Kein Verhalten,</a:t>
+              <a:t>Variable </a:t>
+            </a:r>
+            <a:r>
+              <a:rPr lang="de-DE" dirty="0" err="1" smtClean="0"/>
+              <a:t>result</a:t>
+            </a:r>
+            <a:r>
+              <a:rPr lang="de-DE" dirty="0" smtClean="0"/>
+              <a:t> muss außerhalb der Anweisung definiert werden,</a:t>
             </a:r>
             <a:r>
               <a:rPr lang="de-DE" baseline="0" dirty="0" smtClean="0"/>
-              <a:t> Reine Datenstruktur.  Aber Achtung: Ich kann in F# da ein bisschen schummeln, F# ist </a:t>
+              <a:t> wird jedoch davon berührt: das ist eine Nebenwirkung, also Side </a:t>
             </a:r>
             <a:r>
               <a:rPr lang="de-DE" baseline="0" dirty="0" err="1" smtClean="0"/>
-              <a:t>Functional</a:t>
+              <a:t>Effect</a:t>
             </a:r>
             <a:r>
               <a:rPr lang="de-DE" baseline="0" dirty="0" smtClean="0"/>
-              <a:t> </a:t>
-            </a:r>
+              <a:t>.</a:t>
+            </a:r>
+          </a:p>
+          <a:p>
             <a:r>
               <a:rPr lang="de-DE" baseline="0" dirty="0" err="1" smtClean="0"/>
-              <a:t>first</a:t>
+              <a:t>If</a:t>
             </a:r>
             <a:r>
               <a:rPr lang="de-DE" baseline="0" dirty="0" smtClean="0"/>
-              <a:t> und erlaubt die Verwendung von OO Konstrukte.</a:t>
-            </a:r>
-          </a:p>
-          <a:p>
-            <a:endParaRPr lang="de-DE" baseline="0" dirty="0" smtClean="0"/>
+              <a:t> ist eine Anweisung die NUR Nebenwirkungen erzeugt.  Ich kann IF nicht binden zu einem Bezeichner.</a:t>
+            </a:r>
           </a:p>
           <a:p>
             <a:r>
               <a:rPr lang="de-DE" baseline="0" dirty="0" smtClean="0"/>
-              <a:t>type Name = { Vor : </a:t>
+              <a:t>In einem Ausdruck gibt es keine Nebenwirkung da die Variable den Wert erhält sobald sie deklariert wird.  In einer FP Sprache wäre </a:t>
             </a:r>
             <a:r>
               <a:rPr lang="de-DE" baseline="0" dirty="0" err="1" smtClean="0"/>
-              <a:t>string</a:t>
+              <a:t>result</a:t>
             </a:r>
             <a:r>
               <a:rPr lang="de-DE" baseline="0" dirty="0" smtClean="0"/>
-              <a:t>; Nach : </a:t>
-            </a:r>
-            <a:r>
-              <a:rPr lang="de-DE" baseline="0" dirty="0" err="1" smtClean="0"/>
-              <a:t>string</a:t>
-            </a:r>
-            <a:r>
-              <a:rPr lang="de-DE" baseline="0" dirty="0" smtClean="0"/>
-              <a:t>; }</a:t>
-            </a:r>
-          </a:p>
-          <a:p>
-            <a:r>
-              <a:rPr lang="de-DE" baseline="0" dirty="0" smtClean="0"/>
-              <a:t>type Name‘ = { Name : Name; Title : </a:t>
-            </a:r>
-            <a:r>
-              <a:rPr lang="de-DE" baseline="0" dirty="0" err="1" smtClean="0"/>
-              <a:t>string</a:t>
-            </a:r>
-            <a:r>
-              <a:rPr lang="de-DE" baseline="0" dirty="0" smtClean="0"/>
-              <a:t>; Zusatz : </a:t>
-            </a:r>
-            <a:r>
-              <a:rPr lang="de-DE" baseline="0" dirty="0" err="1" smtClean="0"/>
-              <a:t>string</a:t>
-            </a:r>
-            <a:r>
-              <a:rPr lang="de-DE" baseline="0" dirty="0" smtClean="0"/>
-              <a:t>; }</a:t>
-            </a:r>
-          </a:p>
-          <a:p>
-            <a:endParaRPr lang="de-DE" baseline="0" dirty="0" smtClean="0"/>
-          </a:p>
-          <a:p>
-            <a:r>
-              <a:rPr lang="de-DE" baseline="0" dirty="0" err="1" smtClean="0"/>
-              <a:t>Immutability</a:t>
-            </a:r>
-            <a:r>
-              <a:rPr lang="de-DE" baseline="0" dirty="0" smtClean="0"/>
-              <a:t>. Grundsätzlich: Es gibt keine Variablen (Slot im Speicher wo ich etwas pushen und poppen kann). Einmal zugewiesen, bleibt es da für immer! Zwei Vorteile:</a:t>
-            </a:r>
-          </a:p>
-          <a:p>
-            <a:pPr marL="171450" indent="-171450">
-              <a:buFontTx/>
-              <a:buChar char="-"/>
-            </a:pPr>
-            <a:r>
-              <a:rPr lang="de-DE" baseline="0" dirty="0" smtClean="0"/>
-              <a:t>Simple </a:t>
-            </a:r>
-            <a:r>
-              <a:rPr lang="de-DE" baseline="0" dirty="0" err="1" smtClean="0"/>
-              <a:t>to</a:t>
-            </a:r>
-            <a:r>
-              <a:rPr lang="de-DE" baseline="0" dirty="0" smtClean="0"/>
-              <a:t> </a:t>
-            </a:r>
-            <a:r>
-              <a:rPr lang="de-DE" baseline="0" dirty="0" err="1" smtClean="0"/>
-              <a:t>reason</a:t>
-            </a:r>
-            <a:r>
-              <a:rPr lang="de-DE" baseline="0" dirty="0" smtClean="0"/>
-              <a:t> </a:t>
-            </a:r>
-            <a:r>
-              <a:rPr lang="de-DE" baseline="0" dirty="0" err="1" smtClean="0"/>
-              <a:t>about</a:t>
-            </a:r>
-            <a:r>
-              <a:rPr lang="de-DE" baseline="0" dirty="0" smtClean="0"/>
-              <a:t>. Die Frage „Wann hat sich der Wert geändert?“ stellt sich gar nicht mehr, der Wert kann nur zugewiesen werden</a:t>
-            </a:r>
-          </a:p>
-          <a:p>
-            <a:pPr marL="171450" indent="-171450">
-              <a:buFontTx/>
-              <a:buChar char="-"/>
-            </a:pPr>
-            <a:r>
-              <a:rPr lang="de-DE" baseline="0" dirty="0" smtClean="0"/>
-              <a:t>Multi Core </a:t>
-            </a:r>
-            <a:r>
-              <a:rPr lang="de-DE" baseline="0" dirty="0" err="1" smtClean="0"/>
-              <a:t>ready</a:t>
-            </a:r>
-            <a:r>
-              <a:rPr lang="de-DE" baseline="0" dirty="0" smtClean="0"/>
-              <a:t>: Kein </a:t>
-            </a:r>
-            <a:r>
-              <a:rPr lang="de-DE" baseline="0" dirty="0" err="1" smtClean="0"/>
-              <a:t>Mutex</a:t>
-            </a:r>
-            <a:r>
-              <a:rPr lang="de-DE" baseline="0" dirty="0" smtClean="0"/>
-              <a:t>, kein Semaphore, kein Monitor!</a:t>
-            </a:r>
-          </a:p>
-          <a:p>
-            <a:pPr marL="171450" indent="-171450">
-              <a:buFontTx/>
-              <a:buChar char="-"/>
-            </a:pPr>
-            <a:r>
-              <a:rPr lang="de-DE" baseline="0" dirty="0" smtClean="0"/>
-              <a:t>Man muss State neudenken, besser neulernen, die FP Leute haben das schon gemacht. Und übrigens, </a:t>
-            </a:r>
-            <a:r>
-              <a:rPr lang="de-DE" baseline="0" dirty="0" err="1" smtClean="0"/>
-              <a:t>SmallTalk</a:t>
-            </a:r>
-            <a:r>
-              <a:rPr lang="de-DE" baseline="0" dirty="0" smtClean="0"/>
-              <a:t> war auch </a:t>
+              <a:t> auch noch </a:t>
             </a:r>
             <a:r>
               <a:rPr lang="de-DE" baseline="0" dirty="0" err="1" smtClean="0"/>
@@ -3356,13 +3491,25 @@
             </a:r>
             <a:r>
               <a:rPr lang="de-DE" baseline="0" dirty="0" smtClean="0"/>
-              <a:t>, State war nur mittels eines Messaging Untersystem möglich.</a:t>
+              <a:t>.</a:t>
             </a:r>
           </a:p>
           <a:p>
             <a:endParaRPr lang="de-DE" baseline="0" dirty="0" smtClean="0"/>
           </a:p>
           <a:p>
+            <a:r>
+              <a:rPr lang="de-DE" baseline="0" dirty="0" smtClean="0"/>
+              <a:t>KEINE </a:t>
+            </a:r>
+            <a:r>
+              <a:rPr lang="de-DE" baseline="0" dirty="0" err="1" smtClean="0"/>
+              <a:t>NullReferenceExceptions</a:t>
+            </a:r>
+            <a:r>
+              <a:rPr lang="de-DE" baseline="0" dirty="0" smtClean="0"/>
+              <a:t> mehr, WIRKLICH, GAR keine mehr!!!!!!!!!!!!</a:t>
+            </a:r>
             <a:endParaRPr lang="en-US" dirty="0"/>
           </a:p>
         </p:txBody>
@@ -3393,7 +3540,7 @@
     </p:spTree>
     <p:extLst>
       <p:ext uri="{BB962C8B-B14F-4D97-AF65-F5344CB8AC3E}">
-        <p14:creationId xmlns:p14="http://schemas.microsoft.com/office/powerpoint/2010/main" val="1782259541"/>
+        <p14:creationId xmlns:p14="http://schemas.microsoft.com/office/powerpoint/2010/main" val="1270029111"/>
       </p:ext>
     </p:extLst>
   </p:cSld>
@@ -3448,236 +3595,6 @@
           <a:lstStyle/>
           <a:p>
             <a:r>
-              <a:rPr lang="de-DE" dirty="0" smtClean="0"/>
-              <a:t>Typ </a:t>
-            </a:r>
-            <a:r>
-              <a:rPr lang="de-DE" dirty="0" smtClean="0"/>
-              <a:t>&lt;&gt; Klasse: Kein Verhalten,</a:t>
-            </a:r>
-            <a:r>
-              <a:rPr lang="de-DE" baseline="0" dirty="0" smtClean="0"/>
-              <a:t> Reine Datenstruktur.  Aber Achtung: Ich kann in F# da ein bisschen schummeln, F# ist </a:t>
-            </a:r>
-            <a:r>
-              <a:rPr lang="de-DE" baseline="0" dirty="0" err="1" smtClean="0"/>
-              <a:t>Functional</a:t>
-            </a:r>
-            <a:r>
-              <a:rPr lang="de-DE" baseline="0" dirty="0" smtClean="0"/>
-              <a:t> </a:t>
-            </a:r>
-            <a:r>
-              <a:rPr lang="de-DE" baseline="0" dirty="0" err="1" smtClean="0"/>
-              <a:t>first</a:t>
-            </a:r>
-            <a:r>
-              <a:rPr lang="de-DE" baseline="0" dirty="0" smtClean="0"/>
-              <a:t> und erlaubt die Verwendung von OO Konstrukte.</a:t>
-            </a:r>
-          </a:p>
-          <a:p>
-            <a:endParaRPr lang="de-DE" baseline="0" dirty="0" smtClean="0"/>
-          </a:p>
-          <a:p>
-            <a:r>
-              <a:rPr lang="de-DE" baseline="0" dirty="0" smtClean="0"/>
-              <a:t>type Name = { Vor : </a:t>
-            </a:r>
-            <a:r>
-              <a:rPr lang="de-DE" baseline="0" dirty="0" err="1" smtClean="0"/>
-              <a:t>string</a:t>
-            </a:r>
-            <a:r>
-              <a:rPr lang="de-DE" baseline="0" dirty="0" smtClean="0"/>
-              <a:t>; Nach : </a:t>
-            </a:r>
-            <a:r>
-              <a:rPr lang="de-DE" baseline="0" dirty="0" err="1" smtClean="0"/>
-              <a:t>string</a:t>
-            </a:r>
-            <a:r>
-              <a:rPr lang="de-DE" baseline="0" dirty="0" smtClean="0"/>
-              <a:t>; }</a:t>
-            </a:r>
-          </a:p>
-          <a:p>
-            <a:r>
-              <a:rPr lang="de-DE" baseline="0" dirty="0" smtClean="0"/>
-              <a:t>type Name‘ = { Name : Name; Title : </a:t>
-            </a:r>
-            <a:r>
-              <a:rPr lang="de-DE" baseline="0" dirty="0" err="1" smtClean="0"/>
-              <a:t>string</a:t>
-            </a:r>
-            <a:r>
-              <a:rPr lang="de-DE" baseline="0" dirty="0" smtClean="0"/>
-              <a:t>; Zusatz : </a:t>
-            </a:r>
-            <a:r>
-              <a:rPr lang="de-DE" baseline="0" dirty="0" err="1" smtClean="0"/>
-              <a:t>string</a:t>
-            </a:r>
-            <a:r>
-              <a:rPr lang="de-DE" baseline="0" dirty="0" smtClean="0"/>
-              <a:t>; }</a:t>
-            </a:r>
-          </a:p>
-          <a:p>
-            <a:endParaRPr lang="de-DE" baseline="0" dirty="0" smtClean="0"/>
-          </a:p>
-          <a:p>
-            <a:r>
-              <a:rPr lang="de-DE" baseline="0" dirty="0" err="1" smtClean="0"/>
-              <a:t>Immutability</a:t>
-            </a:r>
-            <a:r>
-              <a:rPr lang="de-DE" baseline="0" dirty="0" smtClean="0"/>
-              <a:t>. Grundsätzlich: Es gibt keine Variablen (Slot im Speicher wo ich etwas pushen und poppen kann). Einmal zugewiesen, bleibt es da für immer! Zwei Vorteile:</a:t>
-            </a:r>
-          </a:p>
-          <a:p>
-            <a:pPr marL="171450" indent="-171450">
-              <a:buFontTx/>
-              <a:buChar char="-"/>
-            </a:pPr>
-            <a:r>
-              <a:rPr lang="de-DE" baseline="0" dirty="0" smtClean="0"/>
-              <a:t>Simple </a:t>
-            </a:r>
-            <a:r>
-              <a:rPr lang="de-DE" baseline="0" dirty="0" err="1" smtClean="0"/>
-              <a:t>to</a:t>
-            </a:r>
-            <a:r>
-              <a:rPr lang="de-DE" baseline="0" dirty="0" smtClean="0"/>
-              <a:t> </a:t>
-            </a:r>
-            <a:r>
-              <a:rPr lang="de-DE" baseline="0" dirty="0" err="1" smtClean="0"/>
-              <a:t>reason</a:t>
-            </a:r>
-            <a:r>
-              <a:rPr lang="de-DE" baseline="0" dirty="0" smtClean="0"/>
-              <a:t> </a:t>
-            </a:r>
-            <a:r>
-              <a:rPr lang="de-DE" baseline="0" dirty="0" err="1" smtClean="0"/>
-              <a:t>about</a:t>
-            </a:r>
-            <a:r>
-              <a:rPr lang="de-DE" baseline="0" dirty="0" smtClean="0"/>
-              <a:t>. Die Frage „Wann hat sich der Wert geändert?“ stellt sich gar nicht mehr, der Wert kann nur zugewiesen werden</a:t>
-            </a:r>
-          </a:p>
-          <a:p>
-            <a:pPr marL="171450" indent="-171450">
-              <a:buFontTx/>
-              <a:buChar char="-"/>
-            </a:pPr>
-            <a:r>
-              <a:rPr lang="de-DE" baseline="0" dirty="0" smtClean="0"/>
-              <a:t>Multi Core </a:t>
-            </a:r>
-            <a:r>
-              <a:rPr lang="de-DE" baseline="0" dirty="0" err="1" smtClean="0"/>
-              <a:t>ready</a:t>
-            </a:r>
-            <a:r>
-              <a:rPr lang="de-DE" baseline="0" dirty="0" smtClean="0"/>
-              <a:t>: Kein </a:t>
-            </a:r>
-            <a:r>
-              <a:rPr lang="de-DE" baseline="0" dirty="0" err="1" smtClean="0"/>
-              <a:t>Mutex</a:t>
-            </a:r>
-            <a:r>
-              <a:rPr lang="de-DE" baseline="0" dirty="0" smtClean="0"/>
-              <a:t>, kein Semaphore, kein Monitor!</a:t>
-            </a:r>
-          </a:p>
-          <a:p>
-            <a:pPr marL="171450" indent="-171450">
-              <a:buFontTx/>
-              <a:buChar char="-"/>
-            </a:pPr>
-            <a:r>
-              <a:rPr lang="de-DE" baseline="0" dirty="0" smtClean="0"/>
-              <a:t>Man muss State neudenken, besser neulernen, die FP Leute haben das schon gemacht. Und übrigens, </a:t>
-            </a:r>
-            <a:r>
-              <a:rPr lang="de-DE" baseline="0" dirty="0" err="1" smtClean="0"/>
-              <a:t>SmallTalk</a:t>
-            </a:r>
-            <a:r>
-              <a:rPr lang="de-DE" baseline="0" dirty="0" smtClean="0"/>
-              <a:t> war auch </a:t>
-            </a:r>
-            <a:r>
-              <a:rPr lang="de-DE" baseline="0" dirty="0" err="1" smtClean="0"/>
-              <a:t>immutable</a:t>
-            </a:r>
-            <a:r>
-              <a:rPr lang="de-DE" baseline="0" dirty="0" smtClean="0"/>
-              <a:t>, State war nur mittels eines Messaging Untersystem möglich.</a:t>
-            </a:r>
-          </a:p>
-          <a:p>
-            <a:pPr marL="171450" indent="-171450">
-              <a:buFontTx/>
-              <a:buChar char="-"/>
-            </a:pPr>
-            <a:endParaRPr lang="de-DE" baseline="0" dirty="0" smtClean="0"/>
-          </a:p>
-          <a:p>
-            <a:pPr marL="0" marR="0" indent="0" algn="l" defTabSz="914400" rtl="0" eaLnBrk="1" fontAlgn="auto" latinLnBrk="0" hangingPunct="1">
-              <a:lnSpc>
-                <a:spcPct val="100000"/>
-              </a:lnSpc>
-              <a:spcBef>
-                <a:spcPts val="0"/>
-              </a:spcBef>
-              <a:spcAft>
-                <a:spcPts val="0"/>
-              </a:spcAft>
-              <a:buClrTx/>
-              <a:buSzTx/>
-              <a:buFontTx/>
-              <a:buNone/>
-              <a:tabLst/>
-              <a:defRPr/>
-            </a:pPr>
-            <a:r>
-              <a:rPr lang="de-DE" dirty="0" smtClean="0"/>
-              <a:t>Eventuell</a:t>
-            </a:r>
-            <a:r>
-              <a:rPr lang="de-DE" baseline="0" dirty="0" smtClean="0"/>
-              <a:t> noch zusammenfassen – was sind die Vorteile? Nicht unbedingt hier, sondern als </a:t>
-            </a:r>
-            <a:r>
-              <a:rPr lang="de-DE" baseline="0" dirty="0" err="1" smtClean="0"/>
-              <a:t>Zusammenfasung</a:t>
-            </a:r>
-            <a:r>
-              <a:rPr lang="de-DE" baseline="0" dirty="0" smtClean="0"/>
-              <a:t> am Ende</a:t>
-            </a:r>
-            <a:r>
-              <a:rPr lang="de-DE" baseline="0" dirty="0" smtClean="0"/>
-              <a:t>? FEHLT</a:t>
-            </a:r>
-            <a:endParaRPr lang="de-DE" dirty="0" smtClean="0"/>
-          </a:p>
-          <a:p>
-            <a:pPr marL="0" indent="0">
-              <a:buFontTx/>
-              <a:buNone/>
-            </a:pPr>
-            <a:endParaRPr lang="de-DE" baseline="0" dirty="0" smtClean="0"/>
-          </a:p>
-          <a:p>
-            <a:r>
               <a:rPr lang="en-US" sz="1200" kern="1200" dirty="0" smtClean="0">
                 <a:solidFill>
                   <a:schemeClr val="tx1"/>
@@ -3783,11 +3700,179 @@
             <a:endParaRPr lang="de-DE" dirty="0" smtClean="0"/>
           </a:p>
           <a:p>
-            <a:pPr marL="0" indent="0">
+            <a:endParaRPr lang="de-DE" dirty="0" smtClean="0"/>
+          </a:p>
+          <a:p>
+            <a:r>
+              <a:rPr lang="de-DE" dirty="0" smtClean="0"/>
+              <a:t>Typ &lt;&gt; Klasse: Kein Verhalten,</a:t>
+            </a:r>
+            <a:r>
+              <a:rPr lang="de-DE" baseline="0" dirty="0" smtClean="0"/>
+              <a:t> Reine Datenstruktur.  Aber Achtung: Ich kann in F# da ein bisschen schummeln, F# ist </a:t>
+            </a:r>
+            <a:r>
+              <a:rPr lang="de-DE" baseline="0" dirty="0" err="1" smtClean="0"/>
+              <a:t>Functional</a:t>
+            </a:r>
+            <a:r>
+              <a:rPr lang="de-DE" baseline="0" dirty="0" smtClean="0"/>
+              <a:t> </a:t>
+            </a:r>
+            <a:r>
+              <a:rPr lang="de-DE" baseline="0" dirty="0" err="1" smtClean="0"/>
+              <a:t>first</a:t>
+            </a:r>
+            <a:r>
+              <a:rPr lang="de-DE" baseline="0" dirty="0" smtClean="0"/>
+              <a:t> und erlaubt die Verwendung von OO Konstrukte.</a:t>
+            </a:r>
+          </a:p>
+          <a:p>
+            <a:endParaRPr lang="de-DE" baseline="0" dirty="0" smtClean="0"/>
+          </a:p>
+          <a:p>
+            <a:r>
+              <a:rPr lang="de-DE" baseline="0" dirty="0" smtClean="0"/>
+              <a:t>type Name = { Vor : </a:t>
+            </a:r>
+            <a:r>
+              <a:rPr lang="de-DE" baseline="0" dirty="0" err="1" smtClean="0"/>
+              <a:t>string</a:t>
+            </a:r>
+            <a:r>
+              <a:rPr lang="de-DE" baseline="0" dirty="0" smtClean="0"/>
+              <a:t>; Nach : </a:t>
+            </a:r>
+            <a:r>
+              <a:rPr lang="de-DE" baseline="0" dirty="0" err="1" smtClean="0"/>
+              <a:t>string</a:t>
+            </a:r>
+            <a:r>
+              <a:rPr lang="de-DE" baseline="0" dirty="0" smtClean="0"/>
+              <a:t>; }</a:t>
+            </a:r>
+          </a:p>
+          <a:p>
+            <a:r>
+              <a:rPr lang="de-DE" baseline="0" dirty="0" smtClean="0"/>
+              <a:t>type Name‘ = { Name : Name; Title : </a:t>
+            </a:r>
+            <a:r>
+              <a:rPr lang="de-DE" baseline="0" dirty="0" err="1" smtClean="0"/>
+              <a:t>string</a:t>
+            </a:r>
+            <a:r>
+              <a:rPr lang="de-DE" baseline="0" dirty="0" smtClean="0"/>
+              <a:t>; Zusatz : </a:t>
+            </a:r>
+            <a:r>
+              <a:rPr lang="de-DE" baseline="0" dirty="0" err="1" smtClean="0"/>
+              <a:t>string</a:t>
+            </a:r>
+            <a:r>
+              <a:rPr lang="de-DE" baseline="0" dirty="0" smtClean="0"/>
+              <a:t>; }</a:t>
+            </a:r>
+          </a:p>
+          <a:p>
+            <a:endParaRPr lang="de-DE" baseline="0" dirty="0" smtClean="0"/>
+          </a:p>
+          <a:p>
+            <a:r>
+              <a:rPr lang="de-DE" baseline="0" dirty="0" err="1" smtClean="0"/>
+              <a:t>Immutability</a:t>
+            </a:r>
+            <a:r>
+              <a:rPr lang="de-DE" baseline="0" dirty="0" smtClean="0"/>
+              <a:t>. Grundsätzlich: Es gibt keine Variablen (Slot im Speicher wo ich etwas pushen und poppen kann). Einmal zugewiesen, bleibt es da für immer! Zwei Vorteile:</a:t>
+            </a:r>
+          </a:p>
+          <a:p>
+            <a:pPr marL="171450" indent="-171450">
               <a:buFontTx/>
-              <a:buNone/>
+              <a:buChar char="-"/>
             </a:pPr>
-            <a:endParaRPr lang="de-DE" baseline="0" dirty="0" smtClean="0"/>
+            <a:r>
+              <a:rPr lang="de-DE" baseline="0" dirty="0" smtClean="0"/>
+              <a:t>Simple </a:t>
+            </a:r>
+            <a:r>
+              <a:rPr lang="de-DE" baseline="0" dirty="0" err="1" smtClean="0"/>
+              <a:t>to</a:t>
+            </a:r>
+            <a:r>
+              <a:rPr lang="de-DE" baseline="0" dirty="0" smtClean="0"/>
+              <a:t> </a:t>
+            </a:r>
+            <a:r>
+              <a:rPr lang="de-DE" baseline="0" dirty="0" err="1" smtClean="0"/>
+              <a:t>reason</a:t>
+            </a:r>
+            <a:r>
+              <a:rPr lang="de-DE" baseline="0" dirty="0" smtClean="0"/>
+              <a:t> </a:t>
+            </a:r>
+            <a:r>
+              <a:rPr lang="de-DE" baseline="0" dirty="0" err="1" smtClean="0"/>
+              <a:t>about</a:t>
+            </a:r>
+            <a:r>
+              <a:rPr lang="de-DE" baseline="0" dirty="0" smtClean="0"/>
+              <a:t>. Die Frage „Wann hat sich der Wert geändert?“ stellt sich gar nicht mehr, der Wert kann nur zugewiesen werden</a:t>
+            </a:r>
+          </a:p>
+          <a:p>
+            <a:pPr marL="171450" indent="-171450">
+              <a:buFontTx/>
+              <a:buChar char="-"/>
+            </a:pPr>
+            <a:r>
+              <a:rPr lang="de-DE" baseline="0" dirty="0" smtClean="0"/>
+              <a:t>Multi Core </a:t>
+            </a:r>
+            <a:r>
+              <a:rPr lang="de-DE" baseline="0" dirty="0" err="1" smtClean="0"/>
+              <a:t>ready</a:t>
+            </a:r>
+            <a:r>
+              <a:rPr lang="de-DE" baseline="0" dirty="0" smtClean="0"/>
+              <a:t>: Kein </a:t>
+            </a:r>
+            <a:r>
+              <a:rPr lang="de-DE" baseline="0" dirty="0" err="1" smtClean="0"/>
+              <a:t>Mutex</a:t>
+            </a:r>
+            <a:r>
+              <a:rPr lang="de-DE" baseline="0" dirty="0" smtClean="0"/>
+              <a:t>, kein Semaphore, kein Monitor!</a:t>
+            </a:r>
+          </a:p>
+          <a:p>
+            <a:pPr marL="171450" indent="-171450">
+              <a:buFontTx/>
+              <a:buChar char="-"/>
+            </a:pPr>
+            <a:r>
+              <a:rPr lang="de-DE" baseline="0" dirty="0" smtClean="0"/>
+              <a:t>Man muss State neudenken, besser neulernen, die FP Leute haben das schon gemacht. Und übrigens, </a:t>
+            </a:r>
+            <a:r>
+              <a:rPr lang="de-DE" baseline="0" dirty="0" err="1" smtClean="0"/>
+              <a:t>SmallTalk</a:t>
+            </a:r>
+            <a:r>
+              <a:rPr lang="de-DE" baseline="0" dirty="0" smtClean="0"/>
+              <a:t> war auch </a:t>
+            </a:r>
+            <a:r>
+              <a:rPr lang="de-DE" baseline="0" dirty="0" err="1" smtClean="0"/>
+              <a:t>immutable</a:t>
+            </a:r>
+            <a:r>
+              <a:rPr lang="de-DE" baseline="0" dirty="0" smtClean="0"/>
+              <a:t>, State war nur mittels eines Messaging Untersystem möglich.</a:t>
+            </a:r>
           </a:p>
           <a:p>
             <a:endParaRPr lang="de-DE" baseline="0" dirty="0" smtClean="0"/>
@@ -4014,7 +4099,7 @@
           <a:p>
             <a:fld id="{28CA3B8B-C56F-4663-93D1-BECEDA7EAF67}" type="datetimeFigureOut">
               <a:rPr lang="en-US" smtClean="0"/>
-              <a:t>11/24/2015</a:t>
+              <a:t>11/25/2015</a:t>
             </a:fld>
             <a:endParaRPr lang="en-US"/>
           </a:p>
@@ -4184,7 +4269,7 @@
           <a:p>
             <a:fld id="{28CA3B8B-C56F-4663-93D1-BECEDA7EAF67}" type="datetimeFigureOut">
               <a:rPr lang="en-US" smtClean="0"/>
-              <a:t>11/24/2015</a:t>
+              <a:t>11/25/2015</a:t>
             </a:fld>
             <a:endParaRPr lang="en-US"/>
           </a:p>
@@ -4364,7 +4449,7 @@
           <a:p>
             <a:fld id="{28CA3B8B-C56F-4663-93D1-BECEDA7EAF67}" type="datetimeFigureOut">
               <a:rPr lang="en-US" smtClean="0"/>
-              <a:t>11/24/2015</a:t>
+              <a:t>11/25/2015</a:t>
             </a:fld>
             <a:endParaRPr lang="en-US"/>
           </a:p>
@@ -4534,7 +4619,7 @@
           <a:p>
             <a:fld id="{28CA3B8B-C56F-4663-93D1-BECEDA7EAF67}" type="datetimeFigureOut">
               <a:rPr lang="en-US" smtClean="0"/>
-              <a:t>11/24/2015</a:t>
+              <a:t>11/25/2015</a:t>
             </a:fld>
             <a:endParaRPr lang="en-US"/>
           </a:p>
@@ -4780,7 +4865,7 @@
           <a:p>
             <a:fld id="{28CA3B8B-C56F-4663-93D1-BECEDA7EAF67}" type="datetimeFigureOut">
               <a:rPr lang="en-US" smtClean="0"/>
-              <a:t>11/24/2015</a:t>
+              <a:t>11/25/2015</a:t>
             </a:fld>
             <a:endParaRPr lang="en-US"/>
           </a:p>
@@ -5068,7 +5153,7 @@
           <a:p>
             <a:fld id="{28CA3B8B-C56F-4663-93D1-BECEDA7EAF67}" type="datetimeFigureOut">
               <a:rPr lang="en-US" smtClean="0"/>
-              <a:t>11/24/2015</a:t>
+              <a:t>11/25/2015</a:t>
             </a:fld>
             <a:endParaRPr lang="en-US"/>
           </a:p>
@@ -5490,7 +5575,7 @@
           <a:p>
             <a:fld id="{28CA3B8B-C56F-4663-93D1-BECEDA7EAF67}" type="datetimeFigureOut">
               <a:rPr lang="en-US" smtClean="0"/>
-              <a:t>11/24/2015</a:t>
+              <a:t>11/25/2015</a:t>
             </a:fld>
             <a:endParaRPr lang="en-US"/>
           </a:p>
@@ -5608,7 +5693,7 @@
           <a:p>
             <a:fld id="{28CA3B8B-C56F-4663-93D1-BECEDA7EAF67}" type="datetimeFigureOut">
               <a:rPr lang="en-US" smtClean="0"/>
-              <a:t>11/24/2015</a:t>
+              <a:t>11/25/2015</a:t>
             </a:fld>
             <a:endParaRPr lang="en-US"/>
           </a:p>
@@ -5703,7 +5788,7 @@
           <a:p>
             <a:fld id="{28CA3B8B-C56F-4663-93D1-BECEDA7EAF67}" type="datetimeFigureOut">
               <a:rPr lang="en-US" smtClean="0"/>
-              <a:t>11/24/2015</a:t>
+              <a:t>11/25/2015</a:t>
             </a:fld>
             <a:endParaRPr lang="en-US"/>
           </a:p>
@@ -5980,7 +6065,7 @@
           <a:p>
             <a:fld id="{28CA3B8B-C56F-4663-93D1-BECEDA7EAF67}" type="datetimeFigureOut">
               <a:rPr lang="en-US" smtClean="0"/>
-              <a:t>11/24/2015</a:t>
+              <a:t>11/25/2015</a:t>
             </a:fld>
             <a:endParaRPr lang="en-US"/>
           </a:p>
@@ -6233,7 +6318,7 @@
           <a:p>
             <a:fld id="{28CA3B8B-C56F-4663-93D1-BECEDA7EAF67}" type="datetimeFigureOut">
               <a:rPr lang="en-US" smtClean="0"/>
-              <a:t>11/24/2015</a:t>
+              <a:t>11/25/2015</a:t>
             </a:fld>
             <a:endParaRPr lang="en-US"/>
           </a:p>
@@ -6446,7 +6531,7 @@
           <a:p>
             <a:fld id="{28CA3B8B-C56F-4663-93D1-BECEDA7EAF67}" type="datetimeFigureOut">
               <a:rPr lang="en-US" smtClean="0"/>
-              <a:t>11/24/2015</a:t>
+              <a:t>11/25/2015</a:t>
             </a:fld>
             <a:endParaRPr lang="en-US"/>
           </a:p>
@@ -7103,6 +7188,326 @@
         <p:spPr/>
         <p:txBody>
           <a:bodyPr>
+            <a:normAutofit/>
+          </a:bodyPr>
+          <a:lstStyle/>
+          <a:p>
+            <a:pPr marL="0" indent="0">
+              <a:buNone/>
+            </a:pPr>
+            <a:r>
+              <a:rPr lang="de-DE" dirty="0"/>
+              <a:t>Typ &lt;&gt; Klasse: Datenstruktur vs. </a:t>
+            </a:r>
+            <a:r>
+              <a:rPr lang="de-DE" dirty="0" smtClean="0"/>
+              <a:t>Verhalten</a:t>
+            </a:r>
+          </a:p>
+          <a:p>
+            <a:r>
+              <a:rPr lang="de-DE" dirty="0" smtClean="0"/>
+              <a:t>Datenstruktur beinhaltet nur Daten</a:t>
+            </a:r>
+          </a:p>
+          <a:p>
+            <a:r>
+              <a:rPr lang="de-DE" dirty="0" smtClean="0"/>
+              <a:t>Komposition</a:t>
+            </a:r>
+            <a:r>
+              <a:rPr lang="de-DE" dirty="0"/>
+              <a:t>: light-</a:t>
+            </a:r>
+            <a:r>
+              <a:rPr lang="de-DE" dirty="0" err="1"/>
+              <a:t>weight</a:t>
+            </a:r>
+            <a:r>
+              <a:rPr lang="de-DE" dirty="0"/>
+              <a:t> </a:t>
+            </a:r>
+            <a:r>
+              <a:rPr lang="de-DE" dirty="0" err="1"/>
+              <a:t>types</a:t>
+            </a:r>
+            <a:r>
+              <a:rPr lang="de-DE" dirty="0"/>
+              <a:t>, verbinden zu neuen </a:t>
+            </a:r>
+            <a:r>
+              <a:rPr lang="de-DE" dirty="0" err="1"/>
+              <a:t>composite</a:t>
+            </a:r>
+            <a:r>
+              <a:rPr lang="de-DE" dirty="0"/>
+              <a:t> </a:t>
+            </a:r>
+            <a:r>
+              <a:rPr lang="de-DE" dirty="0" err="1"/>
+              <a:t>types</a:t>
+            </a:r>
+            <a:r>
+              <a:rPr lang="de-DE" dirty="0"/>
+              <a:t>. Keine </a:t>
+            </a:r>
+            <a:r>
+              <a:rPr lang="de-DE" dirty="0" smtClean="0"/>
+              <a:t>Vererbung</a:t>
+            </a:r>
+            <a:endParaRPr lang="de-DE" dirty="0"/>
+          </a:p>
+          <a:p>
+            <a:pPr marL="0" indent="0">
+              <a:buNone/>
+            </a:pPr>
+            <a:endParaRPr lang="de-DE" dirty="0"/>
+          </a:p>
+        </p:txBody>
+      </p:sp>
+    </p:spTree>
+    <p:extLst>
+      <p:ext uri="{BB962C8B-B14F-4D97-AF65-F5344CB8AC3E}">
+        <p14:creationId xmlns:p14="http://schemas.microsoft.com/office/powerpoint/2010/main" val="304289206"/>
+      </p:ext>
+    </p:extLst>
+  </p:cSld>
+  <p:clrMapOvr>
+    <a:masterClrMapping/>
+  </p:clrMapOvr>
+  <p:timing>
+    <p:tnLst>
+      <p:par>
+        <p:cTn id="1" dur="indefinite" restart="never" nodeType="tmRoot">
+          <p:childTnLst>
+            <p:seq concurrent="1" nextAc="seek">
+              <p:cTn id="2" dur="indefinite" nodeType="mainSeq">
+                <p:childTnLst>
+                  <p:par>
+                    <p:cTn id="3" fill="hold">
+                      <p:stCondLst>
+                        <p:cond delay="indefinite"/>
+                      </p:stCondLst>
+                      <p:childTnLst>
+                        <p:par>
+                          <p:cTn id="4" fill="hold">
+                            <p:stCondLst>
+                              <p:cond delay="0"/>
+                            </p:stCondLst>
+                            <p:childTnLst>
+                              <p:par>
+                                <p:cTn id="5" presetID="1" presetClass="entr" presetSubtype="0" fill="hold" nodeType="clickEffect">
+                                  <p:stCondLst>
+                                    <p:cond delay="0"/>
+                                  </p:stCondLst>
+                                  <p:childTnLst>
+                                    <p:set>
+                                      <p:cBhvr>
+                                        <p:cTn id="6" dur="1" fill="hold">
+                                          <p:stCondLst>
+                                            <p:cond delay="0"/>
+                                          </p:stCondLst>
+                                        </p:cTn>
+                                        <p:tgtEl>
+                                          <p:spTgt spid="3">
+                                            <p:txEl>
+                                              <p:pRg st="0" end="0"/>
+                                            </p:txEl>
+                                          </p:spTgt>
+                                        </p:tgtEl>
+                                        <p:attrNameLst>
+                                          <p:attrName>style.visibility</p:attrName>
+                                        </p:attrNameLst>
+                                      </p:cBhvr>
+                                      <p:to>
+                                        <p:strVal val="visible"/>
+                                      </p:to>
+                                    </p:set>
+                                  </p:childTnLst>
+                                </p:cTn>
+                              </p:par>
+                            </p:childTnLst>
+                          </p:cTn>
+                        </p:par>
+                      </p:childTnLst>
+                    </p:cTn>
+                  </p:par>
+                  <p:par>
+                    <p:cTn id="7" fill="hold">
+                      <p:stCondLst>
+                        <p:cond delay="indefinite"/>
+                      </p:stCondLst>
+                      <p:childTnLst>
+                        <p:par>
+                          <p:cTn id="8" fill="hold">
+                            <p:stCondLst>
+                              <p:cond delay="0"/>
+                            </p:stCondLst>
+                            <p:childTnLst>
+                              <p:par>
+                                <p:cTn id="9" presetID="1" presetClass="entr" presetSubtype="0" fill="hold" nodeType="clickEffect">
+                                  <p:stCondLst>
+                                    <p:cond delay="0"/>
+                                  </p:stCondLst>
+                                  <p:childTnLst>
+                                    <p:set>
+                                      <p:cBhvr>
+                                        <p:cTn id="10" dur="1" fill="hold">
+                                          <p:stCondLst>
+                                            <p:cond delay="0"/>
+                                          </p:stCondLst>
+                                        </p:cTn>
+                                        <p:tgtEl>
+                                          <p:spTgt spid="3">
+                                            <p:txEl>
+                                              <p:pRg st="1" end="1"/>
+                                            </p:txEl>
+                                          </p:spTgt>
+                                        </p:tgtEl>
+                                        <p:attrNameLst>
+                                          <p:attrName>style.visibility</p:attrName>
+                                        </p:attrNameLst>
+                                      </p:cBhvr>
+                                      <p:to>
+                                        <p:strVal val="visible"/>
+                                      </p:to>
+                                    </p:set>
+                                  </p:childTnLst>
+                                </p:cTn>
+                              </p:par>
+                            </p:childTnLst>
+                          </p:cTn>
+                        </p:par>
+                      </p:childTnLst>
+                    </p:cTn>
+                  </p:par>
+                  <p:par>
+                    <p:cTn id="11" fill="hold">
+                      <p:stCondLst>
+                        <p:cond delay="indefinite"/>
+                      </p:stCondLst>
+                      <p:childTnLst>
+                        <p:par>
+                          <p:cTn id="12" fill="hold">
+                            <p:stCondLst>
+                              <p:cond delay="0"/>
+                            </p:stCondLst>
+                            <p:childTnLst>
+                              <p:par>
+                                <p:cTn id="13" presetID="1" presetClass="entr" presetSubtype="0" fill="hold" nodeType="clickEffect">
+                                  <p:stCondLst>
+                                    <p:cond delay="0"/>
+                                  </p:stCondLst>
+                                  <p:childTnLst>
+                                    <p:set>
+                                      <p:cBhvr>
+                                        <p:cTn id="14" dur="1" fill="hold">
+                                          <p:stCondLst>
+                                            <p:cond delay="0"/>
+                                          </p:stCondLst>
+                                        </p:cTn>
+                                        <p:tgtEl>
+                                          <p:spTgt spid="3">
+                                            <p:txEl>
+                                              <p:pRg st="2" end="2"/>
+                                            </p:txEl>
+                                          </p:spTgt>
+                                        </p:tgtEl>
+                                        <p:attrNameLst>
+                                          <p:attrName>style.visibility</p:attrName>
+                                        </p:attrNameLst>
+                                      </p:cBhvr>
+                                      <p:to>
+                                        <p:strVal val="visible"/>
+                                      </p:to>
+                                    </p:set>
+                                  </p:childTnLst>
+                                </p:cTn>
+                              </p:par>
+                            </p:childTnLst>
+                          </p:cTn>
+                        </p:par>
+                      </p:childTnLst>
+                    </p:cTn>
+                  </p:par>
+                </p:childTnLst>
+              </p:cTn>
+              <p:prevCondLst>
+                <p:cond evt="onPrev" delay="0">
+                  <p:tgtEl>
+                    <p:sldTgt/>
+                  </p:tgtEl>
+                </p:cond>
+              </p:prevCondLst>
+              <p:nextCondLst>
+                <p:cond evt="onNext" delay="0">
+                  <p:tgtEl>
+                    <p:sldTgt/>
+                  </p:tgtEl>
+                </p:cond>
+              </p:nextCondLst>
+            </p:seq>
+          </p:childTnLst>
+        </p:cTn>
+      </p:par>
+    </p:tnLst>
+  </p:timing>
+</p:sld>
+</file>
+
+<file path=ppt/slides/slide11.xml><?xml version="1.0" encoding="utf-8"?>
+<p:sld xmlns:a="http://schemas.openxmlformats.org/drawingml/2006/main" xmlns:r="http://schemas.openxmlformats.org/officeDocument/2006/relationships" xmlns:p="http://schemas.openxmlformats.org/presentationml/2006/main">
+  <p:cSld>
+    <p:spTree>
+      <p:nvGrpSpPr>
+        <p:cNvPr id="1" name=""/>
+        <p:cNvGrpSpPr/>
+        <p:nvPr/>
+      </p:nvGrpSpPr>
+      <p:grpSpPr>
+        <a:xfrm>
+          <a:off x="0" y="0"/>
+          <a:ext cx="0" cy="0"/>
+          <a:chOff x="0" y="0"/>
+          <a:chExt cx="0" cy="0"/>
+        </a:xfrm>
+      </p:grpSpPr>
+      <p:sp>
+        <p:nvSpPr>
+          <p:cNvPr id="2" name="Title 1"/>
+          <p:cNvSpPr>
+            <a:spLocks noGrp="1"/>
+          </p:cNvSpPr>
+          <p:nvPr>
+            <p:ph type="title"/>
+          </p:nvPr>
+        </p:nvSpPr>
+        <p:spPr/>
+        <p:txBody>
+          <a:bodyPr/>
+          <a:lstStyle/>
+          <a:p>
+            <a:pPr marL="0" indent="0"/>
+            <a:r>
+              <a:rPr lang="de-DE" dirty="0"/>
+              <a:t>Ideen aus der FP Welt</a:t>
+            </a:r>
+          </a:p>
+        </p:txBody>
+      </p:sp>
+      <p:sp>
+        <p:nvSpPr>
+          <p:cNvPr id="3" name="Content Placeholder 2"/>
+          <p:cNvSpPr>
+            <a:spLocks noGrp="1"/>
+          </p:cNvSpPr>
+          <p:nvPr>
+            <p:ph idx="1"/>
+          </p:nvPr>
+        </p:nvSpPr>
+        <p:spPr/>
+        <p:txBody>
+          <a:bodyPr>
             <a:normAutofit fontScale="92500" lnSpcReduction="20000"/>
           </a:bodyPr>
           <a:lstStyle/>
@@ -7484,7 +7889,7 @@
 </p:sld>
 </file>
 
-<file path=ppt/slides/slide11.xml><?xml version="1.0" encoding="utf-8"?>
+<file path=ppt/slides/slide12.xml><?xml version="1.0" encoding="utf-8"?>
 <p:sld xmlns:a="http://schemas.openxmlformats.org/drawingml/2006/main" xmlns:r="http://schemas.openxmlformats.org/officeDocument/2006/relationships" xmlns:p="http://schemas.openxmlformats.org/presentationml/2006/main">
   <p:cSld>
     <p:spTree>
@@ -7603,11 +8008,7 @@
             </a:r>
             <a:r>
               <a:rPr lang="de-DE" dirty="0" smtClean="0"/>
-              <a:t> als </a:t>
-            </a:r>
-            <a:r>
-              <a:rPr lang="de-DE" dirty="0" smtClean="0"/>
-              <a:t>Default, </a:t>
+              <a:t> als Default, </a:t>
             </a:r>
             <a:r>
               <a:rPr lang="de-DE" dirty="0" err="1" smtClean="0"/>
@@ -7625,7 +8026,6 @@
               <a:rPr lang="de-DE" dirty="0" smtClean="0"/>
               <a:t>“</a:t>
             </a:r>
-            <a:endParaRPr lang="de-DE" dirty="0" smtClean="0"/>
           </a:p>
           <a:p>
             <a:r>
@@ -8104,7 +8504,7 @@
 </p:sld>
 </file>
 
-<file path=ppt/slides/slide12.xml><?xml version="1.0" encoding="utf-8"?>
+<file path=ppt/slides/slide13.xml><?xml version="1.0" encoding="utf-8"?>
 <p:sld xmlns:a="http://schemas.openxmlformats.org/drawingml/2006/main" xmlns:r="http://schemas.openxmlformats.org/officeDocument/2006/relationships" xmlns:p="http://schemas.openxmlformats.org/presentationml/2006/main">
   <p:cSld>
     <p:spTree>
@@ -8533,7 +8933,7 @@
 </p:sld>
 </file>
 
-<file path=ppt/slides/slide13.xml><?xml version="1.0" encoding="utf-8"?>
+<file path=ppt/slides/slide14.xml><?xml version="1.0" encoding="utf-8"?>
 <p:sld xmlns:a="http://schemas.openxmlformats.org/drawingml/2006/main" xmlns:r="http://schemas.openxmlformats.org/officeDocument/2006/relationships" xmlns:p="http://schemas.openxmlformats.org/presentationml/2006/main">
   <p:cSld>
     <p:spTree>
@@ -9019,7 +9419,7 @@
 </p:sld>
 </file>
 
-<file path=ppt/slides/slide14.xml><?xml version="1.0" encoding="utf-8"?>
+<file path=ppt/slides/slide15.xml><?xml version="1.0" encoding="utf-8"?>
 <p:sld xmlns:a="http://schemas.openxmlformats.org/drawingml/2006/main" xmlns:r="http://schemas.openxmlformats.org/officeDocument/2006/relationships" xmlns:p="http://schemas.openxmlformats.org/presentationml/2006/main">
   <p:cSld>
     <p:spTree>
@@ -9227,7 +9627,7 @@
 </p:sld>
 </file>
 
-<file path=ppt/slides/slide15.xml><?xml version="1.0" encoding="utf-8"?>
+<file path=ppt/slides/slide16.xml><?xml version="1.0" encoding="utf-8"?>
 <p:sld xmlns:a="http://schemas.openxmlformats.org/drawingml/2006/main" xmlns:r="http://schemas.openxmlformats.org/officeDocument/2006/relationships" xmlns:p="http://schemas.openxmlformats.org/presentationml/2006/main">
   <p:cSld>
     <p:spTree>
@@ -9363,11 +9763,7 @@
           <a:p>
             <a:r>
               <a:rPr lang="de-DE" dirty="0" smtClean="0"/>
-              <a:t>Type </a:t>
-            </a:r>
-            <a:r>
-              <a:rPr lang="de-DE" dirty="0" smtClean="0"/>
-              <a:t>Provider</a:t>
+              <a:t>Type Provider</a:t>
             </a:r>
           </a:p>
           <a:p>
@@ -9872,7 +10268,7 @@
 </p:sld>
 </file>
 
-<file path=ppt/slides/slide16.xml><?xml version="1.0" encoding="utf-8"?>
+<file path=ppt/slides/slide17.xml><?xml version="1.0" encoding="utf-8"?>
 <p:sld xmlns:a="http://schemas.openxmlformats.org/drawingml/2006/main" xmlns:r="http://schemas.openxmlformats.org/officeDocument/2006/relationships" xmlns:p="http://schemas.openxmlformats.org/presentationml/2006/main">
   <p:cSld>
     <p:spTree>
@@ -10222,7 +10618,7 @@
 </p:sld>
 </file>
 
-<file path=ppt/slides/slide17.xml><?xml version="1.0" encoding="utf-8"?>
+<file path=ppt/slides/slide18.xml><?xml version="1.0" encoding="utf-8"?>
 <p:sld xmlns:a="http://schemas.openxmlformats.org/drawingml/2006/main" xmlns:r="http://schemas.openxmlformats.org/officeDocument/2006/relationships" xmlns:p="http://schemas.openxmlformats.org/presentationml/2006/main">
   <p:cSld>
     <p:spTree>
@@ -10404,7 +10800,6 @@
               <a:rPr lang="de-DE" sz="2400" dirty="0" smtClean="0"/>
               <a:t>Erlaubt die Extraktion von Werten aus F# Datentypen</a:t>
             </a:r>
-            <a:endParaRPr lang="de-DE" sz="2400" dirty="0" smtClean="0"/>
           </a:p>
         </p:txBody>
       </p:sp>
@@ -10438,7 +10833,6 @@
               <a:rPr lang="de-DE" sz="2400" dirty="0" smtClean="0"/>
               <a:t>(Vollständigkeit) Exhaustivness</a:t>
             </a:r>
-            <a:endParaRPr lang="de-DE" sz="2400" dirty="0" smtClean="0"/>
           </a:p>
         </p:txBody>
       </p:sp>
@@ -10470,11 +10864,7 @@
             </a:pPr>
             <a:r>
               <a:rPr lang="de-DE" sz="2400" dirty="0" smtClean="0"/>
-              <a:t>Ist </a:t>
-            </a:r>
-            <a:r>
-              <a:rPr lang="de-DE" sz="2400" dirty="0" smtClean="0"/>
-              <a:t>ein Ausdruck und keine Anweisung</a:t>
+              <a:t>Ist ein Ausdruck und keine Anweisung</a:t>
             </a:r>
           </a:p>
         </p:txBody>
@@ -10840,7 +11230,7 @@
 </p:sld>
 </file>
 
-<file path=ppt/slides/slide18.xml><?xml version="1.0" encoding="utf-8"?>
+<file path=ppt/slides/slide19.xml><?xml version="1.0" encoding="utf-8"?>
 <p:sld xmlns:a="http://schemas.openxmlformats.org/drawingml/2006/main" xmlns:r="http://schemas.openxmlformats.org/officeDocument/2006/relationships" xmlns:p="http://schemas.openxmlformats.org/presentationml/2006/main">
   <p:cSld>
     <p:spTree>
@@ -11209,207 +11599,6 @@
     <p:bldLst>
       <p:bldP spid="3" grpId="0" build="p"/>
     </p:bldLst>
-  </p:timing>
-</p:sld>
-</file>
-
-<file path=ppt/slides/slide19.xml><?xml version="1.0" encoding="utf-8"?>
-<p:sld xmlns:a="http://schemas.openxmlformats.org/drawingml/2006/main" xmlns:r="http://schemas.openxmlformats.org/officeDocument/2006/relationships" xmlns:p="http://schemas.openxmlformats.org/presentationml/2006/main">
-  <p:cSld>
-    <p:spTree>
-      <p:nvGrpSpPr>
-        <p:cNvPr id="1" name=""/>
-        <p:cNvGrpSpPr/>
-        <p:nvPr/>
-      </p:nvGrpSpPr>
-      <p:grpSpPr>
-        <a:xfrm>
-          <a:off x="0" y="0"/>
-          <a:ext cx="0" cy="0"/>
-          <a:chOff x="0" y="0"/>
-          <a:chExt cx="0" cy="0"/>
-        </a:xfrm>
-      </p:grpSpPr>
-      <p:sp>
-        <p:nvSpPr>
-          <p:cNvPr id="2" name="Title 1"/>
-          <p:cNvSpPr>
-            <a:spLocks noGrp="1"/>
-          </p:cNvSpPr>
-          <p:nvPr>
-            <p:ph type="title"/>
-          </p:nvPr>
-        </p:nvSpPr>
-        <p:spPr/>
-        <p:txBody>
-          <a:bodyPr>
-            <a:normAutofit/>
-          </a:bodyPr>
-          <a:lstStyle/>
-          <a:p>
-            <a:r>
-              <a:rPr lang="de-DE" dirty="0" err="1"/>
-              <a:t>Structural</a:t>
-            </a:r>
-            <a:r>
-              <a:rPr lang="de-DE" dirty="0"/>
-              <a:t> </a:t>
-            </a:r>
-            <a:r>
-              <a:rPr lang="de-DE" dirty="0" err="1"/>
-              <a:t>Equality</a:t>
-            </a:r>
-            <a:r>
-              <a:rPr lang="de-DE" dirty="0"/>
-              <a:t> / </a:t>
-            </a:r>
-            <a:r>
-              <a:rPr lang="de-DE" dirty="0" err="1" smtClean="0"/>
-              <a:t>Comparison</a:t>
-            </a:r>
-            <a:endParaRPr lang="en-US" dirty="0"/>
-          </a:p>
-        </p:txBody>
-      </p:sp>
-      <p:sp>
-        <p:nvSpPr>
-          <p:cNvPr id="3" name="Content Placeholder 2"/>
-          <p:cNvSpPr>
-            <a:spLocks noGrp="1"/>
-          </p:cNvSpPr>
-          <p:nvPr>
-            <p:ph idx="1"/>
-          </p:nvPr>
-        </p:nvSpPr>
-        <p:spPr>
-          <a:xfrm>
-            <a:off x="457200" y="1600201"/>
-            <a:ext cx="8229600" cy="2188840"/>
-          </a:xfrm>
-        </p:spPr>
-        <p:txBody>
-          <a:bodyPr/>
-          <a:lstStyle/>
-          <a:p>
-            <a:pPr marL="0" indent="0">
-              <a:buNone/>
-            </a:pPr>
-            <a:r>
-              <a:rPr lang="de-DE" dirty="0" smtClean="0"/>
-              <a:t>In F# wird </a:t>
-            </a:r>
-            <a:r>
-              <a:rPr lang="de-DE" dirty="0" err="1" smtClean="0"/>
-              <a:t>Structural</a:t>
-            </a:r>
-            <a:r>
-              <a:rPr lang="de-DE" dirty="0" smtClean="0"/>
-              <a:t> </a:t>
-            </a:r>
-            <a:r>
-              <a:rPr lang="de-DE" dirty="0" err="1" smtClean="0"/>
-              <a:t>Equality</a:t>
-            </a:r>
-            <a:r>
-              <a:rPr lang="de-DE" dirty="0" smtClean="0"/>
-              <a:t> vom Compiler für ADTs </a:t>
-            </a:r>
-            <a:r>
-              <a:rPr lang="de-DE" dirty="0" err="1" smtClean="0"/>
-              <a:t>imlementiert</a:t>
-            </a:r>
-            <a:r>
-              <a:rPr lang="de-DE" dirty="0" smtClean="0"/>
-              <a:t>.</a:t>
-            </a:r>
-          </a:p>
-          <a:p>
-            <a:pPr marL="0" indent="0">
-              <a:buNone/>
-            </a:pPr>
-            <a:r>
-              <a:rPr lang="de-DE" dirty="0" smtClean="0"/>
-              <a:t>Es werden keine Referenzen abgeglichen sondern Werte</a:t>
-            </a:r>
-          </a:p>
-          <a:p>
-            <a:pPr marL="0" indent="0">
-              <a:buNone/>
-            </a:pPr>
-            <a:endParaRPr lang="en-US" dirty="0"/>
-          </a:p>
-        </p:txBody>
-      </p:sp>
-      <p:pic>
-        <p:nvPicPr>
-          <p:cNvPr id="1026" name="Picture 2"/>
-          <p:cNvPicPr>
-            <a:picLocks noChangeAspect="1" noChangeArrowheads="1"/>
-          </p:cNvPicPr>
-          <p:nvPr/>
-        </p:nvPicPr>
-        <p:blipFill>
-          <a:blip r:embed="rId3">
-            <a:extLst>
-              <a:ext uri="{28A0092B-C50C-407E-A947-70E740481C1C}">
-                <a14:useLocalDpi xmlns:a14="http://schemas.microsoft.com/office/drawing/2010/main" val="0"/>
-              </a:ext>
-            </a:extLst>
-          </a:blip>
-          <a:srcRect/>
-          <a:stretch>
-            <a:fillRect/>
-          </a:stretch>
-        </p:blipFill>
-        <p:spPr bwMode="auto">
-          <a:xfrm>
-            <a:off x="611560" y="3826345"/>
-            <a:ext cx="6408712" cy="2733465"/>
-          </a:xfrm>
-          <a:prstGeom prst="rect">
-            <a:avLst/>
-          </a:prstGeom>
-          <a:noFill/>
-          <a:ln>
-            <a:noFill/>
-          </a:ln>
-          <a:extLst>
-            <a:ext uri="{909E8E84-426E-40DD-AFC4-6F175D3DCCD1}">
-              <a14:hiddenFill xmlns:a14="http://schemas.microsoft.com/office/drawing/2010/main">
-                <a:solidFill>
-                  <a:schemeClr val="accent1"/>
-                </a:solidFill>
-              </a14:hiddenFill>
-            </a:ext>
-            <a:ext uri="{91240B29-F687-4F45-9708-019B960494DF}">
-              <a14:hiddenLine xmlns:a14="http://schemas.microsoft.com/office/drawing/2010/main" w="9525">
-                <a:solidFill>
-                  <a:schemeClr val="tx1"/>
-                </a:solidFill>
-                <a:miter lim="800000"/>
-                <a:headEnd/>
-                <a:tailEnd/>
-              </a14:hiddenLine>
-            </a:ext>
-          </a:extLst>
-        </p:spPr>
-      </p:pic>
-    </p:spTree>
-    <p:extLst>
-      <p:ext uri="{BB962C8B-B14F-4D97-AF65-F5344CB8AC3E}">
-        <p14:creationId xmlns:p14="http://schemas.microsoft.com/office/powerpoint/2010/main" val="2070263003"/>
-      </p:ext>
-    </p:extLst>
-  </p:cSld>
-  <p:clrMapOvr>
-    <a:masterClrMapping/>
-  </p:clrMapOvr>
-  <p:timing>
-    <p:tnLst>
-      <p:par>
-        <p:cTn id="1" dur="indefinite" restart="never" nodeType="tmRoot"/>
-      </p:par>
-    </p:tnLst>
   </p:timing>
 </p:sld>
 </file>
@@ -11886,6 +12075,207 @@
             </p:seq>
           </p:childTnLst>
         </p:cTn>
+      </p:par>
+    </p:tnLst>
+  </p:timing>
+</p:sld>
+</file>
+
+<file path=ppt/slides/slide20.xml><?xml version="1.0" encoding="utf-8"?>
+<p:sld xmlns:a="http://schemas.openxmlformats.org/drawingml/2006/main" xmlns:r="http://schemas.openxmlformats.org/officeDocument/2006/relationships" xmlns:p="http://schemas.openxmlformats.org/presentationml/2006/main">
+  <p:cSld>
+    <p:spTree>
+      <p:nvGrpSpPr>
+        <p:cNvPr id="1" name=""/>
+        <p:cNvGrpSpPr/>
+        <p:nvPr/>
+      </p:nvGrpSpPr>
+      <p:grpSpPr>
+        <a:xfrm>
+          <a:off x="0" y="0"/>
+          <a:ext cx="0" cy="0"/>
+          <a:chOff x="0" y="0"/>
+          <a:chExt cx="0" cy="0"/>
+        </a:xfrm>
+      </p:grpSpPr>
+      <p:sp>
+        <p:nvSpPr>
+          <p:cNvPr id="2" name="Title 1"/>
+          <p:cNvSpPr>
+            <a:spLocks noGrp="1"/>
+          </p:cNvSpPr>
+          <p:nvPr>
+            <p:ph type="title"/>
+          </p:nvPr>
+        </p:nvSpPr>
+        <p:spPr/>
+        <p:txBody>
+          <a:bodyPr>
+            <a:normAutofit/>
+          </a:bodyPr>
+          <a:lstStyle/>
+          <a:p>
+            <a:r>
+              <a:rPr lang="de-DE" dirty="0" err="1"/>
+              <a:t>Structural</a:t>
+            </a:r>
+            <a:r>
+              <a:rPr lang="de-DE" dirty="0"/>
+              <a:t> </a:t>
+            </a:r>
+            <a:r>
+              <a:rPr lang="de-DE" dirty="0" err="1"/>
+              <a:t>Equality</a:t>
+            </a:r>
+            <a:r>
+              <a:rPr lang="de-DE" dirty="0"/>
+              <a:t> / </a:t>
+            </a:r>
+            <a:r>
+              <a:rPr lang="de-DE" dirty="0" err="1" smtClean="0"/>
+              <a:t>Comparison</a:t>
+            </a:r>
+            <a:endParaRPr lang="en-US" dirty="0"/>
+          </a:p>
+        </p:txBody>
+      </p:sp>
+      <p:sp>
+        <p:nvSpPr>
+          <p:cNvPr id="3" name="Content Placeholder 2"/>
+          <p:cNvSpPr>
+            <a:spLocks noGrp="1"/>
+          </p:cNvSpPr>
+          <p:nvPr>
+            <p:ph idx="1"/>
+          </p:nvPr>
+        </p:nvSpPr>
+        <p:spPr>
+          <a:xfrm>
+            <a:off x="457200" y="1600201"/>
+            <a:ext cx="8229600" cy="2188840"/>
+          </a:xfrm>
+        </p:spPr>
+        <p:txBody>
+          <a:bodyPr/>
+          <a:lstStyle/>
+          <a:p>
+            <a:pPr marL="0" indent="0">
+              <a:buNone/>
+            </a:pPr>
+            <a:r>
+              <a:rPr lang="de-DE" dirty="0" smtClean="0"/>
+              <a:t>In F# wird </a:t>
+            </a:r>
+            <a:r>
+              <a:rPr lang="de-DE" dirty="0" err="1" smtClean="0"/>
+              <a:t>Structural</a:t>
+            </a:r>
+            <a:r>
+              <a:rPr lang="de-DE" dirty="0" smtClean="0"/>
+              <a:t> </a:t>
+            </a:r>
+            <a:r>
+              <a:rPr lang="de-DE" dirty="0" err="1" smtClean="0"/>
+              <a:t>Equality</a:t>
+            </a:r>
+            <a:r>
+              <a:rPr lang="de-DE" dirty="0" smtClean="0"/>
+              <a:t> vom Compiler für ADTs </a:t>
+            </a:r>
+            <a:r>
+              <a:rPr lang="de-DE" dirty="0" err="1" smtClean="0"/>
+              <a:t>imlementiert</a:t>
+            </a:r>
+            <a:r>
+              <a:rPr lang="de-DE" dirty="0" smtClean="0"/>
+              <a:t>.</a:t>
+            </a:r>
+          </a:p>
+          <a:p>
+            <a:pPr marL="0" indent="0">
+              <a:buNone/>
+            </a:pPr>
+            <a:r>
+              <a:rPr lang="de-DE" dirty="0" smtClean="0"/>
+              <a:t>Es werden keine Referenzen abgeglichen sondern Werte</a:t>
+            </a:r>
+          </a:p>
+          <a:p>
+            <a:pPr marL="0" indent="0">
+              <a:buNone/>
+            </a:pPr>
+            <a:endParaRPr lang="en-US" dirty="0"/>
+          </a:p>
+        </p:txBody>
+      </p:sp>
+      <p:pic>
+        <p:nvPicPr>
+          <p:cNvPr id="1026" name="Picture 2"/>
+          <p:cNvPicPr>
+            <a:picLocks noChangeAspect="1" noChangeArrowheads="1"/>
+          </p:cNvPicPr>
+          <p:nvPr/>
+        </p:nvPicPr>
+        <p:blipFill>
+          <a:blip r:embed="rId3">
+            <a:extLst>
+              <a:ext uri="{28A0092B-C50C-407E-A947-70E740481C1C}">
+                <a14:useLocalDpi xmlns:a14="http://schemas.microsoft.com/office/drawing/2010/main" val="0"/>
+              </a:ext>
+            </a:extLst>
+          </a:blip>
+          <a:srcRect/>
+          <a:stretch>
+            <a:fillRect/>
+          </a:stretch>
+        </p:blipFill>
+        <p:spPr bwMode="auto">
+          <a:xfrm>
+            <a:off x="611560" y="3826345"/>
+            <a:ext cx="6408712" cy="2733465"/>
+          </a:xfrm>
+          <a:prstGeom prst="rect">
+            <a:avLst/>
+          </a:prstGeom>
+          <a:noFill/>
+          <a:ln>
+            <a:noFill/>
+          </a:ln>
+          <a:extLst>
+            <a:ext uri="{909E8E84-426E-40DD-AFC4-6F175D3DCCD1}">
+              <a14:hiddenFill xmlns:a14="http://schemas.microsoft.com/office/drawing/2010/main">
+                <a:solidFill>
+                  <a:schemeClr val="accent1"/>
+                </a:solidFill>
+              </a14:hiddenFill>
+            </a:ext>
+            <a:ext uri="{91240B29-F687-4F45-9708-019B960494DF}">
+              <a14:hiddenLine xmlns:a14="http://schemas.microsoft.com/office/drawing/2010/main" w="9525">
+                <a:solidFill>
+                  <a:schemeClr val="tx1"/>
+                </a:solidFill>
+                <a:miter lim="800000"/>
+                <a:headEnd/>
+                <a:tailEnd/>
+              </a14:hiddenLine>
+            </a:ext>
+          </a:extLst>
+        </p:spPr>
+      </p:pic>
+    </p:spTree>
+    <p:extLst>
+      <p:ext uri="{BB962C8B-B14F-4D97-AF65-F5344CB8AC3E}">
+        <p14:creationId xmlns:p14="http://schemas.microsoft.com/office/powerpoint/2010/main" val="2070263003"/>
+      </p:ext>
+    </p:extLst>
+  </p:cSld>
+  <p:clrMapOvr>
+    <a:masterClrMapping/>
+  </p:clrMapOvr>
+  <p:timing>
+    <p:tnLst>
+      <p:par>
+        <p:cTn id="1" dur="indefinite" restart="never" nodeType="tmRoot"/>
       </p:par>
     </p:tnLst>
   </p:timing>
@@ -12489,6 +12879,279 @@
           <a:p>
             <a:r>
               <a:rPr lang="de-DE" dirty="0" smtClean="0"/>
+              <a:t>Funktional ist überall</a:t>
+            </a:r>
+            <a:endParaRPr lang="en-US" dirty="0"/>
+          </a:p>
+        </p:txBody>
+      </p:sp>
+      <p:sp>
+        <p:nvSpPr>
+          <p:cNvPr id="4" name="Rectangle 3"/>
+          <p:cNvSpPr/>
+          <p:nvPr/>
+        </p:nvSpPr>
+        <p:spPr>
+          <a:xfrm>
+            <a:off x="971600" y="3356992"/>
+            <a:ext cx="3096344" cy="1872208"/>
+          </a:xfrm>
+          <a:prstGeom prst="rect">
+            <a:avLst/>
+          </a:prstGeom>
+        </p:spPr>
+        <p:style>
+          <a:lnRef idx="2">
+            <a:schemeClr val="accent1">
+              <a:shade val="50000"/>
+            </a:schemeClr>
+          </a:lnRef>
+          <a:fillRef idx="1">
+            <a:schemeClr val="accent1"/>
+          </a:fillRef>
+          <a:effectRef idx="0">
+            <a:schemeClr val="accent1"/>
+          </a:effectRef>
+          <a:fontRef idx="minor">
+            <a:schemeClr val="lt1"/>
+          </a:fontRef>
+        </p:style>
+        <p:txBody>
+          <a:bodyPr rtlCol="0" anchor="ctr"/>
+          <a:lstStyle/>
+          <a:p>
+            <a:pPr algn="ctr"/>
+            <a:r>
+              <a:rPr lang="de-DE" sz="9600" dirty="0" smtClean="0"/>
+              <a:t>.net</a:t>
+            </a:r>
+            <a:endParaRPr lang="en-US" sz="9600" dirty="0"/>
+          </a:p>
+        </p:txBody>
+      </p:sp>
+      <p:sp>
+        <p:nvSpPr>
+          <p:cNvPr id="5" name="Rectangle 4"/>
+          <p:cNvSpPr/>
+          <p:nvPr/>
+        </p:nvSpPr>
+        <p:spPr>
+          <a:xfrm>
+            <a:off x="4572000" y="3356992"/>
+            <a:ext cx="3816424" cy="1872208"/>
+          </a:xfrm>
+          <a:prstGeom prst="rect">
+            <a:avLst/>
+          </a:prstGeom>
+        </p:spPr>
+        <p:style>
+          <a:lnRef idx="2">
+            <a:schemeClr val="accent1">
+              <a:shade val="50000"/>
+            </a:schemeClr>
+          </a:lnRef>
+          <a:fillRef idx="1">
+            <a:schemeClr val="accent1"/>
+          </a:fillRef>
+          <a:effectRef idx="0">
+            <a:schemeClr val="accent1"/>
+          </a:effectRef>
+          <a:fontRef idx="minor">
+            <a:schemeClr val="lt1"/>
+          </a:fontRef>
+        </p:style>
+        <p:txBody>
+          <a:bodyPr rtlCol="0" anchor="ctr"/>
+          <a:lstStyle/>
+          <a:p>
+            <a:pPr algn="ctr"/>
+            <a:r>
+              <a:rPr lang="de-DE" sz="9600" dirty="0" smtClean="0"/>
+              <a:t>Java</a:t>
+            </a:r>
+            <a:endParaRPr lang="en-US" sz="9600" dirty="0"/>
+          </a:p>
+        </p:txBody>
+      </p:sp>
+      <p:sp>
+        <p:nvSpPr>
+          <p:cNvPr id="6" name="Rectangle 5"/>
+          <p:cNvSpPr/>
+          <p:nvPr/>
+        </p:nvSpPr>
+        <p:spPr>
+          <a:xfrm>
+            <a:off x="971600" y="2492896"/>
+            <a:ext cx="3096344" cy="720080"/>
+          </a:xfrm>
+          <a:prstGeom prst="rect">
+            <a:avLst/>
+          </a:prstGeom>
+        </p:spPr>
+        <p:style>
+          <a:lnRef idx="2">
+            <a:schemeClr val="accent3">
+              <a:shade val="50000"/>
+            </a:schemeClr>
+          </a:lnRef>
+          <a:fillRef idx="1">
+            <a:schemeClr val="accent3"/>
+          </a:fillRef>
+          <a:effectRef idx="0">
+            <a:schemeClr val="accent3"/>
+          </a:effectRef>
+          <a:fontRef idx="minor">
+            <a:schemeClr val="lt1"/>
+          </a:fontRef>
+        </p:style>
+        <p:txBody>
+          <a:bodyPr rtlCol="0" anchor="ctr"/>
+          <a:lstStyle/>
+          <a:p>
+            <a:pPr algn="ctr"/>
+            <a:r>
+              <a:rPr lang="de-DE" sz="4800" dirty="0" smtClean="0"/>
+              <a:t>F#</a:t>
+            </a:r>
+            <a:endParaRPr lang="en-US" sz="4800" dirty="0"/>
+          </a:p>
+        </p:txBody>
+      </p:sp>
+      <p:sp>
+        <p:nvSpPr>
+          <p:cNvPr id="7" name="Rectangle 6"/>
+          <p:cNvSpPr/>
+          <p:nvPr/>
+        </p:nvSpPr>
+        <p:spPr>
+          <a:xfrm>
+            <a:off x="4572000" y="2492896"/>
+            <a:ext cx="1548172" cy="720080"/>
+          </a:xfrm>
+          <a:prstGeom prst="rect">
+            <a:avLst/>
+          </a:prstGeom>
+        </p:spPr>
+        <p:style>
+          <a:lnRef idx="2">
+            <a:schemeClr val="accent3">
+              <a:shade val="50000"/>
+            </a:schemeClr>
+          </a:lnRef>
+          <a:fillRef idx="1">
+            <a:schemeClr val="accent3"/>
+          </a:fillRef>
+          <a:effectRef idx="0">
+            <a:schemeClr val="accent3"/>
+          </a:effectRef>
+          <a:fontRef idx="minor">
+            <a:schemeClr val="lt1"/>
+          </a:fontRef>
+        </p:style>
+        <p:txBody>
+          <a:bodyPr rtlCol="0" anchor="ctr"/>
+          <a:lstStyle/>
+          <a:p>
+            <a:pPr algn="ctr"/>
+            <a:r>
+              <a:rPr lang="de-DE" sz="4800" dirty="0" smtClean="0"/>
+              <a:t>Scala</a:t>
+            </a:r>
+            <a:endParaRPr lang="en-US" sz="4800" dirty="0"/>
+          </a:p>
+        </p:txBody>
+      </p:sp>
+      <p:sp>
+        <p:nvSpPr>
+          <p:cNvPr id="8" name="Rectangle 7"/>
+          <p:cNvSpPr/>
+          <p:nvPr/>
+        </p:nvSpPr>
+        <p:spPr>
+          <a:xfrm>
+            <a:off x="6228184" y="2492896"/>
+            <a:ext cx="2160240" cy="720080"/>
+          </a:xfrm>
+          <a:prstGeom prst="rect">
+            <a:avLst/>
+          </a:prstGeom>
+        </p:spPr>
+        <p:style>
+          <a:lnRef idx="2">
+            <a:schemeClr val="accent3">
+              <a:shade val="50000"/>
+            </a:schemeClr>
+          </a:lnRef>
+          <a:fillRef idx="1">
+            <a:schemeClr val="accent3"/>
+          </a:fillRef>
+          <a:effectRef idx="0">
+            <a:schemeClr val="accent3"/>
+          </a:effectRef>
+          <a:fontRef idx="minor">
+            <a:schemeClr val="lt1"/>
+          </a:fontRef>
+        </p:style>
+        <p:txBody>
+          <a:bodyPr rtlCol="0" anchor="ctr"/>
+          <a:lstStyle/>
+          <a:p>
+            <a:pPr algn="ctr"/>
+            <a:r>
+              <a:rPr lang="de-DE" sz="4800" dirty="0" err="1" smtClean="0"/>
+              <a:t>Closure</a:t>
+            </a:r>
+            <a:endParaRPr lang="en-US" sz="4800" dirty="0"/>
+          </a:p>
+        </p:txBody>
+      </p:sp>
+    </p:spTree>
+    <p:extLst>
+      <p:ext uri="{BB962C8B-B14F-4D97-AF65-F5344CB8AC3E}">
+        <p14:creationId xmlns:p14="http://schemas.microsoft.com/office/powerpoint/2010/main" val="3461314516"/>
+      </p:ext>
+    </p:extLst>
+  </p:cSld>
+  <p:clrMapOvr>
+    <a:masterClrMapping/>
+  </p:clrMapOvr>
+</p:sld>
+</file>
+
+<file path=ppt/slides/slide7.xml><?xml version="1.0" encoding="utf-8"?>
+<p:sld xmlns:a="http://schemas.openxmlformats.org/drawingml/2006/main" xmlns:r="http://schemas.openxmlformats.org/officeDocument/2006/relationships" xmlns:p="http://schemas.openxmlformats.org/presentationml/2006/main">
+  <p:cSld>
+    <p:spTree>
+      <p:nvGrpSpPr>
+        <p:cNvPr id="1" name=""/>
+        <p:cNvGrpSpPr/>
+        <p:nvPr/>
+      </p:nvGrpSpPr>
+      <p:grpSpPr>
+        <a:xfrm>
+          <a:off x="0" y="0"/>
+          <a:ext cx="0" cy="0"/>
+          <a:chOff x="0" y="0"/>
+          <a:chExt cx="0" cy="0"/>
+        </a:xfrm>
+      </p:grpSpPr>
+      <p:sp>
+        <p:nvSpPr>
+          <p:cNvPr id="2" name="Title 1"/>
+          <p:cNvSpPr>
+            <a:spLocks noGrp="1"/>
+          </p:cNvSpPr>
+          <p:nvPr>
+            <p:ph type="title"/>
+          </p:nvPr>
+        </p:nvSpPr>
+        <p:spPr/>
+        <p:txBody>
+          <a:bodyPr/>
+          <a:lstStyle/>
+          <a:p>
+            <a:r>
+              <a:rPr lang="de-DE" dirty="0" smtClean="0"/>
               <a:t>Funktionale Erscheinungen</a:t>
             </a:r>
             <a:endParaRPr lang="en-US" dirty="0"/>
@@ -12873,7 +13536,7 @@
 </p:sld>
 </file>
 
-<file path=ppt/slides/slide7.xml><?xml version="1.0" encoding="utf-8"?>
+<file path=ppt/slides/slide8.xml><?xml version="1.0" encoding="utf-8"?>
 <p:sld xmlns:a="http://schemas.openxmlformats.org/drawingml/2006/main" xmlns:r="http://schemas.openxmlformats.org/officeDocument/2006/relationships" xmlns:p="http://schemas.openxmlformats.org/presentationml/2006/main">
   <p:cSld>
     <p:spTree>
@@ -13307,7 +13970,7 @@
 </p:sld>
 </file>
 
-<file path=ppt/slides/slide8.xml><?xml version="1.0" encoding="utf-8"?>
+<file path=ppt/slides/slide9.xml><?xml version="1.0" encoding="utf-8"?>
 <p:sld xmlns:a="http://schemas.openxmlformats.org/drawingml/2006/main" xmlns:r="http://schemas.openxmlformats.org/officeDocument/2006/relationships" xmlns:p="http://schemas.openxmlformats.org/presentationml/2006/main">
   <p:cSld>
     <p:spTree>
@@ -13667,326 +14330,6 @@
     <p:bldLst>
       <p:bldP spid="3" grpId="0" build="p"/>
     </p:bldLst>
-  </p:timing>
-</p:sld>
-</file>
-
-<file path=ppt/slides/slide9.xml><?xml version="1.0" encoding="utf-8"?>
-<p:sld xmlns:a="http://schemas.openxmlformats.org/drawingml/2006/main" xmlns:r="http://schemas.openxmlformats.org/officeDocument/2006/relationships" xmlns:p="http://schemas.openxmlformats.org/presentationml/2006/main">
-  <p:cSld>
-    <p:spTree>
-      <p:nvGrpSpPr>
-        <p:cNvPr id="1" name=""/>
-        <p:cNvGrpSpPr/>
-        <p:nvPr/>
-      </p:nvGrpSpPr>
-      <p:grpSpPr>
-        <a:xfrm>
-          <a:off x="0" y="0"/>
-          <a:ext cx="0" cy="0"/>
-          <a:chOff x="0" y="0"/>
-          <a:chExt cx="0" cy="0"/>
-        </a:xfrm>
-      </p:grpSpPr>
-      <p:sp>
-        <p:nvSpPr>
-          <p:cNvPr id="2" name="Title 1"/>
-          <p:cNvSpPr>
-            <a:spLocks noGrp="1"/>
-          </p:cNvSpPr>
-          <p:nvPr>
-            <p:ph type="title"/>
-          </p:nvPr>
-        </p:nvSpPr>
-        <p:spPr/>
-        <p:txBody>
-          <a:bodyPr/>
-          <a:lstStyle/>
-          <a:p>
-            <a:pPr marL="0" indent="0"/>
-            <a:r>
-              <a:rPr lang="de-DE" dirty="0"/>
-              <a:t>Ideen aus der FP Welt</a:t>
-            </a:r>
-          </a:p>
-        </p:txBody>
-      </p:sp>
-      <p:sp>
-        <p:nvSpPr>
-          <p:cNvPr id="3" name="Content Placeholder 2"/>
-          <p:cNvSpPr>
-            <a:spLocks noGrp="1"/>
-          </p:cNvSpPr>
-          <p:nvPr>
-            <p:ph idx="1"/>
-          </p:nvPr>
-        </p:nvSpPr>
-        <p:spPr/>
-        <p:txBody>
-          <a:bodyPr>
-            <a:normAutofit/>
-          </a:bodyPr>
-          <a:lstStyle/>
-          <a:p>
-            <a:pPr marL="0" indent="0">
-              <a:buNone/>
-            </a:pPr>
-            <a:r>
-              <a:rPr lang="de-DE" dirty="0"/>
-              <a:t>Typ &lt;&gt; Klasse: Datenstruktur vs. </a:t>
-            </a:r>
-            <a:r>
-              <a:rPr lang="de-DE" dirty="0" smtClean="0"/>
-              <a:t>Verhalten</a:t>
-            </a:r>
-          </a:p>
-          <a:p>
-            <a:r>
-              <a:rPr lang="de-DE" dirty="0" smtClean="0"/>
-              <a:t>Datenstruktur beinhaltet nur Daten</a:t>
-            </a:r>
-          </a:p>
-          <a:p>
-            <a:r>
-              <a:rPr lang="de-DE" dirty="0" smtClean="0"/>
-              <a:t>Komposition</a:t>
-            </a:r>
-            <a:r>
-              <a:rPr lang="de-DE" dirty="0"/>
-              <a:t>: light-</a:t>
-            </a:r>
-            <a:r>
-              <a:rPr lang="de-DE" dirty="0" err="1"/>
-              <a:t>weight</a:t>
-            </a:r>
-            <a:r>
-              <a:rPr lang="de-DE" dirty="0"/>
-              <a:t> </a:t>
-            </a:r>
-            <a:r>
-              <a:rPr lang="de-DE" dirty="0" err="1"/>
-              <a:t>types</a:t>
-            </a:r>
-            <a:r>
-              <a:rPr lang="de-DE" dirty="0"/>
-              <a:t>, verbinden zu neuen </a:t>
-            </a:r>
-            <a:r>
-              <a:rPr lang="de-DE" dirty="0" err="1"/>
-              <a:t>composite</a:t>
-            </a:r>
-            <a:r>
-              <a:rPr lang="de-DE" dirty="0"/>
-              <a:t> </a:t>
-            </a:r>
-            <a:r>
-              <a:rPr lang="de-DE" dirty="0" err="1"/>
-              <a:t>types</a:t>
-            </a:r>
-            <a:r>
-              <a:rPr lang="de-DE" dirty="0"/>
-              <a:t>. Keine </a:t>
-            </a:r>
-            <a:r>
-              <a:rPr lang="de-DE" dirty="0" smtClean="0"/>
-              <a:t>Vererbung</a:t>
-            </a:r>
-            <a:endParaRPr lang="de-DE" dirty="0"/>
-          </a:p>
-          <a:p>
-            <a:pPr marL="0" indent="0">
-              <a:buNone/>
-            </a:pPr>
-            <a:endParaRPr lang="de-DE" dirty="0"/>
-          </a:p>
-        </p:txBody>
-      </p:sp>
-    </p:spTree>
-    <p:extLst>
-      <p:ext uri="{BB962C8B-B14F-4D97-AF65-F5344CB8AC3E}">
-        <p14:creationId xmlns:p14="http://schemas.microsoft.com/office/powerpoint/2010/main" val="304289206"/>
-      </p:ext>
-    </p:extLst>
-  </p:cSld>
-  <p:clrMapOvr>
-    <a:masterClrMapping/>
-  </p:clrMapOvr>
-  <p:timing>
-    <p:tnLst>
-      <p:par>
-        <p:cTn id="1" dur="indefinite" restart="never" nodeType="tmRoot">
-          <p:childTnLst>
-            <p:seq concurrent="1" nextAc="seek">
-              <p:cTn id="2" dur="indefinite" nodeType="mainSeq">
-                <p:childTnLst>
-                  <p:par>
-                    <p:cTn id="3" fill="hold">
-                      <p:stCondLst>
-                        <p:cond delay="indefinite"/>
-                      </p:stCondLst>
-                      <p:childTnLst>
-                        <p:par>
-                          <p:cTn id="4" fill="hold">
-                            <p:stCondLst>
-                              <p:cond delay="0"/>
-                            </p:stCondLst>
-                            <p:childTnLst>
-                              <p:par>
-                                <p:cTn id="5" presetID="1" presetClass="entr" presetSubtype="0" fill="hold" nodeType="clickEffect">
-                                  <p:stCondLst>
-                                    <p:cond delay="0"/>
-                                  </p:stCondLst>
-                                  <p:childTnLst>
-                                    <p:set>
-                                      <p:cBhvr>
-                                        <p:cTn id="6" dur="1" fill="hold">
-                                          <p:stCondLst>
-                                            <p:cond delay="0"/>
-                                          </p:stCondLst>
-                                        </p:cTn>
-                                        <p:tgtEl>
-                                          <p:spTgt spid="3">
-                                            <p:txEl>
-                                              <p:pRg st="0" end="0"/>
-                                            </p:txEl>
-                                          </p:spTgt>
-                                        </p:tgtEl>
-                                        <p:attrNameLst>
-                                          <p:attrName>style.visibility</p:attrName>
-                                        </p:attrNameLst>
-                                      </p:cBhvr>
-                                      <p:to>
-                                        <p:strVal val="visible"/>
-                                      </p:to>
-                                    </p:set>
-                                  </p:childTnLst>
-                                </p:cTn>
-                              </p:par>
-                            </p:childTnLst>
-                          </p:cTn>
-                        </p:par>
-                      </p:childTnLst>
-                    </p:cTn>
-                  </p:par>
-                  <p:par>
-                    <p:cTn id="7" fill="hold">
-                      <p:stCondLst>
-                        <p:cond delay="indefinite"/>
-                      </p:stCondLst>
-                      <p:childTnLst>
-                        <p:par>
-                          <p:cTn id="8" fill="hold">
-                            <p:stCondLst>
-                              <p:cond delay="0"/>
-                            </p:stCondLst>
-                            <p:childTnLst>
-                              <p:par>
-                                <p:cTn id="9" presetID="1" presetClass="entr" presetSubtype="0" fill="hold" nodeType="clickEffect">
-                                  <p:stCondLst>
-                                    <p:cond delay="0"/>
-                                  </p:stCondLst>
-                                  <p:childTnLst>
-                                    <p:set>
-                                      <p:cBhvr>
-                                        <p:cTn id="10" dur="1" fill="hold">
-                                          <p:stCondLst>
-                                            <p:cond delay="0"/>
-                                          </p:stCondLst>
-                                        </p:cTn>
-                                        <p:tgtEl>
-                                          <p:spTgt spid="3">
-                                            <p:txEl>
-                                              <p:pRg st="1" end="1"/>
-                                            </p:txEl>
-                                          </p:spTgt>
-                                        </p:tgtEl>
-                                        <p:attrNameLst>
-                                          <p:attrName>style.visibility</p:attrName>
-                                        </p:attrNameLst>
-                                      </p:cBhvr>
-                                      <p:to>
-                                        <p:strVal val="visible"/>
-                                      </p:to>
-                                    </p:set>
-                                  </p:childTnLst>
-                                </p:cTn>
-                              </p:par>
-                            </p:childTnLst>
-                          </p:cTn>
-                        </p:par>
-                      </p:childTnLst>
-                    </p:cTn>
-                  </p:par>
-                  <p:par>
-                    <p:cTn id="11" fill="hold">
-                      <p:stCondLst>
-                        <p:cond delay="indefinite"/>
-                      </p:stCondLst>
-                      <p:childTnLst>
-                        <p:par>
-                          <p:cTn id="12" fill="hold">
-                            <p:stCondLst>
-                              <p:cond delay="0"/>
-                            </p:stCondLst>
-                            <p:childTnLst>
-                              <p:par>
-                                <p:cTn id="13" presetID="1" presetClass="entr" presetSubtype="0" fill="hold" nodeType="clickEffect">
-                                  <p:stCondLst>
-                                    <p:cond delay="0"/>
-                                  </p:stCondLst>
-                                  <p:childTnLst>
-                                    <p:set>
-                                      <p:cBhvr>
-                                        <p:cTn id="14" dur="1" fill="hold">
-                                          <p:stCondLst>
-                                            <p:cond delay="0"/>
-                                          </p:stCondLst>
-                                        </p:cTn>
-                                        <p:tgtEl>
-                                          <p:spTgt spid="3">
-                                            <p:txEl>
-                                              <p:pRg st="2" end="2"/>
-                                            </p:txEl>
-                                          </p:spTgt>
-                                        </p:tgtEl>
-                                        <p:attrNameLst>
-                                          <p:attrName>style.visibility</p:attrName>
-                                        </p:attrNameLst>
-                                      </p:cBhvr>
-                                      <p:to>
-                                        <p:strVal val="visible"/>
-                                      </p:to>
-                                    </p:set>
-                                  </p:childTnLst>
-                                </p:cTn>
-                              </p:par>
-                            </p:childTnLst>
-                          </p:cTn>
-                        </p:par>
-                      </p:childTnLst>
-                    </p:cTn>
-                  </p:par>
-                </p:childTnLst>
-              </p:cTn>
-              <p:prevCondLst>
-                <p:cond evt="onPrev" delay="0">
-                  <p:tgtEl>
-                    <p:sldTgt/>
-                  </p:tgtEl>
-                </p:cond>
-              </p:prevCondLst>
-              <p:nextCondLst>
-                <p:cond evt="onNext" delay="0">
-                  <p:tgtEl>
-                    <p:sldTgt/>
-                  </p:tgtEl>
-                </p:cond>
-              </p:nextCondLst>
-            </p:seq>
-          </p:childTnLst>
-        </p:cTn>
-      </p:par>
-    </p:tnLst>
   </p:timing>
 </p:sld>
 </file>

</xml_diff>

<commit_message>
Slide um Informationen zu F# Foundation erweitert
</commit_message>
<xml_diff>
--- a/20151202/Einführung20151202.pptx
+++ b/20151202/Einführung20151202.pptx
@@ -5,7 +5,7 @@
     <p:sldMasterId id="2147483648" r:id="rId1"/>
   </p:sldMasterIdLst>
   <p:notesMasterIdLst>
-    <p:notesMasterId r:id="rId29"/>
+    <p:notesMasterId r:id="rId31"/>
   </p:notesMasterIdLst>
   <p:sldIdLst>
     <p:sldId id="256" r:id="rId2"/>
@@ -35,6 +35,8 @@
     <p:sldId id="306" r:id="rId26"/>
     <p:sldId id="267" r:id="rId27"/>
     <p:sldId id="268" r:id="rId28"/>
+    <p:sldId id="307" r:id="rId29"/>
+    <p:sldId id="308" r:id="rId30"/>
   </p:sldIdLst>
   <p:sldSz cx="9144000" cy="6858000" type="screen4x3"/>
   <p:notesSz cx="6858000" cy="9144000"/>
@@ -135,7 +137,7 @@
   </p:defaultTextStyle>
   <p:extLst>
     <p:ext uri="{EFAFB233-063F-42B5-8137-9DF3F51BA10A}">
-      <p15:sldGuideLst xmlns="" xmlns:p15="http://schemas.microsoft.com/office/powerpoint/2012/main">
+      <p15:sldGuideLst xmlns:p15="http://schemas.microsoft.com/office/powerpoint/2012/main" xmlns="">
         <p15:guide id="1" orient="horz" pos="2160">
           <p15:clr>
             <a:srgbClr val="A4A3A4"/>
@@ -234,7 +236,7 @@
           <a:p>
             <a:fld id="{8583A242-7230-4070-B2AF-A33EB304C08D}" type="datetimeFigureOut">
               <a:rPr lang="en-US" smtClean="0"/>
-              <a:t>11/27/2015</a:t>
+              <a:t>12/1/2015</a:t>
             </a:fld>
             <a:endParaRPr lang="en-US"/>
           </a:p>
@@ -890,6 +892,40 @@
           <a:p>
             <a:endParaRPr lang="de-DE" baseline="0" dirty="0" smtClean="0"/>
           </a:p>
+          <a:p>
+            <a:r>
+              <a:rPr lang="de-DE" baseline="0" dirty="0" smtClean="0"/>
+              <a:t>ACHTUNG: Bertrand Meyer (Eifel, CQS) hat diese Prinzipien auch für OO gefordert.  Eifel implementiert auch eine Art </a:t>
+            </a:r>
+            <a:r>
+              <a:rPr lang="de-DE" baseline="0" dirty="0" err="1" smtClean="0"/>
+              <a:t>Pre</a:t>
+            </a:r>
+            <a:r>
+              <a:rPr lang="de-DE" baseline="0" dirty="0" smtClean="0"/>
+              <a:t> und Post </a:t>
+            </a:r>
+            <a:r>
+              <a:rPr lang="de-DE" baseline="0" dirty="0" err="1" smtClean="0"/>
+              <a:t>Condition</a:t>
+            </a:r>
+            <a:r>
+              <a:rPr lang="de-DE" baseline="0" dirty="0" smtClean="0"/>
+              <a:t> für Methoden (aber auch </a:t>
+            </a:r>
+            <a:r>
+              <a:rPr lang="de-DE" baseline="0" dirty="0" err="1" smtClean="0"/>
+              <a:t>mehrfachvererbung</a:t>
+            </a:r>
+            <a:r>
+              <a:rPr lang="de-DE" baseline="0" dirty="0" smtClean="0"/>
+              <a:t>)</a:t>
+            </a:r>
+            <a:endParaRPr lang="de-DE" baseline="0" dirty="0" smtClean="0"/>
+          </a:p>
+          <a:p>
+            <a:endParaRPr lang="de-DE" baseline="0" dirty="0" smtClean="0"/>
+          </a:p>
         </p:txBody>
       </p:sp>
       <p:sp>
@@ -3675,6 +3711,224 @@
     <p:extLst>
       <p:ext uri="{BB962C8B-B14F-4D97-AF65-F5344CB8AC3E}">
         <p14:creationId xmlns:p14="http://schemas.microsoft.com/office/powerpoint/2010/main" val="3165246819"/>
+      </p:ext>
+    </p:extLst>
+  </p:cSld>
+  <p:clrMapOvr>
+    <a:masterClrMapping/>
+  </p:clrMapOvr>
+</p:notes>
+</file>
+
+<file path=ppt/notesSlides/notesSlide26.xml><?xml version="1.0" encoding="utf-8"?>
+<p:notes xmlns:a="http://schemas.openxmlformats.org/drawingml/2006/main" xmlns:r="http://schemas.openxmlformats.org/officeDocument/2006/relationships" xmlns:p="http://schemas.openxmlformats.org/presentationml/2006/main">
+  <p:cSld>
+    <p:spTree>
+      <p:nvGrpSpPr>
+        <p:cNvPr id="1" name=""/>
+        <p:cNvGrpSpPr/>
+        <p:nvPr/>
+      </p:nvGrpSpPr>
+      <p:grpSpPr>
+        <a:xfrm>
+          <a:off x="0" y="0"/>
+          <a:ext cx="0" cy="0"/>
+          <a:chOff x="0" y="0"/>
+          <a:chExt cx="0" cy="0"/>
+        </a:xfrm>
+      </p:grpSpPr>
+      <p:sp>
+        <p:nvSpPr>
+          <p:cNvPr id="2" name="Slide Image Placeholder 1"/>
+          <p:cNvSpPr>
+            <a:spLocks noGrp="1" noRot="1" noChangeAspect="1"/>
+          </p:cNvSpPr>
+          <p:nvPr>
+            <p:ph type="sldImg"/>
+          </p:nvPr>
+        </p:nvSpPr>
+        <p:spPr/>
+      </p:sp>
+      <p:sp>
+        <p:nvSpPr>
+          <p:cNvPr id="3" name="Notes Placeholder 2"/>
+          <p:cNvSpPr>
+            <a:spLocks noGrp="1"/>
+          </p:cNvSpPr>
+          <p:nvPr>
+            <p:ph type="body" idx="1"/>
+          </p:nvPr>
+        </p:nvSpPr>
+        <p:spPr/>
+        <p:txBody>
+          <a:bodyPr/>
+          <a:lstStyle/>
+          <a:p>
+            <a:pPr marL="0" marR="0" indent="0" algn="l" defTabSz="914400" rtl="0" eaLnBrk="1" fontAlgn="auto" latinLnBrk="0" hangingPunct="1">
+              <a:lnSpc>
+                <a:spcPct val="100000"/>
+              </a:lnSpc>
+              <a:spcBef>
+                <a:spcPts val="0"/>
+              </a:spcBef>
+              <a:spcAft>
+                <a:spcPts val="0"/>
+              </a:spcAft>
+              <a:buClrTx/>
+              <a:buSzTx/>
+              <a:buFontTx/>
+              <a:buNone/>
+              <a:tabLst/>
+              <a:defRPr/>
+            </a:pPr>
+            <a:r>
+              <a:rPr lang="de-DE" dirty="0" smtClean="0"/>
+              <a:t>Für die die sich an Silverlight oder andere Entwicklungen erinnern</a:t>
+            </a:r>
+            <a:endParaRPr lang="de-DE" dirty="0" smtClean="0"/>
+          </a:p>
+        </p:txBody>
+      </p:sp>
+      <p:sp>
+        <p:nvSpPr>
+          <p:cNvPr id="4" name="Slide Number Placeholder 3"/>
+          <p:cNvSpPr>
+            <a:spLocks noGrp="1"/>
+          </p:cNvSpPr>
+          <p:nvPr>
+            <p:ph type="sldNum" sz="quarter" idx="10"/>
+          </p:nvPr>
+        </p:nvSpPr>
+        <p:spPr/>
+        <p:txBody>
+          <a:bodyPr/>
+          <a:lstStyle/>
+          <a:p>
+            <a:fld id="{4775FDF9-2A53-4261-A0AF-3B6A9698D365}" type="slidenum">
+              <a:rPr lang="en-US" smtClean="0"/>
+              <a:t>28</a:t>
+            </a:fld>
+            <a:endParaRPr lang="en-US"/>
+          </a:p>
+        </p:txBody>
+      </p:sp>
+    </p:spTree>
+    <p:extLst>
+      <p:ext uri="{BB962C8B-B14F-4D97-AF65-F5344CB8AC3E}">
+        <p14:creationId xmlns:p14="http://schemas.microsoft.com/office/powerpoint/2010/main" val="3358926703"/>
+      </p:ext>
+    </p:extLst>
+  </p:cSld>
+  <p:clrMapOvr>
+    <a:masterClrMapping/>
+  </p:clrMapOvr>
+</p:notes>
+</file>
+
+<file path=ppt/notesSlides/notesSlide27.xml><?xml version="1.0" encoding="utf-8"?>
+<p:notes xmlns:a="http://schemas.openxmlformats.org/drawingml/2006/main" xmlns:r="http://schemas.openxmlformats.org/officeDocument/2006/relationships" xmlns:p="http://schemas.openxmlformats.org/presentationml/2006/main">
+  <p:cSld>
+    <p:spTree>
+      <p:nvGrpSpPr>
+        <p:cNvPr id="1" name=""/>
+        <p:cNvGrpSpPr/>
+        <p:nvPr/>
+      </p:nvGrpSpPr>
+      <p:grpSpPr>
+        <a:xfrm>
+          <a:off x="0" y="0"/>
+          <a:ext cx="0" cy="0"/>
+          <a:chOff x="0" y="0"/>
+          <a:chExt cx="0" cy="0"/>
+        </a:xfrm>
+      </p:grpSpPr>
+      <p:sp>
+        <p:nvSpPr>
+          <p:cNvPr id="2" name="Slide Image Placeholder 1"/>
+          <p:cNvSpPr>
+            <a:spLocks noGrp="1" noRot="1" noChangeAspect="1"/>
+          </p:cNvSpPr>
+          <p:nvPr>
+            <p:ph type="sldImg"/>
+          </p:nvPr>
+        </p:nvSpPr>
+        <p:spPr/>
+      </p:sp>
+      <p:sp>
+        <p:nvSpPr>
+          <p:cNvPr id="3" name="Notes Placeholder 2"/>
+          <p:cNvSpPr>
+            <a:spLocks noGrp="1"/>
+          </p:cNvSpPr>
+          <p:nvPr>
+            <p:ph type="body" idx="1"/>
+          </p:nvPr>
+        </p:nvSpPr>
+        <p:spPr/>
+        <p:txBody>
+          <a:bodyPr/>
+          <a:lstStyle/>
+          <a:p>
+            <a:pPr marL="0" marR="0" indent="0" algn="l" defTabSz="914400" rtl="0" eaLnBrk="1" fontAlgn="auto" latinLnBrk="0" hangingPunct="1">
+              <a:lnSpc>
+                <a:spcPct val="100000"/>
+              </a:lnSpc>
+              <a:spcBef>
+                <a:spcPts val="0"/>
+              </a:spcBef>
+              <a:spcAft>
+                <a:spcPts val="0"/>
+              </a:spcAft>
+              <a:buClrTx/>
+              <a:buSzTx/>
+              <a:buFontTx/>
+              <a:buNone/>
+              <a:tabLst/>
+              <a:defRPr/>
+            </a:pPr>
+            <a:r>
+              <a:rPr lang="de-DE" dirty="0" smtClean="0"/>
+              <a:t>Es</a:t>
+            </a:r>
+            <a:r>
+              <a:rPr lang="de-DE" baseline="0" dirty="0" smtClean="0"/>
+              <a:t> geht nicht nur um die Sprache sondern auch darum wie eine </a:t>
+            </a:r>
+            <a:r>
+              <a:rPr lang="de-DE" baseline="0" smtClean="0"/>
+              <a:t>Sprache entsteht.</a:t>
+            </a:r>
+            <a:endParaRPr lang="de-DE" dirty="0" smtClean="0"/>
+          </a:p>
+        </p:txBody>
+      </p:sp>
+      <p:sp>
+        <p:nvSpPr>
+          <p:cNvPr id="4" name="Slide Number Placeholder 3"/>
+          <p:cNvSpPr>
+            <a:spLocks noGrp="1"/>
+          </p:cNvSpPr>
+          <p:nvPr>
+            <p:ph type="sldNum" sz="quarter" idx="10"/>
+          </p:nvPr>
+        </p:nvSpPr>
+        <p:spPr/>
+        <p:txBody>
+          <a:bodyPr/>
+          <a:lstStyle/>
+          <a:p>
+            <a:fld id="{4775FDF9-2A53-4261-A0AF-3B6A9698D365}" type="slidenum">
+              <a:rPr lang="en-US" smtClean="0"/>
+              <a:t>29</a:t>
+            </a:fld>
+            <a:endParaRPr lang="en-US"/>
+          </a:p>
+        </p:txBody>
+      </p:sp>
+    </p:spTree>
+    <p:extLst>
+      <p:ext uri="{BB962C8B-B14F-4D97-AF65-F5344CB8AC3E}">
+        <p14:creationId xmlns:p14="http://schemas.microsoft.com/office/powerpoint/2010/main" val="3358926703"/>
       </p:ext>
     </p:extLst>
   </p:cSld>
@@ -5302,7 +5556,7 @@
           <a:p>
             <a:fld id="{28CA3B8B-C56F-4663-93D1-BECEDA7EAF67}" type="datetimeFigureOut">
               <a:rPr lang="en-US" smtClean="0"/>
-              <a:t>11/27/2015</a:t>
+              <a:t>12/1/2015</a:t>
             </a:fld>
             <a:endParaRPr lang="en-US"/>
           </a:p>
@@ -5472,7 +5726,7 @@
           <a:p>
             <a:fld id="{28CA3B8B-C56F-4663-93D1-BECEDA7EAF67}" type="datetimeFigureOut">
               <a:rPr lang="en-US" smtClean="0"/>
-              <a:t>11/27/2015</a:t>
+              <a:t>12/1/2015</a:t>
             </a:fld>
             <a:endParaRPr lang="en-US"/>
           </a:p>
@@ -5652,7 +5906,7 @@
           <a:p>
             <a:fld id="{28CA3B8B-C56F-4663-93D1-BECEDA7EAF67}" type="datetimeFigureOut">
               <a:rPr lang="en-US" smtClean="0"/>
-              <a:t>11/27/2015</a:t>
+              <a:t>12/1/2015</a:t>
             </a:fld>
             <a:endParaRPr lang="en-US"/>
           </a:p>
@@ -5822,7 +6076,7 @@
           <a:p>
             <a:fld id="{28CA3B8B-C56F-4663-93D1-BECEDA7EAF67}" type="datetimeFigureOut">
               <a:rPr lang="en-US" smtClean="0"/>
-              <a:t>11/27/2015</a:t>
+              <a:t>12/1/2015</a:t>
             </a:fld>
             <a:endParaRPr lang="en-US"/>
           </a:p>
@@ -6068,7 +6322,7 @@
           <a:p>
             <a:fld id="{28CA3B8B-C56F-4663-93D1-BECEDA7EAF67}" type="datetimeFigureOut">
               <a:rPr lang="en-US" smtClean="0"/>
-              <a:t>11/27/2015</a:t>
+              <a:t>12/1/2015</a:t>
             </a:fld>
             <a:endParaRPr lang="en-US"/>
           </a:p>
@@ -6356,7 +6610,7 @@
           <a:p>
             <a:fld id="{28CA3B8B-C56F-4663-93D1-BECEDA7EAF67}" type="datetimeFigureOut">
               <a:rPr lang="en-US" smtClean="0"/>
-              <a:t>11/27/2015</a:t>
+              <a:t>12/1/2015</a:t>
             </a:fld>
             <a:endParaRPr lang="en-US"/>
           </a:p>
@@ -6778,7 +7032,7 @@
           <a:p>
             <a:fld id="{28CA3B8B-C56F-4663-93D1-BECEDA7EAF67}" type="datetimeFigureOut">
               <a:rPr lang="en-US" smtClean="0"/>
-              <a:t>11/27/2015</a:t>
+              <a:t>12/1/2015</a:t>
             </a:fld>
             <a:endParaRPr lang="en-US"/>
           </a:p>
@@ -6896,7 +7150,7 @@
           <a:p>
             <a:fld id="{28CA3B8B-C56F-4663-93D1-BECEDA7EAF67}" type="datetimeFigureOut">
               <a:rPr lang="en-US" smtClean="0"/>
-              <a:t>11/27/2015</a:t>
+              <a:t>12/1/2015</a:t>
             </a:fld>
             <a:endParaRPr lang="en-US"/>
           </a:p>
@@ -6991,7 +7245,7 @@
           <a:p>
             <a:fld id="{28CA3B8B-C56F-4663-93D1-BECEDA7EAF67}" type="datetimeFigureOut">
               <a:rPr lang="en-US" smtClean="0"/>
-              <a:t>11/27/2015</a:t>
+              <a:t>12/1/2015</a:t>
             </a:fld>
             <a:endParaRPr lang="en-US"/>
           </a:p>
@@ -7268,7 +7522,7 @@
           <a:p>
             <a:fld id="{28CA3B8B-C56F-4663-93D1-BECEDA7EAF67}" type="datetimeFigureOut">
               <a:rPr lang="en-US" smtClean="0"/>
-              <a:t>11/27/2015</a:t>
+              <a:t>12/1/2015</a:t>
             </a:fld>
             <a:endParaRPr lang="en-US"/>
           </a:p>
@@ -7521,7 +7775,7 @@
           <a:p>
             <a:fld id="{28CA3B8B-C56F-4663-93D1-BECEDA7EAF67}" type="datetimeFigureOut">
               <a:rPr lang="en-US" smtClean="0"/>
-              <a:t>11/27/2015</a:t>
+              <a:t>12/1/2015</a:t>
             </a:fld>
             <a:endParaRPr lang="en-US"/>
           </a:p>
@@ -7734,7 +7988,7 @@
           <a:p>
             <a:fld id="{28CA3B8B-C56F-4663-93D1-BECEDA7EAF67}" type="datetimeFigureOut">
               <a:rPr lang="en-US" smtClean="0"/>
-              <a:t>11/27/2015</a:t>
+              <a:t>12/1/2015</a:t>
             </a:fld>
             <a:endParaRPr lang="en-US"/>
           </a:p>
@@ -15514,6 +15768,695 @@
         <p:cTn id="1" dur="indefinite" restart="never" nodeType="tmRoot"/>
       </p:par>
     </p:tnLst>
+  </p:timing>
+</p:sld>
+</file>
+
+<file path=ppt/slides/slide28.xml><?xml version="1.0" encoding="utf-8"?>
+<p:sld xmlns:a="http://schemas.openxmlformats.org/drawingml/2006/main" xmlns:r="http://schemas.openxmlformats.org/officeDocument/2006/relationships" xmlns:p="http://schemas.openxmlformats.org/presentationml/2006/main">
+  <p:cSld>
+    <p:spTree>
+      <p:nvGrpSpPr>
+        <p:cNvPr id="1" name=""/>
+        <p:cNvGrpSpPr/>
+        <p:nvPr/>
+      </p:nvGrpSpPr>
+      <p:grpSpPr>
+        <a:xfrm>
+          <a:off x="0" y="0"/>
+          <a:ext cx="0" cy="0"/>
+          <a:chOff x="0" y="0"/>
+          <a:chExt cx="0" cy="0"/>
+        </a:xfrm>
+      </p:grpSpPr>
+      <p:sp>
+        <p:nvSpPr>
+          <p:cNvPr id="2" name="Title 1"/>
+          <p:cNvSpPr>
+            <a:spLocks noGrp="1"/>
+          </p:cNvSpPr>
+          <p:nvPr>
+            <p:ph type="title"/>
+          </p:nvPr>
+        </p:nvSpPr>
+        <p:spPr/>
+        <p:txBody>
+          <a:bodyPr/>
+          <a:lstStyle/>
+          <a:p>
+            <a:r>
+              <a:rPr lang="de-DE" dirty="0"/>
+              <a:t>F# </a:t>
+            </a:r>
+            <a:r>
+              <a:rPr lang="de-DE" dirty="0" err="1" smtClean="0"/>
+              <a:t>Foundation</a:t>
+            </a:r>
+            <a:endParaRPr lang="en-US" dirty="0"/>
+          </a:p>
+        </p:txBody>
+      </p:sp>
+      <p:sp>
+        <p:nvSpPr>
+          <p:cNvPr id="3" name="Content Placeholder 2"/>
+          <p:cNvSpPr>
+            <a:spLocks noGrp="1"/>
+          </p:cNvSpPr>
+          <p:nvPr>
+            <p:ph idx="1"/>
+          </p:nvPr>
+        </p:nvSpPr>
+        <p:spPr/>
+        <p:txBody>
+          <a:bodyPr>
+            <a:normAutofit/>
+          </a:bodyPr>
+          <a:lstStyle/>
+          <a:p>
+            <a:r>
+              <a:rPr lang="de-DE" dirty="0" smtClean="0"/>
+              <a:t>F# </a:t>
+            </a:r>
+            <a:r>
+              <a:rPr lang="de-DE" dirty="0" err="1" smtClean="0"/>
+              <a:t>Foundation</a:t>
+            </a:r>
+            <a:r>
+              <a:rPr lang="de-DE" dirty="0" smtClean="0"/>
+              <a:t> ist eine gemeinnütziger Verein</a:t>
+            </a:r>
+          </a:p>
+          <a:p>
+            <a:r>
+              <a:rPr lang="de-DE" dirty="0" smtClean="0"/>
+              <a:t>Die </a:t>
+            </a:r>
+            <a:r>
+              <a:rPr lang="de-DE" dirty="0" err="1" smtClean="0"/>
+              <a:t>Foundation</a:t>
+            </a:r>
+            <a:r>
+              <a:rPr lang="de-DE" dirty="0" smtClean="0"/>
+              <a:t> kontrolliert die Entwicklung der Sprache</a:t>
+            </a:r>
+          </a:p>
+          <a:p>
+            <a:r>
+              <a:rPr lang="de-DE" dirty="0" smtClean="0"/>
+              <a:t>Es ist hier um zu bleiben</a:t>
+            </a:r>
+            <a:endParaRPr lang="de-DE" dirty="0" smtClean="0"/>
+          </a:p>
+          <a:p>
+            <a:pPr marL="0" indent="0">
+              <a:buNone/>
+            </a:pPr>
+            <a:endParaRPr lang="de-DE" dirty="0" smtClean="0"/>
+          </a:p>
+          <a:p>
+            <a:pPr marL="0" indent="0">
+              <a:buNone/>
+            </a:pPr>
+            <a:endParaRPr lang="de-DE" dirty="0" smtClean="0"/>
+          </a:p>
+          <a:p>
+            <a:pPr marL="0" indent="0">
+              <a:buNone/>
+            </a:pPr>
+            <a:endParaRPr lang="de-DE" dirty="0" smtClean="0"/>
+          </a:p>
+          <a:p>
+            <a:pPr marL="0" indent="0">
+              <a:buNone/>
+            </a:pPr>
+            <a:endParaRPr lang="en-US" dirty="0"/>
+          </a:p>
+        </p:txBody>
+      </p:sp>
+    </p:spTree>
+    <p:extLst>
+      <p:ext uri="{BB962C8B-B14F-4D97-AF65-F5344CB8AC3E}">
+        <p14:creationId xmlns:p14="http://schemas.microsoft.com/office/powerpoint/2010/main" val="2791116488"/>
+      </p:ext>
+    </p:extLst>
+  </p:cSld>
+  <p:clrMapOvr>
+    <a:masterClrMapping/>
+  </p:clrMapOvr>
+  <p:timing>
+    <p:tnLst>
+      <p:par>
+        <p:cTn id="1" dur="indefinite" restart="never" nodeType="tmRoot">
+          <p:childTnLst>
+            <p:seq concurrent="1" nextAc="seek">
+              <p:cTn id="2" dur="indefinite" nodeType="mainSeq">
+                <p:childTnLst>
+                  <p:par>
+                    <p:cTn id="3" fill="hold">
+                      <p:stCondLst>
+                        <p:cond delay="indefinite"/>
+                      </p:stCondLst>
+                      <p:childTnLst>
+                        <p:par>
+                          <p:cTn id="4" fill="hold">
+                            <p:stCondLst>
+                              <p:cond delay="0"/>
+                            </p:stCondLst>
+                            <p:childTnLst>
+                              <p:par>
+                                <p:cTn id="5" presetID="1" presetClass="entr" presetSubtype="0" fill="hold" grpId="0" nodeType="clickEffect">
+                                  <p:stCondLst>
+                                    <p:cond delay="0"/>
+                                  </p:stCondLst>
+                                  <p:childTnLst>
+                                    <p:set>
+                                      <p:cBhvr>
+                                        <p:cTn id="6" dur="1" fill="hold">
+                                          <p:stCondLst>
+                                            <p:cond delay="0"/>
+                                          </p:stCondLst>
+                                        </p:cTn>
+                                        <p:tgtEl>
+                                          <p:spTgt spid="3">
+                                            <p:txEl>
+                                              <p:pRg st="0" end="0"/>
+                                            </p:txEl>
+                                          </p:spTgt>
+                                        </p:tgtEl>
+                                        <p:attrNameLst>
+                                          <p:attrName>style.visibility</p:attrName>
+                                        </p:attrNameLst>
+                                      </p:cBhvr>
+                                      <p:to>
+                                        <p:strVal val="visible"/>
+                                      </p:to>
+                                    </p:set>
+                                  </p:childTnLst>
+                                </p:cTn>
+                              </p:par>
+                            </p:childTnLst>
+                          </p:cTn>
+                        </p:par>
+                      </p:childTnLst>
+                    </p:cTn>
+                  </p:par>
+                  <p:par>
+                    <p:cTn id="7" fill="hold">
+                      <p:stCondLst>
+                        <p:cond delay="indefinite"/>
+                      </p:stCondLst>
+                      <p:childTnLst>
+                        <p:par>
+                          <p:cTn id="8" fill="hold">
+                            <p:stCondLst>
+                              <p:cond delay="0"/>
+                            </p:stCondLst>
+                            <p:childTnLst>
+                              <p:par>
+                                <p:cTn id="9" presetID="1" presetClass="entr" presetSubtype="0" fill="hold" grpId="0" nodeType="clickEffect">
+                                  <p:stCondLst>
+                                    <p:cond delay="0"/>
+                                  </p:stCondLst>
+                                  <p:childTnLst>
+                                    <p:set>
+                                      <p:cBhvr>
+                                        <p:cTn id="10" dur="1" fill="hold">
+                                          <p:stCondLst>
+                                            <p:cond delay="0"/>
+                                          </p:stCondLst>
+                                        </p:cTn>
+                                        <p:tgtEl>
+                                          <p:spTgt spid="3">
+                                            <p:txEl>
+                                              <p:pRg st="1" end="1"/>
+                                            </p:txEl>
+                                          </p:spTgt>
+                                        </p:tgtEl>
+                                        <p:attrNameLst>
+                                          <p:attrName>style.visibility</p:attrName>
+                                        </p:attrNameLst>
+                                      </p:cBhvr>
+                                      <p:to>
+                                        <p:strVal val="visible"/>
+                                      </p:to>
+                                    </p:set>
+                                  </p:childTnLst>
+                                </p:cTn>
+                              </p:par>
+                            </p:childTnLst>
+                          </p:cTn>
+                        </p:par>
+                      </p:childTnLst>
+                    </p:cTn>
+                  </p:par>
+                  <p:par>
+                    <p:cTn id="11" fill="hold">
+                      <p:stCondLst>
+                        <p:cond delay="indefinite"/>
+                      </p:stCondLst>
+                      <p:childTnLst>
+                        <p:par>
+                          <p:cTn id="12" fill="hold">
+                            <p:stCondLst>
+                              <p:cond delay="0"/>
+                            </p:stCondLst>
+                            <p:childTnLst>
+                              <p:par>
+                                <p:cTn id="13" presetID="1" presetClass="entr" presetSubtype="0" fill="hold" grpId="0" nodeType="clickEffect">
+                                  <p:stCondLst>
+                                    <p:cond delay="0"/>
+                                  </p:stCondLst>
+                                  <p:childTnLst>
+                                    <p:set>
+                                      <p:cBhvr>
+                                        <p:cTn id="14" dur="1" fill="hold">
+                                          <p:stCondLst>
+                                            <p:cond delay="0"/>
+                                          </p:stCondLst>
+                                        </p:cTn>
+                                        <p:tgtEl>
+                                          <p:spTgt spid="3">
+                                            <p:txEl>
+                                              <p:pRg st="2" end="2"/>
+                                            </p:txEl>
+                                          </p:spTgt>
+                                        </p:tgtEl>
+                                        <p:attrNameLst>
+                                          <p:attrName>style.visibility</p:attrName>
+                                        </p:attrNameLst>
+                                      </p:cBhvr>
+                                      <p:to>
+                                        <p:strVal val="visible"/>
+                                      </p:to>
+                                    </p:set>
+                                  </p:childTnLst>
+                                </p:cTn>
+                              </p:par>
+                            </p:childTnLst>
+                          </p:cTn>
+                        </p:par>
+                      </p:childTnLst>
+                    </p:cTn>
+                  </p:par>
+                </p:childTnLst>
+              </p:cTn>
+              <p:prevCondLst>
+                <p:cond evt="onPrev" delay="0">
+                  <p:tgtEl>
+                    <p:sldTgt/>
+                  </p:tgtEl>
+                </p:cond>
+              </p:prevCondLst>
+              <p:nextCondLst>
+                <p:cond evt="onNext" delay="0">
+                  <p:tgtEl>
+                    <p:sldTgt/>
+                  </p:tgtEl>
+                </p:cond>
+              </p:nextCondLst>
+            </p:seq>
+          </p:childTnLst>
+        </p:cTn>
+      </p:par>
+    </p:tnLst>
+    <p:bldLst>
+      <p:bldP spid="3" grpId="0" build="p"/>
+    </p:bldLst>
+  </p:timing>
+</p:sld>
+</file>
+
+<file path=ppt/slides/slide29.xml><?xml version="1.0" encoding="utf-8"?>
+<p:sld xmlns:a="http://schemas.openxmlformats.org/drawingml/2006/main" xmlns:r="http://schemas.openxmlformats.org/officeDocument/2006/relationships" xmlns:p="http://schemas.openxmlformats.org/presentationml/2006/main">
+  <p:cSld>
+    <p:spTree>
+      <p:nvGrpSpPr>
+        <p:cNvPr id="1" name=""/>
+        <p:cNvGrpSpPr/>
+        <p:nvPr/>
+      </p:nvGrpSpPr>
+      <p:grpSpPr>
+        <a:xfrm>
+          <a:off x="0" y="0"/>
+          <a:ext cx="0" cy="0"/>
+          <a:chOff x="0" y="0"/>
+          <a:chExt cx="0" cy="0"/>
+        </a:xfrm>
+      </p:grpSpPr>
+      <p:sp>
+        <p:nvSpPr>
+          <p:cNvPr id="2" name="Title 1"/>
+          <p:cNvSpPr>
+            <a:spLocks noGrp="1"/>
+          </p:cNvSpPr>
+          <p:nvPr>
+            <p:ph type="title"/>
+          </p:nvPr>
+        </p:nvSpPr>
+        <p:spPr/>
+        <p:txBody>
+          <a:bodyPr/>
+          <a:lstStyle/>
+          <a:p>
+            <a:r>
+              <a:rPr lang="de-DE" dirty="0"/>
+              <a:t>F# ist open </a:t>
+            </a:r>
+            <a:r>
+              <a:rPr lang="de-DE" dirty="0" err="1"/>
+              <a:t>source</a:t>
+            </a:r>
+            <a:endParaRPr lang="en-US" dirty="0"/>
+          </a:p>
+        </p:txBody>
+      </p:sp>
+      <p:sp>
+        <p:nvSpPr>
+          <p:cNvPr id="3" name="Content Placeholder 2"/>
+          <p:cNvSpPr>
+            <a:spLocks noGrp="1"/>
+          </p:cNvSpPr>
+          <p:nvPr>
+            <p:ph idx="1"/>
+          </p:nvPr>
+        </p:nvSpPr>
+        <p:spPr/>
+        <p:txBody>
+          <a:bodyPr>
+            <a:normAutofit/>
+          </a:bodyPr>
+          <a:lstStyle/>
+          <a:p>
+            <a:r>
+              <a:rPr lang="de-DE" dirty="0" smtClean="0"/>
+              <a:t>Das Quellcode ist auf </a:t>
+            </a:r>
+            <a:r>
+              <a:rPr lang="de-DE" dirty="0" err="1" smtClean="0"/>
+              <a:t>GitHub</a:t>
+            </a:r>
+            <a:r>
+              <a:rPr lang="de-DE" dirty="0" smtClean="0"/>
+              <a:t> zu finden</a:t>
+            </a:r>
+            <a:endParaRPr lang="de-DE" dirty="0" smtClean="0"/>
+          </a:p>
+          <a:p>
+            <a:r>
+              <a:rPr lang="de-DE" dirty="0" smtClean="0"/>
+              <a:t>Das Ökosystem F# ist lebendig</a:t>
+            </a:r>
+          </a:p>
+          <a:p>
+            <a:r>
+              <a:rPr lang="de-DE" dirty="0" smtClean="0"/>
+              <a:t>Sehr viele FSO Projekte in vielen Bereichen (Data, Web, </a:t>
+            </a:r>
+            <a:r>
+              <a:rPr lang="de-DE" dirty="0" err="1" smtClean="0"/>
+              <a:t>Machine</a:t>
+            </a:r>
+            <a:r>
+              <a:rPr lang="de-DE" dirty="0" smtClean="0"/>
+              <a:t> Learning, Finanzen)</a:t>
+            </a:r>
+            <a:endParaRPr lang="de-DE" dirty="0"/>
+          </a:p>
+          <a:p>
+            <a:r>
+              <a:rPr lang="de-DE" dirty="0" smtClean="0"/>
+              <a:t>Hilfreiche Autoren der </a:t>
+            </a:r>
+            <a:r>
+              <a:rPr lang="de-DE" dirty="0" err="1" smtClean="0"/>
+              <a:t>Bilbliotheken</a:t>
+            </a:r>
+            <a:endParaRPr lang="de-DE" dirty="0" smtClean="0"/>
+          </a:p>
+          <a:p>
+            <a:pPr marL="0" indent="0">
+              <a:buNone/>
+            </a:pPr>
+            <a:endParaRPr lang="de-DE" dirty="0" smtClean="0"/>
+          </a:p>
+          <a:p>
+            <a:pPr marL="0" indent="0">
+              <a:buNone/>
+            </a:pPr>
+            <a:endParaRPr lang="de-DE" dirty="0" smtClean="0"/>
+          </a:p>
+          <a:p>
+            <a:pPr marL="0" indent="0">
+              <a:buNone/>
+            </a:pPr>
+            <a:endParaRPr lang="de-DE" dirty="0" smtClean="0"/>
+          </a:p>
+          <a:p>
+            <a:pPr marL="0" indent="0">
+              <a:buNone/>
+            </a:pPr>
+            <a:endParaRPr lang="en-US" dirty="0"/>
+          </a:p>
+        </p:txBody>
+      </p:sp>
+    </p:spTree>
+    <p:extLst>
+      <p:ext uri="{BB962C8B-B14F-4D97-AF65-F5344CB8AC3E}">
+        <p14:creationId xmlns:p14="http://schemas.microsoft.com/office/powerpoint/2010/main" val="3896142169"/>
+      </p:ext>
+    </p:extLst>
+  </p:cSld>
+  <p:clrMapOvr>
+    <a:masterClrMapping/>
+  </p:clrMapOvr>
+  <p:timing>
+    <p:tnLst>
+      <p:par>
+        <p:cTn id="1" dur="indefinite" restart="never" nodeType="tmRoot">
+          <p:childTnLst>
+            <p:seq concurrent="1" nextAc="seek">
+              <p:cTn id="2" dur="indefinite" nodeType="mainSeq">
+                <p:childTnLst>
+                  <p:par>
+                    <p:cTn id="3" fill="hold">
+                      <p:stCondLst>
+                        <p:cond delay="indefinite"/>
+                      </p:stCondLst>
+                      <p:childTnLst>
+                        <p:par>
+                          <p:cTn id="4" fill="hold">
+                            <p:stCondLst>
+                              <p:cond delay="0"/>
+                            </p:stCondLst>
+                            <p:childTnLst>
+                              <p:par>
+                                <p:cTn id="5" presetID="1" presetClass="entr" presetSubtype="0" fill="hold" grpId="0" nodeType="clickEffect">
+                                  <p:stCondLst>
+                                    <p:cond delay="0"/>
+                                  </p:stCondLst>
+                                  <p:childTnLst>
+                                    <p:set>
+                                      <p:cBhvr>
+                                        <p:cTn id="6" dur="1" fill="hold">
+                                          <p:stCondLst>
+                                            <p:cond delay="0"/>
+                                          </p:stCondLst>
+                                        </p:cTn>
+                                        <p:tgtEl>
+                                          <p:spTgt spid="3">
+                                            <p:txEl>
+                                              <p:pRg st="0" end="0"/>
+                                            </p:txEl>
+                                          </p:spTgt>
+                                        </p:tgtEl>
+                                        <p:attrNameLst>
+                                          <p:attrName>style.visibility</p:attrName>
+                                        </p:attrNameLst>
+                                      </p:cBhvr>
+                                      <p:to>
+                                        <p:strVal val="visible"/>
+                                      </p:to>
+                                    </p:set>
+                                  </p:childTnLst>
+                                </p:cTn>
+                              </p:par>
+                            </p:childTnLst>
+                          </p:cTn>
+                        </p:par>
+                      </p:childTnLst>
+                    </p:cTn>
+                  </p:par>
+                  <p:par>
+                    <p:cTn id="7" fill="hold">
+                      <p:stCondLst>
+                        <p:cond delay="indefinite"/>
+                      </p:stCondLst>
+                      <p:childTnLst>
+                        <p:par>
+                          <p:cTn id="8" fill="hold">
+                            <p:stCondLst>
+                              <p:cond delay="0"/>
+                            </p:stCondLst>
+                            <p:childTnLst>
+                              <p:par>
+                                <p:cTn id="9" presetID="1" presetClass="entr" presetSubtype="0" fill="hold" grpId="0" nodeType="clickEffect">
+                                  <p:stCondLst>
+                                    <p:cond delay="0"/>
+                                  </p:stCondLst>
+                                  <p:childTnLst>
+                                    <p:set>
+                                      <p:cBhvr>
+                                        <p:cTn id="10" dur="1" fill="hold">
+                                          <p:stCondLst>
+                                            <p:cond delay="0"/>
+                                          </p:stCondLst>
+                                        </p:cTn>
+                                        <p:tgtEl>
+                                          <p:spTgt spid="3">
+                                            <p:txEl>
+                                              <p:pRg st="1" end="1"/>
+                                            </p:txEl>
+                                          </p:spTgt>
+                                        </p:tgtEl>
+                                        <p:attrNameLst>
+                                          <p:attrName>style.visibility</p:attrName>
+                                        </p:attrNameLst>
+                                      </p:cBhvr>
+                                      <p:to>
+                                        <p:strVal val="visible"/>
+                                      </p:to>
+                                    </p:set>
+                                  </p:childTnLst>
+                                </p:cTn>
+                              </p:par>
+                            </p:childTnLst>
+                          </p:cTn>
+                        </p:par>
+                      </p:childTnLst>
+                    </p:cTn>
+                  </p:par>
+                  <p:par>
+                    <p:cTn id="11" fill="hold">
+                      <p:stCondLst>
+                        <p:cond delay="indefinite"/>
+                      </p:stCondLst>
+                      <p:childTnLst>
+                        <p:par>
+                          <p:cTn id="12" fill="hold">
+                            <p:stCondLst>
+                              <p:cond delay="0"/>
+                            </p:stCondLst>
+                            <p:childTnLst>
+                              <p:par>
+                                <p:cTn id="13" presetID="1" presetClass="entr" presetSubtype="0" fill="hold" grpId="0" nodeType="clickEffect">
+                                  <p:stCondLst>
+                                    <p:cond delay="0"/>
+                                  </p:stCondLst>
+                                  <p:childTnLst>
+                                    <p:set>
+                                      <p:cBhvr>
+                                        <p:cTn id="14" dur="1" fill="hold">
+                                          <p:stCondLst>
+                                            <p:cond delay="0"/>
+                                          </p:stCondLst>
+                                        </p:cTn>
+                                        <p:tgtEl>
+                                          <p:spTgt spid="3">
+                                            <p:txEl>
+                                              <p:pRg st="2" end="2"/>
+                                            </p:txEl>
+                                          </p:spTgt>
+                                        </p:tgtEl>
+                                        <p:attrNameLst>
+                                          <p:attrName>style.visibility</p:attrName>
+                                        </p:attrNameLst>
+                                      </p:cBhvr>
+                                      <p:to>
+                                        <p:strVal val="visible"/>
+                                      </p:to>
+                                    </p:set>
+                                  </p:childTnLst>
+                                </p:cTn>
+                              </p:par>
+                            </p:childTnLst>
+                          </p:cTn>
+                        </p:par>
+                      </p:childTnLst>
+                    </p:cTn>
+                  </p:par>
+                  <p:par>
+                    <p:cTn id="15" fill="hold">
+                      <p:stCondLst>
+                        <p:cond delay="indefinite"/>
+                      </p:stCondLst>
+                      <p:childTnLst>
+                        <p:par>
+                          <p:cTn id="16" fill="hold">
+                            <p:stCondLst>
+                              <p:cond delay="0"/>
+                            </p:stCondLst>
+                            <p:childTnLst>
+                              <p:par>
+                                <p:cTn id="17" presetID="1" presetClass="entr" presetSubtype="0" fill="hold" grpId="0" nodeType="clickEffect">
+                                  <p:stCondLst>
+                                    <p:cond delay="0"/>
+                                  </p:stCondLst>
+                                  <p:childTnLst>
+                                    <p:set>
+                                      <p:cBhvr>
+                                        <p:cTn id="18" dur="1" fill="hold">
+                                          <p:stCondLst>
+                                            <p:cond delay="0"/>
+                                          </p:stCondLst>
+                                        </p:cTn>
+                                        <p:tgtEl>
+                                          <p:spTgt spid="3">
+                                            <p:txEl>
+                                              <p:pRg st="3" end="3"/>
+                                            </p:txEl>
+                                          </p:spTgt>
+                                        </p:tgtEl>
+                                        <p:attrNameLst>
+                                          <p:attrName>style.visibility</p:attrName>
+                                        </p:attrNameLst>
+                                      </p:cBhvr>
+                                      <p:to>
+                                        <p:strVal val="visible"/>
+                                      </p:to>
+                                    </p:set>
+                                  </p:childTnLst>
+                                </p:cTn>
+                              </p:par>
+                            </p:childTnLst>
+                          </p:cTn>
+                        </p:par>
+                      </p:childTnLst>
+                    </p:cTn>
+                  </p:par>
+                </p:childTnLst>
+              </p:cTn>
+              <p:prevCondLst>
+                <p:cond evt="onPrev" delay="0">
+                  <p:tgtEl>
+                    <p:sldTgt/>
+                  </p:tgtEl>
+                </p:cond>
+              </p:prevCondLst>
+              <p:nextCondLst>
+                <p:cond evt="onNext" delay="0">
+                  <p:tgtEl>
+                    <p:sldTgt/>
+                  </p:tgtEl>
+                </p:cond>
+              </p:nextCondLst>
+            </p:seq>
+          </p:childTnLst>
+        </p:cTn>
+      </p:par>
+    </p:tnLst>
+    <p:bldLst>
+      <p:bldP spid="3" grpId="0" build="p"/>
+    </p:bldLst>
   </p:timing>
 </p:sld>
 </file>

</xml_diff>